<commit_message>
Add slide on selective checkout
</commit_message>
<xml_diff>
--- a/mlops_on_hpc.pptx
+++ b/mlops_on_hpc.pptx
@@ -5,7 +5,7 @@
     <p:sldMasterId id="2147483648" r:id="rId1"/>
   </p:sldMasterIdLst>
   <p:notesMasterIdLst>
-    <p:notesMasterId r:id="rId20"/>
+    <p:notesMasterId r:id="rId22"/>
   </p:notesMasterIdLst>
   <p:sldIdLst>
     <p:sldId id="257" r:id="rId2"/>
@@ -25,7 +25,9 @@
     <p:sldId id="368" r:id="rId16"/>
     <p:sldId id="369" r:id="rId17"/>
     <p:sldId id="370" r:id="rId18"/>
-    <p:sldId id="358" r:id="rId19"/>
+    <p:sldId id="372" r:id="rId19"/>
+    <p:sldId id="371" r:id="rId20"/>
+    <p:sldId id="358" r:id="rId21"/>
   </p:sldIdLst>
   <p:sldSz cx="12192000" cy="6858000"/>
   <p:notesSz cx="6858000" cy="9144000"/>
@@ -7766,7 +7768,17 @@
                 <a:latin typeface="Courier New" pitchFamily="49" charset="0"/>
                 <a:cs typeface="Courier New" pitchFamily="49" charset="0"/>
               </a:rPr>
-              <a:t>$  git log</a:t>
+              <a:t>$  git log --</a:t>
+            </a:r>
+            <a:r>
+              <a:rPr lang="en-US" b="1" dirty="0" err="1">
+                <a:solidFill>
+                  <a:schemeClr val="bg1"/>
+                </a:solidFill>
+                <a:latin typeface="Courier New" pitchFamily="49" charset="0"/>
+                <a:cs typeface="Courier New" pitchFamily="49" charset="0"/>
+              </a:rPr>
+              <a:t>oneline</a:t>
             </a:r>
             <a:endParaRPr lang="nl-BE" b="1" dirty="0">
               <a:solidFill>
@@ -8050,10 +8062,10 @@
         </p:nvGrpSpPr>
         <p:grpSpPr>
           <a:xfrm>
-            <a:off x="6150428" y="4361584"/>
-            <a:ext cx="5708901" cy="1233151"/>
-            <a:chOff x="6150428" y="4361584"/>
-            <a:chExt cx="5708901" cy="1233151"/>
+            <a:off x="8413411" y="4542053"/>
+            <a:ext cx="3668370" cy="1449052"/>
+            <a:chOff x="8413411" y="4542053"/>
+            <a:chExt cx="3668370" cy="1449052"/>
           </a:xfrm>
         </p:grpSpPr>
         <p:sp>
@@ -8070,8 +8082,8 @@
           </p:nvSpPr>
           <p:spPr>
             <a:xfrm>
-              <a:off x="6150428" y="5009960"/>
-              <a:ext cx="5648278" cy="584775"/>
+              <a:off x="8413411" y="4913887"/>
+              <a:ext cx="3507692" cy="1077218"/>
             </a:xfrm>
             <a:prstGeom prst="rect">
               <a:avLst/>
@@ -8093,8 +8105,11 @@
             <a:p>
               <a:r>
                 <a:rPr lang="en-US" sz="3200" dirty="0"/>
-                <a:t>Don't forget </a:t>
+                <a:t>Don't forget</a:t>
               </a:r>
+              <a:br>
+                <a:rPr lang="en-US" sz="3200" dirty="0"/>
+              </a:br>
               <a:r>
                 <a:rPr lang="en-US" sz="3200" dirty="0" err="1">
                   <a:latin typeface="Courier New" panose="02070309020205020404" pitchFamily="49" charset="0"/>
@@ -8146,7 +8161,118 @@
           </p:blipFill>
           <p:spPr bwMode="auto">
             <a:xfrm>
-              <a:off x="11293178" y="4361584"/>
+              <a:off x="11515630" y="4542053"/>
+              <a:ext cx="566151" cy="580908"/>
+            </a:xfrm>
+            <a:prstGeom prst="rect">
+              <a:avLst/>
+            </a:prstGeom>
+            <a:noFill/>
+            <a:extLst>
+              <a:ext uri="{909E8E84-426E-40DD-AFC4-6F175D3DCCD1}">
+                <a14:hiddenFill xmlns:a14="http://schemas.microsoft.com/office/drawing/2010/main">
+                  <a:solidFill>
+                    <a:srgbClr val="FFFFFF"/>
+                  </a:solidFill>
+                </a14:hiddenFill>
+              </a:ext>
+            </a:extLst>
+          </p:spPr>
+        </p:pic>
+      </p:grpSp>
+      <p:grpSp>
+        <p:nvGrpSpPr>
+          <p:cNvPr id="12" name="Group 11">
+            <a:extLst>
+              <a:ext uri="{FF2B5EF4-FFF2-40B4-BE49-F238E27FC236}">
+                <a16:creationId xmlns:a16="http://schemas.microsoft.com/office/drawing/2014/main" id="{5FC7630B-0F66-7E50-1CE4-2804692EE7EF}"/>
+              </a:ext>
+            </a:extLst>
+          </p:cNvPr>
+          <p:cNvGrpSpPr/>
+          <p:nvPr/>
+        </p:nvGrpSpPr>
+        <p:grpSpPr>
+          <a:xfrm>
+            <a:off x="7609019" y="2689759"/>
+            <a:ext cx="4189687" cy="942697"/>
+            <a:chOff x="6150428" y="4652038"/>
+            <a:chExt cx="4189687" cy="942697"/>
+          </a:xfrm>
+        </p:grpSpPr>
+        <p:sp>
+          <p:nvSpPr>
+            <p:cNvPr id="13" name="TextBox 12">
+              <a:extLst>
+                <a:ext uri="{FF2B5EF4-FFF2-40B4-BE49-F238E27FC236}">
+                  <a16:creationId xmlns:a16="http://schemas.microsoft.com/office/drawing/2014/main" id="{72798926-F725-FC59-8E20-52323B2C7F8E}"/>
+                </a:ext>
+              </a:extLst>
+            </p:cNvPr>
+            <p:cNvSpPr txBox="1"/>
+            <p:nvPr/>
+          </p:nvSpPr>
+          <p:spPr>
+            <a:xfrm>
+              <a:off x="6150428" y="5009960"/>
+              <a:ext cx="3723648" cy="584775"/>
+            </a:xfrm>
+            <a:prstGeom prst="rect">
+              <a:avLst/>
+            </a:prstGeom>
+            <a:solidFill>
+              <a:schemeClr val="bg1"/>
+            </a:solidFill>
+            <a:ln>
+              <a:solidFill>
+                <a:schemeClr val="tx1"/>
+              </a:solidFill>
+            </a:ln>
+          </p:spPr>
+          <p:txBody>
+            <a:bodyPr wrap="none" rtlCol="0">
+              <a:spAutoFit/>
+            </a:bodyPr>
+            <a:lstStyle/>
+            <a:p>
+              <a:r>
+                <a:rPr lang="en-US" sz="3200" dirty="0"/>
+                <a:t>Scripts also revert!!!</a:t>
+              </a:r>
+              <a:endParaRPr lang="LID4096" sz="3200" dirty="0"/>
+            </a:p>
+          </p:txBody>
+        </p:sp>
+        <p:pic>
+          <p:nvPicPr>
+            <p:cNvPr id="14" name="Picture 2" descr="C:\Users\lucg5005\AppData\Local\Microsoft\Windows\Temporary Internet Files\Content.IE5\CWZUAEH4\lgi01a201309290600[1].jpg">
+              <a:extLst>
+                <a:ext uri="{FF2B5EF4-FFF2-40B4-BE49-F238E27FC236}">
+                  <a16:creationId xmlns:a16="http://schemas.microsoft.com/office/drawing/2014/main" id="{E68B4816-5792-F5BD-519A-2A505E4C857C}"/>
+                </a:ext>
+              </a:extLst>
+            </p:cNvPr>
+            <p:cNvPicPr>
+              <a:picLocks noChangeAspect="1" noChangeArrowheads="1"/>
+            </p:cNvPicPr>
+            <p:nvPr/>
+          </p:nvPicPr>
+          <p:blipFill>
+            <a:blip r:embed="rId2" cstate="print">
+              <a:extLst>
+                <a:ext uri="{28A0092B-C50C-407E-A947-70E740481C1C}">
+                  <a14:useLocalDpi xmlns:a14="http://schemas.microsoft.com/office/drawing/2010/main" val="0"/>
+                </a:ext>
+              </a:extLst>
+            </a:blip>
+            <a:srcRect/>
+            <a:stretch>
+              <a:fillRect/>
+            </a:stretch>
+          </p:blipFill>
+          <p:spPr bwMode="auto">
+            <a:xfrm>
+              <a:off x="9773964" y="4652038"/>
               <a:ext cx="566151" cy="580908"/>
             </a:xfrm>
             <a:prstGeom prst="rect">
@@ -8316,6 +8442,1009 @@
 </file>
 
 <file path=ppt/slides/slide18.xml><?xml version="1.0" encoding="utf-8"?>
+<p:sld xmlns:a="http://schemas.openxmlformats.org/drawingml/2006/main" xmlns:r="http://schemas.openxmlformats.org/officeDocument/2006/relationships" xmlns:p="http://schemas.openxmlformats.org/presentationml/2006/main">
+  <p:cSld>
+    <p:spTree>
+      <p:nvGrpSpPr>
+        <p:cNvPr id="1" name="">
+          <a:extLst>
+            <a:ext uri="{FF2B5EF4-FFF2-40B4-BE49-F238E27FC236}">
+              <a16:creationId xmlns:a16="http://schemas.microsoft.com/office/drawing/2014/main" id="{D3415714-3A45-E687-6CBD-5F4EBA417608}"/>
+            </a:ext>
+          </a:extLst>
+        </p:cNvPr>
+        <p:cNvGrpSpPr/>
+        <p:nvPr/>
+      </p:nvGrpSpPr>
+      <p:grpSpPr>
+        <a:xfrm>
+          <a:off x="0" y="0"/>
+          <a:ext cx="0" cy="0"/>
+          <a:chOff x="0" y="0"/>
+          <a:chExt cx="0" cy="0"/>
+        </a:xfrm>
+      </p:grpSpPr>
+      <p:sp>
+        <p:nvSpPr>
+          <p:cNvPr id="2" name="Title 1">
+            <a:extLst>
+              <a:ext uri="{FF2B5EF4-FFF2-40B4-BE49-F238E27FC236}">
+                <a16:creationId xmlns:a16="http://schemas.microsoft.com/office/drawing/2014/main" id="{6AFC9AD6-CD94-A894-CF95-CB637917AF7B}"/>
+              </a:ext>
+            </a:extLst>
+          </p:cNvPr>
+          <p:cNvSpPr>
+            <a:spLocks noGrp="1"/>
+          </p:cNvSpPr>
+          <p:nvPr>
+            <p:ph type="title"/>
+          </p:nvPr>
+        </p:nvSpPr>
+        <p:spPr/>
+        <p:txBody>
+          <a:bodyPr/>
+          <a:lstStyle/>
+          <a:p>
+            <a:r>
+              <a:rPr lang="en-US" dirty="0"/>
+              <a:t>Check out only older data sets</a:t>
+            </a:r>
+            <a:endParaRPr lang="LID4096" dirty="0"/>
+          </a:p>
+        </p:txBody>
+      </p:sp>
+      <p:sp>
+        <p:nvSpPr>
+          <p:cNvPr id="3" name="Content Placeholder 2">
+            <a:extLst>
+              <a:ext uri="{FF2B5EF4-FFF2-40B4-BE49-F238E27FC236}">
+                <a16:creationId xmlns:a16="http://schemas.microsoft.com/office/drawing/2014/main" id="{D7832CD3-DF03-B8CB-F004-82A4FFD24A56}"/>
+              </a:ext>
+            </a:extLst>
+          </p:cNvPr>
+          <p:cNvSpPr>
+            <a:spLocks noGrp="1"/>
+          </p:cNvSpPr>
+          <p:nvPr>
+            <p:ph idx="1"/>
+          </p:nvPr>
+        </p:nvSpPr>
+        <p:spPr/>
+        <p:txBody>
+          <a:bodyPr/>
+          <a:lstStyle/>
+          <a:p>
+            <a:r>
+              <a:rPr lang="en-US" dirty="0"/>
+              <a:t>Find commit ID with git log</a:t>
+            </a:r>
+          </a:p>
+          <a:p>
+            <a:endParaRPr lang="en-US" dirty="0"/>
+          </a:p>
+          <a:p>
+            <a:r>
+              <a:rPr lang="en-US" dirty="0"/>
+              <a:t>Create a new branch &amp; restore commit, e.g., </a:t>
+            </a:r>
+            <a:r>
+              <a:rPr lang="en-US" dirty="0">
+                <a:latin typeface="Courier New" panose="02070309020205020404" pitchFamily="49" charset="0"/>
+                <a:cs typeface="Courier New" panose="02070309020205020404" pitchFamily="49" charset="0"/>
+              </a:rPr>
+              <a:t>17262ab</a:t>
+            </a:r>
+          </a:p>
+          <a:p>
+            <a:endParaRPr lang="en-US" dirty="0"/>
+          </a:p>
+          <a:p>
+            <a:endParaRPr lang="en-US" dirty="0"/>
+          </a:p>
+          <a:p>
+            <a:endParaRPr lang="en-US" dirty="0"/>
+          </a:p>
+          <a:p>
+            <a:r>
+              <a:rPr lang="en-US" dirty="0"/>
+              <a:t>When done, switch branches &amp; clean up</a:t>
+            </a:r>
+            <a:endParaRPr lang="LID4096" dirty="0"/>
+          </a:p>
+        </p:txBody>
+      </p:sp>
+      <p:sp>
+        <p:nvSpPr>
+          <p:cNvPr id="4" name="Slide Number Placeholder 3">
+            <a:extLst>
+              <a:ext uri="{FF2B5EF4-FFF2-40B4-BE49-F238E27FC236}">
+                <a16:creationId xmlns:a16="http://schemas.microsoft.com/office/drawing/2014/main" id="{3CF6A235-FD7E-FB42-EF92-DBCA59275CA5}"/>
+              </a:ext>
+            </a:extLst>
+          </p:cNvPr>
+          <p:cNvSpPr>
+            <a:spLocks noGrp="1"/>
+          </p:cNvSpPr>
+          <p:nvPr>
+            <p:ph type="sldNum" sz="quarter" idx="12"/>
+          </p:nvPr>
+        </p:nvSpPr>
+        <p:spPr/>
+        <p:txBody>
+          <a:bodyPr/>
+          <a:lstStyle/>
+          <a:p>
+            <a:fld id="{9C7CE217-4467-4B8D-A735-B008FA7C4816}" type="slidenum">
+              <a:rPr lang="LID4096" smtClean="0"/>
+              <a:t>18</a:t>
+            </a:fld>
+            <a:endParaRPr lang="LID4096"/>
+          </a:p>
+        </p:txBody>
+      </p:sp>
+      <p:sp>
+        <p:nvSpPr>
+          <p:cNvPr id="5" name="TextBox 4">
+            <a:extLst>
+              <a:ext uri="{FF2B5EF4-FFF2-40B4-BE49-F238E27FC236}">
+                <a16:creationId xmlns:a16="http://schemas.microsoft.com/office/drawing/2014/main" id="{9DBF9D6C-435F-7C39-8584-D34F4C56AA28}"/>
+              </a:ext>
+            </a:extLst>
+          </p:cNvPr>
+          <p:cNvSpPr txBox="1"/>
+          <p:nvPr/>
+        </p:nvSpPr>
+        <p:spPr>
+          <a:xfrm>
+            <a:off x="1503937" y="2336262"/>
+            <a:ext cx="8663320" cy="369332"/>
+          </a:xfrm>
+          <a:prstGeom prst="rect">
+            <a:avLst/>
+          </a:prstGeom>
+          <a:solidFill>
+            <a:schemeClr val="tx1"/>
+          </a:solidFill>
+          <a:ln>
+            <a:solidFill>
+              <a:schemeClr val="tx1"/>
+            </a:solidFill>
+          </a:ln>
+        </p:spPr>
+        <p:txBody>
+          <a:bodyPr wrap="square" rtlCol="0">
+            <a:spAutoFit/>
+          </a:bodyPr>
+          <a:lstStyle/>
+          <a:p>
+            <a:r>
+              <a:rPr lang="en-US" b="1" dirty="0">
+                <a:solidFill>
+                  <a:schemeClr val="bg1"/>
+                </a:solidFill>
+                <a:latin typeface="Courier New" pitchFamily="49" charset="0"/>
+                <a:cs typeface="Courier New" pitchFamily="49" charset="0"/>
+              </a:rPr>
+              <a:t>$  git log  --</a:t>
+            </a:r>
+            <a:r>
+              <a:rPr lang="en-US" b="1" dirty="0" err="1">
+                <a:solidFill>
+                  <a:schemeClr val="bg1"/>
+                </a:solidFill>
+                <a:latin typeface="Courier New" pitchFamily="49" charset="0"/>
+                <a:cs typeface="Courier New" pitchFamily="49" charset="0"/>
+              </a:rPr>
+              <a:t>oneline</a:t>
+            </a:r>
+            <a:r>
+              <a:rPr lang="en-US" b="1" dirty="0">
+                <a:solidFill>
+                  <a:schemeClr val="bg1"/>
+                </a:solidFill>
+                <a:latin typeface="Courier New" pitchFamily="49" charset="0"/>
+                <a:cs typeface="Courier New" pitchFamily="49" charset="0"/>
+              </a:rPr>
+              <a:t>  --  data/</a:t>
+            </a:r>
+            <a:r>
+              <a:rPr lang="en-US" b="1" dirty="0" err="1">
+                <a:solidFill>
+                  <a:schemeClr val="bg1"/>
+                </a:solidFill>
+                <a:latin typeface="Courier New" pitchFamily="49" charset="0"/>
+                <a:cs typeface="Courier New" pitchFamily="49" charset="0"/>
+              </a:rPr>
+              <a:t>data.csv.dvc</a:t>
+            </a:r>
+            <a:endParaRPr lang="nl-BE" b="1" dirty="0">
+              <a:solidFill>
+                <a:schemeClr val="bg1"/>
+              </a:solidFill>
+              <a:latin typeface="Courier New" pitchFamily="49" charset="0"/>
+              <a:cs typeface="Courier New" pitchFamily="49" charset="0"/>
+            </a:endParaRPr>
+          </a:p>
+        </p:txBody>
+      </p:sp>
+      <p:sp>
+        <p:nvSpPr>
+          <p:cNvPr id="6" name="TextBox 5">
+            <a:extLst>
+              <a:ext uri="{FF2B5EF4-FFF2-40B4-BE49-F238E27FC236}">
+                <a16:creationId xmlns:a16="http://schemas.microsoft.com/office/drawing/2014/main" id="{04566300-F87A-6F00-4390-BEA06B40B5CB}"/>
+              </a:ext>
+            </a:extLst>
+          </p:cNvPr>
+          <p:cNvSpPr txBox="1"/>
+          <p:nvPr/>
+        </p:nvSpPr>
+        <p:spPr>
+          <a:xfrm>
+            <a:off x="1503936" y="3368635"/>
+            <a:ext cx="8663321" cy="1477328"/>
+          </a:xfrm>
+          <a:prstGeom prst="rect">
+            <a:avLst/>
+          </a:prstGeom>
+          <a:solidFill>
+            <a:schemeClr val="tx1"/>
+          </a:solidFill>
+          <a:ln>
+            <a:solidFill>
+              <a:schemeClr val="tx1"/>
+            </a:solidFill>
+          </a:ln>
+        </p:spPr>
+        <p:txBody>
+          <a:bodyPr wrap="square" rtlCol="0">
+            <a:spAutoFit/>
+          </a:bodyPr>
+          <a:lstStyle/>
+          <a:p>
+            <a:r>
+              <a:rPr lang="en-US" b="1" dirty="0">
+                <a:solidFill>
+                  <a:schemeClr val="bg1"/>
+                </a:solidFill>
+                <a:latin typeface="Courier New" pitchFamily="49" charset="0"/>
+                <a:cs typeface="Courier New" pitchFamily="49" charset="0"/>
+              </a:rPr>
+              <a:t>$  git switch -C experiment</a:t>
+            </a:r>
+          </a:p>
+          <a:p>
+            <a:r>
+              <a:rPr lang="en-US" b="1" dirty="0">
+                <a:solidFill>
+                  <a:schemeClr val="bg1"/>
+                </a:solidFill>
+                <a:latin typeface="Courier New" pitchFamily="49" charset="0"/>
+                <a:cs typeface="Courier New" pitchFamily="49" charset="0"/>
+              </a:rPr>
+              <a:t>$  git restore  --source=17262ab  data/</a:t>
+            </a:r>
+            <a:r>
+              <a:rPr lang="en-US" b="1" dirty="0" err="1">
+                <a:solidFill>
+                  <a:schemeClr val="bg1"/>
+                </a:solidFill>
+                <a:latin typeface="Courier New" panose="02070309020205020404" pitchFamily="49" charset="0"/>
+                <a:cs typeface="Courier New" panose="02070309020205020404" pitchFamily="49" charset="0"/>
+              </a:rPr>
+              <a:t>data.csv.dvc</a:t>
+            </a:r>
+            <a:endParaRPr lang="en-US" b="1" dirty="0">
+              <a:solidFill>
+                <a:schemeClr val="bg1"/>
+              </a:solidFill>
+              <a:latin typeface="Courier New" pitchFamily="49" charset="0"/>
+              <a:cs typeface="Courier New" pitchFamily="49" charset="0"/>
+            </a:endParaRPr>
+          </a:p>
+          <a:p>
+            <a:r>
+              <a:rPr lang="en-US" b="1" dirty="0">
+                <a:solidFill>
+                  <a:schemeClr val="bg1"/>
+                </a:solidFill>
+                <a:latin typeface="Courier New" pitchFamily="49" charset="0"/>
+                <a:cs typeface="Courier New" pitchFamily="49" charset="0"/>
+              </a:rPr>
+              <a:t>$  git commit  -a  -m 'Use old data set'</a:t>
+            </a:r>
+          </a:p>
+          <a:p>
+            <a:r>
+              <a:rPr lang="en-US" b="1" dirty="0">
+                <a:solidFill>
+                  <a:schemeClr val="bg1"/>
+                </a:solidFill>
+                <a:latin typeface="Courier New" pitchFamily="49" charset="0"/>
+                <a:cs typeface="Courier New" pitchFamily="49" charset="0"/>
+              </a:rPr>
+              <a:t>$  </a:t>
+            </a:r>
+            <a:r>
+              <a:rPr lang="en-US" b="1" dirty="0" err="1">
+                <a:solidFill>
+                  <a:schemeClr val="bg1"/>
+                </a:solidFill>
+                <a:latin typeface="Courier New" pitchFamily="49" charset="0"/>
+                <a:cs typeface="Courier New" pitchFamily="49" charset="0"/>
+              </a:rPr>
+              <a:t>dvc</a:t>
+            </a:r>
+            <a:r>
+              <a:rPr lang="en-US" b="1" dirty="0">
+                <a:solidFill>
+                  <a:schemeClr val="bg1"/>
+                </a:solidFill>
+                <a:latin typeface="Courier New" pitchFamily="49" charset="0"/>
+                <a:cs typeface="Courier New" pitchFamily="49" charset="0"/>
+              </a:rPr>
+              <a:t> checkout</a:t>
+            </a:r>
+          </a:p>
+          <a:p>
+            <a:r>
+              <a:rPr lang="en-US" b="1" dirty="0">
+                <a:solidFill>
+                  <a:schemeClr val="bg1"/>
+                </a:solidFill>
+                <a:latin typeface="Courier New" pitchFamily="49" charset="0"/>
+                <a:cs typeface="Courier New" pitchFamily="49" charset="0"/>
+                <a:sym typeface="Symbol" panose="05050102010706020507" pitchFamily="18" charset="2"/>
+              </a:rPr>
+              <a:t></a:t>
+            </a:r>
+            <a:endParaRPr lang="nl-BE" b="1" dirty="0">
+              <a:solidFill>
+                <a:schemeClr val="bg1"/>
+              </a:solidFill>
+              <a:latin typeface="Courier New" pitchFamily="49" charset="0"/>
+              <a:cs typeface="Courier New" pitchFamily="49" charset="0"/>
+            </a:endParaRPr>
+          </a:p>
+        </p:txBody>
+      </p:sp>
+      <p:sp>
+        <p:nvSpPr>
+          <p:cNvPr id="8" name="TextBox 7">
+            <a:extLst>
+              <a:ext uri="{FF2B5EF4-FFF2-40B4-BE49-F238E27FC236}">
+                <a16:creationId xmlns:a16="http://schemas.microsoft.com/office/drawing/2014/main" id="{AC5977D0-B1B1-3CE8-39A9-0F5BFF267D10}"/>
+              </a:ext>
+            </a:extLst>
+          </p:cNvPr>
+          <p:cNvSpPr txBox="1"/>
+          <p:nvPr/>
+        </p:nvSpPr>
+        <p:spPr>
+          <a:xfrm>
+            <a:off x="1503936" y="5382147"/>
+            <a:ext cx="8663321" cy="1200329"/>
+          </a:xfrm>
+          <a:prstGeom prst="rect">
+            <a:avLst/>
+          </a:prstGeom>
+          <a:solidFill>
+            <a:schemeClr val="tx1"/>
+          </a:solidFill>
+          <a:ln>
+            <a:solidFill>
+              <a:schemeClr val="tx1"/>
+            </a:solidFill>
+          </a:ln>
+        </p:spPr>
+        <p:txBody>
+          <a:bodyPr wrap="square" rtlCol="0">
+            <a:spAutoFit/>
+          </a:bodyPr>
+          <a:lstStyle/>
+          <a:p>
+            <a:r>
+              <a:rPr lang="en-US" b="1" dirty="0">
+                <a:solidFill>
+                  <a:schemeClr val="bg1"/>
+                </a:solidFill>
+                <a:latin typeface="Courier New" pitchFamily="49" charset="0"/>
+                <a:cs typeface="Courier New" pitchFamily="49" charset="0"/>
+              </a:rPr>
+              <a:t>$  git switch -</a:t>
+            </a:r>
+          </a:p>
+          <a:p>
+            <a:r>
+              <a:rPr lang="en-US" b="1" dirty="0">
+                <a:solidFill>
+                  <a:schemeClr val="bg1"/>
+                </a:solidFill>
+                <a:latin typeface="Courier New" pitchFamily="49" charset="0"/>
+                <a:cs typeface="Courier New" pitchFamily="49" charset="0"/>
+              </a:rPr>
+              <a:t>$  git branch  -D  experiment</a:t>
+            </a:r>
+            <a:endParaRPr lang="en-US" b="1" dirty="0">
+              <a:solidFill>
+                <a:schemeClr val="bg1"/>
+              </a:solidFill>
+            </a:endParaRPr>
+          </a:p>
+          <a:p>
+            <a:r>
+              <a:rPr lang="en-US" b="1" dirty="0">
+                <a:solidFill>
+                  <a:schemeClr val="bg1"/>
+                </a:solidFill>
+                <a:latin typeface="Courier New" pitchFamily="49" charset="0"/>
+                <a:cs typeface="Courier New" pitchFamily="49" charset="0"/>
+              </a:rPr>
+              <a:t>$  </a:t>
+            </a:r>
+            <a:r>
+              <a:rPr lang="en-US" b="1" dirty="0" err="1">
+                <a:solidFill>
+                  <a:schemeClr val="bg1"/>
+                </a:solidFill>
+                <a:latin typeface="Courier New" pitchFamily="49" charset="0"/>
+                <a:cs typeface="Courier New" pitchFamily="49" charset="0"/>
+              </a:rPr>
+              <a:t>dvc</a:t>
+            </a:r>
+            <a:r>
+              <a:rPr lang="en-US" b="1" dirty="0">
+                <a:solidFill>
+                  <a:schemeClr val="bg1"/>
+                </a:solidFill>
+                <a:latin typeface="Courier New" pitchFamily="49" charset="0"/>
+                <a:cs typeface="Courier New" pitchFamily="49" charset="0"/>
+              </a:rPr>
+              <a:t> checkout</a:t>
+            </a:r>
+          </a:p>
+          <a:p>
+            <a:r>
+              <a:rPr lang="en-US" b="1" dirty="0">
+                <a:solidFill>
+                  <a:schemeClr val="bg1"/>
+                </a:solidFill>
+                <a:latin typeface="Courier New" pitchFamily="49" charset="0"/>
+                <a:cs typeface="Courier New" pitchFamily="49" charset="0"/>
+                <a:sym typeface="Symbol" panose="05050102010706020507" pitchFamily="18" charset="2"/>
+              </a:rPr>
+              <a:t></a:t>
+            </a:r>
+            <a:r>
+              <a:rPr lang="en-US" b="1" dirty="0">
+                <a:solidFill>
+                  <a:schemeClr val="bg1"/>
+                </a:solidFill>
+                <a:latin typeface="Courier New" pitchFamily="49" charset="0"/>
+                <a:cs typeface="Courier New" pitchFamily="49" charset="0"/>
+              </a:rPr>
+              <a:t> </a:t>
+            </a:r>
+            <a:endParaRPr lang="nl-BE" b="1" dirty="0">
+              <a:solidFill>
+                <a:schemeClr val="bg1"/>
+              </a:solidFill>
+              <a:latin typeface="Courier New" pitchFamily="49" charset="0"/>
+              <a:cs typeface="Courier New" pitchFamily="49" charset="0"/>
+            </a:endParaRPr>
+          </a:p>
+        </p:txBody>
+      </p:sp>
+      <p:grpSp>
+        <p:nvGrpSpPr>
+          <p:cNvPr id="11" name="Group 10">
+            <a:extLst>
+              <a:ext uri="{FF2B5EF4-FFF2-40B4-BE49-F238E27FC236}">
+                <a16:creationId xmlns:a16="http://schemas.microsoft.com/office/drawing/2014/main" id="{D2D702EF-685A-AD32-B634-29C60289D094}"/>
+              </a:ext>
+            </a:extLst>
+          </p:cNvPr>
+          <p:cNvGrpSpPr/>
+          <p:nvPr/>
+        </p:nvGrpSpPr>
+        <p:grpSpPr>
+          <a:xfrm>
+            <a:off x="8183621" y="4817775"/>
+            <a:ext cx="3967271" cy="1448882"/>
+            <a:chOff x="6150428" y="4638296"/>
+            <a:chExt cx="3967271" cy="1448882"/>
+          </a:xfrm>
+        </p:grpSpPr>
+        <p:sp>
+          <p:nvSpPr>
+            <p:cNvPr id="9" name="TextBox 8">
+              <a:extLst>
+                <a:ext uri="{FF2B5EF4-FFF2-40B4-BE49-F238E27FC236}">
+                  <a16:creationId xmlns:a16="http://schemas.microsoft.com/office/drawing/2014/main" id="{8B352565-7DBF-CB94-48F6-1B3163B6CCC7}"/>
+                </a:ext>
+              </a:extLst>
+            </p:cNvPr>
+            <p:cNvSpPr txBox="1"/>
+            <p:nvPr/>
+          </p:nvSpPr>
+          <p:spPr>
+            <a:xfrm>
+              <a:off x="6150428" y="5009960"/>
+              <a:ext cx="3591048" cy="1077218"/>
+            </a:xfrm>
+            <a:prstGeom prst="rect">
+              <a:avLst/>
+            </a:prstGeom>
+            <a:solidFill>
+              <a:schemeClr val="bg1"/>
+            </a:solidFill>
+            <a:ln>
+              <a:solidFill>
+                <a:schemeClr val="tx1"/>
+              </a:solidFill>
+            </a:ln>
+          </p:spPr>
+          <p:txBody>
+            <a:bodyPr wrap="none" rtlCol="0">
+              <a:spAutoFit/>
+            </a:bodyPr>
+            <a:lstStyle/>
+            <a:p>
+              <a:r>
+                <a:rPr lang="en-US" sz="3200" dirty="0"/>
+                <a:t>Don't forget</a:t>
+              </a:r>
+              <a:br>
+                <a:rPr lang="en-US" sz="3200" dirty="0"/>
+              </a:br>
+              <a:r>
+                <a:rPr lang="en-US" sz="3200" dirty="0" err="1">
+                  <a:latin typeface="Courier New" panose="02070309020205020404" pitchFamily="49" charset="0"/>
+                  <a:cs typeface="Courier New" panose="02070309020205020404" pitchFamily="49" charset="0"/>
+                </a:rPr>
+                <a:t>dvc</a:t>
+              </a:r>
+              <a:r>
+                <a:rPr lang="en-US" sz="3200" dirty="0">
+                  <a:latin typeface="Courier New" panose="02070309020205020404" pitchFamily="49" charset="0"/>
+                  <a:cs typeface="Courier New" panose="02070309020205020404" pitchFamily="49" charset="0"/>
+                </a:rPr>
+                <a:t> checkout</a:t>
+              </a:r>
+              <a:r>
+                <a:rPr lang="en-US" sz="3200" dirty="0"/>
+                <a:t>!!!</a:t>
+              </a:r>
+              <a:endParaRPr lang="LID4096" sz="3200" dirty="0"/>
+            </a:p>
+          </p:txBody>
+        </p:sp>
+        <p:pic>
+          <p:nvPicPr>
+            <p:cNvPr id="10" name="Picture 2" descr="C:\Users\lucg5005\AppData\Local\Microsoft\Windows\Temporary Internet Files\Content.IE5\CWZUAEH4\lgi01a201309290600[1].jpg">
+              <a:extLst>
+                <a:ext uri="{FF2B5EF4-FFF2-40B4-BE49-F238E27FC236}">
+                  <a16:creationId xmlns:a16="http://schemas.microsoft.com/office/drawing/2014/main" id="{3D580E30-7008-C9DE-90E5-E648EFBD635C}"/>
+                </a:ext>
+              </a:extLst>
+            </p:cNvPr>
+            <p:cNvPicPr>
+              <a:picLocks noChangeAspect="1" noChangeArrowheads="1"/>
+            </p:cNvPicPr>
+            <p:nvPr/>
+          </p:nvPicPr>
+          <p:blipFill>
+            <a:blip r:embed="rId2" cstate="print">
+              <a:extLst>
+                <a:ext uri="{28A0092B-C50C-407E-A947-70E740481C1C}">
+                  <a14:useLocalDpi xmlns:a14="http://schemas.microsoft.com/office/drawing/2010/main" val="0"/>
+                </a:ext>
+              </a:extLst>
+            </a:blip>
+            <a:srcRect/>
+            <a:stretch>
+              <a:fillRect/>
+            </a:stretch>
+          </p:blipFill>
+          <p:spPr bwMode="auto">
+            <a:xfrm>
+              <a:off x="9551548" y="4638296"/>
+              <a:ext cx="566151" cy="580908"/>
+            </a:xfrm>
+            <a:prstGeom prst="rect">
+              <a:avLst/>
+            </a:prstGeom>
+            <a:noFill/>
+            <a:extLst>
+              <a:ext uri="{909E8E84-426E-40DD-AFC4-6F175D3DCCD1}">
+                <a14:hiddenFill xmlns:a14="http://schemas.microsoft.com/office/drawing/2010/main">
+                  <a:solidFill>
+                    <a:srgbClr val="FFFFFF"/>
+                  </a:solidFill>
+                </a14:hiddenFill>
+              </a:ext>
+            </a:extLst>
+          </p:spPr>
+        </p:pic>
+      </p:grpSp>
+    </p:spTree>
+    <p:extLst>
+      <p:ext uri="{BB962C8B-B14F-4D97-AF65-F5344CB8AC3E}">
+        <p14:creationId xmlns:p14="http://schemas.microsoft.com/office/powerpoint/2010/main" val="3631280848"/>
+      </p:ext>
+    </p:extLst>
+  </p:cSld>
+  <p:clrMapOvr>
+    <a:masterClrMapping/>
+  </p:clrMapOvr>
+  <p:timing>
+    <p:tnLst>
+      <p:par>
+        <p:cTn id="1" dur="indefinite" restart="never" nodeType="tmRoot">
+          <p:childTnLst>
+            <p:seq concurrent="1" nextAc="seek">
+              <p:cTn id="2" dur="indefinite" nodeType="mainSeq">
+                <p:childTnLst>
+                  <p:par>
+                    <p:cTn id="3" fill="hold">
+                      <p:stCondLst>
+                        <p:cond delay="indefinite"/>
+                        <p:cond evt="onBegin" delay="0">
+                          <p:tn val="2"/>
+                        </p:cond>
+                      </p:stCondLst>
+                      <p:childTnLst>
+                        <p:par>
+                          <p:cTn id="4" fill="hold">
+                            <p:stCondLst>
+                              <p:cond delay="0"/>
+                            </p:stCondLst>
+                            <p:childTnLst>
+                              <p:par>
+                                <p:cTn id="5" presetID="1" presetClass="entr" presetSubtype="0" fill="hold" grpId="0" nodeType="withEffect">
+                                  <p:stCondLst>
+                                    <p:cond delay="0"/>
+                                  </p:stCondLst>
+                                  <p:childTnLst>
+                                    <p:set>
+                                      <p:cBhvr>
+                                        <p:cTn id="6" dur="1" fill="hold">
+                                          <p:stCondLst>
+                                            <p:cond delay="0"/>
+                                          </p:stCondLst>
+                                        </p:cTn>
+                                        <p:tgtEl>
+                                          <p:spTgt spid="5"/>
+                                        </p:tgtEl>
+                                        <p:attrNameLst>
+                                          <p:attrName>style.visibility</p:attrName>
+                                        </p:attrNameLst>
+                                      </p:cBhvr>
+                                      <p:to>
+                                        <p:strVal val="visible"/>
+                                      </p:to>
+                                    </p:set>
+                                  </p:childTnLst>
+                                </p:cTn>
+                              </p:par>
+                              <p:par>
+                                <p:cTn id="7" presetID="1" presetClass="entr" presetSubtype="0" fill="hold" grpId="0" nodeType="withEffect">
+                                  <p:stCondLst>
+                                    <p:cond delay="0"/>
+                                  </p:stCondLst>
+                                  <p:childTnLst>
+                                    <p:set>
+                                      <p:cBhvr>
+                                        <p:cTn id="8" dur="1" fill="hold">
+                                          <p:stCondLst>
+                                            <p:cond delay="0"/>
+                                          </p:stCondLst>
+                                        </p:cTn>
+                                        <p:tgtEl>
+                                          <p:spTgt spid="6"/>
+                                        </p:tgtEl>
+                                        <p:attrNameLst>
+                                          <p:attrName>style.visibility</p:attrName>
+                                        </p:attrNameLst>
+                                      </p:cBhvr>
+                                      <p:to>
+                                        <p:strVal val="visible"/>
+                                      </p:to>
+                                    </p:set>
+                                  </p:childTnLst>
+                                </p:cTn>
+                              </p:par>
+                              <p:par>
+                                <p:cTn id="9" presetID="1" presetClass="entr" presetSubtype="0" fill="hold" grpId="0" nodeType="withEffect">
+                                  <p:stCondLst>
+                                    <p:cond delay="0"/>
+                                  </p:stCondLst>
+                                  <p:childTnLst>
+                                    <p:set>
+                                      <p:cBhvr>
+                                        <p:cTn id="10" dur="1" fill="hold">
+                                          <p:stCondLst>
+                                            <p:cond delay="0"/>
+                                          </p:stCondLst>
+                                        </p:cTn>
+                                        <p:tgtEl>
+                                          <p:spTgt spid="8"/>
+                                        </p:tgtEl>
+                                        <p:attrNameLst>
+                                          <p:attrName>style.visibility</p:attrName>
+                                        </p:attrNameLst>
+                                      </p:cBhvr>
+                                      <p:to>
+                                        <p:strVal val="visible"/>
+                                      </p:to>
+                                    </p:set>
+                                  </p:childTnLst>
+                                </p:cTn>
+                              </p:par>
+                            </p:childTnLst>
+                          </p:cTn>
+                        </p:par>
+                      </p:childTnLst>
+                    </p:cTn>
+                  </p:par>
+                </p:childTnLst>
+              </p:cTn>
+              <p:prevCondLst>
+                <p:cond evt="onPrev" delay="0">
+                  <p:tgtEl>
+                    <p:sldTgt/>
+                  </p:tgtEl>
+                </p:cond>
+              </p:prevCondLst>
+              <p:nextCondLst>
+                <p:cond evt="onNext" delay="0">
+                  <p:tgtEl>
+                    <p:sldTgt/>
+                  </p:tgtEl>
+                </p:cond>
+              </p:nextCondLst>
+            </p:seq>
+          </p:childTnLst>
+        </p:cTn>
+      </p:par>
+    </p:tnLst>
+    <p:bldLst>
+      <p:bldP spid="5" grpId="0" animBg="1"/>
+      <p:bldP spid="6" grpId="0" animBg="1"/>
+      <p:bldP spid="8" grpId="0" animBg="1"/>
+    </p:bldLst>
+  </p:timing>
+</p:sld>
+</file>
+
+<file path=ppt/slides/slide19.xml><?xml version="1.0" encoding="utf-8"?>
+<p:sld xmlns:a="http://schemas.openxmlformats.org/drawingml/2006/main" xmlns:r="http://schemas.openxmlformats.org/officeDocument/2006/relationships" xmlns:p="http://schemas.openxmlformats.org/presentationml/2006/main">
+  <p:cSld>
+    <p:spTree>
+      <p:nvGrpSpPr>
+        <p:cNvPr id="1" name=""/>
+        <p:cNvGrpSpPr/>
+        <p:nvPr/>
+      </p:nvGrpSpPr>
+      <p:grpSpPr>
+        <a:xfrm>
+          <a:off x="0" y="0"/>
+          <a:ext cx="0" cy="0"/>
+          <a:chOff x="0" y="0"/>
+          <a:chExt cx="0" cy="0"/>
+        </a:xfrm>
+      </p:grpSpPr>
+      <p:sp>
+        <p:nvSpPr>
+          <p:cNvPr id="2" name="Title 1">
+            <a:extLst>
+              <a:ext uri="{FF2B5EF4-FFF2-40B4-BE49-F238E27FC236}">
+                <a16:creationId xmlns:a16="http://schemas.microsoft.com/office/drawing/2014/main" id="{4FE6C2F7-8212-3936-E1EF-AE48A6C87DC1}"/>
+              </a:ext>
+            </a:extLst>
+          </p:cNvPr>
+          <p:cNvSpPr>
+            <a:spLocks noGrp="1"/>
+          </p:cNvSpPr>
+          <p:nvPr>
+            <p:ph type="title"/>
+          </p:nvPr>
+        </p:nvSpPr>
+        <p:spPr/>
+        <p:txBody>
+          <a:bodyPr/>
+          <a:lstStyle/>
+          <a:p>
+            <a:endParaRPr lang="LID4096" dirty="0"/>
+          </a:p>
+        </p:txBody>
+      </p:sp>
+      <p:sp>
+        <p:nvSpPr>
+          <p:cNvPr id="3" name="Content Placeholder 2">
+            <a:extLst>
+              <a:ext uri="{FF2B5EF4-FFF2-40B4-BE49-F238E27FC236}">
+                <a16:creationId xmlns:a16="http://schemas.microsoft.com/office/drawing/2014/main" id="{86A9D2A3-E554-9F87-B0F5-BD9269FFCF56}"/>
+              </a:ext>
+            </a:extLst>
+          </p:cNvPr>
+          <p:cNvSpPr>
+            <a:spLocks noGrp="1"/>
+          </p:cNvSpPr>
+          <p:nvPr>
+            <p:ph idx="1"/>
+          </p:nvPr>
+        </p:nvSpPr>
+        <p:spPr/>
+        <p:txBody>
+          <a:bodyPr/>
+          <a:lstStyle/>
+          <a:p>
+            <a:endParaRPr lang="LID4096"/>
+          </a:p>
+        </p:txBody>
+      </p:sp>
+      <p:sp>
+        <p:nvSpPr>
+          <p:cNvPr id="4" name="Slide Number Placeholder 3">
+            <a:extLst>
+              <a:ext uri="{FF2B5EF4-FFF2-40B4-BE49-F238E27FC236}">
+                <a16:creationId xmlns:a16="http://schemas.microsoft.com/office/drawing/2014/main" id="{595F0DD9-43F3-25A1-C77A-743F21AAF249}"/>
+              </a:ext>
+            </a:extLst>
+          </p:cNvPr>
+          <p:cNvSpPr>
+            <a:spLocks noGrp="1"/>
+          </p:cNvSpPr>
+          <p:nvPr>
+            <p:ph type="sldNum" sz="quarter" idx="12"/>
+          </p:nvPr>
+        </p:nvSpPr>
+        <p:spPr/>
+        <p:txBody>
+          <a:bodyPr/>
+          <a:lstStyle/>
+          <a:p>
+            <a:fld id="{9C7CE217-4467-4B8D-A735-B008FA7C4816}" type="slidenum">
+              <a:rPr lang="LID4096" smtClean="0"/>
+              <a:t>19</a:t>
+            </a:fld>
+            <a:endParaRPr lang="LID4096"/>
+          </a:p>
+        </p:txBody>
+      </p:sp>
+    </p:spTree>
+    <p:extLst>
+      <p:ext uri="{BB962C8B-B14F-4D97-AF65-F5344CB8AC3E}">
+        <p14:creationId xmlns:p14="http://schemas.microsoft.com/office/powerpoint/2010/main" val="2970041939"/>
+      </p:ext>
+    </p:extLst>
+  </p:cSld>
+  <p:clrMapOvr>
+    <a:masterClrMapping/>
+  </p:clrMapOvr>
+</p:sld>
+</file>
+
+<file path=ppt/slides/slide2.xml><?xml version="1.0" encoding="utf-8"?>
+<p:sld xmlns:a="http://schemas.openxmlformats.org/drawingml/2006/main" xmlns:r="http://schemas.openxmlformats.org/officeDocument/2006/relationships" xmlns:p="http://schemas.openxmlformats.org/presentationml/2006/main">
+  <p:cSld>
+    <p:spTree>
+      <p:nvGrpSpPr>
+        <p:cNvPr id="1" name=""/>
+        <p:cNvGrpSpPr/>
+        <p:nvPr/>
+      </p:nvGrpSpPr>
+      <p:grpSpPr>
+        <a:xfrm>
+          <a:off x="0" y="0"/>
+          <a:ext cx="0" cy="0"/>
+          <a:chOff x="0" y="0"/>
+          <a:chExt cx="0" cy="0"/>
+        </a:xfrm>
+      </p:grpSpPr>
+      <p:sp>
+        <p:nvSpPr>
+          <p:cNvPr id="4" name="Slide Number Placeholder 3"/>
+          <p:cNvSpPr>
+            <a:spLocks noGrp="1"/>
+          </p:cNvSpPr>
+          <p:nvPr>
+            <p:ph type="sldNum" sz="quarter" idx="12"/>
+          </p:nvPr>
+        </p:nvSpPr>
+        <p:spPr/>
+        <p:txBody>
+          <a:bodyPr/>
+          <a:lstStyle/>
+          <a:p>
+            <a:fld id="{0AA598EC-1C61-495B-A9F8-4410E339CCF5}" type="slidenum">
+              <a:rPr lang="en-US" smtClean="0"/>
+              <a:t>2</a:t>
+            </a:fld>
+            <a:endParaRPr lang="en-US"/>
+          </a:p>
+        </p:txBody>
+      </p:sp>
+      <p:sp>
+        <p:nvSpPr>
+          <p:cNvPr id="6" name="TextBox 5"/>
+          <p:cNvSpPr txBox="1"/>
+          <p:nvPr/>
+        </p:nvSpPr>
+        <p:spPr>
+          <a:xfrm>
+            <a:off x="3588693" y="5445224"/>
+            <a:ext cx="5258171" cy="707886"/>
+          </a:xfrm>
+          <a:prstGeom prst="rect">
+            <a:avLst/>
+          </a:prstGeom>
+          <a:noFill/>
+        </p:spPr>
+        <p:txBody>
+          <a:bodyPr wrap="none" rtlCol="0">
+            <a:spAutoFit/>
+          </a:bodyPr>
+          <a:lstStyle/>
+          <a:p>
+            <a:r>
+              <a:rPr lang="en-US" sz="4000" dirty="0">
+                <a:hlinkClick r:id="rId2"/>
+              </a:rPr>
+              <a:t>https://bit.ly/4737qM1</a:t>
+            </a:r>
+            <a:r>
+              <a:rPr lang="en-US" sz="4000" dirty="0"/>
+              <a:t> </a:t>
+            </a:r>
+          </a:p>
+        </p:txBody>
+      </p:sp>
+      <p:pic>
+        <p:nvPicPr>
+          <p:cNvPr id="3" name="Picture 2">
+            <a:extLst>
+              <a:ext uri="{FF2B5EF4-FFF2-40B4-BE49-F238E27FC236}">
+                <a16:creationId xmlns:a16="http://schemas.microsoft.com/office/drawing/2014/main" id="{E1FFC480-9116-B2BE-7116-6AB38E009BFF}"/>
+              </a:ext>
+            </a:extLst>
+          </p:cNvPr>
+          <p:cNvPicPr>
+            <a:picLocks noChangeAspect="1"/>
+          </p:cNvPicPr>
+          <p:nvPr/>
+        </p:nvPicPr>
+        <p:blipFill>
+          <a:blip r:embed="rId3"/>
+          <a:stretch>
+            <a:fillRect/>
+          </a:stretch>
+        </p:blipFill>
+        <p:spPr>
+          <a:xfrm>
+            <a:off x="3952875" y="1285875"/>
+            <a:ext cx="4286250" cy="4286250"/>
+          </a:xfrm>
+          <a:prstGeom prst="rect">
+            <a:avLst/>
+          </a:prstGeom>
+        </p:spPr>
+      </p:pic>
+    </p:spTree>
+    <p:extLst>
+      <p:ext uri="{BB962C8B-B14F-4D97-AF65-F5344CB8AC3E}">
+        <p14:creationId xmlns:p14="http://schemas.microsoft.com/office/powerpoint/2010/main" val="4231110881"/>
+      </p:ext>
+    </p:extLst>
+  </p:cSld>
+  <p:clrMapOvr>
+    <a:masterClrMapping/>
+  </p:clrMapOvr>
+</p:sld>
+</file>
+
+<file path=ppt/slides/slide20.xml><?xml version="1.0" encoding="utf-8"?>
 <p:sld xmlns:a="http://schemas.openxmlformats.org/drawingml/2006/main" xmlns:r="http://schemas.openxmlformats.org/officeDocument/2006/relationships" xmlns:p="http://schemas.openxmlformats.org/presentationml/2006/main">
   <p:cSld>
     <p:spTree>
@@ -9110,7 +10239,7 @@
           <a:p>
             <a:fld id="{9C7CE217-4467-4B8D-A735-B008FA7C4816}" type="slidenum">
               <a:rPr lang="LID4096" smtClean="0"/>
-              <a:t>18</a:t>
+              <a:t>20</a:t>
             </a:fld>
             <a:endParaRPr lang="LID4096"/>
           </a:p>
@@ -9120,124 +10249,6 @@
     <p:extLst>
       <p:ext uri="{BB962C8B-B14F-4D97-AF65-F5344CB8AC3E}">
         <p14:creationId xmlns:p14="http://schemas.microsoft.com/office/powerpoint/2010/main" val="688779831"/>
-      </p:ext>
-    </p:extLst>
-  </p:cSld>
-  <p:clrMapOvr>
-    <a:masterClrMapping/>
-  </p:clrMapOvr>
-</p:sld>
-</file>
-
-<file path=ppt/slides/slide2.xml><?xml version="1.0" encoding="utf-8"?>
-<p:sld xmlns:a="http://schemas.openxmlformats.org/drawingml/2006/main" xmlns:r="http://schemas.openxmlformats.org/officeDocument/2006/relationships" xmlns:p="http://schemas.openxmlformats.org/presentationml/2006/main">
-  <p:cSld>
-    <p:spTree>
-      <p:nvGrpSpPr>
-        <p:cNvPr id="1" name=""/>
-        <p:cNvGrpSpPr/>
-        <p:nvPr/>
-      </p:nvGrpSpPr>
-      <p:grpSpPr>
-        <a:xfrm>
-          <a:off x="0" y="0"/>
-          <a:ext cx="0" cy="0"/>
-          <a:chOff x="0" y="0"/>
-          <a:chExt cx="0" cy="0"/>
-        </a:xfrm>
-      </p:grpSpPr>
-      <p:sp>
-        <p:nvSpPr>
-          <p:cNvPr id="4" name="Slide Number Placeholder 3"/>
-          <p:cNvSpPr>
-            <a:spLocks noGrp="1"/>
-          </p:cNvSpPr>
-          <p:nvPr>
-            <p:ph type="sldNum" sz="quarter" idx="12"/>
-          </p:nvPr>
-        </p:nvSpPr>
-        <p:spPr/>
-        <p:txBody>
-          <a:bodyPr/>
-          <a:lstStyle/>
-          <a:p>
-            <a:fld id="{0AA598EC-1C61-495B-A9F8-4410E339CCF5}" type="slidenum">
-              <a:rPr lang="en-US" smtClean="0"/>
-              <a:t>2</a:t>
-            </a:fld>
-            <a:endParaRPr lang="en-US"/>
-          </a:p>
-        </p:txBody>
-      </p:sp>
-      <p:sp>
-        <p:nvSpPr>
-          <p:cNvPr id="6" name="TextBox 5"/>
-          <p:cNvSpPr txBox="1"/>
-          <p:nvPr/>
-        </p:nvSpPr>
-        <p:spPr>
-          <a:xfrm>
-            <a:off x="3588693" y="5445224"/>
-            <a:ext cx="5258171" cy="707886"/>
-          </a:xfrm>
-          <a:prstGeom prst="rect">
-            <a:avLst/>
-          </a:prstGeom>
-          <a:noFill/>
-        </p:spPr>
-        <p:txBody>
-          <a:bodyPr wrap="none" rtlCol="0">
-            <a:spAutoFit/>
-          </a:bodyPr>
-          <a:lstStyle/>
-          <a:p>
-            <a:r>
-              <a:rPr lang="en-US" sz="4000" dirty="0">
-                <a:hlinkClick r:id="rId2"/>
-              </a:rPr>
-              <a:t>https://bit.ly/4737qM1</a:t>
-            </a:r>
-            <a:r>
-              <a:rPr lang="en-US" sz="4000" dirty="0"/>
-              <a:t> </a:t>
-            </a:r>
-          </a:p>
-        </p:txBody>
-      </p:sp>
-      <p:pic>
-        <p:nvPicPr>
-          <p:cNvPr id="3" name="Picture 2">
-            <a:extLst>
-              <a:ext uri="{FF2B5EF4-FFF2-40B4-BE49-F238E27FC236}">
-                <a16:creationId xmlns:a16="http://schemas.microsoft.com/office/drawing/2014/main" id="{E1FFC480-9116-B2BE-7116-6AB38E009BFF}"/>
-              </a:ext>
-            </a:extLst>
-          </p:cNvPr>
-          <p:cNvPicPr>
-            <a:picLocks noChangeAspect="1"/>
-          </p:cNvPicPr>
-          <p:nvPr/>
-        </p:nvPicPr>
-        <p:blipFill>
-          <a:blip r:embed="rId3"/>
-          <a:stretch>
-            <a:fillRect/>
-          </a:stretch>
-        </p:blipFill>
-        <p:spPr>
-          <a:xfrm>
-            <a:off x="3952875" y="1285875"/>
-            <a:ext cx="4286250" cy="4286250"/>
-          </a:xfrm>
-          <a:prstGeom prst="rect">
-            <a:avLst/>
-          </a:prstGeom>
-        </p:spPr>
-      </p:pic>
-    </p:spTree>
-    <p:extLst>
-      <p:ext uri="{BB962C8B-B14F-4D97-AF65-F5344CB8AC3E}">
-        <p14:creationId xmlns:p14="http://schemas.microsoft.com/office/powerpoint/2010/main" val="4231110881"/>
       </p:ext>
     </p:extLst>
   </p:cSld>

</xml_diff>

<commit_message>
Add slide on R experiment management with DVC
</commit_message>
<xml_diff>
--- a/mlops_on_hpc.pptx
+++ b/mlops_on_hpc.pptx
@@ -5,7 +5,7 @@
     <p:sldMasterId id="2147483648" r:id="rId1"/>
   </p:sldMasterIdLst>
   <p:notesMasterIdLst>
-    <p:notesMasterId r:id="rId42"/>
+    <p:notesMasterId r:id="rId43"/>
   </p:notesMasterIdLst>
   <p:sldIdLst>
     <p:sldId id="257" r:id="rId2"/>
@@ -48,6 +48,7 @@
     <p:sldId id="392" r:id="rId39"/>
     <p:sldId id="391" r:id="rId40"/>
     <p:sldId id="393" r:id="rId41"/>
+    <p:sldId id="394" r:id="rId42"/>
   </p:sldIdLst>
   <p:sldSz cx="12192000" cy="6858000"/>
   <p:notesSz cx="6858000" cy="9144000"/>
@@ -429,7 +430,7 @@
           <a:p>
             <a:fld id="{8BC644CB-8FFF-4F59-B04D-9A1D2A5DB720}" type="datetimeFigureOut">
               <a:rPr lang="LID4096" smtClean="0"/>
-              <a:t>07/30/2025</a:t>
+              <a:t>08/01/2025</a:t>
             </a:fld>
             <a:endParaRPr lang="LID4096"/>
           </a:p>
@@ -846,7 +847,7 @@
           <a:p>
             <a:fld id="{29DC7A01-813B-4B59-A1CC-F2D63921E46A}" type="datetime1">
               <a:rPr lang="LID4096" smtClean="0"/>
-              <a:t>07/30/2025</a:t>
+              <a:t>08/01/2025</a:t>
             </a:fld>
             <a:endParaRPr lang="LID4096"/>
           </a:p>
@@ -1046,7 +1047,7 @@
           <a:p>
             <a:fld id="{6C2A7740-B6F2-4CC5-9AD0-B161B943DB10}" type="datetime1">
               <a:rPr lang="LID4096" smtClean="0"/>
-              <a:t>07/30/2025</a:t>
+              <a:t>08/01/2025</a:t>
             </a:fld>
             <a:endParaRPr lang="LID4096"/>
           </a:p>
@@ -1256,7 +1257,7 @@
           <a:p>
             <a:fld id="{2F94B025-8F26-4EDF-B991-413B82D6446E}" type="datetime1">
               <a:rPr lang="LID4096" smtClean="0"/>
-              <a:t>07/30/2025</a:t>
+              <a:t>08/01/2025</a:t>
             </a:fld>
             <a:endParaRPr lang="LID4096"/>
           </a:p>
@@ -1456,7 +1457,7 @@
           <a:p>
             <a:fld id="{CB5C8B8A-B2CE-4D78-88A4-476B2363B71E}" type="datetime1">
               <a:rPr lang="LID4096" smtClean="0"/>
-              <a:t>07/30/2025</a:t>
+              <a:t>08/01/2025</a:t>
             </a:fld>
             <a:endParaRPr lang="LID4096"/>
           </a:p>
@@ -1732,7 +1733,7 @@
           <a:p>
             <a:fld id="{CDDAB553-EE67-480E-BCE3-F64D7D51D294}" type="datetime1">
               <a:rPr lang="LID4096" smtClean="0"/>
-              <a:t>07/30/2025</a:t>
+              <a:t>08/01/2025</a:t>
             </a:fld>
             <a:endParaRPr lang="LID4096"/>
           </a:p>
@@ -2000,7 +2001,7 @@
           <a:p>
             <a:fld id="{CD270038-A599-4345-BE24-96A4E06BF8E3}" type="datetime1">
               <a:rPr lang="LID4096" smtClean="0"/>
-              <a:t>07/30/2025</a:t>
+              <a:t>08/01/2025</a:t>
             </a:fld>
             <a:endParaRPr lang="LID4096"/>
           </a:p>
@@ -2415,7 +2416,7 @@
           <a:p>
             <a:fld id="{44A719F7-59BE-4FD1-8AC5-F7BFCCA290D7}" type="datetime1">
               <a:rPr lang="LID4096" smtClean="0"/>
-              <a:t>07/30/2025</a:t>
+              <a:t>08/01/2025</a:t>
             </a:fld>
             <a:endParaRPr lang="LID4096"/>
           </a:p>
@@ -2557,7 +2558,7 @@
           <a:p>
             <a:fld id="{B4C93A37-6A61-4F10-A100-9676ACB86039}" type="datetime1">
               <a:rPr lang="LID4096" smtClean="0"/>
-              <a:t>07/30/2025</a:t>
+              <a:t>08/01/2025</a:t>
             </a:fld>
             <a:endParaRPr lang="LID4096"/>
           </a:p>
@@ -2670,7 +2671,7 @@
           <a:p>
             <a:fld id="{9E73F7F9-09CC-4C21-BDB8-90E2F1A013BD}" type="datetime1">
               <a:rPr lang="LID4096" smtClean="0"/>
-              <a:t>07/30/2025</a:t>
+              <a:t>08/01/2025</a:t>
             </a:fld>
             <a:endParaRPr lang="LID4096"/>
           </a:p>
@@ -2983,7 +2984,7 @@
           <a:p>
             <a:fld id="{FD166AE6-E2E5-4774-8434-34F2AD9BDDCE}" type="datetime1">
               <a:rPr lang="LID4096" smtClean="0"/>
-              <a:t>07/30/2025</a:t>
+              <a:t>08/01/2025</a:t>
             </a:fld>
             <a:endParaRPr lang="LID4096"/>
           </a:p>
@@ -3272,7 +3273,7 @@
           <a:p>
             <a:fld id="{895E2CCE-BBFE-4BEC-9002-70F26B158681}" type="datetime1">
               <a:rPr lang="LID4096" smtClean="0"/>
-              <a:t>07/30/2025</a:t>
+              <a:t>08/01/2025</a:t>
             </a:fld>
             <a:endParaRPr lang="LID4096"/>
           </a:p>
@@ -3515,7 +3516,7 @@
           <a:p>
             <a:fld id="{C795C0FD-7BB7-48C9-86F3-9771767F1BC3}" type="datetime1">
               <a:rPr lang="LID4096" smtClean="0"/>
-              <a:t>07/30/2025</a:t>
+              <a:t>08/01/2025</a:t>
             </a:fld>
             <a:endParaRPr lang="LID4096"/>
           </a:p>
@@ -4473,7 +4474,7 @@
         </p:spPr>
         <p:txBody>
           <a:bodyPr anchor="ctr">
-            <a:normAutofit lnSpcReduction="10000"/>
+            <a:normAutofit fontScale="92500"/>
           </a:bodyPr>
           <a:lstStyle/>
           <a:p>
@@ -4534,7 +4535,7 @@
             <a:pPr lvl="1"/>
             <a:r>
               <a:rPr lang="en-US" sz="2000" dirty="0"/>
-              <a:t>Model registry</a:t>
+              <a:t>Model registry (requires DVC Studio)</a:t>
             </a:r>
             <a:endParaRPr lang="LID4096" sz="2000" dirty="0"/>
           </a:p>
@@ -20154,7 +20155,7 @@
         <p:spPr>
           <a:xfrm>
             <a:off x="6183084" y="1823529"/>
-            <a:ext cx="5867400" cy="4247317"/>
+            <a:ext cx="5867400" cy="3970318"/>
           </a:xfrm>
           <a:prstGeom prst="rect">
             <a:avLst/>
@@ -20605,41 +20606,6 @@
                 <a:cs typeface="Courier New" pitchFamily="49" charset="0"/>
               </a:rPr>
               <a:t>                      type='model')</a:t>
-            </a:r>
-          </a:p>
-          <a:p>
-            <a:pPr lvl="0">
-              <a:defRPr/>
-            </a:pPr>
-            <a:r>
-              <a:rPr lang="en-US" b="1" dirty="0">
-                <a:solidFill>
-                  <a:srgbClr val="FF0000"/>
-                </a:solidFill>
-                <a:latin typeface="Courier New" pitchFamily="49" charset="0"/>
-                <a:cs typeface="Courier New" pitchFamily="49" charset="0"/>
-              </a:rPr>
-              <a:t>    </a:t>
-            </a:r>
-            <a:r>
-              <a:rPr lang="en-US" b="1" dirty="0" err="1">
-                <a:solidFill>
-                  <a:srgbClr val="FF0000"/>
-                </a:solidFill>
-                <a:latin typeface="Courier New" pitchFamily="49" charset="0"/>
-                <a:cs typeface="Courier New" pitchFamily="49" charset="0"/>
-              </a:rPr>
-              <a:t>live.make_report</a:t>
-            </a:r>
-            <a:r>
-              <a:rPr lang="en-US" b="1" dirty="0">
-                <a:solidFill>
-                  <a:srgbClr val="FF0000"/>
-                </a:solidFill>
-                <a:latin typeface="Courier New" pitchFamily="49" charset="0"/>
-                <a:cs typeface="Courier New" pitchFamily="49" charset="0"/>
-              </a:rPr>
-              <a:t>()</a:t>
             </a:r>
           </a:p>
         </p:txBody>
@@ -25970,6 +25936,898 @@
       <p:bldP spid="6" grpId="0" animBg="1"/>
     </p:bldLst>
   </p:timing>
+</p:sld>
+</file>
+
+<file path=ppt/slides/slide41.xml><?xml version="1.0" encoding="utf-8"?>
+<p:sld xmlns:a="http://schemas.openxmlformats.org/drawingml/2006/main" xmlns:r="http://schemas.openxmlformats.org/officeDocument/2006/relationships" xmlns:p="http://schemas.openxmlformats.org/presentationml/2006/main">
+  <p:cSld>
+    <p:spTree>
+      <p:nvGrpSpPr>
+        <p:cNvPr id="1" name=""/>
+        <p:cNvGrpSpPr/>
+        <p:nvPr/>
+      </p:nvGrpSpPr>
+      <p:grpSpPr>
+        <a:xfrm>
+          <a:off x="0" y="0"/>
+          <a:ext cx="0" cy="0"/>
+          <a:chOff x="0" y="0"/>
+          <a:chExt cx="0" cy="0"/>
+        </a:xfrm>
+      </p:grpSpPr>
+      <p:sp>
+        <p:nvSpPr>
+          <p:cNvPr id="2" name="Title 1">
+            <a:extLst>
+              <a:ext uri="{FF2B5EF4-FFF2-40B4-BE49-F238E27FC236}">
+                <a16:creationId xmlns:a16="http://schemas.microsoft.com/office/drawing/2014/main" id="{A256BD0C-DC7C-ECEF-F228-FE714A00DA06}"/>
+              </a:ext>
+            </a:extLst>
+          </p:cNvPr>
+          <p:cNvSpPr>
+            <a:spLocks noGrp="1"/>
+          </p:cNvSpPr>
+          <p:nvPr>
+            <p:ph type="title"/>
+          </p:nvPr>
+        </p:nvSpPr>
+        <p:spPr/>
+        <p:txBody>
+          <a:bodyPr/>
+          <a:lstStyle/>
+          <a:p>
+            <a:r>
+              <a:rPr lang="en-US" dirty="0"/>
+              <a:t>What about R?</a:t>
+            </a:r>
+            <a:endParaRPr lang="LID4096" dirty="0"/>
+          </a:p>
+        </p:txBody>
+      </p:sp>
+      <p:sp>
+        <p:nvSpPr>
+          <p:cNvPr id="3" name="Content Placeholder 2">
+            <a:extLst>
+              <a:ext uri="{FF2B5EF4-FFF2-40B4-BE49-F238E27FC236}">
+                <a16:creationId xmlns:a16="http://schemas.microsoft.com/office/drawing/2014/main" id="{D8C8B397-F5D8-CF03-9E79-56AD679B80A1}"/>
+              </a:ext>
+            </a:extLst>
+          </p:cNvPr>
+          <p:cNvSpPr>
+            <a:spLocks noGrp="1"/>
+          </p:cNvSpPr>
+          <p:nvPr>
+            <p:ph idx="1"/>
+          </p:nvPr>
+        </p:nvSpPr>
+        <p:spPr>
+          <a:xfrm>
+            <a:off x="838200" y="1825625"/>
+            <a:ext cx="4931226" cy="4351338"/>
+          </a:xfrm>
+        </p:spPr>
+        <p:txBody>
+          <a:bodyPr>
+            <a:normAutofit/>
+          </a:bodyPr>
+          <a:lstStyle/>
+          <a:p>
+            <a:r>
+              <a:rPr lang="en-US" dirty="0"/>
+              <a:t>Easy: use </a:t>
+            </a:r>
+            <a:r>
+              <a:rPr lang="en-US" dirty="0">
+                <a:latin typeface="Courier New" panose="02070309020205020404" pitchFamily="49" charset="0"/>
+                <a:cs typeface="Courier New" panose="02070309020205020404" pitchFamily="49" charset="0"/>
+              </a:rPr>
+              <a:t>reticulate</a:t>
+            </a:r>
+            <a:r>
+              <a:rPr lang="en-US" dirty="0"/>
+              <a:t> to use Python </a:t>
+            </a:r>
+            <a:r>
+              <a:rPr lang="en-US" dirty="0" err="1">
+                <a:latin typeface="Courier New" panose="02070309020205020404" pitchFamily="49" charset="0"/>
+                <a:cs typeface="Courier New" panose="02070309020205020404" pitchFamily="49" charset="0"/>
+              </a:rPr>
+              <a:t>dvclive</a:t>
+            </a:r>
+            <a:endParaRPr lang="en-US" dirty="0">
+              <a:latin typeface="Courier New" panose="02070309020205020404" pitchFamily="49" charset="0"/>
+              <a:cs typeface="Courier New" panose="02070309020205020404" pitchFamily="49" charset="0"/>
+            </a:endParaRPr>
+          </a:p>
+        </p:txBody>
+      </p:sp>
+      <p:sp>
+        <p:nvSpPr>
+          <p:cNvPr id="4" name="Slide Number Placeholder 3">
+            <a:extLst>
+              <a:ext uri="{FF2B5EF4-FFF2-40B4-BE49-F238E27FC236}">
+                <a16:creationId xmlns:a16="http://schemas.microsoft.com/office/drawing/2014/main" id="{EE7F08BB-3246-52C0-4035-F9D2DCD55FFD}"/>
+              </a:ext>
+            </a:extLst>
+          </p:cNvPr>
+          <p:cNvSpPr>
+            <a:spLocks noGrp="1"/>
+          </p:cNvSpPr>
+          <p:nvPr>
+            <p:ph type="sldNum" sz="quarter" idx="12"/>
+          </p:nvPr>
+        </p:nvSpPr>
+        <p:spPr/>
+        <p:txBody>
+          <a:bodyPr/>
+          <a:lstStyle/>
+          <a:p>
+            <a:fld id="{9C7CE217-4467-4B8D-A735-B008FA7C4816}" type="slidenum">
+              <a:rPr lang="LID4096" smtClean="0"/>
+              <a:t>41</a:t>
+            </a:fld>
+            <a:endParaRPr lang="LID4096"/>
+          </a:p>
+        </p:txBody>
+      </p:sp>
+      <p:sp>
+        <p:nvSpPr>
+          <p:cNvPr id="5" name="TextBox 4">
+            <a:extLst>
+              <a:ext uri="{FF2B5EF4-FFF2-40B4-BE49-F238E27FC236}">
+                <a16:creationId xmlns:a16="http://schemas.microsoft.com/office/drawing/2014/main" id="{E70D0454-FA1D-63A3-0ECC-CCC405365DB9}"/>
+              </a:ext>
+            </a:extLst>
+          </p:cNvPr>
+          <p:cNvSpPr txBox="1"/>
+          <p:nvPr/>
+        </p:nvSpPr>
+        <p:spPr>
+          <a:xfrm>
+            <a:off x="6487883" y="1652648"/>
+            <a:ext cx="5279571" cy="4524315"/>
+          </a:xfrm>
+          <a:prstGeom prst="rect">
+            <a:avLst/>
+          </a:prstGeom>
+          <a:solidFill>
+            <a:schemeClr val="bg1">
+              <a:lumMod val="85000"/>
+            </a:schemeClr>
+          </a:solidFill>
+          <a:ln>
+            <a:solidFill>
+              <a:schemeClr val="tx1"/>
+            </a:solidFill>
+          </a:ln>
+        </p:spPr>
+        <p:txBody>
+          <a:bodyPr wrap="square" rtlCol="0">
+            <a:spAutoFit/>
+          </a:bodyPr>
+          <a:lstStyle/>
+          <a:p>
+            <a:pPr lvl="0">
+              <a:defRPr/>
+            </a:pPr>
+            <a:r>
+              <a:rPr lang="en-US" b="1" dirty="0">
+                <a:solidFill>
+                  <a:srgbClr val="FF0000"/>
+                </a:solidFill>
+                <a:latin typeface="Courier New" pitchFamily="49" charset="0"/>
+                <a:cs typeface="Courier New" pitchFamily="49" charset="0"/>
+              </a:rPr>
+              <a:t>library(reticulate)</a:t>
+            </a:r>
+          </a:p>
+          <a:p>
+            <a:pPr lvl="0">
+              <a:defRPr/>
+            </a:pPr>
+            <a:r>
+              <a:rPr lang="en-US" b="1" dirty="0" err="1">
+                <a:solidFill>
+                  <a:srgbClr val="FF0000"/>
+                </a:solidFill>
+                <a:latin typeface="Courier New" pitchFamily="49" charset="0"/>
+                <a:cs typeface="Courier New" pitchFamily="49" charset="0"/>
+              </a:rPr>
+              <a:t>dvclive</a:t>
+            </a:r>
+            <a:r>
+              <a:rPr lang="en-US" b="1" dirty="0">
+                <a:solidFill>
+                  <a:srgbClr val="FF0000"/>
+                </a:solidFill>
+                <a:latin typeface="Courier New" pitchFamily="49" charset="0"/>
+                <a:cs typeface="Courier New" pitchFamily="49" charset="0"/>
+              </a:rPr>
+              <a:t> &lt;- import("</a:t>
+            </a:r>
+            <a:r>
+              <a:rPr lang="en-US" b="1" dirty="0" err="1">
+                <a:solidFill>
+                  <a:srgbClr val="FF0000"/>
+                </a:solidFill>
+                <a:latin typeface="Courier New" pitchFamily="49" charset="0"/>
+                <a:cs typeface="Courier New" pitchFamily="49" charset="0"/>
+              </a:rPr>
+              <a:t>dvclive</a:t>
+            </a:r>
+            <a:r>
+              <a:rPr lang="en-US" b="1" dirty="0">
+                <a:solidFill>
+                  <a:srgbClr val="FF0000"/>
+                </a:solidFill>
+                <a:latin typeface="Courier New" pitchFamily="49" charset="0"/>
+                <a:cs typeface="Courier New" pitchFamily="49" charset="0"/>
+              </a:rPr>
+              <a:t>")</a:t>
+            </a:r>
+          </a:p>
+          <a:p>
+            <a:pPr lvl="0">
+              <a:defRPr/>
+            </a:pPr>
+            <a:r>
+              <a:rPr lang="en-US" b="1" dirty="0">
+                <a:solidFill>
+                  <a:srgbClr val="FF0000"/>
+                </a:solidFill>
+                <a:latin typeface="Courier New" pitchFamily="49" charset="0"/>
+                <a:cs typeface="Courier New" pitchFamily="49" charset="0"/>
+              </a:rPr>
+              <a:t>live &lt;- </a:t>
+            </a:r>
+            <a:r>
+              <a:rPr lang="en-US" b="1" dirty="0" err="1">
+                <a:solidFill>
+                  <a:srgbClr val="FF0000"/>
+                </a:solidFill>
+                <a:latin typeface="Courier New" pitchFamily="49" charset="0"/>
+                <a:cs typeface="Courier New" pitchFamily="49" charset="0"/>
+              </a:rPr>
+              <a:t>dvclive$Live</a:t>
+            </a:r>
+            <a:r>
+              <a:rPr lang="en-US" b="1" dirty="0">
+                <a:solidFill>
+                  <a:srgbClr val="FF0000"/>
+                </a:solidFill>
+                <a:latin typeface="Courier New" pitchFamily="49" charset="0"/>
+                <a:cs typeface="Courier New" pitchFamily="49" charset="0"/>
+              </a:rPr>
+              <a:t>(report='html')</a:t>
+            </a:r>
+          </a:p>
+          <a:p>
+            <a:pPr lvl="0">
+              <a:defRPr/>
+            </a:pPr>
+            <a:endParaRPr lang="en-US" b="1" dirty="0">
+              <a:solidFill>
+                <a:srgbClr val="FF0000"/>
+              </a:solidFill>
+              <a:latin typeface="Courier New" pitchFamily="49" charset="0"/>
+              <a:cs typeface="Courier New" pitchFamily="49" charset="0"/>
+            </a:endParaRPr>
+          </a:p>
+          <a:p>
+            <a:pPr lvl="0">
+              <a:defRPr/>
+            </a:pPr>
+            <a:r>
+              <a:rPr lang="en-US" dirty="0">
+                <a:latin typeface="Courier New" pitchFamily="49" charset="0"/>
+                <a:cs typeface="Courier New" pitchFamily="49" charset="0"/>
+              </a:rPr>
+              <a:t>arguments &lt;- </a:t>
+            </a:r>
+            <a:r>
+              <a:rPr lang="en-US" dirty="0" err="1">
+                <a:latin typeface="Courier New" pitchFamily="49" charset="0"/>
+                <a:cs typeface="Courier New" pitchFamily="49" charset="0"/>
+              </a:rPr>
+              <a:t>commandArgs</a:t>
+            </a:r>
+            <a:r>
+              <a:rPr lang="en-US" dirty="0">
+                <a:latin typeface="Courier New" pitchFamily="49" charset="0"/>
+                <a:cs typeface="Courier New" pitchFamily="49" charset="0"/>
+              </a:rPr>
+              <a:t>(</a:t>
+            </a:r>
+            <a:r>
+              <a:rPr lang="en-US" dirty="0">
+                <a:latin typeface="Courier New" pitchFamily="49" charset="0"/>
+                <a:cs typeface="Courier New" pitchFamily="49" charset="0"/>
+                <a:sym typeface="Symbol" panose="05050102010706020507" pitchFamily="18" charset="2"/>
+              </a:rPr>
+              <a:t></a:t>
+            </a:r>
+            <a:r>
+              <a:rPr lang="en-US" dirty="0">
+                <a:latin typeface="Courier New" pitchFamily="49" charset="0"/>
+                <a:cs typeface="Courier New" pitchFamily="49" charset="0"/>
+              </a:rPr>
+              <a:t>)</a:t>
+            </a:r>
+          </a:p>
+          <a:p>
+            <a:pPr lvl="0">
+              <a:defRPr/>
+            </a:pPr>
+            <a:r>
+              <a:rPr lang="en-US" dirty="0">
+                <a:latin typeface="Courier New" pitchFamily="49" charset="0"/>
+                <a:cs typeface="Courier New" pitchFamily="49" charset="0"/>
+              </a:rPr>
+              <a:t>delta &lt;- </a:t>
+            </a:r>
+            <a:r>
+              <a:rPr lang="en-US" dirty="0" err="1">
+                <a:latin typeface="Courier New" pitchFamily="49" charset="0"/>
+                <a:cs typeface="Courier New" pitchFamily="49" charset="0"/>
+              </a:rPr>
+              <a:t>as.numeric</a:t>
+            </a:r>
+            <a:r>
+              <a:rPr lang="en-US" dirty="0">
+                <a:latin typeface="Courier New" pitchFamily="49" charset="0"/>
+                <a:cs typeface="Courier New" pitchFamily="49" charset="0"/>
+              </a:rPr>
+              <a:t>(arguments[1])</a:t>
+            </a:r>
+          </a:p>
+          <a:p>
+            <a:pPr lvl="0">
+              <a:defRPr/>
+            </a:pPr>
+            <a:r>
+              <a:rPr lang="en-US" b="1" dirty="0" err="1">
+                <a:solidFill>
+                  <a:srgbClr val="FF0000"/>
+                </a:solidFill>
+                <a:latin typeface="Courier New" pitchFamily="49" charset="0"/>
+                <a:cs typeface="Courier New" pitchFamily="49" charset="0"/>
+              </a:rPr>
+              <a:t>live$log_param</a:t>
+            </a:r>
+            <a:r>
+              <a:rPr lang="en-US" b="1" dirty="0">
+                <a:solidFill>
+                  <a:srgbClr val="FF0000"/>
+                </a:solidFill>
+                <a:latin typeface="Courier New" pitchFamily="49" charset="0"/>
+                <a:cs typeface="Courier New" pitchFamily="49" charset="0"/>
+              </a:rPr>
+              <a:t>("delta", delta)</a:t>
+            </a:r>
+          </a:p>
+          <a:p>
+            <a:pPr lvl="0">
+              <a:defRPr/>
+            </a:pPr>
+            <a:endParaRPr lang="en-US" b="1" dirty="0">
+              <a:solidFill>
+                <a:srgbClr val="FF0000"/>
+              </a:solidFill>
+              <a:latin typeface="Courier New" pitchFamily="49" charset="0"/>
+              <a:cs typeface="Courier New" pitchFamily="49" charset="0"/>
+            </a:endParaRPr>
+          </a:p>
+          <a:p>
+            <a:pPr lvl="0">
+              <a:defRPr/>
+            </a:pPr>
+            <a:r>
+              <a:rPr lang="en-US" dirty="0">
+                <a:latin typeface="Courier New" pitchFamily="49" charset="0"/>
+                <a:cs typeface="Courier New" pitchFamily="49" charset="0"/>
+              </a:rPr>
+              <a:t>score &lt;- 0.0</a:t>
+            </a:r>
+          </a:p>
+          <a:p>
+            <a:pPr lvl="0">
+              <a:defRPr/>
+            </a:pPr>
+            <a:r>
+              <a:rPr lang="en-US" dirty="0">
+                <a:latin typeface="Courier New" pitchFamily="49" charset="0"/>
+                <a:cs typeface="Courier New" pitchFamily="49" charset="0"/>
+              </a:rPr>
+              <a:t>for(step in 1:100) {</a:t>
+            </a:r>
+          </a:p>
+          <a:p>
+            <a:pPr lvl="0">
+              <a:defRPr/>
+            </a:pPr>
+            <a:r>
+              <a:rPr lang="en-US" dirty="0">
+                <a:latin typeface="Courier New" pitchFamily="49" charset="0"/>
+                <a:cs typeface="Courier New" pitchFamily="49" charset="0"/>
+              </a:rPr>
+              <a:t>  score &lt;- score + delta</a:t>
+            </a:r>
+          </a:p>
+          <a:p>
+            <a:pPr lvl="0">
+              <a:defRPr/>
+            </a:pPr>
+            <a:r>
+              <a:rPr lang="en-US" b="1" dirty="0">
+                <a:latin typeface="Courier New" pitchFamily="49" charset="0"/>
+                <a:cs typeface="Courier New" pitchFamily="49" charset="0"/>
+              </a:rPr>
+              <a:t>  </a:t>
+            </a:r>
+            <a:r>
+              <a:rPr lang="en-US" b="1" dirty="0" err="1">
+                <a:solidFill>
+                  <a:srgbClr val="FF0000"/>
+                </a:solidFill>
+                <a:latin typeface="Courier New" pitchFamily="49" charset="0"/>
+                <a:cs typeface="Courier New" pitchFamily="49" charset="0"/>
+              </a:rPr>
+              <a:t>live$log_metric</a:t>
+            </a:r>
+            <a:r>
+              <a:rPr lang="en-US" b="1" dirty="0">
+                <a:solidFill>
+                  <a:srgbClr val="FF0000"/>
+                </a:solidFill>
+                <a:latin typeface="Courier New" pitchFamily="49" charset="0"/>
+                <a:cs typeface="Courier New" pitchFamily="49" charset="0"/>
+              </a:rPr>
+              <a:t>("score", score)</a:t>
+            </a:r>
+          </a:p>
+          <a:p>
+            <a:pPr lvl="0">
+              <a:defRPr/>
+            </a:pPr>
+            <a:r>
+              <a:rPr lang="en-US" b="1" dirty="0">
+                <a:solidFill>
+                  <a:srgbClr val="FF0000"/>
+                </a:solidFill>
+                <a:latin typeface="Courier New" pitchFamily="49" charset="0"/>
+                <a:cs typeface="Courier New" pitchFamily="49" charset="0"/>
+              </a:rPr>
+              <a:t>  </a:t>
+            </a:r>
+            <a:r>
+              <a:rPr lang="en-US" b="1" dirty="0" err="1">
+                <a:solidFill>
+                  <a:srgbClr val="FF0000"/>
+                </a:solidFill>
+                <a:latin typeface="Courier New" pitchFamily="49" charset="0"/>
+                <a:cs typeface="Courier New" pitchFamily="49" charset="0"/>
+              </a:rPr>
+              <a:t>live$next_step</a:t>
+            </a:r>
+            <a:r>
+              <a:rPr lang="en-US" b="1" dirty="0">
+                <a:solidFill>
+                  <a:srgbClr val="FF0000"/>
+                </a:solidFill>
+                <a:latin typeface="Courier New" pitchFamily="49" charset="0"/>
+                <a:cs typeface="Courier New" pitchFamily="49" charset="0"/>
+              </a:rPr>
+              <a:t>()</a:t>
+            </a:r>
+          </a:p>
+          <a:p>
+            <a:pPr lvl="0">
+              <a:defRPr/>
+            </a:pPr>
+            <a:r>
+              <a:rPr lang="en-US" dirty="0">
+                <a:latin typeface="Courier New" pitchFamily="49" charset="0"/>
+                <a:cs typeface="Courier New" pitchFamily="49" charset="0"/>
+              </a:rPr>
+              <a:t>}</a:t>
+            </a:r>
+          </a:p>
+          <a:p>
+            <a:pPr lvl="0">
+              <a:defRPr/>
+            </a:pPr>
+            <a:endParaRPr lang="en-US" b="1" dirty="0">
+              <a:solidFill>
+                <a:srgbClr val="FF0000"/>
+              </a:solidFill>
+              <a:latin typeface="Courier New" pitchFamily="49" charset="0"/>
+              <a:cs typeface="Courier New" pitchFamily="49" charset="0"/>
+            </a:endParaRPr>
+          </a:p>
+          <a:p>
+            <a:pPr lvl="0">
+              <a:defRPr/>
+            </a:pPr>
+            <a:r>
+              <a:rPr lang="en-US" b="1" dirty="0" err="1">
+                <a:solidFill>
+                  <a:srgbClr val="FF0000"/>
+                </a:solidFill>
+                <a:latin typeface="Courier New" pitchFamily="49" charset="0"/>
+                <a:cs typeface="Courier New" pitchFamily="49" charset="0"/>
+              </a:rPr>
+              <a:t>live$end</a:t>
+            </a:r>
+            <a:r>
+              <a:rPr lang="en-US" b="1" dirty="0">
+                <a:solidFill>
+                  <a:srgbClr val="FF0000"/>
+                </a:solidFill>
+                <a:latin typeface="Courier New" pitchFamily="49" charset="0"/>
+                <a:cs typeface="Courier New" pitchFamily="49" charset="0"/>
+              </a:rPr>
+              <a:t>()</a:t>
+            </a:r>
+          </a:p>
+        </p:txBody>
+      </p:sp>
+      <p:sp>
+        <p:nvSpPr>
+          <p:cNvPr id="6" name="TextBox 5">
+            <a:extLst>
+              <a:ext uri="{FF2B5EF4-FFF2-40B4-BE49-F238E27FC236}">
+                <a16:creationId xmlns:a16="http://schemas.microsoft.com/office/drawing/2014/main" id="{27E346A6-577F-EDE7-79B9-D41BA4AF4C6B}"/>
+              </a:ext>
+            </a:extLst>
+          </p:cNvPr>
+          <p:cNvSpPr txBox="1"/>
+          <p:nvPr/>
+        </p:nvSpPr>
+        <p:spPr>
+          <a:xfrm>
+            <a:off x="424546" y="2985631"/>
+            <a:ext cx="4931226" cy="2031325"/>
+          </a:xfrm>
+          <a:prstGeom prst="rect">
+            <a:avLst/>
+          </a:prstGeom>
+          <a:solidFill>
+            <a:schemeClr val="bg1">
+              <a:lumMod val="85000"/>
+            </a:schemeClr>
+          </a:solidFill>
+          <a:ln>
+            <a:solidFill>
+              <a:schemeClr val="tx1"/>
+            </a:solidFill>
+          </a:ln>
+        </p:spPr>
+        <p:txBody>
+          <a:bodyPr wrap="square" rtlCol="0">
+            <a:spAutoFit/>
+          </a:bodyPr>
+          <a:lstStyle/>
+          <a:p>
+            <a:pPr lvl="0">
+              <a:defRPr/>
+            </a:pPr>
+            <a:r>
+              <a:rPr lang="en-US" dirty="0">
+                <a:latin typeface="Courier New" pitchFamily="49" charset="0"/>
+                <a:cs typeface="Courier New" pitchFamily="49" charset="0"/>
+              </a:rPr>
+              <a:t>arguments &lt;- </a:t>
+            </a:r>
+            <a:r>
+              <a:rPr lang="en-US" dirty="0" err="1">
+                <a:latin typeface="Courier New" pitchFamily="49" charset="0"/>
+                <a:cs typeface="Courier New" pitchFamily="49" charset="0"/>
+              </a:rPr>
+              <a:t>commandArgs</a:t>
+            </a:r>
+            <a:r>
+              <a:rPr lang="en-US" dirty="0">
+                <a:latin typeface="Courier New" pitchFamily="49" charset="0"/>
+                <a:cs typeface="Courier New" pitchFamily="49" charset="0"/>
+              </a:rPr>
+              <a:t>(</a:t>
+            </a:r>
+            <a:r>
+              <a:rPr lang="en-US" dirty="0">
+                <a:latin typeface="Courier New" pitchFamily="49" charset="0"/>
+                <a:cs typeface="Courier New" pitchFamily="49" charset="0"/>
+                <a:sym typeface="Symbol" panose="05050102010706020507" pitchFamily="18" charset="2"/>
+              </a:rPr>
+              <a:t></a:t>
+            </a:r>
+            <a:r>
+              <a:rPr lang="en-US" dirty="0">
+                <a:latin typeface="Courier New" pitchFamily="49" charset="0"/>
+                <a:cs typeface="Courier New" pitchFamily="49" charset="0"/>
+              </a:rPr>
+              <a:t>)</a:t>
+            </a:r>
+          </a:p>
+          <a:p>
+            <a:pPr lvl="0">
+              <a:defRPr/>
+            </a:pPr>
+            <a:r>
+              <a:rPr lang="en-US" dirty="0">
+                <a:latin typeface="Courier New" pitchFamily="49" charset="0"/>
+                <a:cs typeface="Courier New" pitchFamily="49" charset="0"/>
+              </a:rPr>
+              <a:t>delta &lt;- </a:t>
+            </a:r>
+            <a:r>
+              <a:rPr lang="en-US" dirty="0" err="1">
+                <a:latin typeface="Courier New" pitchFamily="49" charset="0"/>
+                <a:cs typeface="Courier New" pitchFamily="49" charset="0"/>
+              </a:rPr>
+              <a:t>as.numeric</a:t>
+            </a:r>
+            <a:r>
+              <a:rPr lang="en-US" dirty="0">
+                <a:latin typeface="Courier New" pitchFamily="49" charset="0"/>
+                <a:cs typeface="Courier New" pitchFamily="49" charset="0"/>
+              </a:rPr>
+              <a:t>(arguments[1])</a:t>
+            </a:r>
+          </a:p>
+          <a:p>
+            <a:pPr lvl="0">
+              <a:defRPr/>
+            </a:pPr>
+            <a:endParaRPr lang="en-US" b="1" dirty="0">
+              <a:solidFill>
+                <a:srgbClr val="FF0000"/>
+              </a:solidFill>
+              <a:latin typeface="Courier New" pitchFamily="49" charset="0"/>
+              <a:cs typeface="Courier New" pitchFamily="49" charset="0"/>
+            </a:endParaRPr>
+          </a:p>
+          <a:p>
+            <a:pPr lvl="0">
+              <a:defRPr/>
+            </a:pPr>
+            <a:r>
+              <a:rPr lang="en-US" dirty="0">
+                <a:latin typeface="Courier New" pitchFamily="49" charset="0"/>
+                <a:cs typeface="Courier New" pitchFamily="49" charset="0"/>
+              </a:rPr>
+              <a:t>score &lt;- 0.0</a:t>
+            </a:r>
+          </a:p>
+          <a:p>
+            <a:pPr lvl="0">
+              <a:defRPr/>
+            </a:pPr>
+            <a:r>
+              <a:rPr lang="en-US" dirty="0">
+                <a:latin typeface="Courier New" pitchFamily="49" charset="0"/>
+                <a:cs typeface="Courier New" pitchFamily="49" charset="0"/>
+              </a:rPr>
+              <a:t>for(step in 1:100) {</a:t>
+            </a:r>
+          </a:p>
+          <a:p>
+            <a:pPr lvl="0">
+              <a:defRPr/>
+            </a:pPr>
+            <a:r>
+              <a:rPr lang="en-US" dirty="0">
+                <a:latin typeface="Courier New" pitchFamily="49" charset="0"/>
+                <a:cs typeface="Courier New" pitchFamily="49" charset="0"/>
+              </a:rPr>
+              <a:t>  score &lt;- score + delta</a:t>
+            </a:r>
+          </a:p>
+          <a:p>
+            <a:pPr lvl="0">
+              <a:defRPr/>
+            </a:pPr>
+            <a:r>
+              <a:rPr lang="en-US" dirty="0">
+                <a:latin typeface="Courier New" pitchFamily="49" charset="0"/>
+                <a:cs typeface="Courier New" pitchFamily="49" charset="0"/>
+              </a:rPr>
+              <a:t>}</a:t>
+            </a:r>
+          </a:p>
+        </p:txBody>
+      </p:sp>
+      <p:sp>
+        <p:nvSpPr>
+          <p:cNvPr id="8" name="Arrow: Right 7">
+            <a:extLst>
+              <a:ext uri="{FF2B5EF4-FFF2-40B4-BE49-F238E27FC236}">
+                <a16:creationId xmlns:a16="http://schemas.microsoft.com/office/drawing/2014/main" id="{A90D2F71-9A9C-35DF-9C3C-56F35709DD44}"/>
+              </a:ext>
+            </a:extLst>
+          </p:cNvPr>
+          <p:cNvSpPr/>
+          <p:nvPr/>
+        </p:nvSpPr>
+        <p:spPr>
+          <a:xfrm>
+            <a:off x="5638802" y="3703050"/>
+            <a:ext cx="609603" cy="298243"/>
+          </a:xfrm>
+          <a:prstGeom prst="rightArrow">
+            <a:avLst/>
+          </a:prstGeom>
+          <a:solidFill>
+            <a:srgbClr val="FF0000"/>
+          </a:solidFill>
+          <a:ln>
+            <a:solidFill>
+              <a:srgbClr val="FF0000"/>
+            </a:solidFill>
+          </a:ln>
+        </p:spPr>
+        <p:style>
+          <a:lnRef idx="2">
+            <a:schemeClr val="accent1">
+              <a:shade val="15000"/>
+            </a:schemeClr>
+          </a:lnRef>
+          <a:fillRef idx="1">
+            <a:schemeClr val="accent1"/>
+          </a:fillRef>
+          <a:effectRef idx="0">
+            <a:schemeClr val="accent1"/>
+          </a:effectRef>
+          <a:fontRef idx="minor">
+            <a:schemeClr val="lt1"/>
+          </a:fontRef>
+        </p:style>
+        <p:txBody>
+          <a:bodyPr rtlCol="0" anchor="ctr"/>
+          <a:lstStyle/>
+          <a:p>
+            <a:pPr algn="ctr"/>
+            <a:endParaRPr lang="LID4096"/>
+          </a:p>
+        </p:txBody>
+      </p:sp>
+      <p:grpSp>
+        <p:nvGrpSpPr>
+          <p:cNvPr id="10" name="Group 9">
+            <a:extLst>
+              <a:ext uri="{FF2B5EF4-FFF2-40B4-BE49-F238E27FC236}">
+                <a16:creationId xmlns:a16="http://schemas.microsoft.com/office/drawing/2014/main" id="{EF7EB8BB-69BD-CD21-17DA-6FE7D5FF9C65}"/>
+              </a:ext>
+            </a:extLst>
+          </p:cNvPr>
+          <p:cNvGrpSpPr/>
+          <p:nvPr/>
+        </p:nvGrpSpPr>
+        <p:grpSpPr>
+          <a:xfrm>
+            <a:off x="424546" y="5086630"/>
+            <a:ext cx="5610300" cy="1090332"/>
+            <a:chOff x="424546" y="5086630"/>
+            <a:chExt cx="5610300" cy="1090332"/>
+          </a:xfrm>
+        </p:grpSpPr>
+        <p:sp>
+          <p:nvSpPr>
+            <p:cNvPr id="7" name="TextBox 6">
+              <a:extLst>
+                <a:ext uri="{FF2B5EF4-FFF2-40B4-BE49-F238E27FC236}">
+                  <a16:creationId xmlns:a16="http://schemas.microsoft.com/office/drawing/2014/main" id="{03D7CA67-8F01-1A12-6ABC-77A5963E9FA5}"/>
+                </a:ext>
+              </a:extLst>
+            </p:cNvPr>
+            <p:cNvSpPr txBox="1"/>
+            <p:nvPr/>
+          </p:nvSpPr>
+          <p:spPr>
+            <a:xfrm>
+              <a:off x="424546" y="5653742"/>
+              <a:ext cx="5346079" cy="523220"/>
+            </a:xfrm>
+            <a:prstGeom prst="rect">
+              <a:avLst/>
+            </a:prstGeom>
+            <a:noFill/>
+            <a:ln>
+              <a:solidFill>
+                <a:schemeClr val="tx1"/>
+              </a:solidFill>
+            </a:ln>
+          </p:spPr>
+          <p:txBody>
+            <a:bodyPr wrap="none" rtlCol="0">
+              <a:spAutoFit/>
+            </a:bodyPr>
+            <a:lstStyle/>
+            <a:p>
+              <a:r>
+                <a:rPr lang="en-US" sz="2800" dirty="0"/>
+                <a:t>Don’t forget to call </a:t>
+              </a:r>
+              <a:r>
+                <a:rPr lang="en-US" sz="2800" dirty="0" err="1">
+                  <a:latin typeface="Courier New" panose="02070309020205020404" pitchFamily="49" charset="0"/>
+                  <a:cs typeface="Courier New" panose="02070309020205020404" pitchFamily="49" charset="0"/>
+                </a:rPr>
+                <a:t>live$end</a:t>
+              </a:r>
+              <a:r>
+                <a:rPr lang="en-US" sz="2800" dirty="0">
+                  <a:latin typeface="Courier New" panose="02070309020205020404" pitchFamily="49" charset="0"/>
+                  <a:cs typeface="Courier New" panose="02070309020205020404" pitchFamily="49" charset="0"/>
+                </a:rPr>
+                <a:t>()</a:t>
+              </a:r>
+              <a:r>
+                <a:rPr lang="en-US" sz="2800" dirty="0"/>
+                <a:t>!</a:t>
+              </a:r>
+              <a:endParaRPr lang="LID4096" sz="2800" dirty="0"/>
+            </a:p>
+          </p:txBody>
+        </p:sp>
+        <p:pic>
+          <p:nvPicPr>
+            <p:cNvPr id="9" name="Picture 3" descr="C:\Users\lucg5005\AppData\Local\Microsoft\Windows\Temporary Internet Files\Content.IE5\T8RCCH8G\cute_snail_by_gniyuhs-d4lvbji[1].png">
+              <a:extLst>
+                <a:ext uri="{FF2B5EF4-FFF2-40B4-BE49-F238E27FC236}">
+                  <a16:creationId xmlns:a16="http://schemas.microsoft.com/office/drawing/2014/main" id="{5366A10D-2E65-B4F3-750B-DA081429EF65}"/>
+                </a:ext>
+              </a:extLst>
+            </p:cNvPr>
+            <p:cNvPicPr>
+              <a:picLocks noChangeAspect="1" noChangeArrowheads="1"/>
+            </p:cNvPicPr>
+            <p:nvPr/>
+          </p:nvPicPr>
+          <p:blipFill>
+            <a:blip r:embed="rId2" cstate="print">
+              <a:extLst>
+                <a:ext uri="{28A0092B-C50C-407E-A947-70E740481C1C}">
+                  <a14:useLocalDpi xmlns:a14="http://schemas.microsoft.com/office/drawing/2010/main" val="0"/>
+                </a:ext>
+              </a:extLst>
+            </a:blip>
+            <a:srcRect/>
+            <a:stretch>
+              <a:fillRect/>
+            </a:stretch>
+          </p:blipFill>
+          <p:spPr bwMode="auto">
+            <a:xfrm>
+              <a:off x="5242758" y="5086630"/>
+              <a:ext cx="792088" cy="792088"/>
+            </a:xfrm>
+            <a:prstGeom prst="rect">
+              <a:avLst/>
+            </a:prstGeom>
+            <a:noFill/>
+            <a:extLst>
+              <a:ext uri="{909E8E84-426E-40DD-AFC4-6F175D3DCCD1}">
+                <a14:hiddenFill xmlns:a14="http://schemas.microsoft.com/office/drawing/2010/main">
+                  <a:solidFill>
+                    <a:srgbClr val="FFFFFF"/>
+                  </a:solidFill>
+                </a14:hiddenFill>
+              </a:ext>
+            </a:extLst>
+          </p:spPr>
+        </p:pic>
+      </p:grpSp>
+    </p:spTree>
+    <p:extLst>
+      <p:ext uri="{BB962C8B-B14F-4D97-AF65-F5344CB8AC3E}">
+        <p14:creationId xmlns:p14="http://schemas.microsoft.com/office/powerpoint/2010/main" val="2278707214"/>
+      </p:ext>
+    </p:extLst>
+  </p:cSld>
+  <p:clrMapOvr>
+    <a:masterClrMapping/>
+  </p:clrMapOvr>
 </p:sld>
 </file>
 
@@ -27346,7 +28204,7 @@
         </p:nvSpPr>
         <p:spPr>
           <a:xfrm>
-            <a:off x="761802" y="2743200"/>
+            <a:off x="761802" y="1643742"/>
             <a:ext cx="4646905" cy="3613149"/>
           </a:xfrm>
         </p:spPr>
@@ -27380,6 +28238,26 @@
             <a:r>
               <a:rPr lang="en-US" sz="2000" dirty="0"/>
               <a:t>Requires flexibility to experiment</a:t>
+            </a:r>
+          </a:p>
+          <a:p>
+            <a:pPr lvl="1"/>
+            <a:endParaRPr lang="en-US" sz="2000" dirty="0"/>
+          </a:p>
+          <a:p>
+            <a:endParaRPr lang="en-US" sz="2400" dirty="0"/>
+          </a:p>
+          <a:p>
+            <a:r>
+              <a:rPr lang="en-US" sz="2000" dirty="0"/>
+              <a:t>However, not limited to ML!</a:t>
+            </a:r>
+          </a:p>
+          <a:p>
+            <a:pPr lvl="1"/>
+            <a:r>
+              <a:rPr lang="en-US" sz="2000" dirty="0"/>
+              <a:t>Any type of experiments</a:t>
             </a:r>
             <a:endParaRPr lang="LID4096" sz="2000" dirty="0"/>
           </a:p>
@@ -27484,7 +28362,7 @@
         </p:nvSpPr>
         <p:spPr>
           <a:xfrm>
-            <a:off x="2486981" y="5663852"/>
+            <a:off x="2486981" y="3704421"/>
             <a:ext cx="1122038" cy="461665"/>
           </a:xfrm>
           <a:prstGeom prst="rect">
@@ -27511,6 +28389,104 @@
           </a:p>
         </p:txBody>
       </p:sp>
+      <p:grpSp>
+        <p:nvGrpSpPr>
+          <p:cNvPr id="9" name="Group 8">
+            <a:extLst>
+              <a:ext uri="{FF2B5EF4-FFF2-40B4-BE49-F238E27FC236}">
+                <a16:creationId xmlns:a16="http://schemas.microsoft.com/office/drawing/2014/main" id="{588CB673-09F9-92B7-3C69-DAC9236D1FB6}"/>
+              </a:ext>
+            </a:extLst>
+          </p:cNvPr>
+          <p:cNvGrpSpPr/>
+          <p:nvPr/>
+        </p:nvGrpSpPr>
+        <p:grpSpPr>
+          <a:xfrm>
+            <a:off x="2441103" y="4961332"/>
+            <a:ext cx="1557440" cy="714591"/>
+            <a:chOff x="2441103" y="4961332"/>
+            <a:chExt cx="1557440" cy="714591"/>
+          </a:xfrm>
+        </p:grpSpPr>
+        <p:sp>
+          <p:nvSpPr>
+            <p:cNvPr id="7" name="TextBox 6">
+              <a:extLst>
+                <a:ext uri="{FF2B5EF4-FFF2-40B4-BE49-F238E27FC236}">
+                  <a16:creationId xmlns:a16="http://schemas.microsoft.com/office/drawing/2014/main" id="{B834E0CF-CC55-76E9-BAC1-C3426E1C6B88}"/>
+                </a:ext>
+              </a:extLst>
+            </p:cNvPr>
+            <p:cNvSpPr txBox="1"/>
+            <p:nvPr/>
+          </p:nvSpPr>
+          <p:spPr>
+            <a:xfrm>
+              <a:off x="2441103" y="5214258"/>
+              <a:ext cx="1213794" cy="461665"/>
+            </a:xfrm>
+            <a:prstGeom prst="rect">
+              <a:avLst/>
+            </a:prstGeom>
+            <a:noFill/>
+            <a:ln>
+              <a:solidFill>
+                <a:schemeClr val="tx1"/>
+              </a:solidFill>
+            </a:ln>
+          </p:spPr>
+          <p:txBody>
+            <a:bodyPr wrap="none" rtlCol="0">
+              <a:spAutoFit/>
+            </a:bodyPr>
+            <a:lstStyle/>
+            <a:p>
+              <a:r>
+                <a:rPr lang="en-US" sz="2400" dirty="0" err="1"/>
+                <a:t>ExpOps</a:t>
+              </a:r>
+              <a:endParaRPr lang="LID4096" sz="2400" dirty="0"/>
+            </a:p>
+          </p:txBody>
+        </p:sp>
+        <p:pic>
+          <p:nvPicPr>
+            <p:cNvPr id="8" name="Graphic 7" descr="Thumbs up sign with solid fill">
+              <a:extLst>
+                <a:ext uri="{FF2B5EF4-FFF2-40B4-BE49-F238E27FC236}">
+                  <a16:creationId xmlns:a16="http://schemas.microsoft.com/office/drawing/2014/main" id="{BCE167F5-DE8A-5BE7-13B1-519EC16B6D4C}"/>
+                </a:ext>
+              </a:extLst>
+            </p:cNvPr>
+            <p:cNvPicPr>
+              <a:picLocks noChangeAspect="1"/>
+            </p:cNvPicPr>
+            <p:nvPr/>
+          </p:nvPicPr>
+          <p:blipFill>
+            <a:blip r:embed="rId3">
+              <a:extLst>
+                <a:ext uri="{96DAC541-7B7A-43D3-8B79-37D633B846F1}">
+                  <asvg:svgBlip xmlns:asvg="http://schemas.microsoft.com/office/drawing/2016/SVG/main" r:embed="rId4"/>
+                </a:ext>
+              </a:extLst>
+            </a:blip>
+            <a:stretch>
+              <a:fillRect/>
+            </a:stretch>
+          </p:blipFill>
+          <p:spPr>
+            <a:xfrm>
+              <a:off x="3493468" y="4961332"/>
+              <a:ext cx="505075" cy="505075"/>
+            </a:xfrm>
+            <a:prstGeom prst="rect">
+              <a:avLst/>
+            </a:prstGeom>
+          </p:spPr>
+        </p:pic>
+      </p:grpSp>
     </p:spTree>
     <p:extLst>
       <p:ext uri="{BB962C8B-B14F-4D97-AF65-F5344CB8AC3E}">

</xml_diff>

<commit_message>
Add slide on reading YAML with R
</commit_message>
<xml_diff>
--- a/mlops_on_hpc.pptx
+++ b/mlops_on_hpc.pptx
@@ -5,7 +5,7 @@
     <p:sldMasterId id="2147483648" r:id="rId1"/>
   </p:sldMasterIdLst>
   <p:notesMasterIdLst>
-    <p:notesMasterId r:id="rId43"/>
+    <p:notesMasterId r:id="rId44"/>
   </p:notesMasterIdLst>
   <p:sldIdLst>
     <p:sldId id="257" r:id="rId2"/>
@@ -38,17 +38,18 @@
     <p:sldId id="382" r:id="rId29"/>
     <p:sldId id="381" r:id="rId30"/>
     <p:sldId id="383" r:id="rId31"/>
-    <p:sldId id="384" r:id="rId32"/>
-    <p:sldId id="385" r:id="rId33"/>
-    <p:sldId id="386" r:id="rId34"/>
-    <p:sldId id="387" r:id="rId35"/>
-    <p:sldId id="388" r:id="rId36"/>
-    <p:sldId id="390" r:id="rId37"/>
-    <p:sldId id="389" r:id="rId38"/>
-    <p:sldId id="392" r:id="rId39"/>
-    <p:sldId id="391" r:id="rId40"/>
-    <p:sldId id="393" r:id="rId41"/>
-    <p:sldId id="394" r:id="rId42"/>
+    <p:sldId id="395" r:id="rId32"/>
+    <p:sldId id="384" r:id="rId33"/>
+    <p:sldId id="385" r:id="rId34"/>
+    <p:sldId id="386" r:id="rId35"/>
+    <p:sldId id="387" r:id="rId36"/>
+    <p:sldId id="388" r:id="rId37"/>
+    <p:sldId id="390" r:id="rId38"/>
+    <p:sldId id="389" r:id="rId39"/>
+    <p:sldId id="392" r:id="rId40"/>
+    <p:sldId id="391" r:id="rId41"/>
+    <p:sldId id="393" r:id="rId42"/>
+    <p:sldId id="394" r:id="rId43"/>
   </p:sldIdLst>
   <p:sldSz cx="12192000" cy="6858000"/>
   <p:notesSz cx="6858000" cy="9144000"/>
@@ -19510,6 +19511,420 @@
   <p:cSld>
     <p:spTree>
       <p:nvGrpSpPr>
+        <p:cNvPr id="1" name=""/>
+        <p:cNvGrpSpPr/>
+        <p:nvPr/>
+      </p:nvGrpSpPr>
+      <p:grpSpPr>
+        <a:xfrm>
+          <a:off x="0" y="0"/>
+          <a:ext cx="0" cy="0"/>
+          <a:chOff x="0" y="0"/>
+          <a:chExt cx="0" cy="0"/>
+        </a:xfrm>
+      </p:grpSpPr>
+      <p:sp>
+        <p:nvSpPr>
+          <p:cNvPr id="2" name="Title 1">
+            <a:extLst>
+              <a:ext uri="{FF2B5EF4-FFF2-40B4-BE49-F238E27FC236}">
+                <a16:creationId xmlns:a16="http://schemas.microsoft.com/office/drawing/2014/main" id="{C9F544F1-4B74-2885-B07B-CCAFEFA93C04}"/>
+              </a:ext>
+            </a:extLst>
+          </p:cNvPr>
+          <p:cNvSpPr>
+            <a:spLocks noGrp="1"/>
+          </p:cNvSpPr>
+          <p:nvPr>
+            <p:ph type="title"/>
+          </p:nvPr>
+        </p:nvSpPr>
+        <p:spPr/>
+        <p:txBody>
+          <a:bodyPr/>
+          <a:lstStyle/>
+          <a:p>
+            <a:r>
+              <a:rPr lang="en-US" dirty="0"/>
+              <a:t>What about R?</a:t>
+            </a:r>
+            <a:endParaRPr lang="LID4096" dirty="0"/>
+          </a:p>
+        </p:txBody>
+      </p:sp>
+      <p:sp>
+        <p:nvSpPr>
+          <p:cNvPr id="3" name="Content Placeholder 2">
+            <a:extLst>
+              <a:ext uri="{FF2B5EF4-FFF2-40B4-BE49-F238E27FC236}">
+                <a16:creationId xmlns:a16="http://schemas.microsoft.com/office/drawing/2014/main" id="{E5B6B181-EA28-ABED-DC60-BA5FB6689D02}"/>
+              </a:ext>
+            </a:extLst>
+          </p:cNvPr>
+          <p:cNvSpPr>
+            <a:spLocks noGrp="1"/>
+          </p:cNvSpPr>
+          <p:nvPr>
+            <p:ph idx="1"/>
+          </p:nvPr>
+        </p:nvSpPr>
+        <p:spPr/>
+        <p:txBody>
+          <a:bodyPr/>
+          <a:lstStyle/>
+          <a:p>
+            <a:r>
+              <a:rPr lang="en-US" dirty="0"/>
+              <a:t>Nothing R specific</a:t>
+            </a:r>
+          </a:p>
+          <a:p>
+            <a:endParaRPr lang="en-US" dirty="0"/>
+          </a:p>
+          <a:p>
+            <a:endParaRPr lang="en-US" dirty="0"/>
+          </a:p>
+          <a:p>
+            <a:endParaRPr lang="en-US" dirty="0"/>
+          </a:p>
+          <a:p>
+            <a:endParaRPr lang="en-US" dirty="0"/>
+          </a:p>
+          <a:p>
+            <a:r>
+              <a:rPr lang="en-US" dirty="0"/>
+              <a:t>Reading YAML files</a:t>
+            </a:r>
+            <a:endParaRPr lang="LID4096" dirty="0"/>
+          </a:p>
+        </p:txBody>
+      </p:sp>
+      <p:sp>
+        <p:nvSpPr>
+          <p:cNvPr id="4" name="Slide Number Placeholder 3">
+            <a:extLst>
+              <a:ext uri="{FF2B5EF4-FFF2-40B4-BE49-F238E27FC236}">
+                <a16:creationId xmlns:a16="http://schemas.microsoft.com/office/drawing/2014/main" id="{CECFE272-6DB1-CDF8-5F57-BA7CF8637EF7}"/>
+              </a:ext>
+            </a:extLst>
+          </p:cNvPr>
+          <p:cNvSpPr>
+            <a:spLocks noGrp="1"/>
+          </p:cNvSpPr>
+          <p:nvPr>
+            <p:ph type="sldNum" sz="quarter" idx="12"/>
+          </p:nvPr>
+        </p:nvSpPr>
+        <p:spPr/>
+        <p:txBody>
+          <a:bodyPr/>
+          <a:lstStyle/>
+          <a:p>
+            <a:fld id="{9C7CE217-4467-4B8D-A735-B008FA7C4816}" type="slidenum">
+              <a:rPr lang="LID4096" smtClean="0"/>
+              <a:t>31</a:t>
+            </a:fld>
+            <a:endParaRPr lang="LID4096"/>
+          </a:p>
+        </p:txBody>
+      </p:sp>
+      <p:grpSp>
+        <p:nvGrpSpPr>
+          <p:cNvPr id="10" name="Group 9">
+            <a:extLst>
+              <a:ext uri="{FF2B5EF4-FFF2-40B4-BE49-F238E27FC236}">
+                <a16:creationId xmlns:a16="http://schemas.microsoft.com/office/drawing/2014/main" id="{A615923F-26B2-5EBA-A2A7-17CADE222723}"/>
+              </a:ext>
+            </a:extLst>
+          </p:cNvPr>
+          <p:cNvGrpSpPr/>
+          <p:nvPr/>
+        </p:nvGrpSpPr>
+        <p:grpSpPr>
+          <a:xfrm>
+            <a:off x="4463144" y="1459360"/>
+            <a:ext cx="7175800" cy="2898163"/>
+            <a:chOff x="4702629" y="1056588"/>
+            <a:chExt cx="7175800" cy="2898163"/>
+          </a:xfrm>
+        </p:grpSpPr>
+        <p:pic>
+          <p:nvPicPr>
+            <p:cNvPr id="6" name="Picture 5">
+              <a:extLst>
+                <a:ext uri="{FF2B5EF4-FFF2-40B4-BE49-F238E27FC236}">
+                  <a16:creationId xmlns:a16="http://schemas.microsoft.com/office/drawing/2014/main" id="{B5AD6433-67DE-D458-122B-F8013C6BBE5A}"/>
+                </a:ext>
+              </a:extLst>
+            </p:cNvPr>
+            <p:cNvPicPr>
+              <a:picLocks noChangeAspect="1"/>
+            </p:cNvPicPr>
+            <p:nvPr/>
+          </p:nvPicPr>
+          <p:blipFill>
+            <a:blip r:embed="rId2"/>
+            <a:stretch>
+              <a:fillRect/>
+            </a:stretch>
+          </p:blipFill>
+          <p:spPr>
+            <a:xfrm>
+              <a:off x="4702629" y="1056588"/>
+              <a:ext cx="7175800" cy="2898163"/>
+            </a:xfrm>
+            <a:prstGeom prst="rect">
+              <a:avLst/>
+            </a:prstGeom>
+          </p:spPr>
+        </p:pic>
+        <p:sp>
+          <p:nvSpPr>
+            <p:cNvPr id="7" name="TextBox 6">
+              <a:extLst>
+                <a:ext uri="{FF2B5EF4-FFF2-40B4-BE49-F238E27FC236}">
+                  <a16:creationId xmlns:a16="http://schemas.microsoft.com/office/drawing/2014/main" id="{3F898E73-0AA3-D92D-E42D-2BC69526C632}"/>
+                </a:ext>
+              </a:extLst>
+            </p:cNvPr>
+            <p:cNvSpPr txBox="1"/>
+            <p:nvPr/>
+          </p:nvSpPr>
+          <p:spPr>
+            <a:xfrm>
+              <a:off x="5083629" y="2505670"/>
+              <a:ext cx="1654628" cy="923330"/>
+            </a:xfrm>
+            <a:prstGeom prst="rect">
+              <a:avLst/>
+            </a:prstGeom>
+            <a:solidFill>
+              <a:schemeClr val="bg1"/>
+            </a:solidFill>
+          </p:spPr>
+          <p:txBody>
+            <a:bodyPr wrap="square" rtlCol="0">
+              <a:spAutoFit/>
+            </a:bodyPr>
+            <a:lstStyle/>
+            <a:p>
+              <a:pPr algn="ctr"/>
+              <a:r>
+                <a:rPr lang="en-US" dirty="0"/>
+                <a:t>This is not a</a:t>
+              </a:r>
+              <a:br>
+                <a:rPr lang="en-US" dirty="0"/>
+              </a:br>
+              <a:r>
+                <a:rPr lang="en-US" dirty="0"/>
+                <a:t>problem you</a:t>
+              </a:r>
+              <a:br>
+                <a:rPr lang="en-US" dirty="0"/>
+              </a:br>
+              <a:r>
+                <a:rPr lang="en-US" dirty="0"/>
+                <a:t>need to solve</a:t>
+              </a:r>
+              <a:endParaRPr lang="LID4096" dirty="0"/>
+            </a:p>
+          </p:txBody>
+        </p:sp>
+      </p:grpSp>
+      <p:sp>
+        <p:nvSpPr>
+          <p:cNvPr id="8" name="TextBox 7">
+            <a:extLst>
+              <a:ext uri="{FF2B5EF4-FFF2-40B4-BE49-F238E27FC236}">
+                <a16:creationId xmlns:a16="http://schemas.microsoft.com/office/drawing/2014/main" id="{C6F87B21-0884-D9E0-3FA8-4BAFD814E5F2}"/>
+              </a:ext>
+            </a:extLst>
+          </p:cNvPr>
+          <p:cNvSpPr txBox="1"/>
+          <p:nvPr/>
+        </p:nvSpPr>
+        <p:spPr>
+          <a:xfrm>
+            <a:off x="1077687" y="5201247"/>
+            <a:ext cx="5987142" cy="1200329"/>
+          </a:xfrm>
+          <a:prstGeom prst="rect">
+            <a:avLst/>
+          </a:prstGeom>
+          <a:solidFill>
+            <a:schemeClr val="bg1">
+              <a:lumMod val="85000"/>
+            </a:schemeClr>
+          </a:solidFill>
+          <a:ln>
+            <a:solidFill>
+              <a:schemeClr val="tx1"/>
+            </a:solidFill>
+          </a:ln>
+        </p:spPr>
+        <p:txBody>
+          <a:bodyPr wrap="square" rtlCol="0">
+            <a:spAutoFit/>
+          </a:bodyPr>
+          <a:lstStyle/>
+          <a:p>
+            <a:pPr lvl="0">
+              <a:defRPr/>
+            </a:pPr>
+            <a:r>
+              <a:rPr lang="en-US" dirty="0">
+                <a:solidFill>
+                  <a:prstClr val="black"/>
+                </a:solidFill>
+                <a:latin typeface="Courier New" pitchFamily="49" charset="0"/>
+                <a:cs typeface="Courier New" pitchFamily="49" charset="0"/>
+              </a:rPr>
+              <a:t>library(</a:t>
+            </a:r>
+            <a:r>
+              <a:rPr lang="en-US" dirty="0" err="1">
+                <a:solidFill>
+                  <a:prstClr val="black"/>
+                </a:solidFill>
+                <a:latin typeface="Courier New" pitchFamily="49" charset="0"/>
+                <a:cs typeface="Courier New" pitchFamily="49" charset="0"/>
+              </a:rPr>
+              <a:t>yaml</a:t>
+            </a:r>
+            <a:r>
+              <a:rPr lang="en-US" dirty="0">
+                <a:solidFill>
+                  <a:prstClr val="black"/>
+                </a:solidFill>
+                <a:latin typeface="Courier New" pitchFamily="49" charset="0"/>
+                <a:cs typeface="Courier New" pitchFamily="49" charset="0"/>
+              </a:rPr>
+              <a:t>)</a:t>
+            </a:r>
+          </a:p>
+          <a:p>
+            <a:pPr lvl="0">
+              <a:defRPr/>
+            </a:pPr>
+            <a:endParaRPr lang="en-US" dirty="0">
+              <a:solidFill>
+                <a:prstClr val="black"/>
+              </a:solidFill>
+              <a:latin typeface="Courier New" pitchFamily="49" charset="0"/>
+              <a:cs typeface="Courier New" pitchFamily="49" charset="0"/>
+            </a:endParaRPr>
+          </a:p>
+          <a:p>
+            <a:pPr lvl="0">
+              <a:defRPr/>
+            </a:pPr>
+            <a:r>
+              <a:rPr lang="en-US" dirty="0">
+                <a:solidFill>
+                  <a:prstClr val="black"/>
+                </a:solidFill>
+                <a:latin typeface="Courier New" pitchFamily="49" charset="0"/>
+                <a:cs typeface="Courier New" pitchFamily="49" charset="0"/>
+              </a:rPr>
+              <a:t>config &lt;- </a:t>
+            </a:r>
+            <a:r>
+              <a:rPr lang="en-US" dirty="0" err="1">
+                <a:solidFill>
+                  <a:prstClr val="black"/>
+                </a:solidFill>
+                <a:latin typeface="Courier New" pitchFamily="49" charset="0"/>
+                <a:cs typeface="Courier New" pitchFamily="49" charset="0"/>
+              </a:rPr>
+              <a:t>yaml.load_file</a:t>
+            </a:r>
+            <a:r>
+              <a:rPr lang="en-US" dirty="0">
+                <a:solidFill>
+                  <a:prstClr val="black"/>
+                </a:solidFill>
+                <a:latin typeface="Courier New" pitchFamily="49" charset="0"/>
+                <a:cs typeface="Courier New" pitchFamily="49" charset="0"/>
+              </a:rPr>
+              <a:t>("</a:t>
+            </a:r>
+            <a:r>
+              <a:rPr lang="en-US" dirty="0" err="1">
+                <a:solidFill>
+                  <a:prstClr val="black"/>
+                </a:solidFill>
+                <a:latin typeface="Courier New" pitchFamily="49" charset="0"/>
+                <a:cs typeface="Courier New" pitchFamily="49" charset="0"/>
+              </a:rPr>
+              <a:t>params.yaml</a:t>
+            </a:r>
+            <a:r>
+              <a:rPr lang="en-US" dirty="0">
+                <a:solidFill>
+                  <a:prstClr val="black"/>
+                </a:solidFill>
+                <a:latin typeface="Courier New" pitchFamily="49" charset="0"/>
+                <a:cs typeface="Courier New" pitchFamily="49" charset="0"/>
+              </a:rPr>
+              <a:t>")</a:t>
+            </a:r>
+          </a:p>
+          <a:p>
+            <a:pPr lvl="0">
+              <a:defRPr/>
+            </a:pPr>
+            <a:r>
+              <a:rPr lang="en-US" dirty="0">
+                <a:solidFill>
+                  <a:prstClr val="black"/>
+                </a:solidFill>
+                <a:latin typeface="Courier New" pitchFamily="49" charset="0"/>
+                <a:cs typeface="Courier New" pitchFamily="49" charset="0"/>
+              </a:rPr>
+              <a:t>print(</a:t>
+            </a:r>
+            <a:r>
+              <a:rPr lang="en-US" dirty="0" err="1">
+                <a:solidFill>
+                  <a:prstClr val="black"/>
+                </a:solidFill>
+                <a:latin typeface="Courier New" pitchFamily="49" charset="0"/>
+                <a:cs typeface="Courier New" pitchFamily="49" charset="0"/>
+              </a:rPr>
+              <a:t>config$split_data$random_state</a:t>
+            </a:r>
+            <a:r>
+              <a:rPr lang="en-US" dirty="0">
+                <a:solidFill>
+                  <a:prstClr val="black"/>
+                </a:solidFill>
+                <a:latin typeface="Courier New" pitchFamily="49" charset="0"/>
+                <a:cs typeface="Courier New" pitchFamily="49" charset="0"/>
+              </a:rPr>
+              <a:t>)</a:t>
+            </a:r>
+          </a:p>
+        </p:txBody>
+      </p:sp>
+    </p:spTree>
+    <p:extLst>
+      <p:ext uri="{BB962C8B-B14F-4D97-AF65-F5344CB8AC3E}">
+        <p14:creationId xmlns:p14="http://schemas.microsoft.com/office/powerpoint/2010/main" val="1890593211"/>
+      </p:ext>
+    </p:extLst>
+  </p:cSld>
+  <p:clrMapOvr>
+    <a:masterClrMapping/>
+  </p:clrMapOvr>
+</p:sld>
+</file>
+
+<file path=ppt/slides/slide32.xml><?xml version="1.0" encoding="utf-8"?>
+<p:sld xmlns:a="http://schemas.openxmlformats.org/drawingml/2006/main" xmlns:r="http://schemas.openxmlformats.org/officeDocument/2006/relationships" xmlns:p="http://schemas.openxmlformats.org/presentationml/2006/main">
+  <p:cSld>
+    <p:spTree>
+      <p:nvGrpSpPr>
         <p:cNvPr id="1" name="">
           <a:extLst>
             <a:ext uri="{FF2B5EF4-FFF2-40B4-BE49-F238E27FC236}">
@@ -19609,7 +20024,7 @@
           <a:p>
             <a:fld id="{9C7CE217-4467-4B8D-A735-B008FA7C4816}" type="slidenum">
               <a:rPr lang="LID4096" smtClean="0"/>
-              <a:t>31</a:t>
+              <a:t>32</a:t>
             </a:fld>
             <a:endParaRPr lang="LID4096"/>
           </a:p>
@@ -19658,7 +20073,7 @@
 </p:sld>
 </file>
 
-<file path=ppt/slides/slide32.xml><?xml version="1.0" encoding="utf-8"?>
+<file path=ppt/slides/slide33.xml><?xml version="1.0" encoding="utf-8"?>
 <p:sld xmlns:a="http://schemas.openxmlformats.org/drawingml/2006/main" xmlns:r="http://schemas.openxmlformats.org/officeDocument/2006/relationships" xmlns:p="http://schemas.openxmlformats.org/presentationml/2006/main">
   <p:cSld>
     <p:spTree>
@@ -19819,7 +20234,7 @@
           <a:p>
             <a:fld id="{9C7CE217-4467-4B8D-A735-B008FA7C4816}" type="slidenum">
               <a:rPr lang="LID4096" smtClean="0"/>
-              <a:t>32</a:t>
+              <a:t>33</a:t>
             </a:fld>
             <a:endParaRPr lang="LID4096"/>
           </a:p>
@@ -19838,7 +20253,7 @@
 </p:sld>
 </file>
 
-<file path=ppt/slides/slide33.xml><?xml version="1.0" encoding="utf-8"?>
+<file path=ppt/slides/slide34.xml><?xml version="1.0" encoding="utf-8"?>
 <p:sld xmlns:a="http://schemas.openxmlformats.org/drawingml/2006/main" xmlns:r="http://schemas.openxmlformats.org/officeDocument/2006/relationships" xmlns:p="http://schemas.openxmlformats.org/presentationml/2006/main">
   <p:cSld>
     <p:spTree>
@@ -19911,7 +20326,7 @@
           <a:p>
             <a:fld id="{9C7CE217-4467-4B8D-A735-B008FA7C4816}" type="slidenum">
               <a:rPr lang="LID4096" smtClean="0"/>
-              <a:t>33</a:t>
+              <a:t>34</a:t>
             </a:fld>
             <a:endParaRPr lang="LID4096"/>
           </a:p>
@@ -20677,7 +21092,7 @@
 </p:sld>
 </file>
 
-<file path=ppt/slides/slide34.xml><?xml version="1.0" encoding="utf-8"?>
+<file path=ppt/slides/slide35.xml><?xml version="1.0" encoding="utf-8"?>
 <p:sld xmlns:a="http://schemas.openxmlformats.org/drawingml/2006/main" xmlns:r="http://schemas.openxmlformats.org/officeDocument/2006/relationships" xmlns:p="http://schemas.openxmlformats.org/presentationml/2006/main">
   <p:cSld>
     <p:spTree>
@@ -20882,7 +21297,7 @@
           <a:p>
             <a:fld id="{9C7CE217-4467-4B8D-A735-B008FA7C4816}" type="slidenum">
               <a:rPr lang="LID4096" smtClean="0"/>
-              <a:t>34</a:t>
+              <a:t>35</a:t>
             </a:fld>
             <a:endParaRPr lang="LID4096"/>
           </a:p>
@@ -20901,7 +21316,7 @@
 </p:sld>
 </file>
 
-<file path=ppt/slides/slide35.xml><?xml version="1.0" encoding="utf-8"?>
+<file path=ppt/slides/slide36.xml><?xml version="1.0" encoding="utf-8"?>
 <p:sld xmlns:a="http://schemas.openxmlformats.org/drawingml/2006/main" xmlns:r="http://schemas.openxmlformats.org/officeDocument/2006/relationships" xmlns:p="http://schemas.openxmlformats.org/presentationml/2006/main">
   <p:cSld>
     <p:spTree>
@@ -21000,7 +21415,7 @@
           <a:p>
             <a:fld id="{9C7CE217-4467-4B8D-A735-B008FA7C4816}" type="slidenum">
               <a:rPr lang="LID4096" smtClean="0"/>
-              <a:t>35</a:t>
+              <a:t>36</a:t>
             </a:fld>
             <a:endParaRPr lang="LID4096"/>
           </a:p>
@@ -21469,7 +21884,7 @@
 </p:sld>
 </file>
 
-<file path=ppt/slides/slide36.xml><?xml version="1.0" encoding="utf-8"?>
+<file path=ppt/slides/slide37.xml><?xml version="1.0" encoding="utf-8"?>
 <p:sld xmlns:a="http://schemas.openxmlformats.org/drawingml/2006/main" xmlns:r="http://schemas.openxmlformats.org/officeDocument/2006/relationships" xmlns:p="http://schemas.openxmlformats.org/presentationml/2006/main">
   <p:cSld>
     <p:spTree>
@@ -21605,7 +22020,7 @@
           <a:p>
             <a:fld id="{9C7CE217-4467-4B8D-A735-B008FA7C4816}" type="slidenum">
               <a:rPr lang="LID4096" smtClean="0"/>
-              <a:t>36</a:t>
+              <a:t>37</a:t>
             </a:fld>
             <a:endParaRPr lang="LID4096"/>
           </a:p>
@@ -22232,7 +22647,7 @@
 </p:sld>
 </file>
 
-<file path=ppt/slides/slide37.xml><?xml version="1.0" encoding="utf-8"?>
+<file path=ppt/slides/slide38.xml><?xml version="1.0" encoding="utf-8"?>
 <p:sld xmlns:a="http://schemas.openxmlformats.org/drawingml/2006/main" xmlns:r="http://schemas.openxmlformats.org/officeDocument/2006/relationships" xmlns:p="http://schemas.openxmlformats.org/presentationml/2006/main">
   <p:cSld>
     <p:spTree>
@@ -22436,7 +22851,7 @@
           <a:p>
             <a:fld id="{9C7CE217-4467-4B8D-A735-B008FA7C4816}" type="slidenum">
               <a:rPr lang="LID4096" smtClean="0"/>
-              <a:t>37</a:t>
+              <a:t>38</a:t>
             </a:fld>
             <a:endParaRPr lang="LID4096"/>
           </a:p>
@@ -22691,7 +23106,7 @@
 </p:sld>
 </file>
 
-<file path=ppt/slides/slide38.xml><?xml version="1.0" encoding="utf-8"?>
+<file path=ppt/slides/slide39.xml><?xml version="1.0" encoding="utf-8"?>
 <p:sld xmlns:a="http://schemas.openxmlformats.org/drawingml/2006/main" xmlns:r="http://schemas.openxmlformats.org/officeDocument/2006/relationships" xmlns:p="http://schemas.openxmlformats.org/presentationml/2006/main">
   <p:cSld>
     <p:spTree>
@@ -22760,7 +23175,7 @@
           <a:p>
             <a:fld id="{9C7CE217-4467-4B8D-A735-B008FA7C4816}" type="slidenum">
               <a:rPr lang="LID4096" smtClean="0"/>
-              <a:t>38</a:t>
+              <a:t>39</a:t>
             </a:fld>
             <a:endParaRPr lang="LID4096"/>
           </a:p>
@@ -23163,818 +23578,6 @@
     </p:tnLst>
     <p:bldLst>
       <p:bldP spid="4" grpId="0" animBg="1"/>
-    </p:bldLst>
-  </p:timing>
-</p:sld>
-</file>
-
-<file path=ppt/slides/slide39.xml><?xml version="1.0" encoding="utf-8"?>
-<p:sld xmlns:a="http://schemas.openxmlformats.org/drawingml/2006/main" xmlns:r="http://schemas.openxmlformats.org/officeDocument/2006/relationships" xmlns:p="http://schemas.openxmlformats.org/presentationml/2006/main">
-  <p:cSld>
-    <p:spTree>
-      <p:nvGrpSpPr>
-        <p:cNvPr id="1" name=""/>
-        <p:cNvGrpSpPr/>
-        <p:nvPr/>
-      </p:nvGrpSpPr>
-      <p:grpSpPr>
-        <a:xfrm>
-          <a:off x="0" y="0"/>
-          <a:ext cx="0" cy="0"/>
-          <a:chOff x="0" y="0"/>
-          <a:chExt cx="0" cy="0"/>
-        </a:xfrm>
-      </p:grpSpPr>
-      <p:sp>
-        <p:nvSpPr>
-          <p:cNvPr id="2" name="Title 1">
-            <a:extLst>
-              <a:ext uri="{FF2B5EF4-FFF2-40B4-BE49-F238E27FC236}">
-                <a16:creationId xmlns:a16="http://schemas.microsoft.com/office/drawing/2014/main" id="{108206CA-3919-5554-121C-1B9552CA43CF}"/>
-              </a:ext>
-            </a:extLst>
-          </p:cNvPr>
-          <p:cNvSpPr>
-            <a:spLocks noGrp="1"/>
-          </p:cNvSpPr>
-          <p:nvPr>
-            <p:ph type="title"/>
-          </p:nvPr>
-        </p:nvSpPr>
-        <p:spPr/>
-        <p:txBody>
-          <a:bodyPr/>
-          <a:lstStyle/>
-          <a:p>
-            <a:r>
-              <a:rPr lang="en-US" dirty="0"/>
-              <a:t>Comparing experiments</a:t>
-            </a:r>
-            <a:endParaRPr lang="LID4096" dirty="0"/>
-          </a:p>
-        </p:txBody>
-      </p:sp>
-      <p:sp>
-        <p:nvSpPr>
-          <p:cNvPr id="3" name="Content Placeholder 2">
-            <a:extLst>
-              <a:ext uri="{FF2B5EF4-FFF2-40B4-BE49-F238E27FC236}">
-                <a16:creationId xmlns:a16="http://schemas.microsoft.com/office/drawing/2014/main" id="{35D0A6D1-9366-11EB-DF4E-38473912069C}"/>
-              </a:ext>
-            </a:extLst>
-          </p:cNvPr>
-          <p:cNvSpPr>
-            <a:spLocks noGrp="1"/>
-          </p:cNvSpPr>
-          <p:nvPr>
-            <p:ph idx="1"/>
-          </p:nvPr>
-        </p:nvSpPr>
-        <p:spPr>
-          <a:xfrm>
-            <a:off x="838200" y="1411968"/>
-            <a:ext cx="10515600" cy="4351338"/>
-          </a:xfrm>
-        </p:spPr>
-        <p:txBody>
-          <a:bodyPr/>
-          <a:lstStyle/>
-          <a:p>
-            <a:r>
-              <a:rPr lang="en-US" dirty="0"/>
-              <a:t>Parameters/final metrics</a:t>
-            </a:r>
-          </a:p>
-          <a:p>
-            <a:endParaRPr lang="en-US" dirty="0"/>
-          </a:p>
-          <a:p>
-            <a:endParaRPr lang="en-US" dirty="0"/>
-          </a:p>
-          <a:p>
-            <a:endParaRPr lang="en-US" dirty="0"/>
-          </a:p>
-          <a:p>
-            <a:endParaRPr lang="en-US" dirty="0"/>
-          </a:p>
-          <a:p>
-            <a:r>
-              <a:rPr lang="en-US" dirty="0"/>
-              <a:t>Evolution</a:t>
-            </a:r>
-          </a:p>
-          <a:p>
-            <a:endParaRPr lang="en-US" dirty="0"/>
-          </a:p>
-          <a:p>
-            <a:endParaRPr lang="en-US" dirty="0"/>
-          </a:p>
-          <a:p>
-            <a:endParaRPr lang="en-US" dirty="0"/>
-          </a:p>
-          <a:p>
-            <a:endParaRPr lang="en-US" dirty="0"/>
-          </a:p>
-          <a:p>
-            <a:endParaRPr lang="LID4096" dirty="0"/>
-          </a:p>
-        </p:txBody>
-      </p:sp>
-      <p:sp>
-        <p:nvSpPr>
-          <p:cNvPr id="4" name="Slide Number Placeholder 3">
-            <a:extLst>
-              <a:ext uri="{FF2B5EF4-FFF2-40B4-BE49-F238E27FC236}">
-                <a16:creationId xmlns:a16="http://schemas.microsoft.com/office/drawing/2014/main" id="{30DD123B-5FCA-205D-BF1D-F928E9541C10}"/>
-              </a:ext>
-            </a:extLst>
-          </p:cNvPr>
-          <p:cNvSpPr>
-            <a:spLocks noGrp="1"/>
-          </p:cNvSpPr>
-          <p:nvPr>
-            <p:ph type="sldNum" sz="quarter" idx="12"/>
-          </p:nvPr>
-        </p:nvSpPr>
-        <p:spPr/>
-        <p:txBody>
-          <a:bodyPr/>
-          <a:lstStyle/>
-          <a:p>
-            <a:fld id="{9C7CE217-4467-4B8D-A735-B008FA7C4816}" type="slidenum">
-              <a:rPr lang="LID4096" smtClean="0"/>
-              <a:t>39</a:t>
-            </a:fld>
-            <a:endParaRPr lang="LID4096"/>
-          </a:p>
-        </p:txBody>
-      </p:sp>
-      <p:sp>
-        <p:nvSpPr>
-          <p:cNvPr id="5" name="TextBox 4">
-            <a:extLst>
-              <a:ext uri="{FF2B5EF4-FFF2-40B4-BE49-F238E27FC236}">
-                <a16:creationId xmlns:a16="http://schemas.microsoft.com/office/drawing/2014/main" id="{FE253980-B1C5-EE74-F219-D0D1DE071438}"/>
-              </a:ext>
-            </a:extLst>
-          </p:cNvPr>
-          <p:cNvSpPr txBox="1"/>
-          <p:nvPr/>
-        </p:nvSpPr>
-        <p:spPr>
-          <a:xfrm>
-            <a:off x="1240972" y="1836390"/>
-            <a:ext cx="10515600" cy="2031325"/>
-          </a:xfrm>
-          <a:prstGeom prst="rect">
-            <a:avLst/>
-          </a:prstGeom>
-          <a:solidFill>
-            <a:schemeClr val="tx1"/>
-          </a:solidFill>
-          <a:ln>
-            <a:solidFill>
-              <a:schemeClr val="tx1"/>
-            </a:solidFill>
-          </a:ln>
-        </p:spPr>
-        <p:txBody>
-          <a:bodyPr wrap="square" rtlCol="0">
-            <a:spAutoFit/>
-          </a:bodyPr>
-          <a:lstStyle/>
-          <a:p>
-            <a:r>
-              <a:rPr lang="en-US" b="1" dirty="0">
-                <a:solidFill>
-                  <a:schemeClr val="bg1"/>
-                </a:solidFill>
-                <a:latin typeface="Courier New" pitchFamily="49" charset="0"/>
-                <a:cs typeface="Courier New" pitchFamily="49" charset="0"/>
-              </a:rPr>
-              <a:t>$  </a:t>
-            </a:r>
-            <a:r>
-              <a:rPr lang="en-US" b="1" dirty="0" err="1">
-                <a:solidFill>
-                  <a:schemeClr val="bg1"/>
-                </a:solidFill>
-                <a:latin typeface="Courier New" pitchFamily="49" charset="0"/>
-                <a:cs typeface="Courier New" pitchFamily="49" charset="0"/>
-              </a:rPr>
-              <a:t>dvc</a:t>
-            </a:r>
-            <a:r>
-              <a:rPr lang="en-US" b="1" dirty="0">
-                <a:solidFill>
-                  <a:schemeClr val="bg1"/>
-                </a:solidFill>
-                <a:latin typeface="Courier New" pitchFamily="49" charset="0"/>
-                <a:cs typeface="Courier New" pitchFamily="49" charset="0"/>
-              </a:rPr>
-              <a:t> exp diff </a:t>
-            </a:r>
-            <a:r>
-              <a:rPr lang="en-US" b="1" dirty="0" err="1">
-                <a:solidFill>
-                  <a:schemeClr val="bg1"/>
-                </a:solidFill>
-                <a:latin typeface="Courier New" pitchFamily="49" charset="0"/>
-                <a:cs typeface="Courier New" pitchFamily="49" charset="0"/>
-              </a:rPr>
-              <a:t>high_temp</a:t>
-            </a:r>
-            <a:r>
-              <a:rPr lang="en-US" b="1" dirty="0">
-                <a:solidFill>
-                  <a:schemeClr val="bg1"/>
-                </a:solidFill>
-                <a:latin typeface="Courier New" pitchFamily="49" charset="0"/>
-                <a:cs typeface="Courier New" pitchFamily="49" charset="0"/>
-              </a:rPr>
-              <a:t> </a:t>
-            </a:r>
-            <a:r>
-              <a:rPr lang="en-US" b="1" dirty="0" err="1">
-                <a:solidFill>
-                  <a:schemeClr val="bg1"/>
-                </a:solidFill>
-                <a:latin typeface="Courier New" pitchFamily="49" charset="0"/>
-                <a:cs typeface="Courier New" pitchFamily="49" charset="0"/>
-              </a:rPr>
-              <a:t>low_temp</a:t>
-            </a:r>
-            <a:endParaRPr lang="en-US" b="1" dirty="0">
-              <a:solidFill>
-                <a:schemeClr val="bg1"/>
-              </a:solidFill>
-              <a:latin typeface="Courier New" pitchFamily="49" charset="0"/>
-              <a:cs typeface="Courier New" pitchFamily="49" charset="0"/>
-            </a:endParaRPr>
-          </a:p>
-          <a:p>
-            <a:r>
-              <a:rPr lang="en-US" b="1" dirty="0">
-                <a:solidFill>
-                  <a:schemeClr val="bg1"/>
-                </a:solidFill>
-                <a:latin typeface="Courier New" pitchFamily="49" charset="0"/>
-                <a:cs typeface="Courier New" pitchFamily="49" charset="0"/>
-              </a:rPr>
-              <a:t>Path                  Metric         </a:t>
-            </a:r>
-            <a:r>
-              <a:rPr lang="en-US" b="1" dirty="0" err="1">
-                <a:solidFill>
-                  <a:schemeClr val="bg1"/>
-                </a:solidFill>
-                <a:latin typeface="Courier New" pitchFamily="49" charset="0"/>
-                <a:cs typeface="Courier New" pitchFamily="49" charset="0"/>
-              </a:rPr>
-              <a:t>high_temp</a:t>
-            </a:r>
-            <a:r>
-              <a:rPr lang="en-US" b="1" dirty="0">
-                <a:solidFill>
-                  <a:schemeClr val="bg1"/>
-                </a:solidFill>
-                <a:latin typeface="Courier New" pitchFamily="49" charset="0"/>
-                <a:cs typeface="Courier New" pitchFamily="49" charset="0"/>
-              </a:rPr>
-              <a:t>    </a:t>
-            </a:r>
-            <a:r>
-              <a:rPr lang="en-US" b="1" dirty="0" err="1">
-                <a:solidFill>
-                  <a:schemeClr val="bg1"/>
-                </a:solidFill>
-                <a:latin typeface="Courier New" pitchFamily="49" charset="0"/>
-                <a:cs typeface="Courier New" pitchFamily="49" charset="0"/>
-              </a:rPr>
-              <a:t>low_temp</a:t>
-            </a:r>
-            <a:r>
-              <a:rPr lang="en-US" b="1" dirty="0">
-                <a:solidFill>
-                  <a:schemeClr val="bg1"/>
-                </a:solidFill>
-                <a:latin typeface="Courier New" pitchFamily="49" charset="0"/>
-                <a:cs typeface="Courier New" pitchFamily="49" charset="0"/>
-              </a:rPr>
-              <a:t>    Change</a:t>
-            </a:r>
-          </a:p>
-          <a:p>
-            <a:r>
-              <a:rPr lang="en-US" b="1" dirty="0" err="1">
-                <a:solidFill>
-                  <a:schemeClr val="bg1"/>
-                </a:solidFill>
-                <a:latin typeface="Courier New" pitchFamily="49" charset="0"/>
-                <a:cs typeface="Courier New" pitchFamily="49" charset="0"/>
-              </a:rPr>
-              <a:t>dvclive</a:t>
-            </a:r>
-            <a:r>
-              <a:rPr lang="en-US" b="1" dirty="0">
-                <a:solidFill>
-                  <a:schemeClr val="bg1"/>
-                </a:solidFill>
-                <a:latin typeface="Courier New" pitchFamily="49" charset="0"/>
-                <a:cs typeface="Courier New" pitchFamily="49" charset="0"/>
-              </a:rPr>
-              <a:t>/</a:t>
-            </a:r>
-            <a:r>
-              <a:rPr lang="en-US" b="1" dirty="0" err="1">
-                <a:solidFill>
-                  <a:schemeClr val="bg1"/>
-                </a:solidFill>
-                <a:latin typeface="Courier New" pitchFamily="49" charset="0"/>
-                <a:cs typeface="Courier New" pitchFamily="49" charset="0"/>
-              </a:rPr>
-              <a:t>metrics.json</a:t>
-            </a:r>
-            <a:r>
-              <a:rPr lang="en-US" b="1" dirty="0">
-                <a:solidFill>
-                  <a:schemeClr val="bg1"/>
-                </a:solidFill>
-                <a:latin typeface="Courier New" pitchFamily="49" charset="0"/>
-                <a:cs typeface="Courier New" pitchFamily="49" charset="0"/>
-              </a:rPr>
-              <a:t>  energy         -2.3871      -0.6899     1.6972</a:t>
-            </a:r>
-          </a:p>
-          <a:p>
-            <a:r>
-              <a:rPr lang="en-US" b="1" dirty="0" err="1">
-                <a:solidFill>
-                  <a:schemeClr val="bg1"/>
-                </a:solidFill>
-                <a:latin typeface="Courier New" pitchFamily="49" charset="0"/>
-                <a:cs typeface="Courier New" pitchFamily="49" charset="0"/>
-              </a:rPr>
-              <a:t>dvclive</a:t>
-            </a:r>
-            <a:r>
-              <a:rPr lang="en-US" b="1" dirty="0">
-                <a:solidFill>
-                  <a:schemeClr val="bg1"/>
-                </a:solidFill>
-                <a:latin typeface="Courier New" pitchFamily="49" charset="0"/>
-                <a:cs typeface="Courier New" pitchFamily="49" charset="0"/>
-              </a:rPr>
-              <a:t>/</a:t>
-            </a:r>
-            <a:r>
-              <a:rPr lang="en-US" b="1" dirty="0" err="1">
-                <a:solidFill>
-                  <a:schemeClr val="bg1"/>
-                </a:solidFill>
-                <a:latin typeface="Courier New" pitchFamily="49" charset="0"/>
-                <a:cs typeface="Courier New" pitchFamily="49" charset="0"/>
-              </a:rPr>
-              <a:t>metrics.json</a:t>
-            </a:r>
-            <a:r>
-              <a:rPr lang="en-US" b="1" dirty="0">
-                <a:solidFill>
-                  <a:schemeClr val="bg1"/>
-                </a:solidFill>
-                <a:latin typeface="Courier New" pitchFamily="49" charset="0"/>
-                <a:cs typeface="Courier New" pitchFamily="49" charset="0"/>
-              </a:rPr>
-              <a:t>  magnetization  0.9734       0.295       -0.6784</a:t>
-            </a:r>
-          </a:p>
-          <a:p>
-            <a:endParaRPr lang="en-US" b="1" dirty="0">
-              <a:solidFill>
-                <a:schemeClr val="bg1"/>
-              </a:solidFill>
-              <a:latin typeface="Courier New" pitchFamily="49" charset="0"/>
-              <a:cs typeface="Courier New" pitchFamily="49" charset="0"/>
-            </a:endParaRPr>
-          </a:p>
-          <a:p>
-            <a:r>
-              <a:rPr lang="en-US" b="1" dirty="0">
-                <a:solidFill>
-                  <a:schemeClr val="bg1"/>
-                </a:solidFill>
-                <a:latin typeface="Courier New" pitchFamily="49" charset="0"/>
-                <a:cs typeface="Courier New" pitchFamily="49" charset="0"/>
-              </a:rPr>
-              <a:t>Path                 Param                 </a:t>
-            </a:r>
-            <a:r>
-              <a:rPr lang="en-US" b="1" dirty="0" err="1">
-                <a:solidFill>
-                  <a:schemeClr val="bg1"/>
-                </a:solidFill>
-                <a:latin typeface="Courier New" pitchFamily="49" charset="0"/>
-                <a:cs typeface="Courier New" pitchFamily="49" charset="0"/>
-              </a:rPr>
-              <a:t>high_temp</a:t>
-            </a:r>
-            <a:r>
-              <a:rPr lang="en-US" b="1" dirty="0">
-                <a:solidFill>
-                  <a:schemeClr val="bg1"/>
-                </a:solidFill>
-                <a:latin typeface="Courier New" pitchFamily="49" charset="0"/>
-                <a:cs typeface="Courier New" pitchFamily="49" charset="0"/>
-              </a:rPr>
-              <a:t>    </a:t>
-            </a:r>
-            <a:r>
-              <a:rPr lang="en-US" b="1" dirty="0" err="1">
-                <a:solidFill>
-                  <a:schemeClr val="bg1"/>
-                </a:solidFill>
-                <a:latin typeface="Courier New" pitchFamily="49" charset="0"/>
-                <a:cs typeface="Courier New" pitchFamily="49" charset="0"/>
-              </a:rPr>
-              <a:t>low_temp</a:t>
-            </a:r>
-            <a:r>
-              <a:rPr lang="en-US" b="1" dirty="0">
-                <a:solidFill>
-                  <a:schemeClr val="bg1"/>
-                </a:solidFill>
-                <a:latin typeface="Courier New" pitchFamily="49" charset="0"/>
-                <a:cs typeface="Courier New" pitchFamily="49" charset="0"/>
-              </a:rPr>
-              <a:t>    Change</a:t>
-            </a:r>
-          </a:p>
-          <a:p>
-            <a:r>
-              <a:rPr lang="en-US" b="1" dirty="0" err="1">
-                <a:solidFill>
-                  <a:schemeClr val="bg1"/>
-                </a:solidFill>
-                <a:latin typeface="Courier New" pitchFamily="49" charset="0"/>
-                <a:cs typeface="Courier New" pitchFamily="49" charset="0"/>
-              </a:rPr>
-              <a:t>dvclive</a:t>
-            </a:r>
-            <a:r>
-              <a:rPr lang="en-US" b="1" dirty="0">
-                <a:solidFill>
-                  <a:schemeClr val="bg1"/>
-                </a:solidFill>
-                <a:latin typeface="Courier New" pitchFamily="49" charset="0"/>
-                <a:cs typeface="Courier New" pitchFamily="49" charset="0"/>
-              </a:rPr>
-              <a:t>/</a:t>
-            </a:r>
-            <a:r>
-              <a:rPr lang="en-US" b="1" dirty="0" err="1">
-                <a:solidFill>
-                  <a:schemeClr val="bg1"/>
-                </a:solidFill>
-                <a:latin typeface="Courier New" pitchFamily="49" charset="0"/>
-                <a:cs typeface="Courier New" pitchFamily="49" charset="0"/>
-              </a:rPr>
-              <a:t>params.yaml</a:t>
-            </a:r>
-            <a:r>
-              <a:rPr lang="en-US" b="1" dirty="0">
-                <a:solidFill>
-                  <a:schemeClr val="bg1"/>
-                </a:solidFill>
-                <a:latin typeface="Courier New" pitchFamily="49" charset="0"/>
-                <a:cs typeface="Courier New" pitchFamily="49" charset="0"/>
-              </a:rPr>
-              <a:t>  </a:t>
-            </a:r>
-            <a:r>
-              <a:rPr lang="en-US" b="1" dirty="0" err="1">
-                <a:solidFill>
-                  <a:schemeClr val="bg1"/>
-                </a:solidFill>
-                <a:latin typeface="Courier New" pitchFamily="49" charset="0"/>
-                <a:cs typeface="Courier New" pitchFamily="49" charset="0"/>
-              </a:rPr>
-              <a:t>dynamics.temperature</a:t>
-            </a:r>
-            <a:r>
-              <a:rPr lang="en-US" b="1" dirty="0">
-                <a:solidFill>
-                  <a:schemeClr val="bg1"/>
-                </a:solidFill>
-                <a:latin typeface="Courier New" pitchFamily="49" charset="0"/>
-                <a:cs typeface="Courier New" pitchFamily="49" charset="0"/>
-              </a:rPr>
-              <a:t>  2.0          5.0         3.0</a:t>
-            </a:r>
-            <a:endParaRPr lang="nl-BE" b="1" dirty="0">
-              <a:solidFill>
-                <a:schemeClr val="bg1"/>
-              </a:solidFill>
-              <a:latin typeface="Courier New" pitchFamily="49" charset="0"/>
-              <a:cs typeface="Courier New" pitchFamily="49" charset="0"/>
-            </a:endParaRPr>
-          </a:p>
-        </p:txBody>
-      </p:sp>
-      <p:sp>
-        <p:nvSpPr>
-          <p:cNvPr id="6" name="TextBox 5">
-            <a:extLst>
-              <a:ext uri="{FF2B5EF4-FFF2-40B4-BE49-F238E27FC236}">
-                <a16:creationId xmlns:a16="http://schemas.microsoft.com/office/drawing/2014/main" id="{E0C1B6BC-9FD8-434E-3730-24E8F29D819E}"/>
-              </a:ext>
-            </a:extLst>
-          </p:cNvPr>
-          <p:cNvSpPr txBox="1"/>
-          <p:nvPr/>
-        </p:nvSpPr>
-        <p:spPr>
-          <a:xfrm>
-            <a:off x="1240972" y="4446178"/>
-            <a:ext cx="5214257" cy="369332"/>
-          </a:xfrm>
-          <a:prstGeom prst="rect">
-            <a:avLst/>
-          </a:prstGeom>
-          <a:solidFill>
-            <a:schemeClr val="tx1"/>
-          </a:solidFill>
-          <a:ln>
-            <a:solidFill>
-              <a:schemeClr val="tx1"/>
-            </a:solidFill>
-          </a:ln>
-        </p:spPr>
-        <p:txBody>
-          <a:bodyPr wrap="square" rtlCol="0">
-            <a:spAutoFit/>
-          </a:bodyPr>
-          <a:lstStyle/>
-          <a:p>
-            <a:r>
-              <a:rPr lang="en-US" b="1" dirty="0">
-                <a:solidFill>
-                  <a:schemeClr val="bg1"/>
-                </a:solidFill>
-                <a:latin typeface="Courier New" pitchFamily="49" charset="0"/>
-                <a:cs typeface="Courier New" pitchFamily="49" charset="0"/>
-              </a:rPr>
-              <a:t>$  </a:t>
-            </a:r>
-            <a:r>
-              <a:rPr lang="en-US" b="1" dirty="0" err="1">
-                <a:solidFill>
-                  <a:schemeClr val="bg1"/>
-                </a:solidFill>
-                <a:latin typeface="Courier New" pitchFamily="49" charset="0"/>
-                <a:cs typeface="Courier New" pitchFamily="49" charset="0"/>
-              </a:rPr>
-              <a:t>dvc</a:t>
-            </a:r>
-            <a:r>
-              <a:rPr lang="en-US" b="1" dirty="0">
-                <a:solidFill>
-                  <a:schemeClr val="bg1"/>
-                </a:solidFill>
-                <a:latin typeface="Courier New" pitchFamily="49" charset="0"/>
-                <a:cs typeface="Courier New" pitchFamily="49" charset="0"/>
-              </a:rPr>
-              <a:t> plots diff </a:t>
-            </a:r>
-            <a:r>
-              <a:rPr lang="en-US" b="1" dirty="0" err="1">
-                <a:solidFill>
-                  <a:schemeClr val="bg1"/>
-                </a:solidFill>
-                <a:latin typeface="Courier New" pitchFamily="49" charset="0"/>
-                <a:cs typeface="Courier New" pitchFamily="49" charset="0"/>
-              </a:rPr>
-              <a:t>high_temp</a:t>
-            </a:r>
-            <a:r>
-              <a:rPr lang="en-US" b="1" dirty="0">
-                <a:solidFill>
-                  <a:schemeClr val="bg1"/>
-                </a:solidFill>
-                <a:latin typeface="Courier New" pitchFamily="49" charset="0"/>
-                <a:cs typeface="Courier New" pitchFamily="49" charset="0"/>
-              </a:rPr>
-              <a:t> </a:t>
-            </a:r>
-            <a:r>
-              <a:rPr lang="en-US" b="1" dirty="0" err="1">
-                <a:solidFill>
-                  <a:schemeClr val="bg1"/>
-                </a:solidFill>
-                <a:latin typeface="Courier New" pitchFamily="49" charset="0"/>
-                <a:cs typeface="Courier New" pitchFamily="49" charset="0"/>
-              </a:rPr>
-              <a:t>low_temp</a:t>
-            </a:r>
-            <a:endParaRPr lang="en-US" b="1" dirty="0">
-              <a:solidFill>
-                <a:schemeClr val="bg1"/>
-              </a:solidFill>
-              <a:latin typeface="Courier New" pitchFamily="49" charset="0"/>
-              <a:cs typeface="Courier New" pitchFamily="49" charset="0"/>
-            </a:endParaRPr>
-          </a:p>
-        </p:txBody>
-      </p:sp>
-      <p:pic>
-        <p:nvPicPr>
-          <p:cNvPr id="10" name="Picture 9">
-            <a:extLst>
-              <a:ext uri="{FF2B5EF4-FFF2-40B4-BE49-F238E27FC236}">
-                <a16:creationId xmlns:a16="http://schemas.microsoft.com/office/drawing/2014/main" id="{A37F60CD-CE2E-AA84-07D4-646E2BC8956D}"/>
-              </a:ext>
-            </a:extLst>
-          </p:cNvPr>
-          <p:cNvPicPr>
-            <a:picLocks noChangeAspect="1"/>
-          </p:cNvPicPr>
-          <p:nvPr/>
-        </p:nvPicPr>
-        <p:blipFill>
-          <a:blip r:embed="rId2"/>
-          <a:stretch>
-            <a:fillRect/>
-          </a:stretch>
-        </p:blipFill>
-        <p:spPr>
-          <a:xfrm>
-            <a:off x="6683722" y="4199202"/>
-            <a:ext cx="4746242" cy="2080948"/>
-          </a:xfrm>
-          <a:prstGeom prst="rect">
-            <a:avLst/>
-          </a:prstGeom>
-        </p:spPr>
-      </p:pic>
-      <p:sp>
-        <p:nvSpPr>
-          <p:cNvPr id="11" name="TextBox 10">
-            <a:extLst>
-              <a:ext uri="{FF2B5EF4-FFF2-40B4-BE49-F238E27FC236}">
-                <a16:creationId xmlns:a16="http://schemas.microsoft.com/office/drawing/2014/main" id="{7E6E73F6-47AF-2664-8C32-27D6AB9D2B00}"/>
-              </a:ext>
-            </a:extLst>
-          </p:cNvPr>
-          <p:cNvSpPr txBox="1"/>
-          <p:nvPr/>
-        </p:nvSpPr>
-        <p:spPr>
-          <a:xfrm>
-            <a:off x="5780314" y="5559718"/>
-            <a:ext cx="1107996" cy="369332"/>
-          </a:xfrm>
-          <a:prstGeom prst="rect">
-            <a:avLst/>
-          </a:prstGeom>
-          <a:solidFill>
-            <a:schemeClr val="bg1"/>
-          </a:solidFill>
-          <a:ln>
-            <a:solidFill>
-              <a:schemeClr val="tx1"/>
-            </a:solidFill>
-          </a:ln>
-        </p:spPr>
-        <p:txBody>
-          <a:bodyPr wrap="none" rtlCol="0">
-            <a:spAutoFit/>
-          </a:bodyPr>
-          <a:lstStyle/>
-          <a:p>
-            <a:r>
-              <a:rPr lang="en-US" dirty="0"/>
-              <a:t>HTML file</a:t>
-            </a:r>
-            <a:endParaRPr lang="LID4096" dirty="0"/>
-          </a:p>
-        </p:txBody>
-      </p:sp>
-    </p:spTree>
-    <p:extLst>
-      <p:ext uri="{BB962C8B-B14F-4D97-AF65-F5344CB8AC3E}">
-        <p14:creationId xmlns:p14="http://schemas.microsoft.com/office/powerpoint/2010/main" val="142169941"/>
-      </p:ext>
-    </p:extLst>
-  </p:cSld>
-  <p:clrMapOvr>
-    <a:masterClrMapping/>
-  </p:clrMapOvr>
-  <p:timing>
-    <p:tnLst>
-      <p:par>
-        <p:cTn id="1" dur="indefinite" restart="never" nodeType="tmRoot">
-          <p:childTnLst>
-            <p:seq concurrent="1" nextAc="seek">
-              <p:cTn id="2" dur="indefinite" nodeType="mainSeq">
-                <p:childTnLst>
-                  <p:par>
-                    <p:cTn id="3" fill="hold">
-                      <p:stCondLst>
-                        <p:cond delay="indefinite"/>
-                        <p:cond evt="onBegin" delay="0">
-                          <p:tn val="2"/>
-                        </p:cond>
-                      </p:stCondLst>
-                      <p:childTnLst>
-                        <p:par>
-                          <p:cTn id="4" fill="hold">
-                            <p:stCondLst>
-                              <p:cond delay="0"/>
-                            </p:stCondLst>
-                            <p:childTnLst>
-                              <p:par>
-                                <p:cTn id="5" presetID="1" presetClass="entr" presetSubtype="0" fill="hold" grpId="0" nodeType="withEffect">
-                                  <p:stCondLst>
-                                    <p:cond delay="0"/>
-                                  </p:stCondLst>
-                                  <p:childTnLst>
-                                    <p:set>
-                                      <p:cBhvr>
-                                        <p:cTn id="6" dur="1" fill="hold">
-                                          <p:stCondLst>
-                                            <p:cond delay="0"/>
-                                          </p:stCondLst>
-                                        </p:cTn>
-                                        <p:tgtEl>
-                                          <p:spTgt spid="5"/>
-                                        </p:tgtEl>
-                                        <p:attrNameLst>
-                                          <p:attrName>style.visibility</p:attrName>
-                                        </p:attrNameLst>
-                                      </p:cBhvr>
-                                      <p:to>
-                                        <p:strVal val="visible"/>
-                                      </p:to>
-                                    </p:set>
-                                  </p:childTnLst>
-                                </p:cTn>
-                              </p:par>
-                              <p:par>
-                                <p:cTn id="7" presetID="1" presetClass="entr" presetSubtype="0" fill="hold" grpId="0" nodeType="withEffect">
-                                  <p:stCondLst>
-                                    <p:cond delay="0"/>
-                                  </p:stCondLst>
-                                  <p:childTnLst>
-                                    <p:set>
-                                      <p:cBhvr>
-                                        <p:cTn id="8" dur="1" fill="hold">
-                                          <p:stCondLst>
-                                            <p:cond delay="0"/>
-                                          </p:stCondLst>
-                                        </p:cTn>
-                                        <p:tgtEl>
-                                          <p:spTgt spid="6"/>
-                                        </p:tgtEl>
-                                        <p:attrNameLst>
-                                          <p:attrName>style.visibility</p:attrName>
-                                        </p:attrNameLst>
-                                      </p:cBhvr>
-                                      <p:to>
-                                        <p:strVal val="visible"/>
-                                      </p:to>
-                                    </p:set>
-                                  </p:childTnLst>
-                                </p:cTn>
-                              </p:par>
-                            </p:childTnLst>
-                          </p:cTn>
-                        </p:par>
-                      </p:childTnLst>
-                    </p:cTn>
-                  </p:par>
-                </p:childTnLst>
-              </p:cTn>
-              <p:prevCondLst>
-                <p:cond evt="onPrev" delay="0">
-                  <p:tgtEl>
-                    <p:sldTgt/>
-                  </p:tgtEl>
-                </p:cond>
-              </p:prevCondLst>
-              <p:nextCondLst>
-                <p:cond evt="onNext" delay="0">
-                  <p:tgtEl>
-                    <p:sldTgt/>
-                  </p:tgtEl>
-                </p:cond>
-              </p:nextCondLst>
-            </p:seq>
-          </p:childTnLst>
-        </p:cTn>
-      </p:par>
-    </p:tnLst>
-    <p:bldLst>
-      <p:bldP spid="5" grpId="0" animBg="1"/>
-      <p:bldP spid="6" grpId="0" animBg="1"/>
     </p:bldLst>
   </p:timing>
 </p:sld>
@@ -25330,7 +24933,7 @@
           <p:cNvPr id="2" name="Title 1">
             <a:extLst>
               <a:ext uri="{FF2B5EF4-FFF2-40B4-BE49-F238E27FC236}">
-                <a16:creationId xmlns:a16="http://schemas.microsoft.com/office/drawing/2014/main" id="{5BAF57E0-A434-0F25-8810-27DED25237C8}"/>
+                <a16:creationId xmlns:a16="http://schemas.microsoft.com/office/drawing/2014/main" id="{108206CA-3919-5554-121C-1B9552CA43CF}"/>
               </a:ext>
             </a:extLst>
           </p:cNvPr>
@@ -25348,6 +24951,818 @@
           <a:p>
             <a:r>
               <a:rPr lang="en-US" dirty="0"/>
+              <a:t>Comparing experiments</a:t>
+            </a:r>
+            <a:endParaRPr lang="LID4096" dirty="0"/>
+          </a:p>
+        </p:txBody>
+      </p:sp>
+      <p:sp>
+        <p:nvSpPr>
+          <p:cNvPr id="3" name="Content Placeholder 2">
+            <a:extLst>
+              <a:ext uri="{FF2B5EF4-FFF2-40B4-BE49-F238E27FC236}">
+                <a16:creationId xmlns:a16="http://schemas.microsoft.com/office/drawing/2014/main" id="{35D0A6D1-9366-11EB-DF4E-38473912069C}"/>
+              </a:ext>
+            </a:extLst>
+          </p:cNvPr>
+          <p:cNvSpPr>
+            <a:spLocks noGrp="1"/>
+          </p:cNvSpPr>
+          <p:nvPr>
+            <p:ph idx="1"/>
+          </p:nvPr>
+        </p:nvSpPr>
+        <p:spPr>
+          <a:xfrm>
+            <a:off x="838200" y="1411968"/>
+            <a:ext cx="10515600" cy="4351338"/>
+          </a:xfrm>
+        </p:spPr>
+        <p:txBody>
+          <a:bodyPr/>
+          <a:lstStyle/>
+          <a:p>
+            <a:r>
+              <a:rPr lang="en-US" dirty="0"/>
+              <a:t>Parameters/final metrics</a:t>
+            </a:r>
+          </a:p>
+          <a:p>
+            <a:endParaRPr lang="en-US" dirty="0"/>
+          </a:p>
+          <a:p>
+            <a:endParaRPr lang="en-US" dirty="0"/>
+          </a:p>
+          <a:p>
+            <a:endParaRPr lang="en-US" dirty="0"/>
+          </a:p>
+          <a:p>
+            <a:endParaRPr lang="en-US" dirty="0"/>
+          </a:p>
+          <a:p>
+            <a:r>
+              <a:rPr lang="en-US" dirty="0"/>
+              <a:t>Evolution</a:t>
+            </a:r>
+          </a:p>
+          <a:p>
+            <a:endParaRPr lang="en-US" dirty="0"/>
+          </a:p>
+          <a:p>
+            <a:endParaRPr lang="en-US" dirty="0"/>
+          </a:p>
+          <a:p>
+            <a:endParaRPr lang="en-US" dirty="0"/>
+          </a:p>
+          <a:p>
+            <a:endParaRPr lang="en-US" dirty="0"/>
+          </a:p>
+          <a:p>
+            <a:endParaRPr lang="LID4096" dirty="0"/>
+          </a:p>
+        </p:txBody>
+      </p:sp>
+      <p:sp>
+        <p:nvSpPr>
+          <p:cNvPr id="4" name="Slide Number Placeholder 3">
+            <a:extLst>
+              <a:ext uri="{FF2B5EF4-FFF2-40B4-BE49-F238E27FC236}">
+                <a16:creationId xmlns:a16="http://schemas.microsoft.com/office/drawing/2014/main" id="{30DD123B-5FCA-205D-BF1D-F928E9541C10}"/>
+              </a:ext>
+            </a:extLst>
+          </p:cNvPr>
+          <p:cNvSpPr>
+            <a:spLocks noGrp="1"/>
+          </p:cNvSpPr>
+          <p:nvPr>
+            <p:ph type="sldNum" sz="quarter" idx="12"/>
+          </p:nvPr>
+        </p:nvSpPr>
+        <p:spPr/>
+        <p:txBody>
+          <a:bodyPr/>
+          <a:lstStyle/>
+          <a:p>
+            <a:fld id="{9C7CE217-4467-4B8D-A735-B008FA7C4816}" type="slidenum">
+              <a:rPr lang="LID4096" smtClean="0"/>
+              <a:t>40</a:t>
+            </a:fld>
+            <a:endParaRPr lang="LID4096"/>
+          </a:p>
+        </p:txBody>
+      </p:sp>
+      <p:sp>
+        <p:nvSpPr>
+          <p:cNvPr id="5" name="TextBox 4">
+            <a:extLst>
+              <a:ext uri="{FF2B5EF4-FFF2-40B4-BE49-F238E27FC236}">
+                <a16:creationId xmlns:a16="http://schemas.microsoft.com/office/drawing/2014/main" id="{FE253980-B1C5-EE74-F219-D0D1DE071438}"/>
+              </a:ext>
+            </a:extLst>
+          </p:cNvPr>
+          <p:cNvSpPr txBox="1"/>
+          <p:nvPr/>
+        </p:nvSpPr>
+        <p:spPr>
+          <a:xfrm>
+            <a:off x="1240972" y="1836390"/>
+            <a:ext cx="10515600" cy="2031325"/>
+          </a:xfrm>
+          <a:prstGeom prst="rect">
+            <a:avLst/>
+          </a:prstGeom>
+          <a:solidFill>
+            <a:schemeClr val="tx1"/>
+          </a:solidFill>
+          <a:ln>
+            <a:solidFill>
+              <a:schemeClr val="tx1"/>
+            </a:solidFill>
+          </a:ln>
+        </p:spPr>
+        <p:txBody>
+          <a:bodyPr wrap="square" rtlCol="0">
+            <a:spAutoFit/>
+          </a:bodyPr>
+          <a:lstStyle/>
+          <a:p>
+            <a:r>
+              <a:rPr lang="en-US" b="1" dirty="0">
+                <a:solidFill>
+                  <a:schemeClr val="bg1"/>
+                </a:solidFill>
+                <a:latin typeface="Courier New" pitchFamily="49" charset="0"/>
+                <a:cs typeface="Courier New" pitchFamily="49" charset="0"/>
+              </a:rPr>
+              <a:t>$  </a:t>
+            </a:r>
+            <a:r>
+              <a:rPr lang="en-US" b="1" dirty="0" err="1">
+                <a:solidFill>
+                  <a:schemeClr val="bg1"/>
+                </a:solidFill>
+                <a:latin typeface="Courier New" pitchFamily="49" charset="0"/>
+                <a:cs typeface="Courier New" pitchFamily="49" charset="0"/>
+              </a:rPr>
+              <a:t>dvc</a:t>
+            </a:r>
+            <a:r>
+              <a:rPr lang="en-US" b="1" dirty="0">
+                <a:solidFill>
+                  <a:schemeClr val="bg1"/>
+                </a:solidFill>
+                <a:latin typeface="Courier New" pitchFamily="49" charset="0"/>
+                <a:cs typeface="Courier New" pitchFamily="49" charset="0"/>
+              </a:rPr>
+              <a:t> exp diff </a:t>
+            </a:r>
+            <a:r>
+              <a:rPr lang="en-US" b="1" dirty="0" err="1">
+                <a:solidFill>
+                  <a:schemeClr val="bg1"/>
+                </a:solidFill>
+                <a:latin typeface="Courier New" pitchFamily="49" charset="0"/>
+                <a:cs typeface="Courier New" pitchFamily="49" charset="0"/>
+              </a:rPr>
+              <a:t>high_temp</a:t>
+            </a:r>
+            <a:r>
+              <a:rPr lang="en-US" b="1" dirty="0">
+                <a:solidFill>
+                  <a:schemeClr val="bg1"/>
+                </a:solidFill>
+                <a:latin typeface="Courier New" pitchFamily="49" charset="0"/>
+                <a:cs typeface="Courier New" pitchFamily="49" charset="0"/>
+              </a:rPr>
+              <a:t> </a:t>
+            </a:r>
+            <a:r>
+              <a:rPr lang="en-US" b="1" dirty="0" err="1">
+                <a:solidFill>
+                  <a:schemeClr val="bg1"/>
+                </a:solidFill>
+                <a:latin typeface="Courier New" pitchFamily="49" charset="0"/>
+                <a:cs typeface="Courier New" pitchFamily="49" charset="0"/>
+              </a:rPr>
+              <a:t>low_temp</a:t>
+            </a:r>
+            <a:endParaRPr lang="en-US" b="1" dirty="0">
+              <a:solidFill>
+                <a:schemeClr val="bg1"/>
+              </a:solidFill>
+              <a:latin typeface="Courier New" pitchFamily="49" charset="0"/>
+              <a:cs typeface="Courier New" pitchFamily="49" charset="0"/>
+            </a:endParaRPr>
+          </a:p>
+          <a:p>
+            <a:r>
+              <a:rPr lang="en-US" b="1" dirty="0">
+                <a:solidFill>
+                  <a:schemeClr val="bg1"/>
+                </a:solidFill>
+                <a:latin typeface="Courier New" pitchFamily="49" charset="0"/>
+                <a:cs typeface="Courier New" pitchFamily="49" charset="0"/>
+              </a:rPr>
+              <a:t>Path                  Metric         </a:t>
+            </a:r>
+            <a:r>
+              <a:rPr lang="en-US" b="1" dirty="0" err="1">
+                <a:solidFill>
+                  <a:schemeClr val="bg1"/>
+                </a:solidFill>
+                <a:latin typeface="Courier New" pitchFamily="49" charset="0"/>
+                <a:cs typeface="Courier New" pitchFamily="49" charset="0"/>
+              </a:rPr>
+              <a:t>high_temp</a:t>
+            </a:r>
+            <a:r>
+              <a:rPr lang="en-US" b="1" dirty="0">
+                <a:solidFill>
+                  <a:schemeClr val="bg1"/>
+                </a:solidFill>
+                <a:latin typeface="Courier New" pitchFamily="49" charset="0"/>
+                <a:cs typeface="Courier New" pitchFamily="49" charset="0"/>
+              </a:rPr>
+              <a:t>    </a:t>
+            </a:r>
+            <a:r>
+              <a:rPr lang="en-US" b="1" dirty="0" err="1">
+                <a:solidFill>
+                  <a:schemeClr val="bg1"/>
+                </a:solidFill>
+                <a:latin typeface="Courier New" pitchFamily="49" charset="0"/>
+                <a:cs typeface="Courier New" pitchFamily="49" charset="0"/>
+              </a:rPr>
+              <a:t>low_temp</a:t>
+            </a:r>
+            <a:r>
+              <a:rPr lang="en-US" b="1" dirty="0">
+                <a:solidFill>
+                  <a:schemeClr val="bg1"/>
+                </a:solidFill>
+                <a:latin typeface="Courier New" pitchFamily="49" charset="0"/>
+                <a:cs typeface="Courier New" pitchFamily="49" charset="0"/>
+              </a:rPr>
+              <a:t>    Change</a:t>
+            </a:r>
+          </a:p>
+          <a:p>
+            <a:r>
+              <a:rPr lang="en-US" b="1" dirty="0" err="1">
+                <a:solidFill>
+                  <a:schemeClr val="bg1"/>
+                </a:solidFill>
+                <a:latin typeface="Courier New" pitchFamily="49" charset="0"/>
+                <a:cs typeface="Courier New" pitchFamily="49" charset="0"/>
+              </a:rPr>
+              <a:t>dvclive</a:t>
+            </a:r>
+            <a:r>
+              <a:rPr lang="en-US" b="1" dirty="0">
+                <a:solidFill>
+                  <a:schemeClr val="bg1"/>
+                </a:solidFill>
+                <a:latin typeface="Courier New" pitchFamily="49" charset="0"/>
+                <a:cs typeface="Courier New" pitchFamily="49" charset="0"/>
+              </a:rPr>
+              <a:t>/</a:t>
+            </a:r>
+            <a:r>
+              <a:rPr lang="en-US" b="1" dirty="0" err="1">
+                <a:solidFill>
+                  <a:schemeClr val="bg1"/>
+                </a:solidFill>
+                <a:latin typeface="Courier New" pitchFamily="49" charset="0"/>
+                <a:cs typeface="Courier New" pitchFamily="49" charset="0"/>
+              </a:rPr>
+              <a:t>metrics.json</a:t>
+            </a:r>
+            <a:r>
+              <a:rPr lang="en-US" b="1" dirty="0">
+                <a:solidFill>
+                  <a:schemeClr val="bg1"/>
+                </a:solidFill>
+                <a:latin typeface="Courier New" pitchFamily="49" charset="0"/>
+                <a:cs typeface="Courier New" pitchFamily="49" charset="0"/>
+              </a:rPr>
+              <a:t>  energy         -2.3871      -0.6899     1.6972</a:t>
+            </a:r>
+          </a:p>
+          <a:p>
+            <a:r>
+              <a:rPr lang="en-US" b="1" dirty="0" err="1">
+                <a:solidFill>
+                  <a:schemeClr val="bg1"/>
+                </a:solidFill>
+                <a:latin typeface="Courier New" pitchFamily="49" charset="0"/>
+                <a:cs typeface="Courier New" pitchFamily="49" charset="0"/>
+              </a:rPr>
+              <a:t>dvclive</a:t>
+            </a:r>
+            <a:r>
+              <a:rPr lang="en-US" b="1" dirty="0">
+                <a:solidFill>
+                  <a:schemeClr val="bg1"/>
+                </a:solidFill>
+                <a:latin typeface="Courier New" pitchFamily="49" charset="0"/>
+                <a:cs typeface="Courier New" pitchFamily="49" charset="0"/>
+              </a:rPr>
+              <a:t>/</a:t>
+            </a:r>
+            <a:r>
+              <a:rPr lang="en-US" b="1" dirty="0" err="1">
+                <a:solidFill>
+                  <a:schemeClr val="bg1"/>
+                </a:solidFill>
+                <a:latin typeface="Courier New" pitchFamily="49" charset="0"/>
+                <a:cs typeface="Courier New" pitchFamily="49" charset="0"/>
+              </a:rPr>
+              <a:t>metrics.json</a:t>
+            </a:r>
+            <a:r>
+              <a:rPr lang="en-US" b="1" dirty="0">
+                <a:solidFill>
+                  <a:schemeClr val="bg1"/>
+                </a:solidFill>
+                <a:latin typeface="Courier New" pitchFamily="49" charset="0"/>
+                <a:cs typeface="Courier New" pitchFamily="49" charset="0"/>
+              </a:rPr>
+              <a:t>  magnetization  0.9734       0.295       -0.6784</a:t>
+            </a:r>
+          </a:p>
+          <a:p>
+            <a:endParaRPr lang="en-US" b="1" dirty="0">
+              <a:solidFill>
+                <a:schemeClr val="bg1"/>
+              </a:solidFill>
+              <a:latin typeface="Courier New" pitchFamily="49" charset="0"/>
+              <a:cs typeface="Courier New" pitchFamily="49" charset="0"/>
+            </a:endParaRPr>
+          </a:p>
+          <a:p>
+            <a:r>
+              <a:rPr lang="en-US" b="1" dirty="0">
+                <a:solidFill>
+                  <a:schemeClr val="bg1"/>
+                </a:solidFill>
+                <a:latin typeface="Courier New" pitchFamily="49" charset="0"/>
+                <a:cs typeface="Courier New" pitchFamily="49" charset="0"/>
+              </a:rPr>
+              <a:t>Path                 Param                 </a:t>
+            </a:r>
+            <a:r>
+              <a:rPr lang="en-US" b="1" dirty="0" err="1">
+                <a:solidFill>
+                  <a:schemeClr val="bg1"/>
+                </a:solidFill>
+                <a:latin typeface="Courier New" pitchFamily="49" charset="0"/>
+                <a:cs typeface="Courier New" pitchFamily="49" charset="0"/>
+              </a:rPr>
+              <a:t>high_temp</a:t>
+            </a:r>
+            <a:r>
+              <a:rPr lang="en-US" b="1" dirty="0">
+                <a:solidFill>
+                  <a:schemeClr val="bg1"/>
+                </a:solidFill>
+                <a:latin typeface="Courier New" pitchFamily="49" charset="0"/>
+                <a:cs typeface="Courier New" pitchFamily="49" charset="0"/>
+              </a:rPr>
+              <a:t>    </a:t>
+            </a:r>
+            <a:r>
+              <a:rPr lang="en-US" b="1" dirty="0" err="1">
+                <a:solidFill>
+                  <a:schemeClr val="bg1"/>
+                </a:solidFill>
+                <a:latin typeface="Courier New" pitchFamily="49" charset="0"/>
+                <a:cs typeface="Courier New" pitchFamily="49" charset="0"/>
+              </a:rPr>
+              <a:t>low_temp</a:t>
+            </a:r>
+            <a:r>
+              <a:rPr lang="en-US" b="1" dirty="0">
+                <a:solidFill>
+                  <a:schemeClr val="bg1"/>
+                </a:solidFill>
+                <a:latin typeface="Courier New" pitchFamily="49" charset="0"/>
+                <a:cs typeface="Courier New" pitchFamily="49" charset="0"/>
+              </a:rPr>
+              <a:t>    Change</a:t>
+            </a:r>
+          </a:p>
+          <a:p>
+            <a:r>
+              <a:rPr lang="en-US" b="1" dirty="0" err="1">
+                <a:solidFill>
+                  <a:schemeClr val="bg1"/>
+                </a:solidFill>
+                <a:latin typeface="Courier New" pitchFamily="49" charset="0"/>
+                <a:cs typeface="Courier New" pitchFamily="49" charset="0"/>
+              </a:rPr>
+              <a:t>dvclive</a:t>
+            </a:r>
+            <a:r>
+              <a:rPr lang="en-US" b="1" dirty="0">
+                <a:solidFill>
+                  <a:schemeClr val="bg1"/>
+                </a:solidFill>
+                <a:latin typeface="Courier New" pitchFamily="49" charset="0"/>
+                <a:cs typeface="Courier New" pitchFamily="49" charset="0"/>
+              </a:rPr>
+              <a:t>/</a:t>
+            </a:r>
+            <a:r>
+              <a:rPr lang="en-US" b="1" dirty="0" err="1">
+                <a:solidFill>
+                  <a:schemeClr val="bg1"/>
+                </a:solidFill>
+                <a:latin typeface="Courier New" pitchFamily="49" charset="0"/>
+                <a:cs typeface="Courier New" pitchFamily="49" charset="0"/>
+              </a:rPr>
+              <a:t>params.yaml</a:t>
+            </a:r>
+            <a:r>
+              <a:rPr lang="en-US" b="1" dirty="0">
+                <a:solidFill>
+                  <a:schemeClr val="bg1"/>
+                </a:solidFill>
+                <a:latin typeface="Courier New" pitchFamily="49" charset="0"/>
+                <a:cs typeface="Courier New" pitchFamily="49" charset="0"/>
+              </a:rPr>
+              <a:t>  </a:t>
+            </a:r>
+            <a:r>
+              <a:rPr lang="en-US" b="1" dirty="0" err="1">
+                <a:solidFill>
+                  <a:schemeClr val="bg1"/>
+                </a:solidFill>
+                <a:latin typeface="Courier New" pitchFamily="49" charset="0"/>
+                <a:cs typeface="Courier New" pitchFamily="49" charset="0"/>
+              </a:rPr>
+              <a:t>dynamics.temperature</a:t>
+            </a:r>
+            <a:r>
+              <a:rPr lang="en-US" b="1" dirty="0">
+                <a:solidFill>
+                  <a:schemeClr val="bg1"/>
+                </a:solidFill>
+                <a:latin typeface="Courier New" pitchFamily="49" charset="0"/>
+                <a:cs typeface="Courier New" pitchFamily="49" charset="0"/>
+              </a:rPr>
+              <a:t>  2.0          5.0         3.0</a:t>
+            </a:r>
+            <a:endParaRPr lang="nl-BE" b="1" dirty="0">
+              <a:solidFill>
+                <a:schemeClr val="bg1"/>
+              </a:solidFill>
+              <a:latin typeface="Courier New" pitchFamily="49" charset="0"/>
+              <a:cs typeface="Courier New" pitchFamily="49" charset="0"/>
+            </a:endParaRPr>
+          </a:p>
+        </p:txBody>
+      </p:sp>
+      <p:sp>
+        <p:nvSpPr>
+          <p:cNvPr id="6" name="TextBox 5">
+            <a:extLst>
+              <a:ext uri="{FF2B5EF4-FFF2-40B4-BE49-F238E27FC236}">
+                <a16:creationId xmlns:a16="http://schemas.microsoft.com/office/drawing/2014/main" id="{E0C1B6BC-9FD8-434E-3730-24E8F29D819E}"/>
+              </a:ext>
+            </a:extLst>
+          </p:cNvPr>
+          <p:cNvSpPr txBox="1"/>
+          <p:nvPr/>
+        </p:nvSpPr>
+        <p:spPr>
+          <a:xfrm>
+            <a:off x="1240972" y="4446178"/>
+            <a:ext cx="5214257" cy="369332"/>
+          </a:xfrm>
+          <a:prstGeom prst="rect">
+            <a:avLst/>
+          </a:prstGeom>
+          <a:solidFill>
+            <a:schemeClr val="tx1"/>
+          </a:solidFill>
+          <a:ln>
+            <a:solidFill>
+              <a:schemeClr val="tx1"/>
+            </a:solidFill>
+          </a:ln>
+        </p:spPr>
+        <p:txBody>
+          <a:bodyPr wrap="square" rtlCol="0">
+            <a:spAutoFit/>
+          </a:bodyPr>
+          <a:lstStyle/>
+          <a:p>
+            <a:r>
+              <a:rPr lang="en-US" b="1" dirty="0">
+                <a:solidFill>
+                  <a:schemeClr val="bg1"/>
+                </a:solidFill>
+                <a:latin typeface="Courier New" pitchFamily="49" charset="0"/>
+                <a:cs typeface="Courier New" pitchFamily="49" charset="0"/>
+              </a:rPr>
+              <a:t>$  </a:t>
+            </a:r>
+            <a:r>
+              <a:rPr lang="en-US" b="1" dirty="0" err="1">
+                <a:solidFill>
+                  <a:schemeClr val="bg1"/>
+                </a:solidFill>
+                <a:latin typeface="Courier New" pitchFamily="49" charset="0"/>
+                <a:cs typeface="Courier New" pitchFamily="49" charset="0"/>
+              </a:rPr>
+              <a:t>dvc</a:t>
+            </a:r>
+            <a:r>
+              <a:rPr lang="en-US" b="1" dirty="0">
+                <a:solidFill>
+                  <a:schemeClr val="bg1"/>
+                </a:solidFill>
+                <a:latin typeface="Courier New" pitchFamily="49" charset="0"/>
+                <a:cs typeface="Courier New" pitchFamily="49" charset="0"/>
+              </a:rPr>
+              <a:t> plots diff </a:t>
+            </a:r>
+            <a:r>
+              <a:rPr lang="en-US" b="1" dirty="0" err="1">
+                <a:solidFill>
+                  <a:schemeClr val="bg1"/>
+                </a:solidFill>
+                <a:latin typeface="Courier New" pitchFamily="49" charset="0"/>
+                <a:cs typeface="Courier New" pitchFamily="49" charset="0"/>
+              </a:rPr>
+              <a:t>high_temp</a:t>
+            </a:r>
+            <a:r>
+              <a:rPr lang="en-US" b="1" dirty="0">
+                <a:solidFill>
+                  <a:schemeClr val="bg1"/>
+                </a:solidFill>
+                <a:latin typeface="Courier New" pitchFamily="49" charset="0"/>
+                <a:cs typeface="Courier New" pitchFamily="49" charset="0"/>
+              </a:rPr>
+              <a:t> </a:t>
+            </a:r>
+            <a:r>
+              <a:rPr lang="en-US" b="1" dirty="0" err="1">
+                <a:solidFill>
+                  <a:schemeClr val="bg1"/>
+                </a:solidFill>
+                <a:latin typeface="Courier New" pitchFamily="49" charset="0"/>
+                <a:cs typeface="Courier New" pitchFamily="49" charset="0"/>
+              </a:rPr>
+              <a:t>low_temp</a:t>
+            </a:r>
+            <a:endParaRPr lang="en-US" b="1" dirty="0">
+              <a:solidFill>
+                <a:schemeClr val="bg1"/>
+              </a:solidFill>
+              <a:latin typeface="Courier New" pitchFamily="49" charset="0"/>
+              <a:cs typeface="Courier New" pitchFamily="49" charset="0"/>
+            </a:endParaRPr>
+          </a:p>
+        </p:txBody>
+      </p:sp>
+      <p:pic>
+        <p:nvPicPr>
+          <p:cNvPr id="10" name="Picture 9">
+            <a:extLst>
+              <a:ext uri="{FF2B5EF4-FFF2-40B4-BE49-F238E27FC236}">
+                <a16:creationId xmlns:a16="http://schemas.microsoft.com/office/drawing/2014/main" id="{A37F60CD-CE2E-AA84-07D4-646E2BC8956D}"/>
+              </a:ext>
+            </a:extLst>
+          </p:cNvPr>
+          <p:cNvPicPr>
+            <a:picLocks noChangeAspect="1"/>
+          </p:cNvPicPr>
+          <p:nvPr/>
+        </p:nvPicPr>
+        <p:blipFill>
+          <a:blip r:embed="rId2"/>
+          <a:stretch>
+            <a:fillRect/>
+          </a:stretch>
+        </p:blipFill>
+        <p:spPr>
+          <a:xfrm>
+            <a:off x="6683722" y="4199202"/>
+            <a:ext cx="4746242" cy="2080948"/>
+          </a:xfrm>
+          <a:prstGeom prst="rect">
+            <a:avLst/>
+          </a:prstGeom>
+        </p:spPr>
+      </p:pic>
+      <p:sp>
+        <p:nvSpPr>
+          <p:cNvPr id="11" name="TextBox 10">
+            <a:extLst>
+              <a:ext uri="{FF2B5EF4-FFF2-40B4-BE49-F238E27FC236}">
+                <a16:creationId xmlns:a16="http://schemas.microsoft.com/office/drawing/2014/main" id="{7E6E73F6-47AF-2664-8C32-27D6AB9D2B00}"/>
+              </a:ext>
+            </a:extLst>
+          </p:cNvPr>
+          <p:cNvSpPr txBox="1"/>
+          <p:nvPr/>
+        </p:nvSpPr>
+        <p:spPr>
+          <a:xfrm>
+            <a:off x="5780314" y="5559718"/>
+            <a:ext cx="1107996" cy="369332"/>
+          </a:xfrm>
+          <a:prstGeom prst="rect">
+            <a:avLst/>
+          </a:prstGeom>
+          <a:solidFill>
+            <a:schemeClr val="bg1"/>
+          </a:solidFill>
+          <a:ln>
+            <a:solidFill>
+              <a:schemeClr val="tx1"/>
+            </a:solidFill>
+          </a:ln>
+        </p:spPr>
+        <p:txBody>
+          <a:bodyPr wrap="none" rtlCol="0">
+            <a:spAutoFit/>
+          </a:bodyPr>
+          <a:lstStyle/>
+          <a:p>
+            <a:r>
+              <a:rPr lang="en-US" dirty="0"/>
+              <a:t>HTML file</a:t>
+            </a:r>
+            <a:endParaRPr lang="LID4096" dirty="0"/>
+          </a:p>
+        </p:txBody>
+      </p:sp>
+    </p:spTree>
+    <p:extLst>
+      <p:ext uri="{BB962C8B-B14F-4D97-AF65-F5344CB8AC3E}">
+        <p14:creationId xmlns:p14="http://schemas.microsoft.com/office/powerpoint/2010/main" val="142169941"/>
+      </p:ext>
+    </p:extLst>
+  </p:cSld>
+  <p:clrMapOvr>
+    <a:masterClrMapping/>
+  </p:clrMapOvr>
+  <p:timing>
+    <p:tnLst>
+      <p:par>
+        <p:cTn id="1" dur="indefinite" restart="never" nodeType="tmRoot">
+          <p:childTnLst>
+            <p:seq concurrent="1" nextAc="seek">
+              <p:cTn id="2" dur="indefinite" nodeType="mainSeq">
+                <p:childTnLst>
+                  <p:par>
+                    <p:cTn id="3" fill="hold">
+                      <p:stCondLst>
+                        <p:cond delay="indefinite"/>
+                        <p:cond evt="onBegin" delay="0">
+                          <p:tn val="2"/>
+                        </p:cond>
+                      </p:stCondLst>
+                      <p:childTnLst>
+                        <p:par>
+                          <p:cTn id="4" fill="hold">
+                            <p:stCondLst>
+                              <p:cond delay="0"/>
+                            </p:stCondLst>
+                            <p:childTnLst>
+                              <p:par>
+                                <p:cTn id="5" presetID="1" presetClass="entr" presetSubtype="0" fill="hold" grpId="0" nodeType="withEffect">
+                                  <p:stCondLst>
+                                    <p:cond delay="0"/>
+                                  </p:stCondLst>
+                                  <p:childTnLst>
+                                    <p:set>
+                                      <p:cBhvr>
+                                        <p:cTn id="6" dur="1" fill="hold">
+                                          <p:stCondLst>
+                                            <p:cond delay="0"/>
+                                          </p:stCondLst>
+                                        </p:cTn>
+                                        <p:tgtEl>
+                                          <p:spTgt spid="5"/>
+                                        </p:tgtEl>
+                                        <p:attrNameLst>
+                                          <p:attrName>style.visibility</p:attrName>
+                                        </p:attrNameLst>
+                                      </p:cBhvr>
+                                      <p:to>
+                                        <p:strVal val="visible"/>
+                                      </p:to>
+                                    </p:set>
+                                  </p:childTnLst>
+                                </p:cTn>
+                              </p:par>
+                              <p:par>
+                                <p:cTn id="7" presetID="1" presetClass="entr" presetSubtype="0" fill="hold" grpId="0" nodeType="withEffect">
+                                  <p:stCondLst>
+                                    <p:cond delay="0"/>
+                                  </p:stCondLst>
+                                  <p:childTnLst>
+                                    <p:set>
+                                      <p:cBhvr>
+                                        <p:cTn id="8" dur="1" fill="hold">
+                                          <p:stCondLst>
+                                            <p:cond delay="0"/>
+                                          </p:stCondLst>
+                                        </p:cTn>
+                                        <p:tgtEl>
+                                          <p:spTgt spid="6"/>
+                                        </p:tgtEl>
+                                        <p:attrNameLst>
+                                          <p:attrName>style.visibility</p:attrName>
+                                        </p:attrNameLst>
+                                      </p:cBhvr>
+                                      <p:to>
+                                        <p:strVal val="visible"/>
+                                      </p:to>
+                                    </p:set>
+                                  </p:childTnLst>
+                                </p:cTn>
+                              </p:par>
+                            </p:childTnLst>
+                          </p:cTn>
+                        </p:par>
+                      </p:childTnLst>
+                    </p:cTn>
+                  </p:par>
+                </p:childTnLst>
+              </p:cTn>
+              <p:prevCondLst>
+                <p:cond evt="onPrev" delay="0">
+                  <p:tgtEl>
+                    <p:sldTgt/>
+                  </p:tgtEl>
+                </p:cond>
+              </p:prevCondLst>
+              <p:nextCondLst>
+                <p:cond evt="onNext" delay="0">
+                  <p:tgtEl>
+                    <p:sldTgt/>
+                  </p:tgtEl>
+                </p:cond>
+              </p:nextCondLst>
+            </p:seq>
+          </p:childTnLst>
+        </p:cTn>
+      </p:par>
+    </p:tnLst>
+    <p:bldLst>
+      <p:bldP spid="5" grpId="0" animBg="1"/>
+      <p:bldP spid="6" grpId="0" animBg="1"/>
+    </p:bldLst>
+  </p:timing>
+</p:sld>
+</file>
+
+<file path=ppt/slides/slide41.xml><?xml version="1.0" encoding="utf-8"?>
+<p:sld xmlns:a="http://schemas.openxmlformats.org/drawingml/2006/main" xmlns:r="http://schemas.openxmlformats.org/officeDocument/2006/relationships" xmlns:p="http://schemas.openxmlformats.org/presentationml/2006/main">
+  <p:cSld>
+    <p:spTree>
+      <p:nvGrpSpPr>
+        <p:cNvPr id="1" name=""/>
+        <p:cNvGrpSpPr/>
+        <p:nvPr/>
+      </p:nvGrpSpPr>
+      <p:grpSpPr>
+        <a:xfrm>
+          <a:off x="0" y="0"/>
+          <a:ext cx="0" cy="0"/>
+          <a:chOff x="0" y="0"/>
+          <a:chExt cx="0" cy="0"/>
+        </a:xfrm>
+      </p:grpSpPr>
+      <p:sp>
+        <p:nvSpPr>
+          <p:cNvPr id="2" name="Title 1">
+            <a:extLst>
+              <a:ext uri="{FF2B5EF4-FFF2-40B4-BE49-F238E27FC236}">
+                <a16:creationId xmlns:a16="http://schemas.microsoft.com/office/drawing/2014/main" id="{5BAF57E0-A434-0F25-8810-27DED25237C8}"/>
+              </a:ext>
+            </a:extLst>
+          </p:cNvPr>
+          <p:cNvSpPr>
+            <a:spLocks noGrp="1"/>
+          </p:cNvSpPr>
+          <p:nvPr>
+            <p:ph type="title"/>
+          </p:nvPr>
+        </p:nvSpPr>
+        <p:spPr/>
+        <p:txBody>
+          <a:bodyPr/>
+          <a:lstStyle/>
+          <a:p>
+            <a:r>
+              <a:rPr lang="en-US" dirty="0"/>
               <a:t>Sharing experiments</a:t>
             </a:r>
             <a:endParaRPr lang="LID4096" dirty="0"/>
@@ -25415,7 +25830,7 @@
           <a:p>
             <a:fld id="{9C7CE217-4467-4B8D-A735-B008FA7C4816}" type="slidenum">
               <a:rPr lang="LID4096" smtClean="0"/>
-              <a:t>40</a:t>
+              <a:t>41</a:t>
             </a:fld>
             <a:endParaRPr lang="LID4096"/>
           </a:p>
@@ -25939,7 +26354,7 @@
 </p:sld>
 </file>
 
-<file path=ppt/slides/slide41.xml><?xml version="1.0" encoding="utf-8"?>
+<file path=ppt/slides/slide42.xml><?xml version="1.0" encoding="utf-8"?>
 <p:sld xmlns:a="http://schemas.openxmlformats.org/drawingml/2006/main" xmlns:r="http://schemas.openxmlformats.org/officeDocument/2006/relationships" xmlns:p="http://schemas.openxmlformats.org/presentationml/2006/main">
   <p:cSld>
     <p:spTree>
@@ -26065,7 +26480,7 @@
           <a:p>
             <a:fld id="{9C7CE217-4467-4B8D-A735-B008FA7C4816}" type="slidenum">
               <a:rPr lang="LID4096" smtClean="0"/>
-              <a:t>41</a:t>
+              <a:t>42</a:t>
             </a:fld>
             <a:endParaRPr lang="LID4096"/>
           </a:p>
@@ -26085,8 +26500,8 @@
         </p:nvSpPr>
         <p:spPr>
           <a:xfrm>
-            <a:off x="6487883" y="1652648"/>
-            <a:ext cx="5279571" cy="4524315"/>
+            <a:off x="6487883" y="1043047"/>
+            <a:ext cx="5279571" cy="5078313"/>
           </a:xfrm>
           <a:prstGeom prst="rect">
             <a:avLst/>
@@ -26328,6 +26743,56 @@
                 <a:cs typeface="Courier New" pitchFamily="49" charset="0"/>
               </a:rPr>
               <a:t>score &lt;- 0.0</a:t>
+            </a:r>
+          </a:p>
+          <a:p>
+            <a:pPr lvl="0">
+              <a:defRPr/>
+            </a:pPr>
+            <a:r>
+              <a:rPr lang="en-US" b="1" dirty="0" err="1">
+                <a:solidFill>
+                  <a:srgbClr val="FF0000"/>
+                </a:solidFill>
+                <a:latin typeface="Courier New" pitchFamily="49" charset="0"/>
+                <a:cs typeface="Courier New" pitchFamily="49" charset="0"/>
+              </a:rPr>
+              <a:t>live$log_metric</a:t>
+            </a:r>
+            <a:r>
+              <a:rPr lang="en-US" b="1" dirty="0">
+                <a:solidFill>
+                  <a:srgbClr val="FF0000"/>
+                </a:solidFill>
+                <a:latin typeface="Courier New" pitchFamily="49" charset="0"/>
+                <a:cs typeface="Courier New" pitchFamily="49" charset="0"/>
+              </a:rPr>
+              <a:t>("score", score)</a:t>
+            </a:r>
+          </a:p>
+          <a:p>
+            <a:pPr lvl="0">
+              <a:defRPr/>
+            </a:pPr>
+            <a:r>
+              <a:rPr lang="en-US" b="1" dirty="0" err="1">
+                <a:solidFill>
+                  <a:srgbClr val="FF0000"/>
+                </a:solidFill>
+                <a:latin typeface="Courier New" pitchFamily="49" charset="0"/>
+                <a:cs typeface="Courier New" pitchFamily="49" charset="0"/>
+              </a:rPr>
+              <a:t>live$next_step</a:t>
+            </a:r>
+            <a:r>
+              <a:rPr lang="en-US" b="1" dirty="0">
+                <a:solidFill>
+                  <a:srgbClr val="FF0000"/>
+                </a:solidFill>
+                <a:latin typeface="Courier New" pitchFamily="49" charset="0"/>
+                <a:cs typeface="Courier New" pitchFamily="49" charset="0"/>
+              </a:rPr>
+              <a:t>()</a:t>
             </a:r>
           </a:p>
           <a:p>

</xml_diff>

<commit_message>
Add warnings on push/pull DVC vs. git
</commit_message>
<xml_diff>
--- a/mlops_on_hpc.pptx
+++ b/mlops_on_hpc.pptx
@@ -26231,6 +26231,130 @@
             </a:fontRef>
           </p:style>
         </p:cxnSp>
+      </p:grpSp>
+      <p:grpSp>
+        <p:nvGrpSpPr>
+          <p:cNvPr id="10" name="Group 9">
+            <a:extLst>
+              <a:ext uri="{FF2B5EF4-FFF2-40B4-BE49-F238E27FC236}">
+                <a16:creationId xmlns:a16="http://schemas.microsoft.com/office/drawing/2014/main" id="{D480B76E-9E75-5766-9591-85778F37A33F}"/>
+              </a:ext>
+            </a:extLst>
+          </p:cNvPr>
+          <p:cNvGrpSpPr/>
+          <p:nvPr/>
+        </p:nvGrpSpPr>
+        <p:grpSpPr>
+          <a:xfrm>
+            <a:off x="3461552" y="4159938"/>
+            <a:ext cx="5083625" cy="1379498"/>
+            <a:chOff x="424546" y="5228351"/>
+            <a:chExt cx="5083625" cy="1379498"/>
+          </a:xfrm>
+        </p:grpSpPr>
+        <p:sp>
+          <p:nvSpPr>
+            <p:cNvPr id="11" name="TextBox 10">
+              <a:extLst>
+                <a:ext uri="{FF2B5EF4-FFF2-40B4-BE49-F238E27FC236}">
+                  <a16:creationId xmlns:a16="http://schemas.microsoft.com/office/drawing/2014/main" id="{15F8BC51-5153-06D0-761B-19D80FEC2989}"/>
+                </a:ext>
+              </a:extLst>
+            </p:cNvPr>
+            <p:cNvSpPr txBox="1"/>
+            <p:nvPr/>
+          </p:nvSpPr>
+          <p:spPr>
+            <a:xfrm>
+              <a:off x="424546" y="5653742"/>
+              <a:ext cx="4661469" cy="954107"/>
+            </a:xfrm>
+            <a:prstGeom prst="rect">
+              <a:avLst/>
+            </a:prstGeom>
+            <a:noFill/>
+            <a:ln>
+              <a:solidFill>
+                <a:schemeClr val="tx1"/>
+              </a:solidFill>
+            </a:ln>
+          </p:spPr>
+          <p:txBody>
+            <a:bodyPr wrap="none" rtlCol="0">
+              <a:spAutoFit/>
+            </a:bodyPr>
+            <a:lstStyle/>
+            <a:p>
+              <a:r>
+                <a:rPr lang="en-US" sz="2800" dirty="0"/>
+                <a:t>Don’t forget to </a:t>
+              </a:r>
+              <a:r>
+                <a:rPr lang="en-US" sz="2800" dirty="0" err="1"/>
+                <a:t>dvc</a:t>
+              </a:r>
+              <a:r>
+                <a:rPr lang="en-US" sz="2800" dirty="0"/>
+                <a:t> push/pull,</a:t>
+              </a:r>
+              <a:br>
+                <a:rPr lang="en-US" sz="2800" dirty="0"/>
+              </a:br>
+              <a:r>
+                <a:rPr lang="en-US" sz="2800" dirty="0"/>
+                <a:t>git push/pull is not enough!</a:t>
+              </a:r>
+              <a:endParaRPr lang="LID4096" sz="2800" dirty="0"/>
+            </a:p>
+          </p:txBody>
+        </p:sp>
+        <p:pic>
+          <p:nvPicPr>
+            <p:cNvPr id="13" name="Picture 2" descr="C:\Users\lucg5005\AppData\Local\Microsoft\Windows\Temporary Internet Files\Content.IE5\CWZUAEH4\lgi01a201309290600[1].jpg">
+              <a:extLst>
+                <a:ext uri="{FF2B5EF4-FFF2-40B4-BE49-F238E27FC236}">
+                  <a16:creationId xmlns:a16="http://schemas.microsoft.com/office/drawing/2014/main" id="{CE4F2AF2-2090-AEFA-BB78-E2542DB9AAE5}"/>
+                </a:ext>
+              </a:extLst>
+            </p:cNvPr>
+            <p:cNvPicPr>
+              <a:picLocks noChangeAspect="1" noChangeArrowheads="1"/>
+            </p:cNvPicPr>
+            <p:nvPr/>
+          </p:nvPicPr>
+          <p:blipFill>
+            <a:blip r:embed="rId2" cstate="print">
+              <a:extLst>
+                <a:ext uri="{28A0092B-C50C-407E-A947-70E740481C1C}">
+                  <a14:useLocalDpi xmlns:a14="http://schemas.microsoft.com/office/drawing/2010/main" val="0"/>
+                </a:ext>
+              </a:extLst>
+            </a:blip>
+            <a:srcRect/>
+            <a:stretch>
+              <a:fillRect/>
+            </a:stretch>
+          </p:blipFill>
+          <p:spPr bwMode="auto">
+            <a:xfrm>
+              <a:off x="4942020" y="5228351"/>
+              <a:ext cx="566151" cy="580908"/>
+            </a:xfrm>
+            <a:prstGeom prst="rect">
+              <a:avLst/>
+            </a:prstGeom>
+            <a:noFill/>
+            <a:extLst>
+              <a:ext uri="{909E8E84-426E-40DD-AFC4-6F175D3DCCD1}">
+                <a14:hiddenFill xmlns:a14="http://schemas.microsoft.com/office/drawing/2010/main">
+                  <a:solidFill>
+                    <a:srgbClr val="FFFFFF"/>
+                  </a:solidFill>
+                </a14:hiddenFill>
+              </a:ext>
+            </a:extLst>
+          </p:spPr>
+        </p:pic>
       </p:grpSp>
     </p:spTree>
     <p:extLst>

</xml_diff>

<commit_message>
Add remark on --open, wslview
</commit_message>
<xml_diff>
--- a/mlops_on_hpc.pptx
+++ b/mlops_on_hpc.pptx
@@ -21355,7 +21355,7 @@
         </p:blipFill>
         <p:spPr>
           <a:xfrm>
-            <a:off x="1282860" y="1065015"/>
+            <a:off x="618830" y="1065015"/>
             <a:ext cx="8341765" cy="5771213"/>
           </a:xfrm>
           <a:prstGeom prst="rect">
@@ -21435,7 +21435,7 @@
         </p:nvGrpSpPr>
         <p:grpSpPr>
           <a:xfrm>
-            <a:off x="6068596" y="365125"/>
+            <a:off x="5404566" y="365125"/>
             <a:ext cx="3206035" cy="1250898"/>
             <a:chOff x="88563" y="5501785"/>
             <a:chExt cx="5047585" cy="1135701"/>
@@ -21585,7 +21585,7 @@
         </p:nvGrpSpPr>
         <p:grpSpPr>
           <a:xfrm>
-            <a:off x="8610600" y="1230518"/>
+            <a:off x="7946570" y="1230518"/>
             <a:ext cx="2862943" cy="1250898"/>
             <a:chOff x="88563" y="5501785"/>
             <a:chExt cx="4507421" cy="1135701"/>
@@ -21735,7 +21735,7 @@
         </p:nvGrpSpPr>
         <p:grpSpPr>
           <a:xfrm>
-            <a:off x="7637155" y="4233277"/>
+            <a:off x="6973125" y="4233277"/>
             <a:ext cx="3368302" cy="1250898"/>
             <a:chOff x="88563" y="5501785"/>
             <a:chExt cx="5303059" cy="1135701"/>
@@ -21870,6 +21870,121 @@
             </a:fontRef>
           </p:style>
         </p:cxnSp>
+      </p:grpSp>
+      <p:grpSp>
+        <p:nvGrpSpPr>
+          <p:cNvPr id="4" name="Group 3">
+            <a:extLst>
+              <a:ext uri="{FF2B5EF4-FFF2-40B4-BE49-F238E27FC236}">
+                <a16:creationId xmlns:a16="http://schemas.microsoft.com/office/drawing/2014/main" id="{9703C93F-8221-FBC1-86C0-F9DB2E680581}"/>
+              </a:ext>
+            </a:extLst>
+          </p:cNvPr>
+          <p:cNvGrpSpPr/>
+          <p:nvPr/>
+        </p:nvGrpSpPr>
+        <p:grpSpPr>
+          <a:xfrm>
+            <a:off x="9605805" y="4932394"/>
+            <a:ext cx="2271286" cy="1210028"/>
+            <a:chOff x="6061878" y="373626"/>
+            <a:chExt cx="2271286" cy="1210028"/>
+          </a:xfrm>
+        </p:grpSpPr>
+        <p:sp>
+          <p:nvSpPr>
+            <p:cNvPr id="5" name="TextBox 4">
+              <a:extLst>
+                <a:ext uri="{FF2B5EF4-FFF2-40B4-BE49-F238E27FC236}">
+                  <a16:creationId xmlns:a16="http://schemas.microsoft.com/office/drawing/2014/main" id="{967D306A-9652-4B6A-B041-08CBE277F554}"/>
+                </a:ext>
+              </a:extLst>
+            </p:cNvPr>
+            <p:cNvSpPr txBox="1"/>
+            <p:nvPr/>
+          </p:nvSpPr>
+          <p:spPr>
+            <a:xfrm>
+              <a:off x="6061878" y="752657"/>
+              <a:ext cx="1835759" cy="830997"/>
+            </a:xfrm>
+            <a:prstGeom prst="rect">
+              <a:avLst/>
+            </a:prstGeom>
+            <a:noFill/>
+            <a:ln>
+              <a:solidFill>
+                <a:schemeClr val="tx1"/>
+              </a:solidFill>
+            </a:ln>
+          </p:spPr>
+          <p:txBody>
+            <a:bodyPr wrap="none" rtlCol="0">
+              <a:spAutoFit/>
+            </a:bodyPr>
+            <a:lstStyle/>
+            <a:p>
+              <a:r>
+                <a:rPr lang="en-US" sz="2400" dirty="0"/>
+                <a:t>On WSL2</a:t>
+              </a:r>
+              <a:br>
+                <a:rPr lang="en-US" sz="2400" dirty="0"/>
+              </a:br>
+              <a:r>
+                <a:rPr lang="en-US" sz="2400" dirty="0"/>
+                <a:t>use </a:t>
+              </a:r>
+              <a:r>
+                <a:rPr lang="en-US" sz="2400" dirty="0">
+                  <a:latin typeface="Courier New" panose="02070309020205020404" pitchFamily="49" charset="0"/>
+                  <a:cs typeface="Courier New" panose="02070309020205020404" pitchFamily="49" charset="0"/>
+                </a:rPr>
+                <a:t>--open</a:t>
+              </a:r>
+              <a:endParaRPr lang="LID4096" sz="2400" dirty="0">
+                <a:latin typeface="Courier New" panose="02070309020205020404" pitchFamily="49" charset="0"/>
+                <a:cs typeface="Courier New" panose="02070309020205020404" pitchFamily="49" charset="0"/>
+              </a:endParaRPr>
+            </a:p>
+          </p:txBody>
+        </p:sp>
+        <p:pic>
+          <p:nvPicPr>
+            <p:cNvPr id="6" name="Graphic 5" descr="Smiling face with solid fill with solid fill">
+              <a:extLst>
+                <a:ext uri="{FF2B5EF4-FFF2-40B4-BE49-F238E27FC236}">
+                  <a16:creationId xmlns:a16="http://schemas.microsoft.com/office/drawing/2014/main" id="{8B011098-B56D-B679-5982-18AF64E24760}"/>
+                </a:ext>
+              </a:extLst>
+            </p:cNvPr>
+            <p:cNvPicPr>
+              <a:picLocks noChangeAspect="1"/>
+            </p:cNvPicPr>
+            <p:nvPr/>
+          </p:nvPicPr>
+          <p:blipFill>
+            <a:blip r:embed="rId3">
+              <a:extLst>
+                <a:ext uri="{96DAC541-7B7A-43D3-8B79-37D633B846F1}">
+                  <asvg:svgBlip xmlns:asvg="http://schemas.microsoft.com/office/drawing/2016/SVG/main" r:embed="rId4"/>
+                </a:ext>
+              </a:extLst>
+            </a:blip>
+            <a:stretch>
+              <a:fillRect/>
+            </a:stretch>
+          </p:blipFill>
+          <p:spPr>
+            <a:xfrm>
+              <a:off x="7725322" y="373626"/>
+              <a:ext cx="607842" cy="607842"/>
+            </a:xfrm>
+            <a:prstGeom prst="rect">
+              <a:avLst/>
+            </a:prstGeom>
+          </p:spPr>
+        </p:pic>
       </p:grpSp>
     </p:spTree>
     <p:extLst>
@@ -23489,6 +23604,121 @@
           </a:p>
         </p:txBody>
       </p:sp>
+      <p:grpSp>
+        <p:nvGrpSpPr>
+          <p:cNvPr id="13" name="Group 12">
+            <a:extLst>
+              <a:ext uri="{FF2B5EF4-FFF2-40B4-BE49-F238E27FC236}">
+                <a16:creationId xmlns:a16="http://schemas.microsoft.com/office/drawing/2014/main" id="{60332A15-2890-7F95-4177-670EBE5F6AAD}"/>
+              </a:ext>
+            </a:extLst>
+          </p:cNvPr>
+          <p:cNvGrpSpPr/>
+          <p:nvPr/>
+        </p:nvGrpSpPr>
+        <p:grpSpPr>
+          <a:xfrm>
+            <a:off x="6061878" y="752657"/>
+            <a:ext cx="3376036" cy="1283447"/>
+            <a:chOff x="6061878" y="752657"/>
+            <a:chExt cx="3376036" cy="1283447"/>
+          </a:xfrm>
+        </p:grpSpPr>
+        <p:sp>
+          <p:nvSpPr>
+            <p:cNvPr id="5" name="TextBox 4">
+              <a:extLst>
+                <a:ext uri="{FF2B5EF4-FFF2-40B4-BE49-F238E27FC236}">
+                  <a16:creationId xmlns:a16="http://schemas.microsoft.com/office/drawing/2014/main" id="{C9869AB2-DDDF-0CA2-D329-91BB16218C8C}"/>
+                </a:ext>
+              </a:extLst>
+            </p:cNvPr>
+            <p:cNvSpPr txBox="1"/>
+            <p:nvPr/>
+          </p:nvSpPr>
+          <p:spPr>
+            <a:xfrm>
+              <a:off x="6061878" y="752657"/>
+              <a:ext cx="3015634" cy="830997"/>
+            </a:xfrm>
+            <a:prstGeom prst="rect">
+              <a:avLst/>
+            </a:prstGeom>
+            <a:noFill/>
+            <a:ln>
+              <a:solidFill>
+                <a:schemeClr val="tx1"/>
+              </a:solidFill>
+            </a:ln>
+          </p:spPr>
+          <p:txBody>
+            <a:bodyPr wrap="none" rtlCol="0">
+              <a:spAutoFit/>
+            </a:bodyPr>
+            <a:lstStyle/>
+            <a:p>
+              <a:r>
+                <a:rPr lang="en-US" sz="2400" dirty="0"/>
+                <a:t>If you have a browser,</a:t>
+              </a:r>
+              <a:br>
+                <a:rPr lang="en-US" sz="2400" dirty="0"/>
+              </a:br>
+              <a:r>
+                <a:rPr lang="en-US" sz="2400" dirty="0"/>
+                <a:t>use </a:t>
+              </a:r>
+              <a:r>
+                <a:rPr lang="en-US" sz="2400" dirty="0">
+                  <a:latin typeface="Courier New" panose="02070309020205020404" pitchFamily="49" charset="0"/>
+                  <a:cs typeface="Courier New" panose="02070309020205020404" pitchFamily="49" charset="0"/>
+                </a:rPr>
+                <a:t>--open</a:t>
+              </a:r>
+              <a:endParaRPr lang="LID4096" sz="2400" dirty="0">
+                <a:latin typeface="Courier New" panose="02070309020205020404" pitchFamily="49" charset="0"/>
+                <a:cs typeface="Courier New" panose="02070309020205020404" pitchFamily="49" charset="0"/>
+              </a:endParaRPr>
+            </a:p>
+          </p:txBody>
+        </p:sp>
+        <p:pic>
+          <p:nvPicPr>
+            <p:cNvPr id="12" name="Graphic 11" descr="Smiling face with solid fill with solid fill">
+              <a:extLst>
+                <a:ext uri="{FF2B5EF4-FFF2-40B4-BE49-F238E27FC236}">
+                  <a16:creationId xmlns:a16="http://schemas.microsoft.com/office/drawing/2014/main" id="{BA1EB4FF-1075-D0BC-B773-69ACAD9735BE}"/>
+                </a:ext>
+              </a:extLst>
+            </p:cNvPr>
+            <p:cNvPicPr>
+              <a:picLocks noChangeAspect="1"/>
+            </p:cNvPicPr>
+            <p:nvPr/>
+          </p:nvPicPr>
+          <p:blipFill>
+            <a:blip r:embed="rId3">
+              <a:extLst>
+                <a:ext uri="{96DAC541-7B7A-43D3-8B79-37D633B846F1}">
+                  <asvg:svgBlip xmlns:asvg="http://schemas.microsoft.com/office/drawing/2016/SVG/main" r:embed="rId4"/>
+                </a:ext>
+              </a:extLst>
+            </a:blip>
+            <a:stretch>
+              <a:fillRect/>
+            </a:stretch>
+          </p:blipFill>
+          <p:spPr>
+            <a:xfrm>
+              <a:off x="8523514" y="1121704"/>
+              <a:ext cx="914400" cy="914400"/>
+            </a:xfrm>
+            <a:prstGeom prst="rect">
+              <a:avLst/>
+            </a:prstGeom>
+          </p:spPr>
+        </p:pic>
+      </p:grpSp>
     </p:spTree>
     <p:extLst>
       <p:ext uri="{BB962C8B-B14F-4D97-AF65-F5344CB8AC3E}">
@@ -25601,6 +25831,121 @@
           </a:p>
         </p:txBody>
       </p:sp>
+      <p:grpSp>
+        <p:nvGrpSpPr>
+          <p:cNvPr id="7" name="Group 6">
+            <a:extLst>
+              <a:ext uri="{FF2B5EF4-FFF2-40B4-BE49-F238E27FC236}">
+                <a16:creationId xmlns:a16="http://schemas.microsoft.com/office/drawing/2014/main" id="{A5E85CCD-6D7D-3879-AA23-56B0BBA3C446}"/>
+              </a:ext>
+            </a:extLst>
+          </p:cNvPr>
+          <p:cNvGrpSpPr/>
+          <p:nvPr/>
+        </p:nvGrpSpPr>
+        <p:grpSpPr>
+          <a:xfrm>
+            <a:off x="1169535" y="5255465"/>
+            <a:ext cx="3376036" cy="1283447"/>
+            <a:chOff x="6061878" y="752657"/>
+            <a:chExt cx="3376036" cy="1283447"/>
+          </a:xfrm>
+        </p:grpSpPr>
+        <p:sp>
+          <p:nvSpPr>
+            <p:cNvPr id="8" name="TextBox 7">
+              <a:extLst>
+                <a:ext uri="{FF2B5EF4-FFF2-40B4-BE49-F238E27FC236}">
+                  <a16:creationId xmlns:a16="http://schemas.microsoft.com/office/drawing/2014/main" id="{2C04D22C-6CE7-EF8A-DD62-2EBE454B7ABE}"/>
+                </a:ext>
+              </a:extLst>
+            </p:cNvPr>
+            <p:cNvSpPr txBox="1"/>
+            <p:nvPr/>
+          </p:nvSpPr>
+          <p:spPr>
+            <a:xfrm>
+              <a:off x="6061878" y="752657"/>
+              <a:ext cx="3015634" cy="830997"/>
+            </a:xfrm>
+            <a:prstGeom prst="rect">
+              <a:avLst/>
+            </a:prstGeom>
+            <a:noFill/>
+            <a:ln>
+              <a:solidFill>
+                <a:schemeClr val="tx1"/>
+              </a:solidFill>
+            </a:ln>
+          </p:spPr>
+          <p:txBody>
+            <a:bodyPr wrap="none" rtlCol="0">
+              <a:spAutoFit/>
+            </a:bodyPr>
+            <a:lstStyle/>
+            <a:p>
+              <a:r>
+                <a:rPr lang="en-US" sz="2400" dirty="0"/>
+                <a:t>If you have a browser,</a:t>
+              </a:r>
+              <a:br>
+                <a:rPr lang="en-US" sz="2400" dirty="0"/>
+              </a:br>
+              <a:r>
+                <a:rPr lang="en-US" sz="2400" dirty="0"/>
+                <a:t>use </a:t>
+              </a:r>
+              <a:r>
+                <a:rPr lang="en-US" sz="2400" dirty="0">
+                  <a:latin typeface="Courier New" panose="02070309020205020404" pitchFamily="49" charset="0"/>
+                  <a:cs typeface="Courier New" panose="02070309020205020404" pitchFamily="49" charset="0"/>
+                </a:rPr>
+                <a:t>--open</a:t>
+              </a:r>
+              <a:endParaRPr lang="LID4096" sz="2400" dirty="0">
+                <a:latin typeface="Courier New" panose="02070309020205020404" pitchFamily="49" charset="0"/>
+                <a:cs typeface="Courier New" panose="02070309020205020404" pitchFamily="49" charset="0"/>
+              </a:endParaRPr>
+            </a:p>
+          </p:txBody>
+        </p:sp>
+        <p:pic>
+          <p:nvPicPr>
+            <p:cNvPr id="9" name="Graphic 8" descr="Smiling face with solid fill with solid fill">
+              <a:extLst>
+                <a:ext uri="{FF2B5EF4-FFF2-40B4-BE49-F238E27FC236}">
+                  <a16:creationId xmlns:a16="http://schemas.microsoft.com/office/drawing/2014/main" id="{4D1D8A83-ACA7-8425-BABE-15AFA29B35CA}"/>
+                </a:ext>
+              </a:extLst>
+            </p:cNvPr>
+            <p:cNvPicPr>
+              <a:picLocks noChangeAspect="1"/>
+            </p:cNvPicPr>
+            <p:nvPr/>
+          </p:nvPicPr>
+          <p:blipFill>
+            <a:blip r:embed="rId3">
+              <a:extLst>
+                <a:ext uri="{96DAC541-7B7A-43D3-8B79-37D633B846F1}">
+                  <asvg:svgBlip xmlns:asvg="http://schemas.microsoft.com/office/drawing/2016/SVG/main" r:embed="rId4"/>
+                </a:ext>
+              </a:extLst>
+            </a:blip>
+            <a:stretch>
+              <a:fillRect/>
+            </a:stretch>
+          </p:blipFill>
+          <p:spPr>
+            <a:xfrm>
+              <a:off x="8523514" y="1121704"/>
+              <a:ext cx="914400" cy="914400"/>
+            </a:xfrm>
+            <a:prstGeom prst="rect">
+              <a:avLst/>
+            </a:prstGeom>
+          </p:spPr>
+        </p:pic>
+      </p:grpSp>
     </p:spTree>
     <p:extLst>
       <p:ext uri="{BB962C8B-B14F-4D97-AF65-F5344CB8AC3E}">

</xml_diff>

<commit_message>
Add remarks on stage management
</commit_message>
<xml_diff>
--- a/mlops_on_hpc.pptx
+++ b/mlops_on_hpc.pptx
@@ -431,7 +431,7 @@
           <a:p>
             <a:fld id="{8BC644CB-8FFF-4F59-B04D-9A1D2A5DB720}" type="datetimeFigureOut">
               <a:rPr lang="LID4096" smtClean="0"/>
-              <a:t>08/01/2025</a:t>
+              <a:t>08/04/2025</a:t>
             </a:fld>
             <a:endParaRPr lang="LID4096"/>
           </a:p>
@@ -848,7 +848,7 @@
           <a:p>
             <a:fld id="{29DC7A01-813B-4B59-A1CC-F2D63921E46A}" type="datetime1">
               <a:rPr lang="LID4096" smtClean="0"/>
-              <a:t>08/01/2025</a:t>
+              <a:t>08/04/2025</a:t>
             </a:fld>
             <a:endParaRPr lang="LID4096"/>
           </a:p>
@@ -1048,7 +1048,7 @@
           <a:p>
             <a:fld id="{6C2A7740-B6F2-4CC5-9AD0-B161B943DB10}" type="datetime1">
               <a:rPr lang="LID4096" smtClean="0"/>
-              <a:t>08/01/2025</a:t>
+              <a:t>08/04/2025</a:t>
             </a:fld>
             <a:endParaRPr lang="LID4096"/>
           </a:p>
@@ -1258,7 +1258,7 @@
           <a:p>
             <a:fld id="{2F94B025-8F26-4EDF-B991-413B82D6446E}" type="datetime1">
               <a:rPr lang="LID4096" smtClean="0"/>
-              <a:t>08/01/2025</a:t>
+              <a:t>08/04/2025</a:t>
             </a:fld>
             <a:endParaRPr lang="LID4096"/>
           </a:p>
@@ -1458,7 +1458,7 @@
           <a:p>
             <a:fld id="{CB5C8B8A-B2CE-4D78-88A4-476B2363B71E}" type="datetime1">
               <a:rPr lang="LID4096" smtClean="0"/>
-              <a:t>08/01/2025</a:t>
+              <a:t>08/04/2025</a:t>
             </a:fld>
             <a:endParaRPr lang="LID4096"/>
           </a:p>
@@ -1734,7 +1734,7 @@
           <a:p>
             <a:fld id="{CDDAB553-EE67-480E-BCE3-F64D7D51D294}" type="datetime1">
               <a:rPr lang="LID4096" smtClean="0"/>
-              <a:t>08/01/2025</a:t>
+              <a:t>08/04/2025</a:t>
             </a:fld>
             <a:endParaRPr lang="LID4096"/>
           </a:p>
@@ -2002,7 +2002,7 @@
           <a:p>
             <a:fld id="{CD270038-A599-4345-BE24-96A4E06BF8E3}" type="datetime1">
               <a:rPr lang="LID4096" smtClean="0"/>
-              <a:t>08/01/2025</a:t>
+              <a:t>08/04/2025</a:t>
             </a:fld>
             <a:endParaRPr lang="LID4096"/>
           </a:p>
@@ -2417,7 +2417,7 @@
           <a:p>
             <a:fld id="{44A719F7-59BE-4FD1-8AC5-F7BFCCA290D7}" type="datetime1">
               <a:rPr lang="LID4096" smtClean="0"/>
-              <a:t>08/01/2025</a:t>
+              <a:t>08/04/2025</a:t>
             </a:fld>
             <a:endParaRPr lang="LID4096"/>
           </a:p>
@@ -2559,7 +2559,7 @@
           <a:p>
             <a:fld id="{B4C93A37-6A61-4F10-A100-9676ACB86039}" type="datetime1">
               <a:rPr lang="LID4096" smtClean="0"/>
-              <a:t>08/01/2025</a:t>
+              <a:t>08/04/2025</a:t>
             </a:fld>
             <a:endParaRPr lang="LID4096"/>
           </a:p>
@@ -2672,7 +2672,7 @@
           <a:p>
             <a:fld id="{9E73F7F9-09CC-4C21-BDB8-90E2F1A013BD}" type="datetime1">
               <a:rPr lang="LID4096" smtClean="0"/>
-              <a:t>08/01/2025</a:t>
+              <a:t>08/04/2025</a:t>
             </a:fld>
             <a:endParaRPr lang="LID4096"/>
           </a:p>
@@ -2985,7 +2985,7 @@
           <a:p>
             <a:fld id="{FD166AE6-E2E5-4774-8434-34F2AD9BDDCE}" type="datetime1">
               <a:rPr lang="LID4096" smtClean="0"/>
-              <a:t>08/01/2025</a:t>
+              <a:t>08/04/2025</a:t>
             </a:fld>
             <a:endParaRPr lang="LID4096"/>
           </a:p>
@@ -3274,7 +3274,7 @@
           <a:p>
             <a:fld id="{895E2CCE-BBFE-4BEC-9002-70F26B158681}" type="datetime1">
               <a:rPr lang="LID4096" smtClean="0"/>
-              <a:t>08/01/2025</a:t>
+              <a:t>08/04/2025</a:t>
             </a:fld>
             <a:endParaRPr lang="LID4096"/>
           </a:p>
@@ -3517,7 +3517,7 @@
           <a:p>
             <a:fld id="{C795C0FD-7BB7-48C9-86F3-9771767F1BC3}" type="datetime1">
               <a:rPr lang="LID4096" smtClean="0"/>
-              <a:t>08/01/2025</a:t>
+              <a:t>08/04/2025</a:t>
             </a:fld>
             <a:endParaRPr lang="LID4096"/>
           </a:p>
@@ -9217,7 +9217,7 @@
           <a:p>
             <a:r>
               <a:rPr lang="en-US" dirty="0"/>
-              <a:t>Check out only older data sets</a:t>
+              <a:t>Check out only previous versions of data sets</a:t>
             </a:r>
             <a:endParaRPr lang="LID4096" dirty="0"/>
           </a:p>
@@ -14777,7 +14777,7 @@
         <p:spPr>
           <a:xfrm>
             <a:off x="1578429" y="5646154"/>
-            <a:ext cx="8526886" cy="523220"/>
+            <a:ext cx="8600624" cy="954107"/>
           </a:xfrm>
           <a:prstGeom prst="rect">
             <a:avLst/>
@@ -14820,6 +14820,31 @@
                 <a:sym typeface="Symbol" panose="05050102010706020507" pitchFamily="18" charset="2"/>
               </a:rPr>
               <a:t></a:t>
+            </a:r>
+          </a:p>
+          <a:p>
+            <a:r>
+              <a:rPr lang="en-US" sz="2800" dirty="0">
+                <a:cs typeface="Courier New" panose="02070309020205020404" pitchFamily="49" charset="0"/>
+                <a:sym typeface="Symbol" panose="05050102010706020507" pitchFamily="18" charset="2"/>
+              </a:rPr>
+              <a:t>To remove stage, use: </a:t>
+            </a:r>
+            <a:r>
+              <a:rPr lang="en-US" sz="2800" dirty="0" err="1">
+                <a:latin typeface="Courier New" panose="02070309020205020404" pitchFamily="49" charset="0"/>
+                <a:cs typeface="Courier New" panose="02070309020205020404" pitchFamily="49" charset="0"/>
+                <a:sym typeface="Symbol" panose="05050102010706020507" pitchFamily="18" charset="2"/>
+              </a:rPr>
+              <a:t>dvc</a:t>
+            </a:r>
+            <a:r>
+              <a:rPr lang="en-US" sz="2800" dirty="0">
+                <a:latin typeface="Courier New" panose="02070309020205020404" pitchFamily="49" charset="0"/>
+                <a:cs typeface="Courier New" panose="02070309020205020404" pitchFamily="49" charset="0"/>
+                <a:sym typeface="Symbol" panose="05050102010706020507" pitchFamily="18" charset="2"/>
+              </a:rPr>
+              <a:t> remove </a:t>
             </a:r>
             <a:endParaRPr lang="LID4096" sz="2800" dirty="0">
               <a:latin typeface="Courier New" panose="02070309020205020404" pitchFamily="49" charset="0"/>
@@ -16405,6 +16430,15 @@
           <a:p>
             <a:r>
               <a:rPr lang="en-US" dirty="0"/>
+              <a:t>List stages</a:t>
+            </a:r>
+          </a:p>
+          <a:p>
+            <a:endParaRPr lang="en-US" dirty="0"/>
+          </a:p>
+          <a:p>
+            <a:r>
+              <a:rPr lang="en-US" dirty="0"/>
               <a:t>ASCII-art visualization of stages</a:t>
             </a:r>
           </a:p>
@@ -16482,7 +16516,7 @@
         </p:nvSpPr>
         <p:spPr>
           <a:xfrm>
-            <a:off x="1503936" y="2336262"/>
+            <a:off x="1503936" y="3337749"/>
             <a:ext cx="4733577" cy="369332"/>
           </a:xfrm>
           <a:prstGeom prst="rect">
@@ -16567,7 +16601,7 @@
         </p:nvSpPr>
         <p:spPr>
           <a:xfrm>
-            <a:off x="1503936" y="3429000"/>
+            <a:off x="1503936" y="4430487"/>
             <a:ext cx="4733577" cy="369332"/>
           </a:xfrm>
           <a:prstGeom prst="rect">
@@ -16662,7 +16696,7 @@
         </p:nvSpPr>
         <p:spPr>
           <a:xfrm>
-            <a:off x="1503936" y="4341316"/>
+            <a:off x="1503936" y="5342803"/>
             <a:ext cx="4733577" cy="646331"/>
           </a:xfrm>
           <a:prstGeom prst="rect">
@@ -16864,304 +16898,12 @@
           </a:ln>
         </p:spPr>
       </p:pic>
-    </p:spTree>
-    <p:extLst>
-      <p:ext uri="{BB962C8B-B14F-4D97-AF65-F5344CB8AC3E}">
-        <p14:creationId xmlns:p14="http://schemas.microsoft.com/office/powerpoint/2010/main" val="2286517938"/>
-      </p:ext>
-    </p:extLst>
-  </p:cSld>
-  <p:clrMapOvr>
-    <a:masterClrMapping/>
-  </p:clrMapOvr>
-  <p:timing>
-    <p:tnLst>
-      <p:par>
-        <p:cTn id="1" dur="indefinite" restart="never" nodeType="tmRoot">
-          <p:childTnLst>
-            <p:seq concurrent="1" nextAc="seek">
-              <p:cTn id="2" dur="indefinite" nodeType="mainSeq">
-                <p:childTnLst>
-                  <p:par>
-                    <p:cTn id="3" fill="hold">
-                      <p:stCondLst>
-                        <p:cond delay="indefinite"/>
-                        <p:cond evt="onBegin" delay="0">
-                          <p:tn val="2"/>
-                        </p:cond>
-                      </p:stCondLst>
-                      <p:childTnLst>
-                        <p:par>
-                          <p:cTn id="4" fill="hold">
-                            <p:stCondLst>
-                              <p:cond delay="0"/>
-                            </p:stCondLst>
-                            <p:childTnLst>
-                              <p:par>
-                                <p:cTn id="5" presetID="1" presetClass="entr" presetSubtype="0" fill="hold" grpId="0" nodeType="withEffect">
-                                  <p:stCondLst>
-                                    <p:cond delay="0"/>
-                                  </p:stCondLst>
-                                  <p:childTnLst>
-                                    <p:set>
-                                      <p:cBhvr>
-                                        <p:cTn id="6" dur="1" fill="hold">
-                                          <p:stCondLst>
-                                            <p:cond delay="0"/>
-                                          </p:stCondLst>
-                                        </p:cTn>
-                                        <p:tgtEl>
-                                          <p:spTgt spid="5"/>
-                                        </p:tgtEl>
-                                        <p:attrNameLst>
-                                          <p:attrName>style.visibility</p:attrName>
-                                        </p:attrNameLst>
-                                      </p:cBhvr>
-                                      <p:to>
-                                        <p:strVal val="visible"/>
-                                      </p:to>
-                                    </p:set>
-                                  </p:childTnLst>
-                                </p:cTn>
-                              </p:par>
-                              <p:par>
-                                <p:cTn id="7" presetID="1" presetClass="entr" presetSubtype="0" fill="hold" grpId="0" nodeType="withEffect">
-                                  <p:stCondLst>
-                                    <p:cond delay="0"/>
-                                  </p:stCondLst>
-                                  <p:childTnLst>
-                                    <p:set>
-                                      <p:cBhvr>
-                                        <p:cTn id="8" dur="1" fill="hold">
-                                          <p:stCondLst>
-                                            <p:cond delay="0"/>
-                                          </p:stCondLst>
-                                        </p:cTn>
-                                        <p:tgtEl>
-                                          <p:spTgt spid="6"/>
-                                        </p:tgtEl>
-                                        <p:attrNameLst>
-                                          <p:attrName>style.visibility</p:attrName>
-                                        </p:attrNameLst>
-                                      </p:cBhvr>
-                                      <p:to>
-                                        <p:strVal val="visible"/>
-                                      </p:to>
-                                    </p:set>
-                                  </p:childTnLst>
-                                </p:cTn>
-                              </p:par>
-                              <p:par>
-                                <p:cTn id="9" presetID="1" presetClass="entr" presetSubtype="0" fill="hold" grpId="0" nodeType="withEffect">
-                                  <p:stCondLst>
-                                    <p:cond delay="0"/>
-                                  </p:stCondLst>
-                                  <p:childTnLst>
-                                    <p:set>
-                                      <p:cBhvr>
-                                        <p:cTn id="10" dur="1" fill="hold">
-                                          <p:stCondLst>
-                                            <p:cond delay="0"/>
-                                          </p:stCondLst>
-                                        </p:cTn>
-                                        <p:tgtEl>
-                                          <p:spTgt spid="7"/>
-                                        </p:tgtEl>
-                                        <p:attrNameLst>
-                                          <p:attrName>style.visibility</p:attrName>
-                                        </p:attrNameLst>
-                                      </p:cBhvr>
-                                      <p:to>
-                                        <p:strVal val="visible"/>
-                                      </p:to>
-                                    </p:set>
-                                  </p:childTnLst>
-                                </p:cTn>
-                              </p:par>
-                            </p:childTnLst>
-                          </p:cTn>
-                        </p:par>
-                      </p:childTnLst>
-                    </p:cTn>
-                  </p:par>
-                </p:childTnLst>
-              </p:cTn>
-              <p:prevCondLst>
-                <p:cond evt="onPrev" delay="0">
-                  <p:tgtEl>
-                    <p:sldTgt/>
-                  </p:tgtEl>
-                </p:cond>
-              </p:prevCondLst>
-              <p:nextCondLst>
-                <p:cond evt="onNext" delay="0">
-                  <p:tgtEl>
-                    <p:sldTgt/>
-                  </p:tgtEl>
-                </p:cond>
-              </p:nextCondLst>
-            </p:seq>
-          </p:childTnLst>
-        </p:cTn>
-      </p:par>
-    </p:tnLst>
-    <p:bldLst>
-      <p:bldP spid="5" grpId="0" animBg="1"/>
-      <p:bldP spid="6" grpId="0" animBg="1"/>
-      <p:bldP spid="7" grpId="0" animBg="1"/>
-    </p:bldLst>
-  </p:timing>
-</p:sld>
-</file>
-
-<file path=ppt/slides/slide27.xml><?xml version="1.0" encoding="utf-8"?>
-<p:sld xmlns:a="http://schemas.openxmlformats.org/drawingml/2006/main" xmlns:r="http://schemas.openxmlformats.org/officeDocument/2006/relationships" xmlns:p="http://schemas.openxmlformats.org/presentationml/2006/main">
-  <p:cSld>
-    <p:spTree>
-      <p:nvGrpSpPr>
-        <p:cNvPr id="1" name=""/>
-        <p:cNvGrpSpPr/>
-        <p:nvPr/>
-      </p:nvGrpSpPr>
-      <p:grpSpPr>
-        <a:xfrm>
-          <a:off x="0" y="0"/>
-          <a:ext cx="0" cy="0"/>
-          <a:chOff x="0" y="0"/>
-          <a:chExt cx="0" cy="0"/>
-        </a:xfrm>
-      </p:grpSpPr>
       <p:sp>
         <p:nvSpPr>
-          <p:cNvPr id="2" name="Title 1">
+          <p:cNvPr id="8" name="TextBox 7">
             <a:extLst>
               <a:ext uri="{FF2B5EF4-FFF2-40B4-BE49-F238E27FC236}">
-                <a16:creationId xmlns:a16="http://schemas.microsoft.com/office/drawing/2014/main" id="{9828417E-9735-91D4-C82D-938AFDD03A35}"/>
-              </a:ext>
-            </a:extLst>
-          </p:cNvPr>
-          <p:cNvSpPr>
-            <a:spLocks noGrp="1"/>
-          </p:cNvSpPr>
-          <p:nvPr>
-            <p:ph type="title"/>
-          </p:nvPr>
-        </p:nvSpPr>
-        <p:spPr/>
-        <p:txBody>
-          <a:bodyPr/>
-          <a:lstStyle/>
-          <a:p>
-            <a:r>
-              <a:rPr lang="en-US" dirty="0"/>
-              <a:t>Run pipeline</a:t>
-            </a:r>
-            <a:endParaRPr lang="LID4096" dirty="0"/>
-          </a:p>
-        </p:txBody>
-      </p:sp>
-      <p:sp>
-        <p:nvSpPr>
-          <p:cNvPr id="4" name="Content Placeholder 3">
-            <a:extLst>
-              <a:ext uri="{FF2B5EF4-FFF2-40B4-BE49-F238E27FC236}">
-                <a16:creationId xmlns:a16="http://schemas.microsoft.com/office/drawing/2014/main" id="{B331F5F7-7901-0D11-15F1-A3C4797EEDAB}"/>
-              </a:ext>
-            </a:extLst>
-          </p:cNvPr>
-          <p:cNvSpPr>
-            <a:spLocks noGrp="1"/>
-          </p:cNvSpPr>
-          <p:nvPr>
-            <p:ph idx="1"/>
-          </p:nvPr>
-        </p:nvSpPr>
-        <p:spPr/>
-        <p:txBody>
-          <a:bodyPr/>
-          <a:lstStyle/>
-          <a:p>
-            <a:r>
-              <a:rPr lang="en-US" dirty="0"/>
-              <a:t>Only print commands, don't execute</a:t>
-            </a:r>
-          </a:p>
-          <a:p>
-            <a:endParaRPr lang="en-US" dirty="0"/>
-          </a:p>
-          <a:p>
-            <a:r>
-              <a:rPr lang="en-US" dirty="0"/>
-              <a:t>Run only required stages</a:t>
-            </a:r>
-          </a:p>
-          <a:p>
-            <a:endParaRPr lang="en-US" dirty="0"/>
-          </a:p>
-          <a:p>
-            <a:r>
-              <a:rPr lang="en-US" dirty="0"/>
-              <a:t>Run all stages</a:t>
-            </a:r>
-          </a:p>
-          <a:p>
-            <a:endParaRPr lang="en-US" dirty="0"/>
-          </a:p>
-          <a:p>
-            <a:r>
-              <a:rPr lang="en-US" dirty="0"/>
-              <a:t>Produces/updates </a:t>
-            </a:r>
-            <a:r>
-              <a:rPr lang="en-US" dirty="0" err="1">
-                <a:latin typeface="Courier New" panose="02070309020205020404" pitchFamily="49" charset="0"/>
-                <a:cs typeface="Courier New" panose="02070309020205020404" pitchFamily="49" charset="0"/>
-              </a:rPr>
-              <a:t>dvc.lock</a:t>
-            </a:r>
-            <a:r>
-              <a:rPr lang="en-US" dirty="0"/>
-              <a:t> file: version control</a:t>
-            </a:r>
-            <a:endParaRPr lang="LID4096" dirty="0"/>
-          </a:p>
-        </p:txBody>
-      </p:sp>
-      <p:sp>
-        <p:nvSpPr>
-          <p:cNvPr id="3" name="Slide Number Placeholder 2">
-            <a:extLst>
-              <a:ext uri="{FF2B5EF4-FFF2-40B4-BE49-F238E27FC236}">
-                <a16:creationId xmlns:a16="http://schemas.microsoft.com/office/drawing/2014/main" id="{B2479D15-A82F-8B1B-1ED9-99E31344A406}"/>
-              </a:ext>
-            </a:extLst>
-          </p:cNvPr>
-          <p:cNvSpPr>
-            <a:spLocks noGrp="1"/>
-          </p:cNvSpPr>
-          <p:nvPr>
-            <p:ph type="sldNum" sz="quarter" idx="12"/>
-          </p:nvPr>
-        </p:nvSpPr>
-        <p:spPr/>
-        <p:txBody>
-          <a:bodyPr/>
-          <a:lstStyle/>
-          <a:p>
-            <a:fld id="{9C7CE217-4467-4B8D-A735-B008FA7C4816}" type="slidenum">
-              <a:rPr lang="LID4096" smtClean="0"/>
-              <a:t>27</a:t>
-            </a:fld>
-            <a:endParaRPr lang="LID4096"/>
-          </a:p>
-        </p:txBody>
-      </p:sp>
-      <p:sp>
-        <p:nvSpPr>
-          <p:cNvPr id="5" name="TextBox 4">
-            <a:extLst>
-              <a:ext uri="{FF2B5EF4-FFF2-40B4-BE49-F238E27FC236}">
-                <a16:creationId xmlns:a16="http://schemas.microsoft.com/office/drawing/2014/main" id="{0BDEFB3C-6F07-AF4A-A03B-5ECEF2E3A1C0}"/>
+                <a16:creationId xmlns:a16="http://schemas.microsoft.com/office/drawing/2014/main" id="{2BB95A7E-4C28-1EF3-C3B3-C964D89C60C8}"/>
               </a:ext>
             </a:extLst>
           </p:cNvPr>
@@ -17170,7 +16912,7 @@
         </p:nvSpPr>
         <p:spPr>
           <a:xfrm>
-            <a:off x="1503936" y="2336262"/>
+            <a:off x="1503936" y="2310327"/>
             <a:ext cx="4733577" cy="369332"/>
           </a:xfrm>
           <a:prstGeom prst="rect">
@@ -17219,7 +16961,7 @@
                 <a:latin typeface="Courier New" pitchFamily="49" charset="0"/>
                 <a:cs typeface="Courier New" pitchFamily="49" charset="0"/>
               </a:rPr>
-              <a:t> repro  --dry</a:t>
+              <a:t> stage list</a:t>
             </a:r>
             <a:endParaRPr lang="nl-BE" b="1" dirty="0">
               <a:solidFill>
@@ -17231,215 +16973,10 @@
           </a:p>
         </p:txBody>
       </p:sp>
-      <p:sp>
-        <p:nvSpPr>
-          <p:cNvPr id="6" name="TextBox 5">
-            <a:extLst>
-              <a:ext uri="{FF2B5EF4-FFF2-40B4-BE49-F238E27FC236}">
-                <a16:creationId xmlns:a16="http://schemas.microsoft.com/office/drawing/2014/main" id="{4AF2420A-5986-C766-E676-CCF82043185F}"/>
-              </a:ext>
-            </a:extLst>
-          </p:cNvPr>
-          <p:cNvSpPr txBox="1"/>
-          <p:nvPr/>
-        </p:nvSpPr>
-        <p:spPr>
-          <a:xfrm>
-            <a:off x="1503936" y="3385456"/>
-            <a:ext cx="4733578" cy="369332"/>
-          </a:xfrm>
-          <a:prstGeom prst="rect">
-            <a:avLst/>
-          </a:prstGeom>
-          <a:solidFill>
-            <a:schemeClr val="tx1"/>
-          </a:solidFill>
-          <a:ln>
-            <a:solidFill>
-              <a:schemeClr val="tx1"/>
-            </a:solidFill>
-          </a:ln>
-        </p:spPr>
-        <p:txBody>
-          <a:bodyPr wrap="square" rtlCol="0">
-            <a:spAutoFit/>
-          </a:bodyPr>
-          <a:lstStyle/>
-          <a:p>
-            <a:r>
-              <a:rPr lang="en-US" b="1" dirty="0">
-                <a:solidFill>
-                  <a:schemeClr val="bg1"/>
-                </a:solidFill>
-                <a:latin typeface="Courier New" pitchFamily="49" charset="0"/>
-                <a:cs typeface="Courier New" pitchFamily="49" charset="0"/>
-              </a:rPr>
-              <a:t>$  </a:t>
-            </a:r>
-            <a:r>
-              <a:rPr lang="en-US" b="1" dirty="0" err="1">
-                <a:solidFill>
-                  <a:schemeClr val="bg1"/>
-                </a:solidFill>
-                <a:latin typeface="Courier New" pitchFamily="49" charset="0"/>
-                <a:cs typeface="Courier New" pitchFamily="49" charset="0"/>
-              </a:rPr>
-              <a:t>dvc</a:t>
-            </a:r>
-            <a:r>
-              <a:rPr lang="en-US" b="1" dirty="0">
-                <a:solidFill>
-                  <a:schemeClr val="bg1"/>
-                </a:solidFill>
-                <a:latin typeface="Courier New" pitchFamily="49" charset="0"/>
-                <a:cs typeface="Courier New" pitchFamily="49" charset="0"/>
-              </a:rPr>
-              <a:t> repro</a:t>
-            </a:r>
-            <a:endParaRPr lang="nl-BE" b="1" dirty="0">
-              <a:solidFill>
-                <a:schemeClr val="bg1"/>
-              </a:solidFill>
-              <a:latin typeface="Courier New" pitchFamily="49" charset="0"/>
-              <a:cs typeface="Courier New" pitchFamily="49" charset="0"/>
-            </a:endParaRPr>
-          </a:p>
-        </p:txBody>
-      </p:sp>
-      <p:sp>
-        <p:nvSpPr>
-          <p:cNvPr id="7" name="TextBox 6">
-            <a:extLst>
-              <a:ext uri="{FF2B5EF4-FFF2-40B4-BE49-F238E27FC236}">
-                <a16:creationId xmlns:a16="http://schemas.microsoft.com/office/drawing/2014/main" id="{651F5951-9235-414F-F0EE-278571DD08C9}"/>
-              </a:ext>
-            </a:extLst>
-          </p:cNvPr>
-          <p:cNvSpPr txBox="1"/>
-          <p:nvPr/>
-        </p:nvSpPr>
-        <p:spPr>
-          <a:xfrm>
-            <a:off x="1503935" y="4434650"/>
-            <a:ext cx="4733579" cy="369332"/>
-          </a:xfrm>
-          <a:prstGeom prst="rect">
-            <a:avLst/>
-          </a:prstGeom>
-          <a:solidFill>
-            <a:schemeClr val="tx1"/>
-          </a:solidFill>
-          <a:ln>
-            <a:solidFill>
-              <a:schemeClr val="tx1"/>
-            </a:solidFill>
-          </a:ln>
-        </p:spPr>
-        <p:txBody>
-          <a:bodyPr wrap="square" rtlCol="0">
-            <a:spAutoFit/>
-          </a:bodyPr>
-          <a:lstStyle/>
-          <a:p>
-            <a:r>
-              <a:rPr lang="en-US" b="1" dirty="0">
-                <a:solidFill>
-                  <a:schemeClr val="bg1"/>
-                </a:solidFill>
-                <a:latin typeface="Courier New" pitchFamily="49" charset="0"/>
-                <a:cs typeface="Courier New" pitchFamily="49" charset="0"/>
-              </a:rPr>
-              <a:t>$  </a:t>
-            </a:r>
-            <a:r>
-              <a:rPr lang="en-US" b="1" dirty="0" err="1">
-                <a:solidFill>
-                  <a:schemeClr val="bg1"/>
-                </a:solidFill>
-                <a:latin typeface="Courier New" pitchFamily="49" charset="0"/>
-                <a:cs typeface="Courier New" pitchFamily="49" charset="0"/>
-              </a:rPr>
-              <a:t>dvc</a:t>
-            </a:r>
-            <a:r>
-              <a:rPr lang="en-US" b="1" dirty="0">
-                <a:solidFill>
-                  <a:schemeClr val="bg1"/>
-                </a:solidFill>
-                <a:latin typeface="Courier New" pitchFamily="49" charset="0"/>
-                <a:cs typeface="Courier New" pitchFamily="49" charset="0"/>
-              </a:rPr>
-              <a:t> repro  --force</a:t>
-            </a:r>
-            <a:endParaRPr lang="nl-BE" b="1" dirty="0">
-              <a:solidFill>
-                <a:schemeClr val="bg1"/>
-              </a:solidFill>
-              <a:latin typeface="Courier New" pitchFamily="49" charset="0"/>
-              <a:cs typeface="Courier New" pitchFamily="49" charset="0"/>
-            </a:endParaRPr>
-          </a:p>
-        </p:txBody>
-      </p:sp>
-      <p:sp>
-        <p:nvSpPr>
-          <p:cNvPr id="8" name="TextBox 7">
-            <a:extLst>
-              <a:ext uri="{FF2B5EF4-FFF2-40B4-BE49-F238E27FC236}">
-                <a16:creationId xmlns:a16="http://schemas.microsoft.com/office/drawing/2014/main" id="{8B7C10FD-B553-7CAF-6C76-5C77B68D4934}"/>
-              </a:ext>
-            </a:extLst>
-          </p:cNvPr>
-          <p:cNvSpPr txBox="1"/>
-          <p:nvPr/>
-        </p:nvSpPr>
-        <p:spPr>
-          <a:xfrm>
-            <a:off x="1503934" y="5483844"/>
-            <a:ext cx="4733580" cy="369332"/>
-          </a:xfrm>
-          <a:prstGeom prst="rect">
-            <a:avLst/>
-          </a:prstGeom>
-          <a:solidFill>
-            <a:schemeClr val="tx1"/>
-          </a:solidFill>
-          <a:ln>
-            <a:solidFill>
-              <a:schemeClr val="tx1"/>
-            </a:solidFill>
-          </a:ln>
-        </p:spPr>
-        <p:txBody>
-          <a:bodyPr wrap="square" rtlCol="0">
-            <a:spAutoFit/>
-          </a:bodyPr>
-          <a:lstStyle/>
-          <a:p>
-            <a:r>
-              <a:rPr lang="en-US" b="1" dirty="0">
-                <a:solidFill>
-                  <a:schemeClr val="bg1"/>
-                </a:solidFill>
-                <a:latin typeface="Courier New" pitchFamily="49" charset="0"/>
-                <a:cs typeface="Courier New" pitchFamily="49" charset="0"/>
-              </a:rPr>
-              <a:t>$  git commit  -m 'Run pipeline'</a:t>
-            </a:r>
-            <a:endParaRPr lang="nl-BE" b="1" dirty="0">
-              <a:solidFill>
-                <a:schemeClr val="bg1"/>
-              </a:solidFill>
-              <a:latin typeface="Courier New" pitchFamily="49" charset="0"/>
-              <a:cs typeface="Courier New" pitchFamily="49" charset="0"/>
-            </a:endParaRPr>
-          </a:p>
-        </p:txBody>
-      </p:sp>
     </p:spTree>
     <p:extLst>
       <p:ext uri="{BB962C8B-B14F-4D97-AF65-F5344CB8AC3E}">
-        <p14:creationId xmlns:p14="http://schemas.microsoft.com/office/powerpoint/2010/main" val="3415999053"/>
+        <p14:creationId xmlns:p14="http://schemas.microsoft.com/office/powerpoint/2010/main" val="2286517938"/>
       </p:ext>
     </p:extLst>
   </p:cSld>
@@ -17609,6 +17146,849 @@
       <p:bldP spid="6" grpId="0" animBg="1"/>
       <p:bldP spid="7" grpId="0" animBg="1"/>
       <p:bldP spid="8" grpId="0" animBg="1"/>
+    </p:bldLst>
+  </p:timing>
+</p:sld>
+</file>
+
+<file path=ppt/slides/slide27.xml><?xml version="1.0" encoding="utf-8"?>
+<p:sld xmlns:a="http://schemas.openxmlformats.org/drawingml/2006/main" xmlns:r="http://schemas.openxmlformats.org/officeDocument/2006/relationships" xmlns:p="http://schemas.openxmlformats.org/presentationml/2006/main">
+  <p:cSld>
+    <p:spTree>
+      <p:nvGrpSpPr>
+        <p:cNvPr id="1" name=""/>
+        <p:cNvGrpSpPr/>
+        <p:nvPr/>
+      </p:nvGrpSpPr>
+      <p:grpSpPr>
+        <a:xfrm>
+          <a:off x="0" y="0"/>
+          <a:ext cx="0" cy="0"/>
+          <a:chOff x="0" y="0"/>
+          <a:chExt cx="0" cy="0"/>
+        </a:xfrm>
+      </p:grpSpPr>
+      <p:sp>
+        <p:nvSpPr>
+          <p:cNvPr id="2" name="Title 1">
+            <a:extLst>
+              <a:ext uri="{FF2B5EF4-FFF2-40B4-BE49-F238E27FC236}">
+                <a16:creationId xmlns:a16="http://schemas.microsoft.com/office/drawing/2014/main" id="{9828417E-9735-91D4-C82D-938AFDD03A35}"/>
+              </a:ext>
+            </a:extLst>
+          </p:cNvPr>
+          <p:cNvSpPr>
+            <a:spLocks noGrp="1"/>
+          </p:cNvSpPr>
+          <p:nvPr>
+            <p:ph type="title"/>
+          </p:nvPr>
+        </p:nvSpPr>
+        <p:spPr/>
+        <p:txBody>
+          <a:bodyPr/>
+          <a:lstStyle/>
+          <a:p>
+            <a:r>
+              <a:rPr lang="en-US" dirty="0"/>
+              <a:t>Run pipeline</a:t>
+            </a:r>
+            <a:endParaRPr lang="LID4096" dirty="0"/>
+          </a:p>
+        </p:txBody>
+      </p:sp>
+      <p:sp>
+        <p:nvSpPr>
+          <p:cNvPr id="4" name="Content Placeholder 3">
+            <a:extLst>
+              <a:ext uri="{FF2B5EF4-FFF2-40B4-BE49-F238E27FC236}">
+                <a16:creationId xmlns:a16="http://schemas.microsoft.com/office/drawing/2014/main" id="{B331F5F7-7901-0D11-15F1-A3C4797EEDAB}"/>
+              </a:ext>
+            </a:extLst>
+          </p:cNvPr>
+          <p:cNvSpPr>
+            <a:spLocks noGrp="1"/>
+          </p:cNvSpPr>
+          <p:nvPr>
+            <p:ph sz="half" idx="1"/>
+          </p:nvPr>
+        </p:nvSpPr>
+        <p:spPr/>
+        <p:txBody>
+          <a:bodyPr>
+            <a:normAutofit/>
+          </a:bodyPr>
+          <a:lstStyle/>
+          <a:p>
+            <a:r>
+              <a:rPr lang="en-US" dirty="0"/>
+              <a:t>Only print commands, don't execute</a:t>
+            </a:r>
+          </a:p>
+          <a:p>
+            <a:endParaRPr lang="en-US" dirty="0"/>
+          </a:p>
+          <a:p>
+            <a:r>
+              <a:rPr lang="en-US" dirty="0"/>
+              <a:t>Run only required stages</a:t>
+            </a:r>
+          </a:p>
+          <a:p>
+            <a:endParaRPr lang="en-US" dirty="0"/>
+          </a:p>
+          <a:p>
+            <a:r>
+              <a:rPr lang="en-US" dirty="0"/>
+              <a:t>Run all stages</a:t>
+            </a:r>
+          </a:p>
+          <a:p>
+            <a:endParaRPr lang="en-US" dirty="0"/>
+          </a:p>
+          <a:p>
+            <a:r>
+              <a:rPr lang="en-US" dirty="0"/>
+              <a:t>Produces/updates </a:t>
+            </a:r>
+            <a:r>
+              <a:rPr lang="en-US" dirty="0" err="1">
+                <a:latin typeface="Courier New" panose="02070309020205020404" pitchFamily="49" charset="0"/>
+                <a:cs typeface="Courier New" panose="02070309020205020404" pitchFamily="49" charset="0"/>
+              </a:rPr>
+              <a:t>dvc.lock</a:t>
+            </a:r>
+            <a:r>
+              <a:rPr lang="en-US" dirty="0"/>
+              <a:t> file: version control</a:t>
+            </a:r>
+            <a:endParaRPr lang="LID4096" dirty="0"/>
+          </a:p>
+        </p:txBody>
+      </p:sp>
+      <p:sp>
+        <p:nvSpPr>
+          <p:cNvPr id="12" name="Content Placeholder 11">
+            <a:extLst>
+              <a:ext uri="{FF2B5EF4-FFF2-40B4-BE49-F238E27FC236}">
+                <a16:creationId xmlns:a16="http://schemas.microsoft.com/office/drawing/2014/main" id="{725322EE-0847-9449-49B9-7232D76E536C}"/>
+              </a:ext>
+            </a:extLst>
+          </p:cNvPr>
+          <p:cNvSpPr>
+            <a:spLocks noGrp="1"/>
+          </p:cNvSpPr>
+          <p:nvPr>
+            <p:ph sz="half" idx="2"/>
+          </p:nvPr>
+        </p:nvSpPr>
+        <p:spPr/>
+        <p:txBody>
+          <a:bodyPr/>
+          <a:lstStyle/>
+          <a:p>
+            <a:r>
+              <a:rPr lang="en-US" dirty="0"/>
+              <a:t>Check pipeline status</a:t>
+            </a:r>
+            <a:endParaRPr lang="LID4096" dirty="0"/>
+          </a:p>
+        </p:txBody>
+      </p:sp>
+      <p:sp>
+        <p:nvSpPr>
+          <p:cNvPr id="3" name="Slide Number Placeholder 2">
+            <a:extLst>
+              <a:ext uri="{FF2B5EF4-FFF2-40B4-BE49-F238E27FC236}">
+                <a16:creationId xmlns:a16="http://schemas.microsoft.com/office/drawing/2014/main" id="{B2479D15-A82F-8B1B-1ED9-99E31344A406}"/>
+              </a:ext>
+            </a:extLst>
+          </p:cNvPr>
+          <p:cNvSpPr>
+            <a:spLocks noGrp="1"/>
+          </p:cNvSpPr>
+          <p:nvPr>
+            <p:ph type="sldNum" sz="quarter" idx="12"/>
+          </p:nvPr>
+        </p:nvSpPr>
+        <p:spPr/>
+        <p:txBody>
+          <a:bodyPr/>
+          <a:lstStyle/>
+          <a:p>
+            <a:fld id="{9C7CE217-4467-4B8D-A735-B008FA7C4816}" type="slidenum">
+              <a:rPr lang="LID4096" smtClean="0"/>
+              <a:t>27</a:t>
+            </a:fld>
+            <a:endParaRPr lang="LID4096"/>
+          </a:p>
+        </p:txBody>
+      </p:sp>
+      <p:sp>
+        <p:nvSpPr>
+          <p:cNvPr id="5" name="TextBox 4">
+            <a:extLst>
+              <a:ext uri="{FF2B5EF4-FFF2-40B4-BE49-F238E27FC236}">
+                <a16:creationId xmlns:a16="http://schemas.microsoft.com/office/drawing/2014/main" id="{0BDEFB3C-6F07-AF4A-A03B-5ECEF2E3A1C0}"/>
+              </a:ext>
+            </a:extLst>
+          </p:cNvPr>
+          <p:cNvSpPr txBox="1"/>
+          <p:nvPr/>
+        </p:nvSpPr>
+        <p:spPr>
+          <a:xfrm>
+            <a:off x="1286223" y="2700047"/>
+            <a:ext cx="4733577" cy="369332"/>
+          </a:xfrm>
+          <a:prstGeom prst="rect">
+            <a:avLst/>
+          </a:prstGeom>
+          <a:solidFill>
+            <a:schemeClr val="tx1"/>
+          </a:solidFill>
+          <a:ln>
+            <a:solidFill>
+              <a:schemeClr val="tx1"/>
+            </a:solidFill>
+          </a:ln>
+        </p:spPr>
+        <p:txBody>
+          <a:bodyPr wrap="square" rtlCol="0">
+            <a:spAutoFit/>
+          </a:bodyPr>
+          <a:lstStyle/>
+          <a:p>
+            <a:r>
+              <a:rPr lang="en-US" b="1" dirty="0">
+                <a:solidFill>
+                  <a:schemeClr val="bg1"/>
+                </a:solidFill>
+                <a:latin typeface="Courier New" pitchFamily="49" charset="0"/>
+                <a:cs typeface="Courier New" pitchFamily="49" charset="0"/>
+              </a:rPr>
+              <a:t>$  </a:t>
+            </a:r>
+            <a:r>
+              <a:rPr lang="en-US" b="1" dirty="0" err="1">
+                <a:solidFill>
+                  <a:schemeClr val="bg1"/>
+                </a:solidFill>
+                <a:latin typeface="Courier New" pitchFamily="49" charset="0"/>
+                <a:cs typeface="Courier New" pitchFamily="49" charset="0"/>
+              </a:rPr>
+              <a:t>dvc</a:t>
+            </a:r>
+            <a:r>
+              <a:rPr lang="en-US" b="1" dirty="0">
+                <a:solidFill>
+                  <a:schemeClr val="bg1"/>
+                </a:solidFill>
+                <a:latin typeface="Courier New" pitchFamily="49" charset="0"/>
+                <a:cs typeface="Courier New" pitchFamily="49" charset="0"/>
+              </a:rPr>
+              <a:t> repro  --dry</a:t>
+            </a:r>
+            <a:endParaRPr lang="nl-BE" b="1" dirty="0">
+              <a:solidFill>
+                <a:schemeClr val="bg1"/>
+              </a:solidFill>
+              <a:latin typeface="Courier New" pitchFamily="49" charset="0"/>
+              <a:cs typeface="Courier New" pitchFamily="49" charset="0"/>
+            </a:endParaRPr>
+          </a:p>
+        </p:txBody>
+      </p:sp>
+      <p:sp>
+        <p:nvSpPr>
+          <p:cNvPr id="6" name="TextBox 5">
+            <a:extLst>
+              <a:ext uri="{FF2B5EF4-FFF2-40B4-BE49-F238E27FC236}">
+                <a16:creationId xmlns:a16="http://schemas.microsoft.com/office/drawing/2014/main" id="{4AF2420A-5986-C766-E676-CCF82043185F}"/>
+              </a:ext>
+            </a:extLst>
+          </p:cNvPr>
+          <p:cNvSpPr txBox="1"/>
+          <p:nvPr/>
+        </p:nvSpPr>
+        <p:spPr>
+          <a:xfrm>
+            <a:off x="1286220" y="3729242"/>
+            <a:ext cx="4733578" cy="369332"/>
+          </a:xfrm>
+          <a:prstGeom prst="rect">
+            <a:avLst/>
+          </a:prstGeom>
+          <a:solidFill>
+            <a:schemeClr val="tx1"/>
+          </a:solidFill>
+          <a:ln>
+            <a:solidFill>
+              <a:schemeClr val="tx1"/>
+            </a:solidFill>
+          </a:ln>
+        </p:spPr>
+        <p:txBody>
+          <a:bodyPr wrap="square" rtlCol="0">
+            <a:spAutoFit/>
+          </a:bodyPr>
+          <a:lstStyle/>
+          <a:p>
+            <a:r>
+              <a:rPr lang="en-US" b="1" dirty="0">
+                <a:solidFill>
+                  <a:schemeClr val="bg1"/>
+                </a:solidFill>
+                <a:latin typeface="Courier New" pitchFamily="49" charset="0"/>
+                <a:cs typeface="Courier New" pitchFamily="49" charset="0"/>
+              </a:rPr>
+              <a:t>$  </a:t>
+            </a:r>
+            <a:r>
+              <a:rPr lang="en-US" b="1" dirty="0" err="1">
+                <a:solidFill>
+                  <a:schemeClr val="bg1"/>
+                </a:solidFill>
+                <a:latin typeface="Courier New" pitchFamily="49" charset="0"/>
+                <a:cs typeface="Courier New" pitchFamily="49" charset="0"/>
+              </a:rPr>
+              <a:t>dvc</a:t>
+            </a:r>
+            <a:r>
+              <a:rPr lang="en-US" b="1" dirty="0">
+                <a:solidFill>
+                  <a:schemeClr val="bg1"/>
+                </a:solidFill>
+                <a:latin typeface="Courier New" pitchFamily="49" charset="0"/>
+                <a:cs typeface="Courier New" pitchFamily="49" charset="0"/>
+              </a:rPr>
+              <a:t> repro</a:t>
+            </a:r>
+            <a:endParaRPr lang="nl-BE" b="1" dirty="0">
+              <a:solidFill>
+                <a:schemeClr val="bg1"/>
+              </a:solidFill>
+              <a:latin typeface="Courier New" pitchFamily="49" charset="0"/>
+              <a:cs typeface="Courier New" pitchFamily="49" charset="0"/>
+            </a:endParaRPr>
+          </a:p>
+        </p:txBody>
+      </p:sp>
+      <p:sp>
+        <p:nvSpPr>
+          <p:cNvPr id="7" name="TextBox 6">
+            <a:extLst>
+              <a:ext uri="{FF2B5EF4-FFF2-40B4-BE49-F238E27FC236}">
+                <a16:creationId xmlns:a16="http://schemas.microsoft.com/office/drawing/2014/main" id="{651F5951-9235-414F-F0EE-278571DD08C9}"/>
+              </a:ext>
+            </a:extLst>
+          </p:cNvPr>
+          <p:cNvSpPr txBox="1"/>
+          <p:nvPr/>
+        </p:nvSpPr>
+        <p:spPr>
+          <a:xfrm>
+            <a:off x="1286221" y="4758437"/>
+            <a:ext cx="4733579" cy="369332"/>
+          </a:xfrm>
+          <a:prstGeom prst="rect">
+            <a:avLst/>
+          </a:prstGeom>
+          <a:solidFill>
+            <a:schemeClr val="tx1"/>
+          </a:solidFill>
+          <a:ln>
+            <a:solidFill>
+              <a:schemeClr val="tx1"/>
+            </a:solidFill>
+          </a:ln>
+        </p:spPr>
+        <p:txBody>
+          <a:bodyPr wrap="square" rtlCol="0">
+            <a:spAutoFit/>
+          </a:bodyPr>
+          <a:lstStyle/>
+          <a:p>
+            <a:r>
+              <a:rPr lang="en-US" b="1" dirty="0">
+                <a:solidFill>
+                  <a:schemeClr val="bg1"/>
+                </a:solidFill>
+                <a:latin typeface="Courier New" pitchFamily="49" charset="0"/>
+                <a:cs typeface="Courier New" pitchFamily="49" charset="0"/>
+              </a:rPr>
+              <a:t>$  </a:t>
+            </a:r>
+            <a:r>
+              <a:rPr lang="en-US" b="1" dirty="0" err="1">
+                <a:solidFill>
+                  <a:schemeClr val="bg1"/>
+                </a:solidFill>
+                <a:latin typeface="Courier New" pitchFamily="49" charset="0"/>
+                <a:cs typeface="Courier New" pitchFamily="49" charset="0"/>
+              </a:rPr>
+              <a:t>dvc</a:t>
+            </a:r>
+            <a:r>
+              <a:rPr lang="en-US" b="1" dirty="0">
+                <a:solidFill>
+                  <a:schemeClr val="bg1"/>
+                </a:solidFill>
+                <a:latin typeface="Courier New" pitchFamily="49" charset="0"/>
+                <a:cs typeface="Courier New" pitchFamily="49" charset="0"/>
+              </a:rPr>
+              <a:t> repro  --force</a:t>
+            </a:r>
+            <a:endParaRPr lang="nl-BE" b="1" dirty="0">
+              <a:solidFill>
+                <a:schemeClr val="bg1"/>
+              </a:solidFill>
+              <a:latin typeface="Courier New" pitchFamily="49" charset="0"/>
+              <a:cs typeface="Courier New" pitchFamily="49" charset="0"/>
+            </a:endParaRPr>
+          </a:p>
+        </p:txBody>
+      </p:sp>
+      <p:sp>
+        <p:nvSpPr>
+          <p:cNvPr id="8" name="TextBox 7">
+            <a:extLst>
+              <a:ext uri="{FF2B5EF4-FFF2-40B4-BE49-F238E27FC236}">
+                <a16:creationId xmlns:a16="http://schemas.microsoft.com/office/drawing/2014/main" id="{8B7C10FD-B553-7CAF-6C76-5C77B68D4934}"/>
+              </a:ext>
+            </a:extLst>
+          </p:cNvPr>
+          <p:cNvSpPr txBox="1"/>
+          <p:nvPr/>
+        </p:nvSpPr>
+        <p:spPr>
+          <a:xfrm>
+            <a:off x="1286218" y="6118203"/>
+            <a:ext cx="4733580" cy="369332"/>
+          </a:xfrm>
+          <a:prstGeom prst="rect">
+            <a:avLst/>
+          </a:prstGeom>
+          <a:solidFill>
+            <a:schemeClr val="tx1"/>
+          </a:solidFill>
+          <a:ln>
+            <a:solidFill>
+              <a:schemeClr val="tx1"/>
+            </a:solidFill>
+          </a:ln>
+        </p:spPr>
+        <p:txBody>
+          <a:bodyPr wrap="square" rtlCol="0">
+            <a:spAutoFit/>
+          </a:bodyPr>
+          <a:lstStyle/>
+          <a:p>
+            <a:r>
+              <a:rPr lang="en-US" b="1" dirty="0">
+                <a:solidFill>
+                  <a:schemeClr val="bg1"/>
+                </a:solidFill>
+                <a:latin typeface="Courier New" pitchFamily="49" charset="0"/>
+                <a:cs typeface="Courier New" pitchFamily="49" charset="0"/>
+              </a:rPr>
+              <a:t>$  git commit  -m 'Run pipeline'</a:t>
+            </a:r>
+            <a:endParaRPr lang="nl-BE" b="1" dirty="0">
+              <a:solidFill>
+                <a:schemeClr val="bg1"/>
+              </a:solidFill>
+              <a:latin typeface="Courier New" pitchFamily="49" charset="0"/>
+              <a:cs typeface="Courier New" pitchFamily="49" charset="0"/>
+            </a:endParaRPr>
+          </a:p>
+        </p:txBody>
+      </p:sp>
+      <p:sp>
+        <p:nvSpPr>
+          <p:cNvPr id="13" name="TextBox 12">
+            <a:extLst>
+              <a:ext uri="{FF2B5EF4-FFF2-40B4-BE49-F238E27FC236}">
+                <a16:creationId xmlns:a16="http://schemas.microsoft.com/office/drawing/2014/main" id="{BD9F291D-2497-502F-6583-CCBD12C12E39}"/>
+              </a:ext>
+            </a:extLst>
+          </p:cNvPr>
+          <p:cNvSpPr txBox="1"/>
+          <p:nvPr/>
+        </p:nvSpPr>
+        <p:spPr>
+          <a:xfrm>
+            <a:off x="6620224" y="2700047"/>
+            <a:ext cx="5005720" cy="2031325"/>
+          </a:xfrm>
+          <a:prstGeom prst="rect">
+            <a:avLst/>
+          </a:prstGeom>
+          <a:solidFill>
+            <a:schemeClr val="tx1"/>
+          </a:solidFill>
+          <a:ln>
+            <a:solidFill>
+              <a:schemeClr val="tx1"/>
+            </a:solidFill>
+          </a:ln>
+        </p:spPr>
+        <p:txBody>
+          <a:bodyPr wrap="square" rtlCol="0">
+            <a:spAutoFit/>
+          </a:bodyPr>
+          <a:lstStyle/>
+          <a:p>
+            <a:r>
+              <a:rPr lang="en-US" b="1" dirty="0">
+                <a:solidFill>
+                  <a:schemeClr val="bg1"/>
+                </a:solidFill>
+                <a:latin typeface="Courier New" pitchFamily="49" charset="0"/>
+                <a:cs typeface="Courier New" pitchFamily="49" charset="0"/>
+              </a:rPr>
+              <a:t>$  </a:t>
+            </a:r>
+            <a:r>
+              <a:rPr lang="en-US" b="1" dirty="0" err="1">
+                <a:solidFill>
+                  <a:schemeClr val="bg1"/>
+                </a:solidFill>
+                <a:latin typeface="Courier New" pitchFamily="49" charset="0"/>
+                <a:cs typeface="Courier New" pitchFamily="49" charset="0"/>
+              </a:rPr>
+              <a:t>dvc</a:t>
+            </a:r>
+            <a:r>
+              <a:rPr lang="en-US" b="1" dirty="0">
+                <a:solidFill>
+                  <a:schemeClr val="bg1"/>
+                </a:solidFill>
+                <a:latin typeface="Courier New" pitchFamily="49" charset="0"/>
+                <a:cs typeface="Courier New" pitchFamily="49" charset="0"/>
+              </a:rPr>
+              <a:t> status</a:t>
+            </a:r>
+            <a:br>
+              <a:rPr lang="en-US" b="1" dirty="0">
+                <a:solidFill>
+                  <a:schemeClr val="bg1"/>
+                </a:solidFill>
+                <a:latin typeface="Courier New" pitchFamily="49" charset="0"/>
+                <a:cs typeface="Courier New" pitchFamily="49" charset="0"/>
+              </a:rPr>
+            </a:br>
+            <a:r>
+              <a:rPr lang="en-US" b="1" dirty="0" err="1">
+                <a:solidFill>
+                  <a:schemeClr val="bg1"/>
+                </a:solidFill>
+                <a:latin typeface="Courier New" pitchFamily="49" charset="0"/>
+                <a:cs typeface="Courier New" pitchFamily="49" charset="0"/>
+              </a:rPr>
+              <a:t>split_data</a:t>
+            </a:r>
+            <a:r>
+              <a:rPr lang="en-US" b="1" dirty="0">
+                <a:solidFill>
+                  <a:schemeClr val="bg1"/>
+                </a:solidFill>
+                <a:latin typeface="Courier New" pitchFamily="49" charset="0"/>
+                <a:cs typeface="Courier New" pitchFamily="49" charset="0"/>
+              </a:rPr>
+              <a:t>:</a:t>
+            </a:r>
+          </a:p>
+          <a:p>
+            <a:r>
+              <a:rPr lang="en-US" b="1" dirty="0">
+                <a:solidFill>
+                  <a:schemeClr val="bg1"/>
+                </a:solidFill>
+                <a:latin typeface="Courier New" pitchFamily="49" charset="0"/>
+                <a:cs typeface="Courier New" pitchFamily="49" charset="0"/>
+              </a:rPr>
+              <a:t>  changed deps:</a:t>
+            </a:r>
+          </a:p>
+          <a:p>
+            <a:r>
+              <a:rPr lang="en-US" b="1" dirty="0">
+                <a:solidFill>
+                  <a:schemeClr val="bg1"/>
+                </a:solidFill>
+                <a:latin typeface="Courier New" pitchFamily="49" charset="0"/>
+                <a:cs typeface="Courier New" pitchFamily="49" charset="0"/>
+              </a:rPr>
+              <a:t>    modified:       data/data.csv</a:t>
+            </a:r>
+          </a:p>
+          <a:p>
+            <a:r>
+              <a:rPr lang="en-US" b="1" dirty="0">
+                <a:solidFill>
+                  <a:schemeClr val="bg1"/>
+                </a:solidFill>
+                <a:latin typeface="Courier New" pitchFamily="49" charset="0"/>
+                <a:cs typeface="Courier New" pitchFamily="49" charset="0"/>
+              </a:rPr>
+              <a:t>data/</a:t>
+            </a:r>
+            <a:r>
+              <a:rPr lang="en-US" b="1" dirty="0" err="1">
+                <a:solidFill>
+                  <a:schemeClr val="bg1"/>
+                </a:solidFill>
+                <a:latin typeface="Courier New" pitchFamily="49" charset="0"/>
+                <a:cs typeface="Courier New" pitchFamily="49" charset="0"/>
+              </a:rPr>
+              <a:t>data.csv.dvc</a:t>
+            </a:r>
+            <a:r>
+              <a:rPr lang="en-US" b="1" dirty="0">
+                <a:solidFill>
+                  <a:schemeClr val="bg1"/>
+                </a:solidFill>
+                <a:latin typeface="Courier New" pitchFamily="49" charset="0"/>
+                <a:cs typeface="Courier New" pitchFamily="49" charset="0"/>
+              </a:rPr>
+              <a:t>:</a:t>
+            </a:r>
+          </a:p>
+          <a:p>
+            <a:r>
+              <a:rPr lang="en-US" b="1" dirty="0">
+                <a:solidFill>
+                  <a:schemeClr val="bg1"/>
+                </a:solidFill>
+                <a:latin typeface="Courier New" pitchFamily="49" charset="0"/>
+                <a:cs typeface="Courier New" pitchFamily="49" charset="0"/>
+              </a:rPr>
+              <a:t>  changed outs:</a:t>
+            </a:r>
+          </a:p>
+          <a:p>
+            <a:r>
+              <a:rPr lang="en-US" b="1" dirty="0">
+                <a:solidFill>
+                  <a:schemeClr val="bg1"/>
+                </a:solidFill>
+                <a:latin typeface="Courier New" pitchFamily="49" charset="0"/>
+                <a:cs typeface="Courier New" pitchFamily="49" charset="0"/>
+              </a:rPr>
+              <a:t>    modified:       data/data.csv</a:t>
+            </a:r>
+            <a:endParaRPr lang="nl-BE" b="1" dirty="0">
+              <a:solidFill>
+                <a:schemeClr val="bg1"/>
+              </a:solidFill>
+              <a:latin typeface="Courier New" pitchFamily="49" charset="0"/>
+              <a:cs typeface="Courier New" pitchFamily="49" charset="0"/>
+            </a:endParaRPr>
+          </a:p>
+        </p:txBody>
+      </p:sp>
+    </p:spTree>
+    <p:extLst>
+      <p:ext uri="{BB962C8B-B14F-4D97-AF65-F5344CB8AC3E}">
+        <p14:creationId xmlns:p14="http://schemas.microsoft.com/office/powerpoint/2010/main" val="3415999053"/>
+      </p:ext>
+    </p:extLst>
+  </p:cSld>
+  <p:clrMapOvr>
+    <a:masterClrMapping/>
+  </p:clrMapOvr>
+  <p:timing>
+    <p:tnLst>
+      <p:par>
+        <p:cTn id="1" dur="indefinite" restart="never" nodeType="tmRoot">
+          <p:childTnLst>
+            <p:seq concurrent="1" nextAc="seek">
+              <p:cTn id="2" dur="indefinite" nodeType="mainSeq">
+                <p:childTnLst>
+                  <p:par>
+                    <p:cTn id="3" fill="hold">
+                      <p:stCondLst>
+                        <p:cond delay="indefinite"/>
+                        <p:cond evt="onBegin" delay="0">
+                          <p:tn val="2"/>
+                        </p:cond>
+                      </p:stCondLst>
+                      <p:childTnLst>
+                        <p:par>
+                          <p:cTn id="4" fill="hold">
+                            <p:stCondLst>
+                              <p:cond delay="0"/>
+                            </p:stCondLst>
+                            <p:childTnLst>
+                              <p:par>
+                                <p:cTn id="5" presetID="1" presetClass="entr" presetSubtype="0" fill="hold" grpId="0" nodeType="withEffect">
+                                  <p:stCondLst>
+                                    <p:cond delay="0"/>
+                                  </p:stCondLst>
+                                  <p:childTnLst>
+                                    <p:set>
+                                      <p:cBhvr>
+                                        <p:cTn id="6" dur="1" fill="hold">
+                                          <p:stCondLst>
+                                            <p:cond delay="0"/>
+                                          </p:stCondLst>
+                                        </p:cTn>
+                                        <p:tgtEl>
+                                          <p:spTgt spid="5"/>
+                                        </p:tgtEl>
+                                        <p:attrNameLst>
+                                          <p:attrName>style.visibility</p:attrName>
+                                        </p:attrNameLst>
+                                      </p:cBhvr>
+                                      <p:to>
+                                        <p:strVal val="visible"/>
+                                      </p:to>
+                                    </p:set>
+                                  </p:childTnLst>
+                                </p:cTn>
+                              </p:par>
+                              <p:par>
+                                <p:cTn id="7" presetID="1" presetClass="entr" presetSubtype="0" fill="hold" grpId="0" nodeType="withEffect">
+                                  <p:stCondLst>
+                                    <p:cond delay="0"/>
+                                  </p:stCondLst>
+                                  <p:childTnLst>
+                                    <p:set>
+                                      <p:cBhvr>
+                                        <p:cTn id="8" dur="1" fill="hold">
+                                          <p:stCondLst>
+                                            <p:cond delay="0"/>
+                                          </p:stCondLst>
+                                        </p:cTn>
+                                        <p:tgtEl>
+                                          <p:spTgt spid="6"/>
+                                        </p:tgtEl>
+                                        <p:attrNameLst>
+                                          <p:attrName>style.visibility</p:attrName>
+                                        </p:attrNameLst>
+                                      </p:cBhvr>
+                                      <p:to>
+                                        <p:strVal val="visible"/>
+                                      </p:to>
+                                    </p:set>
+                                  </p:childTnLst>
+                                </p:cTn>
+                              </p:par>
+                              <p:par>
+                                <p:cTn id="9" presetID="1" presetClass="entr" presetSubtype="0" fill="hold" grpId="0" nodeType="withEffect">
+                                  <p:stCondLst>
+                                    <p:cond delay="0"/>
+                                  </p:stCondLst>
+                                  <p:childTnLst>
+                                    <p:set>
+                                      <p:cBhvr>
+                                        <p:cTn id="10" dur="1" fill="hold">
+                                          <p:stCondLst>
+                                            <p:cond delay="0"/>
+                                          </p:stCondLst>
+                                        </p:cTn>
+                                        <p:tgtEl>
+                                          <p:spTgt spid="7"/>
+                                        </p:tgtEl>
+                                        <p:attrNameLst>
+                                          <p:attrName>style.visibility</p:attrName>
+                                        </p:attrNameLst>
+                                      </p:cBhvr>
+                                      <p:to>
+                                        <p:strVal val="visible"/>
+                                      </p:to>
+                                    </p:set>
+                                  </p:childTnLst>
+                                </p:cTn>
+                              </p:par>
+                              <p:par>
+                                <p:cTn id="11" presetID="1" presetClass="entr" presetSubtype="0" fill="hold" grpId="0" nodeType="withEffect">
+                                  <p:stCondLst>
+                                    <p:cond delay="0"/>
+                                  </p:stCondLst>
+                                  <p:childTnLst>
+                                    <p:set>
+                                      <p:cBhvr>
+                                        <p:cTn id="12" dur="1" fill="hold">
+                                          <p:stCondLst>
+                                            <p:cond delay="0"/>
+                                          </p:stCondLst>
+                                        </p:cTn>
+                                        <p:tgtEl>
+                                          <p:spTgt spid="8"/>
+                                        </p:tgtEl>
+                                        <p:attrNameLst>
+                                          <p:attrName>style.visibility</p:attrName>
+                                        </p:attrNameLst>
+                                      </p:cBhvr>
+                                      <p:to>
+                                        <p:strVal val="visible"/>
+                                      </p:to>
+                                    </p:set>
+                                  </p:childTnLst>
+                                </p:cTn>
+                              </p:par>
+                              <p:par>
+                                <p:cTn id="13" presetID="1" presetClass="entr" presetSubtype="0" fill="hold" grpId="0" nodeType="withEffect">
+                                  <p:stCondLst>
+                                    <p:cond delay="0"/>
+                                  </p:stCondLst>
+                                  <p:childTnLst>
+                                    <p:set>
+                                      <p:cBhvr>
+                                        <p:cTn id="14" dur="1" fill="hold">
+                                          <p:stCondLst>
+                                            <p:cond delay="0"/>
+                                          </p:stCondLst>
+                                        </p:cTn>
+                                        <p:tgtEl>
+                                          <p:spTgt spid="13"/>
+                                        </p:tgtEl>
+                                        <p:attrNameLst>
+                                          <p:attrName>style.visibility</p:attrName>
+                                        </p:attrNameLst>
+                                      </p:cBhvr>
+                                      <p:to>
+                                        <p:strVal val="visible"/>
+                                      </p:to>
+                                    </p:set>
+                                  </p:childTnLst>
+                                </p:cTn>
+                              </p:par>
+                            </p:childTnLst>
+                          </p:cTn>
+                        </p:par>
+                      </p:childTnLst>
+                    </p:cTn>
+                  </p:par>
+                </p:childTnLst>
+              </p:cTn>
+              <p:prevCondLst>
+                <p:cond evt="onPrev" delay="0">
+                  <p:tgtEl>
+                    <p:sldTgt/>
+                  </p:tgtEl>
+                </p:cond>
+              </p:prevCondLst>
+              <p:nextCondLst>
+                <p:cond evt="onNext" delay="0">
+                  <p:tgtEl>
+                    <p:sldTgt/>
+                  </p:tgtEl>
+                </p:cond>
+              </p:nextCondLst>
+            </p:seq>
+          </p:childTnLst>
+        </p:cTn>
+      </p:par>
+    </p:tnLst>
+    <p:bldLst>
+      <p:bldP spid="5" grpId="0" animBg="1"/>
+      <p:bldP spid="6" grpId="0" animBg="1"/>
+      <p:bldP spid="7" grpId="0" animBg="1"/>
+      <p:bldP spid="8" grpId="0" animBg="1"/>
+      <p:bldP spid="13" grpId="0" animBg="1"/>
     </p:bldLst>
   </p:timing>
 </p:sld>

</xml_diff>

<commit_message>
Add slide on DVC data import
</commit_message>
<xml_diff>
--- a/mlops_on_hpc.pptx
+++ b/mlops_on_hpc.pptx
@@ -5,7 +5,7 @@
     <p:sldMasterId id="2147483648" r:id="rId1"/>
   </p:sldMasterIdLst>
   <p:notesMasterIdLst>
-    <p:notesMasterId r:id="rId44"/>
+    <p:notesMasterId r:id="rId45"/>
   </p:notesMasterIdLst>
   <p:sldIdLst>
     <p:sldId id="257" r:id="rId2"/>
@@ -27,29 +27,30 @@
     <p:sldId id="369" r:id="rId18"/>
     <p:sldId id="370" r:id="rId19"/>
     <p:sldId id="372" r:id="rId20"/>
-    <p:sldId id="374" r:id="rId21"/>
-    <p:sldId id="371" r:id="rId22"/>
-    <p:sldId id="375" r:id="rId23"/>
-    <p:sldId id="376" r:id="rId24"/>
-    <p:sldId id="377" r:id="rId25"/>
-    <p:sldId id="379" r:id="rId26"/>
-    <p:sldId id="380" r:id="rId27"/>
-    <p:sldId id="378" r:id="rId28"/>
-    <p:sldId id="382" r:id="rId29"/>
-    <p:sldId id="381" r:id="rId30"/>
-    <p:sldId id="383" r:id="rId31"/>
-    <p:sldId id="395" r:id="rId32"/>
-    <p:sldId id="384" r:id="rId33"/>
-    <p:sldId id="385" r:id="rId34"/>
-    <p:sldId id="386" r:id="rId35"/>
-    <p:sldId id="387" r:id="rId36"/>
-    <p:sldId id="388" r:id="rId37"/>
-    <p:sldId id="390" r:id="rId38"/>
-    <p:sldId id="389" r:id="rId39"/>
-    <p:sldId id="392" r:id="rId40"/>
-    <p:sldId id="391" r:id="rId41"/>
-    <p:sldId id="393" r:id="rId42"/>
-    <p:sldId id="394" r:id="rId43"/>
+    <p:sldId id="396" r:id="rId21"/>
+    <p:sldId id="374" r:id="rId22"/>
+    <p:sldId id="371" r:id="rId23"/>
+    <p:sldId id="375" r:id="rId24"/>
+    <p:sldId id="376" r:id="rId25"/>
+    <p:sldId id="377" r:id="rId26"/>
+    <p:sldId id="379" r:id="rId27"/>
+    <p:sldId id="380" r:id="rId28"/>
+    <p:sldId id="378" r:id="rId29"/>
+    <p:sldId id="382" r:id="rId30"/>
+    <p:sldId id="381" r:id="rId31"/>
+    <p:sldId id="383" r:id="rId32"/>
+    <p:sldId id="395" r:id="rId33"/>
+    <p:sldId id="384" r:id="rId34"/>
+    <p:sldId id="385" r:id="rId35"/>
+    <p:sldId id="386" r:id="rId36"/>
+    <p:sldId id="387" r:id="rId37"/>
+    <p:sldId id="388" r:id="rId38"/>
+    <p:sldId id="390" r:id="rId39"/>
+    <p:sldId id="389" r:id="rId40"/>
+    <p:sldId id="392" r:id="rId41"/>
+    <p:sldId id="391" r:id="rId42"/>
+    <p:sldId id="393" r:id="rId43"/>
+    <p:sldId id="394" r:id="rId44"/>
   </p:sldIdLst>
   <p:sldSz cx="12192000" cy="6858000"/>
   <p:notesSz cx="6858000" cy="9144000"/>
@@ -10070,6 +10071,1055 @@
   <p:cSld>
     <p:spTree>
       <p:nvGrpSpPr>
+        <p:cNvPr id="1" name=""/>
+        <p:cNvGrpSpPr/>
+        <p:nvPr/>
+      </p:nvGrpSpPr>
+      <p:grpSpPr>
+        <a:xfrm>
+          <a:off x="0" y="0"/>
+          <a:ext cx="0" cy="0"/>
+          <a:chOff x="0" y="0"/>
+          <a:chExt cx="0" cy="0"/>
+        </a:xfrm>
+      </p:grpSpPr>
+      <p:sp>
+        <p:nvSpPr>
+          <p:cNvPr id="2" name="Title 1">
+            <a:extLst>
+              <a:ext uri="{FF2B5EF4-FFF2-40B4-BE49-F238E27FC236}">
+                <a16:creationId xmlns:a16="http://schemas.microsoft.com/office/drawing/2014/main" id="{3457CEE3-1552-DE57-5958-BC2DFBCA87E3}"/>
+              </a:ext>
+            </a:extLst>
+          </p:cNvPr>
+          <p:cNvSpPr>
+            <a:spLocks noGrp="1"/>
+          </p:cNvSpPr>
+          <p:nvPr>
+            <p:ph type="title"/>
+          </p:nvPr>
+        </p:nvSpPr>
+        <p:spPr/>
+        <p:txBody>
+          <a:bodyPr/>
+          <a:lstStyle/>
+          <a:p>
+            <a:r>
+              <a:rPr lang="en-US" dirty="0"/>
+              <a:t>Importing data</a:t>
+            </a:r>
+            <a:endParaRPr lang="LID4096" dirty="0"/>
+          </a:p>
+        </p:txBody>
+      </p:sp>
+      <p:sp>
+        <p:nvSpPr>
+          <p:cNvPr id="3" name="Content Placeholder 2">
+            <a:extLst>
+              <a:ext uri="{FF2B5EF4-FFF2-40B4-BE49-F238E27FC236}">
+                <a16:creationId xmlns:a16="http://schemas.microsoft.com/office/drawing/2014/main" id="{977C2AB7-4C49-EBA0-911F-1B035297B542}"/>
+              </a:ext>
+            </a:extLst>
+          </p:cNvPr>
+          <p:cNvSpPr>
+            <a:spLocks noGrp="1"/>
+          </p:cNvSpPr>
+          <p:nvPr>
+            <p:ph idx="1"/>
+          </p:nvPr>
+        </p:nvSpPr>
+        <p:spPr/>
+        <p:txBody>
+          <a:bodyPr/>
+          <a:lstStyle/>
+          <a:p>
+            <a:r>
+              <a:rPr lang="en-US" dirty="0"/>
+              <a:t>List files in git repository</a:t>
+            </a:r>
+          </a:p>
+          <a:p>
+            <a:endParaRPr lang="en-US" dirty="0"/>
+          </a:p>
+          <a:p>
+            <a:r>
+              <a:rPr lang="en-US" dirty="0"/>
+              <a:t>Recursively list files</a:t>
+            </a:r>
+          </a:p>
+          <a:p>
+            <a:endParaRPr lang="en-US" dirty="0"/>
+          </a:p>
+          <a:p>
+            <a:r>
+              <a:rPr lang="en-US" dirty="0"/>
+              <a:t>Import data set from git repository</a:t>
+            </a:r>
+          </a:p>
+          <a:p>
+            <a:endParaRPr lang="en-US" dirty="0"/>
+          </a:p>
+          <a:p>
+            <a:r>
+              <a:rPr lang="en-US" dirty="0"/>
+              <a:t>Copy files from git repository</a:t>
+            </a:r>
+            <a:endParaRPr lang="LID4096" dirty="0"/>
+          </a:p>
+        </p:txBody>
+      </p:sp>
+      <p:sp>
+        <p:nvSpPr>
+          <p:cNvPr id="4" name="Slide Number Placeholder 3">
+            <a:extLst>
+              <a:ext uri="{FF2B5EF4-FFF2-40B4-BE49-F238E27FC236}">
+                <a16:creationId xmlns:a16="http://schemas.microsoft.com/office/drawing/2014/main" id="{6F898982-1B76-5C14-2DF4-8F67E0F0ED37}"/>
+              </a:ext>
+            </a:extLst>
+          </p:cNvPr>
+          <p:cNvSpPr>
+            <a:spLocks noGrp="1"/>
+          </p:cNvSpPr>
+          <p:nvPr>
+            <p:ph type="sldNum" sz="quarter" idx="12"/>
+          </p:nvPr>
+        </p:nvSpPr>
+        <p:spPr/>
+        <p:txBody>
+          <a:bodyPr/>
+          <a:lstStyle/>
+          <a:p>
+            <a:fld id="{9C7CE217-4467-4B8D-A735-B008FA7C4816}" type="slidenum">
+              <a:rPr lang="LID4096" smtClean="0"/>
+              <a:t>20</a:t>
+            </a:fld>
+            <a:endParaRPr lang="LID4096"/>
+          </a:p>
+        </p:txBody>
+      </p:sp>
+      <p:sp>
+        <p:nvSpPr>
+          <p:cNvPr id="5" name="TextBox 4">
+            <a:extLst>
+              <a:ext uri="{FF2B5EF4-FFF2-40B4-BE49-F238E27FC236}">
+                <a16:creationId xmlns:a16="http://schemas.microsoft.com/office/drawing/2014/main" id="{1E421214-3A68-CE8E-3B82-37EA5FFB6E36}"/>
+              </a:ext>
+            </a:extLst>
+          </p:cNvPr>
+          <p:cNvSpPr txBox="1"/>
+          <p:nvPr/>
+        </p:nvSpPr>
+        <p:spPr>
+          <a:xfrm>
+            <a:off x="1171068" y="2292719"/>
+            <a:ext cx="9849863" cy="369332"/>
+          </a:xfrm>
+          <a:prstGeom prst="rect">
+            <a:avLst/>
+          </a:prstGeom>
+          <a:solidFill>
+            <a:schemeClr val="tx1"/>
+          </a:solidFill>
+          <a:ln>
+            <a:solidFill>
+              <a:schemeClr val="tx1"/>
+            </a:solidFill>
+          </a:ln>
+        </p:spPr>
+        <p:txBody>
+          <a:bodyPr wrap="square" rtlCol="0">
+            <a:spAutoFit/>
+          </a:bodyPr>
+          <a:lstStyle/>
+          <a:p>
+            <a:r>
+              <a:rPr lang="en-US" b="1" dirty="0">
+                <a:solidFill>
+                  <a:schemeClr val="bg1"/>
+                </a:solidFill>
+                <a:latin typeface="Courier New" pitchFamily="49" charset="0"/>
+                <a:cs typeface="Courier New" pitchFamily="49" charset="0"/>
+              </a:rPr>
+              <a:t>$  </a:t>
+            </a:r>
+            <a:r>
+              <a:rPr lang="en-US" b="1" dirty="0" err="1">
+                <a:solidFill>
+                  <a:schemeClr val="bg1"/>
+                </a:solidFill>
+                <a:latin typeface="Courier New" pitchFamily="49" charset="0"/>
+                <a:cs typeface="Courier New" pitchFamily="49" charset="0"/>
+              </a:rPr>
+              <a:t>dvc</a:t>
+            </a:r>
+            <a:r>
+              <a:rPr lang="en-US" b="1" dirty="0">
+                <a:solidFill>
+                  <a:schemeClr val="bg1"/>
+                </a:solidFill>
+                <a:latin typeface="Courier New" pitchFamily="49" charset="0"/>
+                <a:cs typeface="Courier New" pitchFamily="49" charset="0"/>
+              </a:rPr>
+              <a:t> list  </a:t>
+            </a:r>
+            <a:r>
+              <a:rPr lang="en-US" b="1" dirty="0" err="1">
+                <a:solidFill>
+                  <a:schemeClr val="bg1"/>
+                </a:solidFill>
+                <a:latin typeface="Courier New" pitchFamily="49" charset="0"/>
+                <a:cs typeface="Courier New" pitchFamily="49" charset="0"/>
+                <a:hlinkClick r:id="rId2">
+                  <a:extLst>
+                    <a:ext uri="{A12FA001-AC4F-418D-AE19-62706E023703}">
+                      <ahyp:hlinkClr xmlns:ahyp="http://schemas.microsoft.com/office/drawing/2018/hyperlinkcolor" val="tx"/>
+                    </a:ext>
+                  </a:extLst>
+                </a:hlinkClick>
+              </a:rPr>
+              <a:t>git@github.com:gjbex</a:t>
+            </a:r>
+            <a:r>
+              <a:rPr lang="en-US" b="1" dirty="0">
+                <a:solidFill>
+                  <a:schemeClr val="bg1"/>
+                </a:solidFill>
+                <a:latin typeface="Courier New" pitchFamily="49" charset="0"/>
+                <a:cs typeface="Courier New" pitchFamily="49" charset="0"/>
+                <a:hlinkClick r:id="rId2">
+                  <a:extLst>
+                    <a:ext uri="{A12FA001-AC4F-418D-AE19-62706E023703}">
+                      <ahyp:hlinkClr xmlns:ahyp="http://schemas.microsoft.com/office/drawing/2018/hyperlinkcolor" val="tx"/>
+                    </a:ext>
+                  </a:extLst>
+                </a:hlinkClick>
+              </a:rPr>
+              <a:t>/</a:t>
+            </a:r>
+            <a:r>
+              <a:rPr lang="en-US" b="1" dirty="0" err="1">
+                <a:solidFill>
+                  <a:schemeClr val="bg1"/>
+                </a:solidFill>
+                <a:latin typeface="Courier New" pitchFamily="49" charset="0"/>
+                <a:cs typeface="Courier New" pitchFamily="49" charset="0"/>
+                <a:hlinkClick r:id="rId2">
+                  <a:extLst>
+                    <a:ext uri="{A12FA001-AC4F-418D-AE19-62706E023703}">
+                      <ahyp:hlinkClr xmlns:ahyp="http://schemas.microsoft.com/office/drawing/2018/hyperlinkcolor" val="tx"/>
+                    </a:ext>
+                  </a:extLst>
+                </a:hlinkClick>
+              </a:rPr>
+              <a:t>ml_project.git</a:t>
+            </a:r>
+            <a:endParaRPr lang="nl-BE" b="1" dirty="0">
+              <a:solidFill>
+                <a:schemeClr val="bg1"/>
+              </a:solidFill>
+              <a:latin typeface="Courier New" pitchFamily="49" charset="0"/>
+              <a:cs typeface="Courier New" pitchFamily="49" charset="0"/>
+            </a:endParaRPr>
+          </a:p>
+        </p:txBody>
+      </p:sp>
+      <p:sp>
+        <p:nvSpPr>
+          <p:cNvPr id="6" name="TextBox 5">
+            <a:extLst>
+              <a:ext uri="{FF2B5EF4-FFF2-40B4-BE49-F238E27FC236}">
+                <a16:creationId xmlns:a16="http://schemas.microsoft.com/office/drawing/2014/main" id="{01C250F4-052F-55BF-D121-A10674E83CF0}"/>
+              </a:ext>
+            </a:extLst>
+          </p:cNvPr>
+          <p:cNvSpPr txBox="1"/>
+          <p:nvPr/>
+        </p:nvSpPr>
+        <p:spPr>
+          <a:xfrm>
+            <a:off x="1171068" y="4350117"/>
+            <a:ext cx="9849863" cy="369332"/>
+          </a:xfrm>
+          <a:prstGeom prst="rect">
+            <a:avLst/>
+          </a:prstGeom>
+          <a:solidFill>
+            <a:schemeClr val="tx1"/>
+          </a:solidFill>
+          <a:ln>
+            <a:solidFill>
+              <a:schemeClr val="tx1"/>
+            </a:solidFill>
+          </a:ln>
+        </p:spPr>
+        <p:txBody>
+          <a:bodyPr wrap="square" rtlCol="0">
+            <a:spAutoFit/>
+          </a:bodyPr>
+          <a:lstStyle/>
+          <a:p>
+            <a:r>
+              <a:rPr lang="en-US" b="1" dirty="0">
+                <a:solidFill>
+                  <a:schemeClr val="bg1"/>
+                </a:solidFill>
+                <a:latin typeface="Courier New" pitchFamily="49" charset="0"/>
+                <a:cs typeface="Courier New" pitchFamily="49" charset="0"/>
+              </a:rPr>
+              <a:t>$  </a:t>
+            </a:r>
+            <a:r>
+              <a:rPr lang="en-US" b="1" dirty="0" err="1">
+                <a:solidFill>
+                  <a:schemeClr val="bg1"/>
+                </a:solidFill>
+                <a:latin typeface="Courier New" pitchFamily="49" charset="0"/>
+                <a:cs typeface="Courier New" pitchFamily="49" charset="0"/>
+              </a:rPr>
+              <a:t>dvc</a:t>
+            </a:r>
+            <a:r>
+              <a:rPr lang="en-US" b="1" dirty="0">
+                <a:solidFill>
+                  <a:schemeClr val="bg1"/>
+                </a:solidFill>
+                <a:latin typeface="Courier New" pitchFamily="49" charset="0"/>
+                <a:cs typeface="Courier New" pitchFamily="49" charset="0"/>
+              </a:rPr>
+              <a:t> import  </a:t>
+            </a:r>
+            <a:r>
+              <a:rPr lang="en-US" b="1" dirty="0" err="1">
+                <a:solidFill>
+                  <a:schemeClr val="bg1"/>
+                </a:solidFill>
+                <a:latin typeface="Courier New" pitchFamily="49" charset="0"/>
+                <a:cs typeface="Courier New" pitchFamily="49" charset="0"/>
+                <a:hlinkClick r:id="rId2">
+                  <a:extLst>
+                    <a:ext uri="{A12FA001-AC4F-418D-AE19-62706E023703}">
+                      <ahyp:hlinkClr xmlns:ahyp="http://schemas.microsoft.com/office/drawing/2018/hyperlinkcolor" val="tx"/>
+                    </a:ext>
+                  </a:extLst>
+                </a:hlinkClick>
+              </a:rPr>
+              <a:t>git@github.com:gjbex</a:t>
+            </a:r>
+            <a:r>
+              <a:rPr lang="en-US" b="1" dirty="0">
+                <a:solidFill>
+                  <a:schemeClr val="bg1"/>
+                </a:solidFill>
+                <a:latin typeface="Courier New" pitchFamily="49" charset="0"/>
+                <a:cs typeface="Courier New" pitchFamily="49" charset="0"/>
+                <a:hlinkClick r:id="rId2">
+                  <a:extLst>
+                    <a:ext uri="{A12FA001-AC4F-418D-AE19-62706E023703}">
+                      <ahyp:hlinkClr xmlns:ahyp="http://schemas.microsoft.com/office/drawing/2018/hyperlinkcolor" val="tx"/>
+                    </a:ext>
+                  </a:extLst>
+                </a:hlinkClick>
+              </a:rPr>
+              <a:t>/</a:t>
+            </a:r>
+            <a:r>
+              <a:rPr lang="en-US" b="1" dirty="0" err="1">
+                <a:solidFill>
+                  <a:schemeClr val="bg1"/>
+                </a:solidFill>
+                <a:latin typeface="Courier New" pitchFamily="49" charset="0"/>
+                <a:cs typeface="Courier New" pitchFamily="49" charset="0"/>
+                <a:hlinkClick r:id="rId2">
+                  <a:extLst>
+                    <a:ext uri="{A12FA001-AC4F-418D-AE19-62706E023703}">
+                      <ahyp:hlinkClr xmlns:ahyp="http://schemas.microsoft.com/office/drawing/2018/hyperlinkcolor" val="tx"/>
+                    </a:ext>
+                  </a:extLst>
+                </a:hlinkClick>
+              </a:rPr>
+              <a:t>ml_project.git</a:t>
+            </a:r>
+            <a:r>
+              <a:rPr lang="en-US" b="1" dirty="0">
+                <a:solidFill>
+                  <a:schemeClr val="bg1"/>
+                </a:solidFill>
+                <a:latin typeface="Courier New" pitchFamily="49" charset="0"/>
+                <a:cs typeface="Courier New" pitchFamily="49" charset="0"/>
+              </a:rPr>
+              <a:t>  data/preprocessed</a:t>
+            </a:r>
+            <a:endParaRPr lang="nl-BE" b="1" dirty="0">
+              <a:solidFill>
+                <a:schemeClr val="bg1"/>
+              </a:solidFill>
+              <a:latin typeface="Courier New" pitchFamily="49" charset="0"/>
+              <a:cs typeface="Courier New" pitchFamily="49" charset="0"/>
+            </a:endParaRPr>
+          </a:p>
+        </p:txBody>
+      </p:sp>
+      <p:sp>
+        <p:nvSpPr>
+          <p:cNvPr id="7" name="TextBox 6">
+            <a:extLst>
+              <a:ext uri="{FF2B5EF4-FFF2-40B4-BE49-F238E27FC236}">
+                <a16:creationId xmlns:a16="http://schemas.microsoft.com/office/drawing/2014/main" id="{20FBF0C9-8F49-054E-83BE-E19FF8372848}"/>
+              </a:ext>
+            </a:extLst>
+          </p:cNvPr>
+          <p:cNvSpPr txBox="1"/>
+          <p:nvPr/>
+        </p:nvSpPr>
+        <p:spPr>
+          <a:xfrm>
+            <a:off x="1171067" y="3313833"/>
+            <a:ext cx="9849863" cy="369332"/>
+          </a:xfrm>
+          <a:prstGeom prst="rect">
+            <a:avLst/>
+          </a:prstGeom>
+          <a:solidFill>
+            <a:schemeClr val="tx1"/>
+          </a:solidFill>
+          <a:ln>
+            <a:solidFill>
+              <a:schemeClr val="tx1"/>
+            </a:solidFill>
+          </a:ln>
+        </p:spPr>
+        <p:txBody>
+          <a:bodyPr wrap="square" rtlCol="0">
+            <a:spAutoFit/>
+          </a:bodyPr>
+          <a:lstStyle/>
+          <a:p>
+            <a:r>
+              <a:rPr lang="en-US" b="1" dirty="0">
+                <a:solidFill>
+                  <a:schemeClr val="bg1"/>
+                </a:solidFill>
+                <a:latin typeface="Courier New" pitchFamily="49" charset="0"/>
+                <a:cs typeface="Courier New" pitchFamily="49" charset="0"/>
+              </a:rPr>
+              <a:t>$  </a:t>
+            </a:r>
+            <a:r>
+              <a:rPr lang="en-US" b="1" dirty="0" err="1">
+                <a:solidFill>
+                  <a:schemeClr val="bg1"/>
+                </a:solidFill>
+                <a:latin typeface="Courier New" pitchFamily="49" charset="0"/>
+                <a:cs typeface="Courier New" pitchFamily="49" charset="0"/>
+              </a:rPr>
+              <a:t>dvc</a:t>
+            </a:r>
+            <a:r>
+              <a:rPr lang="en-US" b="1" dirty="0">
+                <a:solidFill>
+                  <a:schemeClr val="bg1"/>
+                </a:solidFill>
+                <a:latin typeface="Courier New" pitchFamily="49" charset="0"/>
+                <a:cs typeface="Courier New" pitchFamily="49" charset="0"/>
+              </a:rPr>
+              <a:t> list  -T  </a:t>
+            </a:r>
+            <a:r>
+              <a:rPr lang="en-US" b="1" dirty="0" err="1">
+                <a:solidFill>
+                  <a:schemeClr val="bg1"/>
+                </a:solidFill>
+                <a:latin typeface="Courier New" pitchFamily="49" charset="0"/>
+                <a:cs typeface="Courier New" pitchFamily="49" charset="0"/>
+                <a:hlinkClick r:id="rId2">
+                  <a:extLst>
+                    <a:ext uri="{A12FA001-AC4F-418D-AE19-62706E023703}">
+                      <ahyp:hlinkClr xmlns:ahyp="http://schemas.microsoft.com/office/drawing/2018/hyperlinkcolor" val="tx"/>
+                    </a:ext>
+                  </a:extLst>
+                </a:hlinkClick>
+              </a:rPr>
+              <a:t>git@github.com:gjbex</a:t>
+            </a:r>
+            <a:r>
+              <a:rPr lang="en-US" b="1" dirty="0">
+                <a:solidFill>
+                  <a:schemeClr val="bg1"/>
+                </a:solidFill>
+                <a:latin typeface="Courier New" pitchFamily="49" charset="0"/>
+                <a:cs typeface="Courier New" pitchFamily="49" charset="0"/>
+                <a:hlinkClick r:id="rId2">
+                  <a:extLst>
+                    <a:ext uri="{A12FA001-AC4F-418D-AE19-62706E023703}">
+                      <ahyp:hlinkClr xmlns:ahyp="http://schemas.microsoft.com/office/drawing/2018/hyperlinkcolor" val="tx"/>
+                    </a:ext>
+                  </a:extLst>
+                </a:hlinkClick>
+              </a:rPr>
+              <a:t>/</a:t>
+            </a:r>
+            <a:r>
+              <a:rPr lang="en-US" b="1" dirty="0" err="1">
+                <a:solidFill>
+                  <a:schemeClr val="bg1"/>
+                </a:solidFill>
+                <a:latin typeface="Courier New" pitchFamily="49" charset="0"/>
+                <a:cs typeface="Courier New" pitchFamily="49" charset="0"/>
+                <a:hlinkClick r:id="rId2">
+                  <a:extLst>
+                    <a:ext uri="{A12FA001-AC4F-418D-AE19-62706E023703}">
+                      <ahyp:hlinkClr xmlns:ahyp="http://schemas.microsoft.com/office/drawing/2018/hyperlinkcolor" val="tx"/>
+                    </a:ext>
+                  </a:extLst>
+                </a:hlinkClick>
+              </a:rPr>
+              <a:t>ml_project.git</a:t>
+            </a:r>
+            <a:endParaRPr lang="nl-BE" b="1" dirty="0">
+              <a:solidFill>
+                <a:schemeClr val="bg1"/>
+              </a:solidFill>
+              <a:latin typeface="Courier New" pitchFamily="49" charset="0"/>
+              <a:cs typeface="Courier New" pitchFamily="49" charset="0"/>
+            </a:endParaRPr>
+          </a:p>
+        </p:txBody>
+      </p:sp>
+      <p:sp>
+        <p:nvSpPr>
+          <p:cNvPr id="8" name="TextBox 7">
+            <a:extLst>
+              <a:ext uri="{FF2B5EF4-FFF2-40B4-BE49-F238E27FC236}">
+                <a16:creationId xmlns:a16="http://schemas.microsoft.com/office/drawing/2014/main" id="{07B3A1E3-4AA9-7FDB-DDF0-7BA237038676}"/>
+              </a:ext>
+            </a:extLst>
+          </p:cNvPr>
+          <p:cNvSpPr txBox="1"/>
+          <p:nvPr/>
+        </p:nvSpPr>
+        <p:spPr>
+          <a:xfrm>
+            <a:off x="9599164" y="2854799"/>
+            <a:ext cx="2202847" cy="1200329"/>
+          </a:xfrm>
+          <a:prstGeom prst="rect">
+            <a:avLst/>
+          </a:prstGeom>
+          <a:solidFill>
+            <a:schemeClr val="bg1"/>
+          </a:solidFill>
+          <a:ln>
+            <a:solidFill>
+              <a:schemeClr val="tx1"/>
+            </a:solidFill>
+          </a:ln>
+        </p:spPr>
+        <p:txBody>
+          <a:bodyPr wrap="none" rtlCol="0">
+            <a:spAutoFit/>
+          </a:bodyPr>
+          <a:lstStyle/>
+          <a:p>
+            <a:pPr algn="ctr"/>
+            <a:r>
+              <a:rPr lang="en-US" sz="2400" dirty="0"/>
+              <a:t>Note: performs</a:t>
+            </a:r>
+            <a:br>
+              <a:rPr lang="en-US" sz="2400" dirty="0"/>
+            </a:br>
+            <a:r>
+              <a:rPr lang="en-US" sz="2400" dirty="0">
+                <a:latin typeface="Courier New" panose="02070309020205020404" pitchFamily="49" charset="0"/>
+                <a:cs typeface="Courier New" panose="02070309020205020404" pitchFamily="49" charset="0"/>
+              </a:rPr>
+              <a:t>git clone</a:t>
+            </a:r>
+            <a:r>
+              <a:rPr lang="en-US" sz="2400" dirty="0"/>
+              <a:t> </a:t>
+            </a:r>
+            <a:br>
+              <a:rPr lang="en-US" sz="2400" dirty="0"/>
+            </a:br>
+            <a:r>
+              <a:rPr lang="en-US" sz="2400" dirty="0"/>
+              <a:t>under the hood</a:t>
+            </a:r>
+            <a:endParaRPr lang="LID4096" sz="2400" dirty="0"/>
+          </a:p>
+        </p:txBody>
+      </p:sp>
+      <p:grpSp>
+        <p:nvGrpSpPr>
+          <p:cNvPr id="9" name="Group 8">
+            <a:extLst>
+              <a:ext uri="{FF2B5EF4-FFF2-40B4-BE49-F238E27FC236}">
+                <a16:creationId xmlns:a16="http://schemas.microsoft.com/office/drawing/2014/main" id="{63716980-5C90-C0FF-8B28-DF2DAF8BE645}"/>
+              </a:ext>
+            </a:extLst>
+          </p:cNvPr>
+          <p:cNvGrpSpPr/>
+          <p:nvPr/>
+        </p:nvGrpSpPr>
+        <p:grpSpPr>
+          <a:xfrm>
+            <a:off x="6717700" y="867288"/>
+            <a:ext cx="1993730" cy="778950"/>
+            <a:chOff x="10483358" y="2630321"/>
+            <a:chExt cx="1993730" cy="778950"/>
+          </a:xfrm>
+        </p:grpSpPr>
+        <p:sp>
+          <p:nvSpPr>
+            <p:cNvPr id="12" name="TextBox 11">
+              <a:extLst>
+                <a:ext uri="{FF2B5EF4-FFF2-40B4-BE49-F238E27FC236}">
+                  <a16:creationId xmlns:a16="http://schemas.microsoft.com/office/drawing/2014/main" id="{1C627ACB-6408-9BEE-D0BD-EBE43B88CF14}"/>
+                </a:ext>
+              </a:extLst>
+            </p:cNvPr>
+            <p:cNvSpPr txBox="1"/>
+            <p:nvPr/>
+          </p:nvSpPr>
+          <p:spPr>
+            <a:xfrm>
+              <a:off x="10483358" y="2947606"/>
+              <a:ext cx="1673150" cy="461665"/>
+            </a:xfrm>
+            <a:prstGeom prst="rect">
+              <a:avLst/>
+            </a:prstGeom>
+            <a:solidFill>
+              <a:schemeClr val="bg1"/>
+            </a:solidFill>
+            <a:ln w="19050">
+              <a:solidFill>
+                <a:srgbClr val="C00000"/>
+              </a:solidFill>
+            </a:ln>
+          </p:spPr>
+          <p:txBody>
+            <a:bodyPr wrap="none" rtlCol="0">
+              <a:spAutoFit/>
+            </a:bodyPr>
+            <a:lstStyle/>
+            <a:p>
+              <a:pPr marL="0" marR="0" lvl="0" indent="0" algn="l" defTabSz="914400" rtl="0" eaLnBrk="1" fontAlgn="auto" latinLnBrk="0" hangingPunct="1">
+                <a:lnSpc>
+                  <a:spcPct val="100000"/>
+                </a:lnSpc>
+                <a:spcBef>
+                  <a:spcPts val="0"/>
+                </a:spcBef>
+                <a:spcAft>
+                  <a:spcPts val="0"/>
+                </a:spcAft>
+                <a:buClrTx/>
+                <a:buSzTx/>
+                <a:buFontTx/>
+                <a:buNone/>
+                <a:tabLst/>
+                <a:defRPr/>
+              </a:pPr>
+              <a:r>
+                <a:rPr kumimoji="0" lang="en-US" sz="2400" b="0" i="0" u="none" strike="noStrike" kern="1200" cap="none" spc="0" normalizeH="0" baseline="0" noProof="0" dirty="0">
+                  <a:ln>
+                    <a:noFill/>
+                  </a:ln>
+                  <a:solidFill>
+                    <a:prstClr val="black"/>
+                  </a:solidFill>
+                  <a:effectLst/>
+                  <a:uLnTx/>
+                  <a:uFillTx/>
+                  <a:ea typeface="+mn-ea"/>
+                  <a:cs typeface="+mn-cs"/>
+                </a:rPr>
+                <a:t>Reuse data</a:t>
+              </a:r>
+              <a:endParaRPr kumimoji="0" lang="nl-BE" sz="2400" b="0" i="0" u="none" strike="noStrike" kern="1200" cap="none" spc="0" normalizeH="0" baseline="0" noProof="0" dirty="0">
+                <a:ln>
+                  <a:noFill/>
+                </a:ln>
+                <a:solidFill>
+                  <a:prstClr val="black"/>
+                </a:solidFill>
+                <a:effectLst/>
+                <a:uLnTx/>
+                <a:uFillTx/>
+                <a:ea typeface="+mn-ea"/>
+                <a:cs typeface="+mn-cs"/>
+              </a:endParaRPr>
+            </a:p>
+          </p:txBody>
+        </p:sp>
+        <p:pic>
+          <p:nvPicPr>
+            <p:cNvPr id="11" name="Graphic 10" descr="Thumbs up sign with solid fill">
+              <a:extLst>
+                <a:ext uri="{FF2B5EF4-FFF2-40B4-BE49-F238E27FC236}">
+                  <a16:creationId xmlns:a16="http://schemas.microsoft.com/office/drawing/2014/main" id="{E399D65C-E4A7-043D-F531-2BD80853695B}"/>
+                </a:ext>
+              </a:extLst>
+            </p:cNvPr>
+            <p:cNvPicPr>
+              <a:picLocks noChangeAspect="1"/>
+            </p:cNvPicPr>
+            <p:nvPr/>
+          </p:nvPicPr>
+          <p:blipFill>
+            <a:blip r:embed="rId3">
+              <a:extLst>
+                <a:ext uri="{96DAC541-7B7A-43D3-8B79-37D633B846F1}">
+                  <asvg:svgBlip xmlns:asvg="http://schemas.microsoft.com/office/drawing/2016/SVG/main" r:embed="rId4"/>
+                </a:ext>
+              </a:extLst>
+            </a:blip>
+            <a:stretch>
+              <a:fillRect/>
+            </a:stretch>
+          </p:blipFill>
+          <p:spPr>
+            <a:xfrm>
+              <a:off x="12021905" y="2630321"/>
+              <a:ext cx="455183" cy="455183"/>
+            </a:xfrm>
+            <a:prstGeom prst="rect">
+              <a:avLst/>
+            </a:prstGeom>
+          </p:spPr>
+        </p:pic>
+      </p:grpSp>
+      <p:sp>
+        <p:nvSpPr>
+          <p:cNvPr id="14" name="TextBox 13">
+            <a:extLst>
+              <a:ext uri="{FF2B5EF4-FFF2-40B4-BE49-F238E27FC236}">
+                <a16:creationId xmlns:a16="http://schemas.microsoft.com/office/drawing/2014/main" id="{783F93B9-405A-E5AB-31D7-52BAEDB18327}"/>
+              </a:ext>
+            </a:extLst>
+          </p:cNvPr>
+          <p:cNvSpPr txBox="1"/>
+          <p:nvPr/>
+        </p:nvSpPr>
+        <p:spPr>
+          <a:xfrm>
+            <a:off x="1171066" y="5448205"/>
+            <a:ext cx="9849863" cy="369332"/>
+          </a:xfrm>
+          <a:prstGeom prst="rect">
+            <a:avLst/>
+          </a:prstGeom>
+          <a:solidFill>
+            <a:schemeClr val="tx1"/>
+          </a:solidFill>
+          <a:ln>
+            <a:solidFill>
+              <a:schemeClr val="tx1"/>
+            </a:solidFill>
+          </a:ln>
+        </p:spPr>
+        <p:txBody>
+          <a:bodyPr wrap="square" rtlCol="0">
+            <a:spAutoFit/>
+          </a:bodyPr>
+          <a:lstStyle/>
+          <a:p>
+            <a:r>
+              <a:rPr lang="en-US" b="1" dirty="0">
+                <a:solidFill>
+                  <a:schemeClr val="bg1"/>
+                </a:solidFill>
+                <a:latin typeface="Courier New" pitchFamily="49" charset="0"/>
+                <a:cs typeface="Courier New" pitchFamily="49" charset="0"/>
+              </a:rPr>
+              <a:t>$  </a:t>
+            </a:r>
+            <a:r>
+              <a:rPr lang="en-US" b="1" dirty="0" err="1">
+                <a:solidFill>
+                  <a:schemeClr val="bg1"/>
+                </a:solidFill>
+                <a:latin typeface="Courier New" pitchFamily="49" charset="0"/>
+                <a:cs typeface="Courier New" pitchFamily="49" charset="0"/>
+              </a:rPr>
+              <a:t>dvc</a:t>
+            </a:r>
+            <a:r>
+              <a:rPr lang="en-US" b="1" dirty="0">
+                <a:solidFill>
+                  <a:schemeClr val="bg1"/>
+                </a:solidFill>
+                <a:latin typeface="Courier New" pitchFamily="49" charset="0"/>
+                <a:cs typeface="Courier New" pitchFamily="49" charset="0"/>
+              </a:rPr>
+              <a:t> import  </a:t>
+            </a:r>
+            <a:r>
+              <a:rPr lang="en-US" b="1" dirty="0" err="1">
+                <a:solidFill>
+                  <a:schemeClr val="bg1"/>
+                </a:solidFill>
+                <a:latin typeface="Courier New" pitchFamily="49" charset="0"/>
+                <a:cs typeface="Courier New" pitchFamily="49" charset="0"/>
+                <a:hlinkClick r:id="rId2">
+                  <a:extLst>
+                    <a:ext uri="{A12FA001-AC4F-418D-AE19-62706E023703}">
+                      <ahyp:hlinkClr xmlns:ahyp="http://schemas.microsoft.com/office/drawing/2018/hyperlinkcolor" val="tx"/>
+                    </a:ext>
+                  </a:extLst>
+                </a:hlinkClick>
+              </a:rPr>
+              <a:t>git@github.com:gjbex</a:t>
+            </a:r>
+            <a:r>
+              <a:rPr lang="en-US" b="1" dirty="0">
+                <a:solidFill>
+                  <a:schemeClr val="bg1"/>
+                </a:solidFill>
+                <a:latin typeface="Courier New" pitchFamily="49" charset="0"/>
+                <a:cs typeface="Courier New" pitchFamily="49" charset="0"/>
+                <a:hlinkClick r:id="rId2">
+                  <a:extLst>
+                    <a:ext uri="{A12FA001-AC4F-418D-AE19-62706E023703}">
+                      <ahyp:hlinkClr xmlns:ahyp="http://schemas.microsoft.com/office/drawing/2018/hyperlinkcolor" val="tx"/>
+                    </a:ext>
+                  </a:extLst>
+                </a:hlinkClick>
+              </a:rPr>
+              <a:t>/</a:t>
+            </a:r>
+            <a:r>
+              <a:rPr lang="en-US" b="1" dirty="0" err="1">
+                <a:solidFill>
+                  <a:schemeClr val="bg1"/>
+                </a:solidFill>
+                <a:latin typeface="Courier New" pitchFamily="49" charset="0"/>
+                <a:cs typeface="Courier New" pitchFamily="49" charset="0"/>
+                <a:hlinkClick r:id="rId2">
+                  <a:extLst>
+                    <a:ext uri="{A12FA001-AC4F-418D-AE19-62706E023703}">
+                      <ahyp:hlinkClr xmlns:ahyp="http://schemas.microsoft.com/office/drawing/2018/hyperlinkcolor" val="tx"/>
+                    </a:ext>
+                  </a:extLst>
+                </a:hlinkClick>
+              </a:rPr>
+              <a:t>ml_project.git</a:t>
+            </a:r>
+            <a:r>
+              <a:rPr lang="en-US" b="1" dirty="0">
+                <a:solidFill>
+                  <a:schemeClr val="bg1"/>
+                </a:solidFill>
+                <a:latin typeface="Courier New" pitchFamily="49" charset="0"/>
+                <a:cs typeface="Courier New" pitchFamily="49" charset="0"/>
+              </a:rPr>
+              <a:t>  </a:t>
+            </a:r>
+            <a:r>
+              <a:rPr lang="en-US" b="1" dirty="0" err="1">
+                <a:solidFill>
+                  <a:schemeClr val="bg1"/>
+                </a:solidFill>
+                <a:latin typeface="Courier New" pitchFamily="49" charset="0"/>
+                <a:cs typeface="Courier New" pitchFamily="49" charset="0"/>
+              </a:rPr>
+              <a:t>params.yaml</a:t>
+            </a:r>
+            <a:endParaRPr lang="nl-BE" b="1" dirty="0">
+              <a:solidFill>
+                <a:schemeClr val="bg1"/>
+              </a:solidFill>
+              <a:latin typeface="Courier New" pitchFamily="49" charset="0"/>
+              <a:cs typeface="Courier New" pitchFamily="49" charset="0"/>
+            </a:endParaRPr>
+          </a:p>
+        </p:txBody>
+      </p:sp>
+    </p:spTree>
+    <p:extLst>
+      <p:ext uri="{BB962C8B-B14F-4D97-AF65-F5344CB8AC3E}">
+        <p14:creationId xmlns:p14="http://schemas.microsoft.com/office/powerpoint/2010/main" val="3598636514"/>
+      </p:ext>
+    </p:extLst>
+  </p:cSld>
+  <p:clrMapOvr>
+    <a:masterClrMapping/>
+  </p:clrMapOvr>
+  <p:timing>
+    <p:tnLst>
+      <p:par>
+        <p:cTn id="1" dur="indefinite" restart="never" nodeType="tmRoot">
+          <p:childTnLst>
+            <p:seq concurrent="1" nextAc="seek">
+              <p:cTn id="2" dur="indefinite" nodeType="mainSeq">
+                <p:childTnLst>
+                  <p:par>
+                    <p:cTn id="3" fill="hold">
+                      <p:stCondLst>
+                        <p:cond delay="indefinite"/>
+                        <p:cond evt="onBegin" delay="0">
+                          <p:tn val="2"/>
+                        </p:cond>
+                      </p:stCondLst>
+                      <p:childTnLst>
+                        <p:par>
+                          <p:cTn id="4" fill="hold">
+                            <p:stCondLst>
+                              <p:cond delay="0"/>
+                            </p:stCondLst>
+                            <p:childTnLst>
+                              <p:par>
+                                <p:cTn id="5" presetID="1" presetClass="entr" presetSubtype="0" fill="hold" grpId="0" nodeType="withEffect">
+                                  <p:stCondLst>
+                                    <p:cond delay="0"/>
+                                  </p:stCondLst>
+                                  <p:childTnLst>
+                                    <p:set>
+                                      <p:cBhvr>
+                                        <p:cTn id="6" dur="1" fill="hold">
+                                          <p:stCondLst>
+                                            <p:cond delay="0"/>
+                                          </p:stCondLst>
+                                        </p:cTn>
+                                        <p:tgtEl>
+                                          <p:spTgt spid="5"/>
+                                        </p:tgtEl>
+                                        <p:attrNameLst>
+                                          <p:attrName>style.visibility</p:attrName>
+                                        </p:attrNameLst>
+                                      </p:cBhvr>
+                                      <p:to>
+                                        <p:strVal val="visible"/>
+                                      </p:to>
+                                    </p:set>
+                                  </p:childTnLst>
+                                </p:cTn>
+                              </p:par>
+                              <p:par>
+                                <p:cTn id="7" presetID="1" presetClass="entr" presetSubtype="0" fill="hold" grpId="0" nodeType="withEffect">
+                                  <p:stCondLst>
+                                    <p:cond delay="0"/>
+                                  </p:stCondLst>
+                                  <p:childTnLst>
+                                    <p:set>
+                                      <p:cBhvr>
+                                        <p:cTn id="8" dur="1" fill="hold">
+                                          <p:stCondLst>
+                                            <p:cond delay="0"/>
+                                          </p:stCondLst>
+                                        </p:cTn>
+                                        <p:tgtEl>
+                                          <p:spTgt spid="6"/>
+                                        </p:tgtEl>
+                                        <p:attrNameLst>
+                                          <p:attrName>style.visibility</p:attrName>
+                                        </p:attrNameLst>
+                                      </p:cBhvr>
+                                      <p:to>
+                                        <p:strVal val="visible"/>
+                                      </p:to>
+                                    </p:set>
+                                  </p:childTnLst>
+                                </p:cTn>
+                              </p:par>
+                              <p:par>
+                                <p:cTn id="9" presetID="1" presetClass="entr" presetSubtype="0" fill="hold" grpId="0" nodeType="withEffect">
+                                  <p:stCondLst>
+                                    <p:cond delay="0"/>
+                                  </p:stCondLst>
+                                  <p:childTnLst>
+                                    <p:set>
+                                      <p:cBhvr>
+                                        <p:cTn id="10" dur="1" fill="hold">
+                                          <p:stCondLst>
+                                            <p:cond delay="0"/>
+                                          </p:stCondLst>
+                                        </p:cTn>
+                                        <p:tgtEl>
+                                          <p:spTgt spid="7"/>
+                                        </p:tgtEl>
+                                        <p:attrNameLst>
+                                          <p:attrName>style.visibility</p:attrName>
+                                        </p:attrNameLst>
+                                      </p:cBhvr>
+                                      <p:to>
+                                        <p:strVal val="visible"/>
+                                      </p:to>
+                                    </p:set>
+                                  </p:childTnLst>
+                                </p:cTn>
+                              </p:par>
+                              <p:par>
+                                <p:cTn id="11" presetID="1" presetClass="entr" presetSubtype="0" fill="hold" grpId="0" nodeType="withEffect">
+                                  <p:stCondLst>
+                                    <p:cond delay="0"/>
+                                  </p:stCondLst>
+                                  <p:childTnLst>
+                                    <p:set>
+                                      <p:cBhvr>
+                                        <p:cTn id="12" dur="1" fill="hold">
+                                          <p:stCondLst>
+                                            <p:cond delay="0"/>
+                                          </p:stCondLst>
+                                        </p:cTn>
+                                        <p:tgtEl>
+                                          <p:spTgt spid="14"/>
+                                        </p:tgtEl>
+                                        <p:attrNameLst>
+                                          <p:attrName>style.visibility</p:attrName>
+                                        </p:attrNameLst>
+                                      </p:cBhvr>
+                                      <p:to>
+                                        <p:strVal val="visible"/>
+                                      </p:to>
+                                    </p:set>
+                                  </p:childTnLst>
+                                </p:cTn>
+                              </p:par>
+                            </p:childTnLst>
+                          </p:cTn>
+                        </p:par>
+                      </p:childTnLst>
+                    </p:cTn>
+                  </p:par>
+                </p:childTnLst>
+              </p:cTn>
+              <p:prevCondLst>
+                <p:cond evt="onPrev" delay="0">
+                  <p:tgtEl>
+                    <p:sldTgt/>
+                  </p:tgtEl>
+                </p:cond>
+              </p:prevCondLst>
+              <p:nextCondLst>
+                <p:cond evt="onNext" delay="0">
+                  <p:tgtEl>
+                    <p:sldTgt/>
+                  </p:tgtEl>
+                </p:cond>
+              </p:nextCondLst>
+            </p:seq>
+          </p:childTnLst>
+        </p:cTn>
+      </p:par>
+    </p:tnLst>
+    <p:bldLst>
+      <p:bldP spid="5" grpId="0" animBg="1"/>
+      <p:bldP spid="6" grpId="0" animBg="1"/>
+      <p:bldP spid="7" grpId="0" animBg="1"/>
+      <p:bldP spid="14" grpId="0" animBg="1"/>
+    </p:bldLst>
+  </p:timing>
+</p:sld>
+</file>
+
+<file path=ppt/slides/slide21.xml><?xml version="1.0" encoding="utf-8"?>
+<p:sld xmlns:a="http://schemas.openxmlformats.org/drawingml/2006/main" xmlns:r="http://schemas.openxmlformats.org/officeDocument/2006/relationships" xmlns:p="http://schemas.openxmlformats.org/presentationml/2006/main">
+  <p:cSld>
+    <p:spTree>
+      <p:nvGrpSpPr>
         <p:cNvPr id="1" name="">
           <a:extLst>
             <a:ext uri="{FF2B5EF4-FFF2-40B4-BE49-F238E27FC236}">
@@ -10169,7 +11219,7 @@
           <a:p>
             <a:fld id="{9C7CE217-4467-4B8D-A735-B008FA7C4816}" type="slidenum">
               <a:rPr lang="LID4096" smtClean="0"/>
-              <a:t>20</a:t>
+              <a:t>21</a:t>
             </a:fld>
             <a:endParaRPr lang="LID4096"/>
           </a:p>
@@ -10218,186 +11268,6 @@
 </p:sld>
 </file>
 
-<file path=ppt/slides/slide21.xml><?xml version="1.0" encoding="utf-8"?>
-<p:sld xmlns:a="http://schemas.openxmlformats.org/drawingml/2006/main" xmlns:r="http://schemas.openxmlformats.org/officeDocument/2006/relationships" xmlns:p="http://schemas.openxmlformats.org/presentationml/2006/main">
-  <p:cSld>
-    <p:spTree>
-      <p:nvGrpSpPr>
-        <p:cNvPr id="1" name=""/>
-        <p:cNvGrpSpPr/>
-        <p:nvPr/>
-      </p:nvGrpSpPr>
-      <p:grpSpPr>
-        <a:xfrm>
-          <a:off x="0" y="0"/>
-          <a:ext cx="0" cy="0"/>
-          <a:chOff x="0" y="0"/>
-          <a:chExt cx="0" cy="0"/>
-        </a:xfrm>
-      </p:grpSpPr>
-      <p:sp>
-        <p:nvSpPr>
-          <p:cNvPr id="2" name="Title 1">
-            <a:extLst>
-              <a:ext uri="{FF2B5EF4-FFF2-40B4-BE49-F238E27FC236}">
-                <a16:creationId xmlns:a16="http://schemas.microsoft.com/office/drawing/2014/main" id="{4FE6C2F7-8212-3936-E1EF-AE48A6C87DC1}"/>
-              </a:ext>
-            </a:extLst>
-          </p:cNvPr>
-          <p:cNvSpPr>
-            <a:spLocks noGrp="1"/>
-          </p:cNvSpPr>
-          <p:nvPr>
-            <p:ph type="title"/>
-          </p:nvPr>
-        </p:nvSpPr>
-        <p:spPr/>
-        <p:txBody>
-          <a:bodyPr/>
-          <a:lstStyle/>
-          <a:p>
-            <a:r>
-              <a:rPr lang="en-US" dirty="0"/>
-              <a:t>Data pipelines</a:t>
-            </a:r>
-            <a:endParaRPr lang="LID4096" dirty="0"/>
-          </a:p>
-        </p:txBody>
-      </p:sp>
-      <p:sp>
-        <p:nvSpPr>
-          <p:cNvPr id="3" name="Content Placeholder 2">
-            <a:extLst>
-              <a:ext uri="{FF2B5EF4-FFF2-40B4-BE49-F238E27FC236}">
-                <a16:creationId xmlns:a16="http://schemas.microsoft.com/office/drawing/2014/main" id="{86A9D2A3-E554-9F87-B0F5-BD9269FFCF56}"/>
-              </a:ext>
-            </a:extLst>
-          </p:cNvPr>
-          <p:cNvSpPr>
-            <a:spLocks noGrp="1"/>
-          </p:cNvSpPr>
-          <p:nvPr>
-            <p:ph idx="1"/>
-          </p:nvPr>
-        </p:nvSpPr>
-        <p:spPr/>
-        <p:txBody>
-          <a:bodyPr/>
-          <a:lstStyle/>
-          <a:p>
-            <a:r>
-              <a:rPr lang="en-US" dirty="0"/>
-              <a:t>Pipelines are built from stages</a:t>
-            </a:r>
-          </a:p>
-          <a:p>
-            <a:r>
-              <a:rPr lang="en-US" dirty="0"/>
-              <a:t>Stage has</a:t>
-            </a:r>
-          </a:p>
-          <a:p>
-            <a:pPr lvl="1"/>
-            <a:r>
-              <a:rPr lang="en-US" dirty="0"/>
-              <a:t>Dependencies</a:t>
-            </a:r>
-          </a:p>
-          <a:p>
-            <a:pPr lvl="1"/>
-            <a:r>
-              <a:rPr lang="en-US" dirty="0"/>
-              <a:t>Parameters (optional)</a:t>
-            </a:r>
-          </a:p>
-          <a:p>
-            <a:pPr lvl="1"/>
-            <a:r>
-              <a:rPr lang="en-US" dirty="0"/>
-              <a:t>Metrics (optional)</a:t>
-            </a:r>
-          </a:p>
-          <a:p>
-            <a:pPr lvl="1"/>
-            <a:r>
-              <a:rPr lang="en-US" dirty="0"/>
-              <a:t>Output(s)</a:t>
-            </a:r>
-          </a:p>
-          <a:p>
-            <a:pPr lvl="1"/>
-            <a:r>
-              <a:rPr lang="en-US" dirty="0"/>
-              <a:t>Action (Python/R/Bash/</a:t>
-            </a:r>
-            <a:r>
-              <a:rPr lang="en-US" dirty="0">
-                <a:sym typeface="Symbol" panose="05050102010706020507" pitchFamily="18" charset="2"/>
-              </a:rPr>
-              <a:t></a:t>
-            </a:r>
-            <a:r>
-              <a:rPr lang="en-US" dirty="0"/>
-              <a:t> script)</a:t>
-            </a:r>
-          </a:p>
-          <a:p>
-            <a:r>
-              <a:rPr lang="en-US" dirty="0"/>
-              <a:t>Pipeline is directed acyclic graph (DAG) of stages</a:t>
-            </a:r>
-          </a:p>
-          <a:p>
-            <a:r>
-              <a:rPr lang="en-US" dirty="0"/>
-              <a:t>Stages are cached, only run on changes</a:t>
-            </a:r>
-            <a:endParaRPr lang="LID4096" dirty="0"/>
-          </a:p>
-        </p:txBody>
-      </p:sp>
-      <p:sp>
-        <p:nvSpPr>
-          <p:cNvPr id="4" name="Slide Number Placeholder 3">
-            <a:extLst>
-              <a:ext uri="{FF2B5EF4-FFF2-40B4-BE49-F238E27FC236}">
-                <a16:creationId xmlns:a16="http://schemas.microsoft.com/office/drawing/2014/main" id="{595F0DD9-43F3-25A1-C77A-743F21AAF249}"/>
-              </a:ext>
-            </a:extLst>
-          </p:cNvPr>
-          <p:cNvSpPr>
-            <a:spLocks noGrp="1"/>
-          </p:cNvSpPr>
-          <p:nvPr>
-            <p:ph type="sldNum" sz="quarter" idx="12"/>
-          </p:nvPr>
-        </p:nvSpPr>
-        <p:spPr/>
-        <p:txBody>
-          <a:bodyPr/>
-          <a:lstStyle/>
-          <a:p>
-            <a:fld id="{9C7CE217-4467-4B8D-A735-B008FA7C4816}" type="slidenum">
-              <a:rPr lang="LID4096" smtClean="0"/>
-              <a:t>21</a:t>
-            </a:fld>
-            <a:endParaRPr lang="LID4096"/>
-          </a:p>
-        </p:txBody>
-      </p:sp>
-    </p:spTree>
-    <p:extLst>
-      <p:ext uri="{BB962C8B-B14F-4D97-AF65-F5344CB8AC3E}">
-        <p14:creationId xmlns:p14="http://schemas.microsoft.com/office/powerpoint/2010/main" val="2970041939"/>
-      </p:ext>
-    </p:extLst>
-  </p:cSld>
-  <p:clrMapOvr>
-    <a:masterClrMapping/>
-  </p:clrMapOvr>
-</p:sld>
-</file>
-
 <file path=ppt/slides/slide22.xml><?xml version="1.0" encoding="utf-8"?>
 <p:sld xmlns:a="http://schemas.openxmlformats.org/drawingml/2006/main" xmlns:r="http://schemas.openxmlformats.org/officeDocument/2006/relationships" xmlns:p="http://schemas.openxmlformats.org/presentationml/2006/main">
   <p:cSld>
@@ -10420,7 +11290,7 @@
           <p:cNvPr id="2" name="Title 1">
             <a:extLst>
               <a:ext uri="{FF2B5EF4-FFF2-40B4-BE49-F238E27FC236}">
-                <a16:creationId xmlns:a16="http://schemas.microsoft.com/office/drawing/2014/main" id="{DF82EBDC-A35E-10B5-BCBE-4623DF9E4931}"/>
+                <a16:creationId xmlns:a16="http://schemas.microsoft.com/office/drawing/2014/main" id="{4FE6C2F7-8212-3936-E1EF-AE48A6C87DC1}"/>
               </a:ext>
             </a:extLst>
           </p:cNvPr>
@@ -10438,7 +11308,99 @@
           <a:p>
             <a:r>
               <a:rPr lang="en-US" dirty="0"/>
-              <a:t>Add stage</a:t>
+              <a:t>Data pipelines</a:t>
+            </a:r>
+            <a:endParaRPr lang="LID4096" dirty="0"/>
+          </a:p>
+        </p:txBody>
+      </p:sp>
+      <p:sp>
+        <p:nvSpPr>
+          <p:cNvPr id="3" name="Content Placeholder 2">
+            <a:extLst>
+              <a:ext uri="{FF2B5EF4-FFF2-40B4-BE49-F238E27FC236}">
+                <a16:creationId xmlns:a16="http://schemas.microsoft.com/office/drawing/2014/main" id="{86A9D2A3-E554-9F87-B0F5-BD9269FFCF56}"/>
+              </a:ext>
+            </a:extLst>
+          </p:cNvPr>
+          <p:cNvSpPr>
+            <a:spLocks noGrp="1"/>
+          </p:cNvSpPr>
+          <p:nvPr>
+            <p:ph idx="1"/>
+          </p:nvPr>
+        </p:nvSpPr>
+        <p:spPr/>
+        <p:txBody>
+          <a:bodyPr/>
+          <a:lstStyle/>
+          <a:p>
+            <a:r>
+              <a:rPr lang="en-US" dirty="0"/>
+              <a:t>Pipelines are built from stages</a:t>
+            </a:r>
+          </a:p>
+          <a:p>
+            <a:r>
+              <a:rPr lang="en-US" dirty="0"/>
+              <a:t>Stage has</a:t>
+            </a:r>
+          </a:p>
+          <a:p>
+            <a:pPr lvl="1"/>
+            <a:r>
+              <a:rPr lang="en-US" dirty="0"/>
+              <a:t>Dependencies</a:t>
+            </a:r>
+          </a:p>
+          <a:p>
+            <a:pPr lvl="1"/>
+            <a:r>
+              <a:rPr lang="en-US" dirty="0"/>
+              <a:t>Parameters (optional)</a:t>
+            </a:r>
+          </a:p>
+          <a:p>
+            <a:pPr lvl="1"/>
+            <a:r>
+              <a:rPr lang="en-US" dirty="0"/>
+              <a:t>Metrics (optional)</a:t>
+            </a:r>
+          </a:p>
+          <a:p>
+            <a:pPr lvl="1"/>
+            <a:r>
+              <a:rPr lang="en-US" dirty="0"/>
+              <a:t>Output(s)</a:t>
+            </a:r>
+          </a:p>
+          <a:p>
+            <a:pPr lvl="1"/>
+            <a:r>
+              <a:rPr lang="en-US" dirty="0"/>
+              <a:t>Action (Python/R/Bash/</a:t>
+            </a:r>
+            <a:r>
+              <a:rPr lang="en-US" dirty="0">
+                <a:sym typeface="Symbol" panose="05050102010706020507" pitchFamily="18" charset="2"/>
+              </a:rPr>
+              <a:t></a:t>
+            </a:r>
+            <a:r>
+              <a:rPr lang="en-US" dirty="0"/>
+              <a:t> script)</a:t>
+            </a:r>
+          </a:p>
+          <a:p>
+            <a:r>
+              <a:rPr lang="en-US" dirty="0"/>
+              <a:t>Pipeline is directed acyclic graph (DAG) of stages</a:t>
+            </a:r>
+          </a:p>
+          <a:p>
+            <a:r>
+              <a:rPr lang="en-US" dirty="0"/>
+              <a:t>Stages are cached, only run on changes</a:t>
             </a:r>
             <a:endParaRPr lang="LID4096" dirty="0"/>
           </a:p>
@@ -10449,7 +11411,7 @@
           <p:cNvPr id="4" name="Slide Number Placeholder 3">
             <a:extLst>
               <a:ext uri="{FF2B5EF4-FFF2-40B4-BE49-F238E27FC236}">
-                <a16:creationId xmlns:a16="http://schemas.microsoft.com/office/drawing/2014/main" id="{65CA1B04-20D1-7547-7CC3-FCCEBB20CF28}"/>
+                <a16:creationId xmlns:a16="http://schemas.microsoft.com/office/drawing/2014/main" id="{595F0DD9-43F3-25A1-C77A-743F21AAF249}"/>
               </a:ext>
             </a:extLst>
           </p:cNvPr>
@@ -10468,6 +11430,94 @@
             <a:fld id="{9C7CE217-4467-4B8D-A735-B008FA7C4816}" type="slidenum">
               <a:rPr lang="LID4096" smtClean="0"/>
               <a:t>22</a:t>
+            </a:fld>
+            <a:endParaRPr lang="LID4096"/>
+          </a:p>
+        </p:txBody>
+      </p:sp>
+    </p:spTree>
+    <p:extLst>
+      <p:ext uri="{BB962C8B-B14F-4D97-AF65-F5344CB8AC3E}">
+        <p14:creationId xmlns:p14="http://schemas.microsoft.com/office/powerpoint/2010/main" val="2970041939"/>
+      </p:ext>
+    </p:extLst>
+  </p:cSld>
+  <p:clrMapOvr>
+    <a:masterClrMapping/>
+  </p:clrMapOvr>
+</p:sld>
+</file>
+
+<file path=ppt/slides/slide23.xml><?xml version="1.0" encoding="utf-8"?>
+<p:sld xmlns:a="http://schemas.openxmlformats.org/drawingml/2006/main" xmlns:r="http://schemas.openxmlformats.org/officeDocument/2006/relationships" xmlns:p="http://schemas.openxmlformats.org/presentationml/2006/main">
+  <p:cSld>
+    <p:spTree>
+      <p:nvGrpSpPr>
+        <p:cNvPr id="1" name=""/>
+        <p:cNvGrpSpPr/>
+        <p:nvPr/>
+      </p:nvGrpSpPr>
+      <p:grpSpPr>
+        <a:xfrm>
+          <a:off x="0" y="0"/>
+          <a:ext cx="0" cy="0"/>
+          <a:chOff x="0" y="0"/>
+          <a:chExt cx="0" cy="0"/>
+        </a:xfrm>
+      </p:grpSpPr>
+      <p:sp>
+        <p:nvSpPr>
+          <p:cNvPr id="2" name="Title 1">
+            <a:extLst>
+              <a:ext uri="{FF2B5EF4-FFF2-40B4-BE49-F238E27FC236}">
+                <a16:creationId xmlns:a16="http://schemas.microsoft.com/office/drawing/2014/main" id="{DF82EBDC-A35E-10B5-BCBE-4623DF9E4931}"/>
+              </a:ext>
+            </a:extLst>
+          </p:cNvPr>
+          <p:cNvSpPr>
+            <a:spLocks noGrp="1"/>
+          </p:cNvSpPr>
+          <p:nvPr>
+            <p:ph type="title"/>
+          </p:nvPr>
+        </p:nvSpPr>
+        <p:spPr/>
+        <p:txBody>
+          <a:bodyPr/>
+          <a:lstStyle/>
+          <a:p>
+            <a:r>
+              <a:rPr lang="en-US" dirty="0"/>
+              <a:t>Add stage</a:t>
+            </a:r>
+            <a:endParaRPr lang="LID4096" dirty="0"/>
+          </a:p>
+        </p:txBody>
+      </p:sp>
+      <p:sp>
+        <p:nvSpPr>
+          <p:cNvPr id="4" name="Slide Number Placeholder 3">
+            <a:extLst>
+              <a:ext uri="{FF2B5EF4-FFF2-40B4-BE49-F238E27FC236}">
+                <a16:creationId xmlns:a16="http://schemas.microsoft.com/office/drawing/2014/main" id="{65CA1B04-20D1-7547-7CC3-FCCEBB20CF28}"/>
+              </a:ext>
+            </a:extLst>
+          </p:cNvPr>
+          <p:cNvSpPr>
+            <a:spLocks noGrp="1"/>
+          </p:cNvSpPr>
+          <p:nvPr>
+            <p:ph type="sldNum" sz="quarter" idx="12"/>
+          </p:nvPr>
+        </p:nvSpPr>
+        <p:spPr/>
+        <p:txBody>
+          <a:bodyPr/>
+          <a:lstStyle/>
+          <a:p>
+            <a:fld id="{9C7CE217-4467-4B8D-A735-B008FA7C4816}" type="slidenum">
+              <a:rPr lang="LID4096" smtClean="0"/>
+              <a:t>23</a:t>
             </a:fld>
             <a:endParaRPr lang="LID4096"/>
           </a:p>
@@ -12187,7 +13237,7 @@
 </p:sld>
 </file>
 
-<file path=ppt/slides/slide23.xml><?xml version="1.0" encoding="utf-8"?>
+<file path=ppt/slides/slide24.xml><?xml version="1.0" encoding="utf-8"?>
 <p:sld xmlns:a="http://schemas.openxmlformats.org/drawingml/2006/main" xmlns:r="http://schemas.openxmlformats.org/officeDocument/2006/relationships" xmlns:p="http://schemas.openxmlformats.org/presentationml/2006/main">
   <p:cSld>
     <p:spTree>
@@ -12316,7 +13366,7 @@
           <a:p>
             <a:fld id="{9C7CE217-4467-4B8D-A735-B008FA7C4816}" type="slidenum">
               <a:rPr lang="LID4096" smtClean="0"/>
-              <a:t>23</a:t>
+              <a:t>24</a:t>
             </a:fld>
             <a:endParaRPr lang="LID4096"/>
           </a:p>
@@ -13276,7 +14326,7 @@
 </p:sld>
 </file>
 
-<file path=ppt/slides/slide24.xml><?xml version="1.0" encoding="utf-8"?>
+<file path=ppt/slides/slide25.xml><?xml version="1.0" encoding="utf-8"?>
 <p:sld xmlns:a="http://schemas.openxmlformats.org/drawingml/2006/main" xmlns:r="http://schemas.openxmlformats.org/officeDocument/2006/relationships" xmlns:p="http://schemas.openxmlformats.org/presentationml/2006/main">
   <p:cSld>
     <p:spTree>
@@ -13351,7 +14401,7 @@
           <a:p>
             <a:fld id="{9C7CE217-4467-4B8D-A735-B008FA7C4816}" type="slidenum">
               <a:rPr lang="LID4096" smtClean="0"/>
-              <a:t>24</a:t>
+              <a:t>25</a:t>
             </a:fld>
             <a:endParaRPr lang="LID4096"/>
           </a:p>
@@ -14947,7 +15997,7 @@
 </p:sld>
 </file>
 
-<file path=ppt/slides/slide25.xml><?xml version="1.0" encoding="utf-8"?>
+<file path=ppt/slides/slide26.xml><?xml version="1.0" encoding="utf-8"?>
 <p:sld xmlns:a="http://schemas.openxmlformats.org/drawingml/2006/main" xmlns:r="http://schemas.openxmlformats.org/officeDocument/2006/relationships" xmlns:p="http://schemas.openxmlformats.org/presentationml/2006/main">
   <p:cSld>
     <p:spTree>
@@ -15022,7 +16072,7 @@
           <a:p>
             <a:fld id="{9C7CE217-4467-4B8D-A735-B008FA7C4816}" type="slidenum">
               <a:rPr lang="LID4096" smtClean="0"/>
-              <a:t>25</a:t>
+              <a:t>26</a:t>
             </a:fld>
             <a:endParaRPr lang="LID4096"/>
           </a:p>
@@ -16361,7 +17411,7 @@
 </p:sld>
 </file>
 
-<file path=ppt/slides/slide26.xml><?xml version="1.0" encoding="utf-8"?>
+<file path=ppt/slides/slide27.xml><?xml version="1.0" encoding="utf-8"?>
 <p:sld xmlns:a="http://schemas.openxmlformats.org/drawingml/2006/main" xmlns:r="http://schemas.openxmlformats.org/officeDocument/2006/relationships" xmlns:p="http://schemas.openxmlformats.org/presentationml/2006/main">
   <p:cSld>
     <p:spTree>
@@ -16496,7 +17546,7 @@
           <a:p>
             <a:fld id="{9C7CE217-4467-4B8D-A735-B008FA7C4816}" type="slidenum">
               <a:rPr lang="LID4096" smtClean="0"/>
-              <a:t>26</a:t>
+              <a:t>27</a:t>
             </a:fld>
             <a:endParaRPr lang="LID4096"/>
           </a:p>
@@ -17151,7 +18201,7 @@
 </p:sld>
 </file>
 
-<file path=ppt/slides/slide27.xml><?xml version="1.0" encoding="utf-8"?>
+<file path=ppt/slides/slide28.xml><?xml version="1.0" encoding="utf-8"?>
 <p:sld xmlns:a="http://schemas.openxmlformats.org/drawingml/2006/main" xmlns:r="http://schemas.openxmlformats.org/officeDocument/2006/relationships" xmlns:p="http://schemas.openxmlformats.org/presentationml/2006/main">
   <p:cSld>
     <p:spTree>
@@ -17318,7 +18368,7 @@
           <a:p>
             <a:fld id="{9C7CE217-4467-4B8D-A735-B008FA7C4816}" type="slidenum">
               <a:rPr lang="LID4096" smtClean="0"/>
-              <a:t>27</a:t>
+              <a:t>28</a:t>
             </a:fld>
             <a:endParaRPr lang="LID4096"/>
           </a:p>
@@ -17994,7 +19044,7 @@
 </p:sld>
 </file>
 
-<file path=ppt/slides/slide28.xml><?xml version="1.0" encoding="utf-8"?>
+<file path=ppt/slides/slide29.xml><?xml version="1.0" encoding="utf-8"?>
 <p:sld xmlns:a="http://schemas.openxmlformats.org/drawingml/2006/main" xmlns:r="http://schemas.openxmlformats.org/officeDocument/2006/relationships" xmlns:p="http://schemas.openxmlformats.org/presentationml/2006/main">
   <p:cSld>
     <p:spTree>
@@ -18118,7 +19168,7 @@
           <a:p>
             <a:fld id="{9C7CE217-4467-4B8D-A735-B008FA7C4816}" type="slidenum">
               <a:rPr lang="LID4096" smtClean="0"/>
-              <a:t>28</a:t>
+              <a:t>29</a:t>
             </a:fld>
             <a:endParaRPr lang="LID4096"/>
           </a:p>
@@ -18708,7 +19758,102 @@
 </p:sld>
 </file>
 
-<file path=ppt/slides/slide29.xml><?xml version="1.0" encoding="utf-8"?>
+<file path=ppt/slides/slide3.xml><?xml version="1.0" encoding="utf-8"?>
+<p:sld xmlns:a="http://schemas.openxmlformats.org/drawingml/2006/main" xmlns:r="http://schemas.openxmlformats.org/officeDocument/2006/relationships" xmlns:p="http://schemas.openxmlformats.org/presentationml/2006/main">
+  <p:cSld>
+    <p:spTree>
+      <p:nvGrpSpPr>
+        <p:cNvPr id="1" name=""/>
+        <p:cNvGrpSpPr/>
+        <p:nvPr/>
+      </p:nvGrpSpPr>
+      <p:grpSpPr>
+        <a:xfrm>
+          <a:off x="0" y="0"/>
+          <a:ext cx="0" cy="0"/>
+          <a:chOff x="0" y="0"/>
+          <a:chExt cx="0" cy="0"/>
+        </a:xfrm>
+      </p:grpSpPr>
+      <p:pic>
+        <p:nvPicPr>
+          <p:cNvPr id="3" name="Picture 2" descr="Qr code&#10;&#10;Description automatically generated">
+            <a:extLst>
+              <a:ext uri="{FF2B5EF4-FFF2-40B4-BE49-F238E27FC236}">
+                <a16:creationId xmlns:a16="http://schemas.microsoft.com/office/drawing/2014/main" id="{73A4FCC5-DC3D-4500-9780-EECF84D9A9C9}"/>
+              </a:ext>
+            </a:extLst>
+          </p:cNvPr>
+          <p:cNvPicPr>
+            <a:picLocks noChangeAspect="1"/>
+          </p:cNvPicPr>
+          <p:nvPr/>
+        </p:nvPicPr>
+        <p:blipFill>
+          <a:blip r:embed="rId2">
+            <a:extLst>
+              <a:ext uri="{28A0092B-C50C-407E-A947-70E740481C1C}">
+                <a14:useLocalDpi xmlns:a14="http://schemas.microsoft.com/office/drawing/2010/main" val="0"/>
+              </a:ext>
+            </a:extLst>
+          </a:blip>
+          <a:stretch>
+            <a:fillRect/>
+          </a:stretch>
+        </p:blipFill>
+        <p:spPr>
+          <a:xfrm>
+            <a:off x="0" y="0"/>
+            <a:ext cx="12192000" cy="6858000"/>
+          </a:xfrm>
+          <a:prstGeom prst="rect">
+            <a:avLst/>
+          </a:prstGeom>
+        </p:spPr>
+      </p:pic>
+      <p:sp>
+        <p:nvSpPr>
+          <p:cNvPr id="2" name="Slide Number Placeholder 1">
+            <a:extLst>
+              <a:ext uri="{FF2B5EF4-FFF2-40B4-BE49-F238E27FC236}">
+                <a16:creationId xmlns:a16="http://schemas.microsoft.com/office/drawing/2014/main" id="{F570AEBC-58DC-06FC-AE67-813A2E7C9CA8}"/>
+              </a:ext>
+            </a:extLst>
+          </p:cNvPr>
+          <p:cNvSpPr>
+            <a:spLocks noGrp="1"/>
+          </p:cNvSpPr>
+          <p:nvPr>
+            <p:ph type="sldNum" sz="quarter" idx="12"/>
+          </p:nvPr>
+        </p:nvSpPr>
+        <p:spPr/>
+        <p:txBody>
+          <a:bodyPr/>
+          <a:lstStyle/>
+          <a:p>
+            <a:fld id="{9C7CE217-4467-4B8D-A735-B008FA7C4816}" type="slidenum">
+              <a:rPr lang="LID4096" smtClean="0"/>
+              <a:t>3</a:t>
+            </a:fld>
+            <a:endParaRPr lang="LID4096"/>
+          </a:p>
+        </p:txBody>
+      </p:sp>
+    </p:spTree>
+    <p:extLst>
+      <p:ext uri="{BB962C8B-B14F-4D97-AF65-F5344CB8AC3E}">
+        <p14:creationId xmlns:p14="http://schemas.microsoft.com/office/powerpoint/2010/main" val="2488509471"/>
+      </p:ext>
+    </p:extLst>
+  </p:cSld>
+  <p:clrMapOvr>
+    <a:masterClrMapping/>
+  </p:clrMapOvr>
+</p:sld>
+</file>
+
+<file path=ppt/slides/slide30.xml><?xml version="1.0" encoding="utf-8"?>
 <p:sld xmlns:a="http://schemas.openxmlformats.org/drawingml/2006/main" xmlns:r="http://schemas.openxmlformats.org/officeDocument/2006/relationships" xmlns:p="http://schemas.openxmlformats.org/presentationml/2006/main">
   <p:cSld>
     <p:spTree>
@@ -18806,7 +19951,7 @@
           <a:p>
             <a:fld id="{9C7CE217-4467-4B8D-A735-B008FA7C4816}" type="slidenum">
               <a:rPr lang="LID4096" smtClean="0"/>
-              <a:t>29</a:t>
+              <a:t>30</a:t>
             </a:fld>
             <a:endParaRPr lang="LID4096"/>
           </a:p>
@@ -19237,102 +20382,7 @@
 </p:sld>
 </file>
 
-<file path=ppt/slides/slide3.xml><?xml version="1.0" encoding="utf-8"?>
-<p:sld xmlns:a="http://schemas.openxmlformats.org/drawingml/2006/main" xmlns:r="http://schemas.openxmlformats.org/officeDocument/2006/relationships" xmlns:p="http://schemas.openxmlformats.org/presentationml/2006/main">
-  <p:cSld>
-    <p:spTree>
-      <p:nvGrpSpPr>
-        <p:cNvPr id="1" name=""/>
-        <p:cNvGrpSpPr/>
-        <p:nvPr/>
-      </p:nvGrpSpPr>
-      <p:grpSpPr>
-        <a:xfrm>
-          <a:off x="0" y="0"/>
-          <a:ext cx="0" cy="0"/>
-          <a:chOff x="0" y="0"/>
-          <a:chExt cx="0" cy="0"/>
-        </a:xfrm>
-      </p:grpSpPr>
-      <p:pic>
-        <p:nvPicPr>
-          <p:cNvPr id="3" name="Picture 2" descr="Qr code&#10;&#10;Description automatically generated">
-            <a:extLst>
-              <a:ext uri="{FF2B5EF4-FFF2-40B4-BE49-F238E27FC236}">
-                <a16:creationId xmlns:a16="http://schemas.microsoft.com/office/drawing/2014/main" id="{73A4FCC5-DC3D-4500-9780-EECF84D9A9C9}"/>
-              </a:ext>
-            </a:extLst>
-          </p:cNvPr>
-          <p:cNvPicPr>
-            <a:picLocks noChangeAspect="1"/>
-          </p:cNvPicPr>
-          <p:nvPr/>
-        </p:nvPicPr>
-        <p:blipFill>
-          <a:blip r:embed="rId2">
-            <a:extLst>
-              <a:ext uri="{28A0092B-C50C-407E-A947-70E740481C1C}">
-                <a14:useLocalDpi xmlns:a14="http://schemas.microsoft.com/office/drawing/2010/main" val="0"/>
-              </a:ext>
-            </a:extLst>
-          </a:blip>
-          <a:stretch>
-            <a:fillRect/>
-          </a:stretch>
-        </p:blipFill>
-        <p:spPr>
-          <a:xfrm>
-            <a:off x="0" y="0"/>
-            <a:ext cx="12192000" cy="6858000"/>
-          </a:xfrm>
-          <a:prstGeom prst="rect">
-            <a:avLst/>
-          </a:prstGeom>
-        </p:spPr>
-      </p:pic>
-      <p:sp>
-        <p:nvSpPr>
-          <p:cNvPr id="2" name="Slide Number Placeholder 1">
-            <a:extLst>
-              <a:ext uri="{FF2B5EF4-FFF2-40B4-BE49-F238E27FC236}">
-                <a16:creationId xmlns:a16="http://schemas.microsoft.com/office/drawing/2014/main" id="{F570AEBC-58DC-06FC-AE67-813A2E7C9CA8}"/>
-              </a:ext>
-            </a:extLst>
-          </p:cNvPr>
-          <p:cNvSpPr>
-            <a:spLocks noGrp="1"/>
-          </p:cNvSpPr>
-          <p:nvPr>
-            <p:ph type="sldNum" sz="quarter" idx="12"/>
-          </p:nvPr>
-        </p:nvSpPr>
-        <p:spPr/>
-        <p:txBody>
-          <a:bodyPr/>
-          <a:lstStyle/>
-          <a:p>
-            <a:fld id="{9C7CE217-4467-4B8D-A735-B008FA7C4816}" type="slidenum">
-              <a:rPr lang="LID4096" smtClean="0"/>
-              <a:t>3</a:t>
-            </a:fld>
-            <a:endParaRPr lang="LID4096"/>
-          </a:p>
-        </p:txBody>
-      </p:sp>
-    </p:spTree>
-    <p:extLst>
-      <p:ext uri="{BB962C8B-B14F-4D97-AF65-F5344CB8AC3E}">
-        <p14:creationId xmlns:p14="http://schemas.microsoft.com/office/powerpoint/2010/main" val="2488509471"/>
-      </p:ext>
-    </p:extLst>
-  </p:cSld>
-  <p:clrMapOvr>
-    <a:masterClrMapping/>
-  </p:clrMapOvr>
-</p:sld>
-</file>
-
-<file path=ppt/slides/slide30.xml><?xml version="1.0" encoding="utf-8"?>
+<file path=ppt/slides/slide31.xml><?xml version="1.0" encoding="utf-8"?>
 <p:sld xmlns:a="http://schemas.openxmlformats.org/drawingml/2006/main" xmlns:r="http://schemas.openxmlformats.org/officeDocument/2006/relationships" xmlns:p="http://schemas.openxmlformats.org/presentationml/2006/main">
   <p:cSld>
     <p:spTree>
@@ -19448,7 +20498,7 @@
           <a:p>
             <a:fld id="{9C7CE217-4467-4B8D-A735-B008FA7C4816}" type="slidenum">
               <a:rPr lang="LID4096" smtClean="0"/>
-              <a:t>30</a:t>
+              <a:t>31</a:t>
             </a:fld>
             <a:endParaRPr lang="LID4096"/>
           </a:p>
@@ -19886,7 +20936,7 @@
 </p:sld>
 </file>
 
-<file path=ppt/slides/slide31.xml><?xml version="1.0" encoding="utf-8"?>
+<file path=ppt/slides/slide32.xml><?xml version="1.0" encoding="utf-8"?>
 <p:sld xmlns:a="http://schemas.openxmlformats.org/drawingml/2006/main" xmlns:r="http://schemas.openxmlformats.org/officeDocument/2006/relationships" xmlns:p="http://schemas.openxmlformats.org/presentationml/2006/main">
   <p:cSld>
     <p:spTree>
@@ -20002,7 +21052,7 @@
           <a:p>
             <a:fld id="{9C7CE217-4467-4B8D-A735-B008FA7C4816}" type="slidenum">
               <a:rPr lang="LID4096" smtClean="0"/>
-              <a:t>31</a:t>
+              <a:t>32</a:t>
             </a:fld>
             <a:endParaRPr lang="LID4096"/>
           </a:p>
@@ -20300,7 +21350,7 @@
 </p:sld>
 </file>
 
-<file path=ppt/slides/slide32.xml><?xml version="1.0" encoding="utf-8"?>
+<file path=ppt/slides/slide33.xml><?xml version="1.0" encoding="utf-8"?>
 <p:sld xmlns:a="http://schemas.openxmlformats.org/drawingml/2006/main" xmlns:r="http://schemas.openxmlformats.org/officeDocument/2006/relationships" xmlns:p="http://schemas.openxmlformats.org/presentationml/2006/main">
   <p:cSld>
     <p:spTree>
@@ -20404,7 +21454,7 @@
           <a:p>
             <a:fld id="{9C7CE217-4467-4B8D-A735-B008FA7C4816}" type="slidenum">
               <a:rPr lang="LID4096" smtClean="0"/>
-              <a:t>32</a:t>
+              <a:t>33</a:t>
             </a:fld>
             <a:endParaRPr lang="LID4096"/>
           </a:p>
@@ -20453,7 +21503,7 @@
 </p:sld>
 </file>
 
-<file path=ppt/slides/slide33.xml><?xml version="1.0" encoding="utf-8"?>
+<file path=ppt/slides/slide34.xml><?xml version="1.0" encoding="utf-8"?>
 <p:sld xmlns:a="http://schemas.openxmlformats.org/drawingml/2006/main" xmlns:r="http://schemas.openxmlformats.org/officeDocument/2006/relationships" xmlns:p="http://schemas.openxmlformats.org/presentationml/2006/main">
   <p:cSld>
     <p:spTree>
@@ -20614,7 +21664,7 @@
           <a:p>
             <a:fld id="{9C7CE217-4467-4B8D-A735-B008FA7C4816}" type="slidenum">
               <a:rPr lang="LID4096" smtClean="0"/>
-              <a:t>33</a:t>
+              <a:t>34</a:t>
             </a:fld>
             <a:endParaRPr lang="LID4096"/>
           </a:p>
@@ -20633,7 +21683,7 @@
 </p:sld>
 </file>
 
-<file path=ppt/slides/slide34.xml><?xml version="1.0" encoding="utf-8"?>
+<file path=ppt/slides/slide35.xml><?xml version="1.0" encoding="utf-8"?>
 <p:sld xmlns:a="http://schemas.openxmlformats.org/drawingml/2006/main" xmlns:r="http://schemas.openxmlformats.org/officeDocument/2006/relationships" xmlns:p="http://schemas.openxmlformats.org/presentationml/2006/main">
   <p:cSld>
     <p:spTree>
@@ -20706,7 +21756,7 @@
           <a:p>
             <a:fld id="{9C7CE217-4467-4B8D-A735-B008FA7C4816}" type="slidenum">
               <a:rPr lang="LID4096" smtClean="0"/>
-              <a:t>34</a:t>
+              <a:t>35</a:t>
             </a:fld>
             <a:endParaRPr lang="LID4096"/>
           </a:p>
@@ -21472,7 +22522,7 @@
 </p:sld>
 </file>
 
-<file path=ppt/slides/slide35.xml><?xml version="1.0" encoding="utf-8"?>
+<file path=ppt/slides/slide36.xml><?xml version="1.0" encoding="utf-8"?>
 <p:sld xmlns:a="http://schemas.openxmlformats.org/drawingml/2006/main" xmlns:r="http://schemas.openxmlformats.org/officeDocument/2006/relationships" xmlns:p="http://schemas.openxmlformats.org/presentationml/2006/main">
   <p:cSld>
     <p:spTree>
@@ -21677,7 +22727,7 @@
           <a:p>
             <a:fld id="{9C7CE217-4467-4B8D-A735-B008FA7C4816}" type="slidenum">
               <a:rPr lang="LID4096" smtClean="0"/>
-              <a:t>35</a:t>
+              <a:t>36</a:t>
             </a:fld>
             <a:endParaRPr lang="LID4096"/>
           </a:p>
@@ -21696,7 +22746,7 @@
 </p:sld>
 </file>
 
-<file path=ppt/slides/slide36.xml><?xml version="1.0" encoding="utf-8"?>
+<file path=ppt/slides/slide37.xml><?xml version="1.0" encoding="utf-8"?>
 <p:sld xmlns:a="http://schemas.openxmlformats.org/drawingml/2006/main" xmlns:r="http://schemas.openxmlformats.org/officeDocument/2006/relationships" xmlns:p="http://schemas.openxmlformats.org/presentationml/2006/main">
   <p:cSld>
     <p:spTree>
@@ -21795,7 +22845,7 @@
           <a:p>
             <a:fld id="{9C7CE217-4467-4B8D-A735-B008FA7C4816}" type="slidenum">
               <a:rPr lang="LID4096" smtClean="0"/>
-              <a:t>36</a:t>
+              <a:t>37</a:t>
             </a:fld>
             <a:endParaRPr lang="LID4096"/>
           </a:p>
@@ -22379,7 +23429,7 @@
 </p:sld>
 </file>
 
-<file path=ppt/slides/slide37.xml><?xml version="1.0" encoding="utf-8"?>
+<file path=ppt/slides/slide38.xml><?xml version="1.0" encoding="utf-8"?>
 <p:sld xmlns:a="http://schemas.openxmlformats.org/drawingml/2006/main" xmlns:r="http://schemas.openxmlformats.org/officeDocument/2006/relationships" xmlns:p="http://schemas.openxmlformats.org/presentationml/2006/main">
   <p:cSld>
     <p:spTree>
@@ -22515,7 +23565,7 @@
           <a:p>
             <a:fld id="{9C7CE217-4467-4B8D-A735-B008FA7C4816}" type="slidenum">
               <a:rPr lang="LID4096" smtClean="0"/>
-              <a:t>37</a:t>
+              <a:t>38</a:t>
             </a:fld>
             <a:endParaRPr lang="LID4096"/>
           </a:p>
@@ -23142,7 +24192,7 @@
 </p:sld>
 </file>
 
-<file path=ppt/slides/slide38.xml><?xml version="1.0" encoding="utf-8"?>
+<file path=ppt/slides/slide39.xml><?xml version="1.0" encoding="utf-8"?>
 <p:sld xmlns:a="http://schemas.openxmlformats.org/drawingml/2006/main" xmlns:r="http://schemas.openxmlformats.org/officeDocument/2006/relationships" xmlns:p="http://schemas.openxmlformats.org/presentationml/2006/main">
   <p:cSld>
     <p:spTree>
@@ -23346,7 +24396,7 @@
           <a:p>
             <a:fld id="{9C7CE217-4467-4B8D-A735-B008FA7C4816}" type="slidenum">
               <a:rPr lang="LID4096" smtClean="0"/>
-              <a:t>38</a:t>
+              <a:t>39</a:t>
             </a:fld>
             <a:endParaRPr lang="LID4096"/>
           </a:p>
@@ -23596,598 +24646,6 @@
     </p:tnLst>
     <p:bldLst>
       <p:bldP spid="7" grpId="0" animBg="1"/>
-    </p:bldLst>
-  </p:timing>
-</p:sld>
-</file>
-
-<file path=ppt/slides/slide39.xml><?xml version="1.0" encoding="utf-8"?>
-<p:sld xmlns:a="http://schemas.openxmlformats.org/drawingml/2006/main" xmlns:r="http://schemas.openxmlformats.org/officeDocument/2006/relationships" xmlns:p="http://schemas.openxmlformats.org/presentationml/2006/main">
-  <p:cSld>
-    <p:spTree>
-      <p:nvGrpSpPr>
-        <p:cNvPr id="1" name=""/>
-        <p:cNvGrpSpPr/>
-        <p:nvPr/>
-      </p:nvGrpSpPr>
-      <p:grpSpPr>
-        <a:xfrm>
-          <a:off x="0" y="0"/>
-          <a:ext cx="0" cy="0"/>
-          <a:chOff x="0" y="0"/>
-          <a:chExt cx="0" cy="0"/>
-        </a:xfrm>
-      </p:grpSpPr>
-      <p:sp>
-        <p:nvSpPr>
-          <p:cNvPr id="2" name="Title 1">
-            <a:extLst>
-              <a:ext uri="{FF2B5EF4-FFF2-40B4-BE49-F238E27FC236}">
-                <a16:creationId xmlns:a16="http://schemas.microsoft.com/office/drawing/2014/main" id="{F49AF386-E6D7-F5DB-C51F-93F7299117AE}"/>
-              </a:ext>
-            </a:extLst>
-          </p:cNvPr>
-          <p:cNvSpPr>
-            <a:spLocks noGrp="1"/>
-          </p:cNvSpPr>
-          <p:nvPr>
-            <p:ph type="title"/>
-          </p:nvPr>
-        </p:nvSpPr>
-        <p:spPr/>
-        <p:txBody>
-          <a:bodyPr/>
-          <a:lstStyle/>
-          <a:p>
-            <a:r>
-              <a:rPr lang="en-US" dirty="0"/>
-              <a:t>Experiment plots</a:t>
-            </a:r>
-            <a:endParaRPr lang="LID4096" dirty="0"/>
-          </a:p>
-        </p:txBody>
-      </p:sp>
-      <p:sp>
-        <p:nvSpPr>
-          <p:cNvPr id="3" name="Slide Number Placeholder 2">
-            <a:extLst>
-              <a:ext uri="{FF2B5EF4-FFF2-40B4-BE49-F238E27FC236}">
-                <a16:creationId xmlns:a16="http://schemas.microsoft.com/office/drawing/2014/main" id="{399FF7DD-5DA6-18C4-4D1D-4257F4FC3F9D}"/>
-              </a:ext>
-            </a:extLst>
-          </p:cNvPr>
-          <p:cNvSpPr>
-            <a:spLocks noGrp="1"/>
-          </p:cNvSpPr>
-          <p:nvPr>
-            <p:ph type="sldNum" sz="quarter" idx="12"/>
-          </p:nvPr>
-        </p:nvSpPr>
-        <p:spPr/>
-        <p:txBody>
-          <a:bodyPr/>
-          <a:lstStyle/>
-          <a:p>
-            <a:fld id="{9C7CE217-4467-4B8D-A735-B008FA7C4816}" type="slidenum">
-              <a:rPr lang="LID4096" smtClean="0"/>
-              <a:t>39</a:t>
-            </a:fld>
-            <a:endParaRPr lang="LID4096"/>
-          </a:p>
-        </p:txBody>
-      </p:sp>
-      <p:sp>
-        <p:nvSpPr>
-          <p:cNvPr id="4" name="TextBox 3">
-            <a:extLst>
-              <a:ext uri="{FF2B5EF4-FFF2-40B4-BE49-F238E27FC236}">
-                <a16:creationId xmlns:a16="http://schemas.microsoft.com/office/drawing/2014/main" id="{DF273256-D8A0-52DF-0E7A-3CB389C77D61}"/>
-              </a:ext>
-            </a:extLst>
-          </p:cNvPr>
-          <p:cNvSpPr txBox="1"/>
-          <p:nvPr/>
-        </p:nvSpPr>
-        <p:spPr>
-          <a:xfrm>
-            <a:off x="1317171" y="1879057"/>
-            <a:ext cx="4180115" cy="369332"/>
-          </a:xfrm>
-          <a:prstGeom prst="rect">
-            <a:avLst/>
-          </a:prstGeom>
-          <a:solidFill>
-            <a:schemeClr val="tx1"/>
-          </a:solidFill>
-          <a:ln>
-            <a:solidFill>
-              <a:schemeClr val="tx1"/>
-            </a:solidFill>
-          </a:ln>
-        </p:spPr>
-        <p:txBody>
-          <a:bodyPr wrap="square" rtlCol="0">
-            <a:spAutoFit/>
-          </a:bodyPr>
-          <a:lstStyle/>
-          <a:p>
-            <a:r>
-              <a:rPr lang="en-US" b="1" dirty="0">
-                <a:solidFill>
-                  <a:schemeClr val="bg1"/>
-                </a:solidFill>
-                <a:latin typeface="Courier New" pitchFamily="49" charset="0"/>
-                <a:cs typeface="Courier New" pitchFamily="49" charset="0"/>
-              </a:rPr>
-              <a:t>$  </a:t>
-            </a:r>
-            <a:r>
-              <a:rPr lang="en-US" b="1" dirty="0" err="1">
-                <a:solidFill>
-                  <a:schemeClr val="bg1"/>
-                </a:solidFill>
-                <a:latin typeface="Courier New" pitchFamily="49" charset="0"/>
-                <a:cs typeface="Courier New" pitchFamily="49" charset="0"/>
-              </a:rPr>
-              <a:t>dvc</a:t>
-            </a:r>
-            <a:r>
-              <a:rPr lang="en-US" b="1" dirty="0">
-                <a:solidFill>
-                  <a:schemeClr val="bg1"/>
-                </a:solidFill>
-                <a:latin typeface="Courier New" pitchFamily="49" charset="0"/>
-                <a:cs typeface="Courier New" pitchFamily="49" charset="0"/>
-              </a:rPr>
-              <a:t> plots show  </a:t>
-            </a:r>
-            <a:r>
-              <a:rPr lang="en-US" b="1" dirty="0" err="1">
-                <a:solidFill>
-                  <a:schemeClr val="bg1"/>
-                </a:solidFill>
-                <a:latin typeface="Courier New" pitchFamily="49" charset="0"/>
-                <a:cs typeface="Courier New" pitchFamily="49" charset="0"/>
-              </a:rPr>
-              <a:t>high_temp</a:t>
-            </a:r>
-            <a:endParaRPr lang="nl-BE" b="1" dirty="0">
-              <a:solidFill>
-                <a:schemeClr val="bg1"/>
-              </a:solidFill>
-              <a:latin typeface="Courier New" pitchFamily="49" charset="0"/>
-              <a:cs typeface="Courier New" pitchFamily="49" charset="0"/>
-            </a:endParaRPr>
-          </a:p>
-        </p:txBody>
-      </p:sp>
-      <p:pic>
-        <p:nvPicPr>
-          <p:cNvPr id="6" name="Picture 5">
-            <a:extLst>
-              <a:ext uri="{FF2B5EF4-FFF2-40B4-BE49-F238E27FC236}">
-                <a16:creationId xmlns:a16="http://schemas.microsoft.com/office/drawing/2014/main" id="{E06A1521-DD7F-157E-A284-99D6450215E4}"/>
-              </a:ext>
-            </a:extLst>
-          </p:cNvPr>
-          <p:cNvPicPr>
-            <a:picLocks noChangeAspect="1"/>
-          </p:cNvPicPr>
-          <p:nvPr/>
-        </p:nvPicPr>
-        <p:blipFill>
-          <a:blip r:embed="rId2"/>
-          <a:stretch>
-            <a:fillRect/>
-          </a:stretch>
-        </p:blipFill>
-        <p:spPr>
-          <a:xfrm>
-            <a:off x="1132114" y="2683802"/>
-            <a:ext cx="8946821" cy="4174198"/>
-          </a:xfrm>
-          <a:prstGeom prst="rect">
-            <a:avLst/>
-          </a:prstGeom>
-        </p:spPr>
-      </p:pic>
-      <p:grpSp>
-        <p:nvGrpSpPr>
-          <p:cNvPr id="7" name="Group 6">
-            <a:extLst>
-              <a:ext uri="{FF2B5EF4-FFF2-40B4-BE49-F238E27FC236}">
-                <a16:creationId xmlns:a16="http://schemas.microsoft.com/office/drawing/2014/main" id="{9CE147B6-8370-4B6E-1245-BB840C21CD24}"/>
-              </a:ext>
-            </a:extLst>
-          </p:cNvPr>
-          <p:cNvGrpSpPr/>
-          <p:nvPr/>
-        </p:nvGrpSpPr>
-        <p:grpSpPr>
-          <a:xfrm>
-            <a:off x="8105240" y="2058353"/>
-            <a:ext cx="3368302" cy="1250898"/>
-            <a:chOff x="88563" y="5501785"/>
-            <a:chExt cx="5303059" cy="1135701"/>
-          </a:xfrm>
-        </p:grpSpPr>
-        <p:sp>
-          <p:nvSpPr>
-            <p:cNvPr id="8" name="TextBox 7">
-              <a:extLst>
-                <a:ext uri="{FF2B5EF4-FFF2-40B4-BE49-F238E27FC236}">
-                  <a16:creationId xmlns:a16="http://schemas.microsoft.com/office/drawing/2014/main" id="{BBA59516-5AAB-7B87-0309-2D1C1CAD1650}"/>
-                </a:ext>
-              </a:extLst>
-            </p:cNvPr>
-            <p:cNvSpPr txBox="1"/>
-            <p:nvPr/>
-          </p:nvSpPr>
-          <p:spPr>
-            <a:xfrm>
-              <a:off x="2083561" y="5501785"/>
-              <a:ext cx="3308061" cy="586809"/>
-            </a:xfrm>
-            <a:prstGeom prst="rect">
-              <a:avLst/>
-            </a:prstGeom>
-            <a:solidFill>
-              <a:schemeClr val="bg1"/>
-            </a:solidFill>
-            <a:ln w="19050">
-              <a:solidFill>
-                <a:srgbClr val="C00000"/>
-              </a:solidFill>
-            </a:ln>
-          </p:spPr>
-          <p:txBody>
-            <a:bodyPr wrap="square" rtlCol="0">
-              <a:spAutoFit/>
-            </a:bodyPr>
-            <a:lstStyle/>
-            <a:p>
-              <a:pPr marL="0" marR="0" lvl="0" indent="0" algn="l" defTabSz="914400" rtl="0" eaLnBrk="1" fontAlgn="auto" latinLnBrk="0" hangingPunct="1">
-                <a:lnSpc>
-                  <a:spcPct val="100000"/>
-                </a:lnSpc>
-                <a:spcBef>
-                  <a:spcPts val="0"/>
-                </a:spcBef>
-                <a:spcAft>
-                  <a:spcPts val="0"/>
-                </a:spcAft>
-                <a:buClrTx/>
-                <a:buSzTx/>
-                <a:buFontTx/>
-                <a:buNone/>
-                <a:tabLst/>
-                <a:defRPr/>
-              </a:pPr>
-              <a:r>
-                <a:rPr kumimoji="0" lang="en-US" sz="1800" b="0" i="0" u="none" strike="noStrike" kern="1200" cap="none" spc="0" normalizeH="0" baseline="0" noProof="0" dirty="0">
-                  <a:ln>
-                    <a:noFill/>
-                  </a:ln>
-                  <a:solidFill>
-                    <a:prstClr val="black"/>
-                  </a:solidFill>
-                  <a:effectLst/>
-                  <a:uLnTx/>
-                  <a:uFillTx/>
-                  <a:ea typeface="+mn-ea"/>
-                  <a:cs typeface="+mn-cs"/>
-                </a:rPr>
-                <a:t>Plots based on TSV files, interactive</a:t>
-              </a:r>
-              <a:endParaRPr kumimoji="0" lang="nl-BE" sz="1800" b="0" i="0" u="none" strike="noStrike" kern="1200" cap="none" spc="0" normalizeH="0" baseline="0" noProof="0" dirty="0">
-                <a:ln>
-                  <a:noFill/>
-                </a:ln>
-                <a:solidFill>
-                  <a:prstClr val="black"/>
-                </a:solidFill>
-                <a:effectLst/>
-                <a:uLnTx/>
-                <a:uFillTx/>
-                <a:latin typeface="Courier New" panose="02070309020205020404" pitchFamily="49" charset="0"/>
-                <a:cs typeface="Courier New" panose="02070309020205020404" pitchFamily="49" charset="0"/>
-              </a:endParaRPr>
-            </a:p>
-          </p:txBody>
-        </p:sp>
-        <p:cxnSp>
-          <p:nvCxnSpPr>
-            <p:cNvPr id="9" name="Straight Arrow Connector 8">
-              <a:extLst>
-                <a:ext uri="{FF2B5EF4-FFF2-40B4-BE49-F238E27FC236}">
-                  <a16:creationId xmlns:a16="http://schemas.microsoft.com/office/drawing/2014/main" id="{A90F7800-678F-D266-462D-92AB4961B9D6}"/>
-                </a:ext>
-              </a:extLst>
-            </p:cNvPr>
-            <p:cNvCxnSpPr>
-              <a:cxnSpLocks/>
-              <a:stCxn id="8" idx="1"/>
-            </p:cNvCxnSpPr>
-            <p:nvPr/>
-          </p:nvCxnSpPr>
-          <p:spPr>
-            <a:xfrm flipH="1">
-              <a:off x="88563" y="5795190"/>
-              <a:ext cx="1994998" cy="842296"/>
-            </a:xfrm>
-            <a:prstGeom prst="straightConnector1">
-              <a:avLst/>
-            </a:prstGeom>
-            <a:ln w="28575">
-              <a:solidFill>
-                <a:srgbClr val="C00000"/>
-              </a:solidFill>
-              <a:tailEnd type="stealth" w="lg" len="lg"/>
-            </a:ln>
-          </p:spPr>
-          <p:style>
-            <a:lnRef idx="1">
-              <a:schemeClr val="accent1"/>
-            </a:lnRef>
-            <a:fillRef idx="0">
-              <a:schemeClr val="accent1"/>
-            </a:fillRef>
-            <a:effectRef idx="0">
-              <a:schemeClr val="accent1"/>
-            </a:effectRef>
-            <a:fontRef idx="minor">
-              <a:schemeClr val="tx1"/>
-            </a:fontRef>
-          </p:style>
-        </p:cxnSp>
-      </p:grpSp>
-      <p:sp>
-        <p:nvSpPr>
-          <p:cNvPr id="10" name="TextBox 9">
-            <a:extLst>
-              <a:ext uri="{FF2B5EF4-FFF2-40B4-BE49-F238E27FC236}">
-                <a16:creationId xmlns:a16="http://schemas.microsoft.com/office/drawing/2014/main" id="{763E99FA-21E3-0262-02EC-49D61910601E}"/>
-              </a:ext>
-            </a:extLst>
-          </p:cNvPr>
-          <p:cNvSpPr txBox="1"/>
-          <p:nvPr/>
-        </p:nvSpPr>
-        <p:spPr>
-          <a:xfrm>
-            <a:off x="8523514" y="4973022"/>
-            <a:ext cx="1107996" cy="369332"/>
-          </a:xfrm>
-          <a:prstGeom prst="rect">
-            <a:avLst/>
-          </a:prstGeom>
-          <a:solidFill>
-            <a:schemeClr val="bg1"/>
-          </a:solidFill>
-          <a:ln>
-            <a:solidFill>
-              <a:schemeClr val="tx1"/>
-            </a:solidFill>
-          </a:ln>
-        </p:spPr>
-        <p:txBody>
-          <a:bodyPr wrap="none" rtlCol="0">
-            <a:spAutoFit/>
-          </a:bodyPr>
-          <a:lstStyle/>
-          <a:p>
-            <a:r>
-              <a:rPr lang="en-US" dirty="0"/>
-              <a:t>HTML file</a:t>
-            </a:r>
-            <a:endParaRPr lang="LID4096" dirty="0"/>
-          </a:p>
-        </p:txBody>
-      </p:sp>
-      <p:grpSp>
-        <p:nvGrpSpPr>
-          <p:cNvPr id="13" name="Group 12">
-            <a:extLst>
-              <a:ext uri="{FF2B5EF4-FFF2-40B4-BE49-F238E27FC236}">
-                <a16:creationId xmlns:a16="http://schemas.microsoft.com/office/drawing/2014/main" id="{60332A15-2890-7F95-4177-670EBE5F6AAD}"/>
-              </a:ext>
-            </a:extLst>
-          </p:cNvPr>
-          <p:cNvGrpSpPr/>
-          <p:nvPr/>
-        </p:nvGrpSpPr>
-        <p:grpSpPr>
-          <a:xfrm>
-            <a:off x="6061878" y="752657"/>
-            <a:ext cx="3376036" cy="1283447"/>
-            <a:chOff x="6061878" y="752657"/>
-            <a:chExt cx="3376036" cy="1283447"/>
-          </a:xfrm>
-        </p:grpSpPr>
-        <p:sp>
-          <p:nvSpPr>
-            <p:cNvPr id="5" name="TextBox 4">
-              <a:extLst>
-                <a:ext uri="{FF2B5EF4-FFF2-40B4-BE49-F238E27FC236}">
-                  <a16:creationId xmlns:a16="http://schemas.microsoft.com/office/drawing/2014/main" id="{C9869AB2-DDDF-0CA2-D329-91BB16218C8C}"/>
-                </a:ext>
-              </a:extLst>
-            </p:cNvPr>
-            <p:cNvSpPr txBox="1"/>
-            <p:nvPr/>
-          </p:nvSpPr>
-          <p:spPr>
-            <a:xfrm>
-              <a:off x="6061878" y="752657"/>
-              <a:ext cx="3015634" cy="830997"/>
-            </a:xfrm>
-            <a:prstGeom prst="rect">
-              <a:avLst/>
-            </a:prstGeom>
-            <a:noFill/>
-            <a:ln>
-              <a:solidFill>
-                <a:schemeClr val="tx1"/>
-              </a:solidFill>
-            </a:ln>
-          </p:spPr>
-          <p:txBody>
-            <a:bodyPr wrap="none" rtlCol="0">
-              <a:spAutoFit/>
-            </a:bodyPr>
-            <a:lstStyle/>
-            <a:p>
-              <a:r>
-                <a:rPr lang="en-US" sz="2400" dirty="0"/>
-                <a:t>If you have a browser,</a:t>
-              </a:r>
-              <a:br>
-                <a:rPr lang="en-US" sz="2400" dirty="0"/>
-              </a:br>
-              <a:r>
-                <a:rPr lang="en-US" sz="2400" dirty="0"/>
-                <a:t>use </a:t>
-              </a:r>
-              <a:r>
-                <a:rPr lang="en-US" sz="2400" dirty="0">
-                  <a:latin typeface="Courier New" panose="02070309020205020404" pitchFamily="49" charset="0"/>
-                  <a:cs typeface="Courier New" panose="02070309020205020404" pitchFamily="49" charset="0"/>
-                </a:rPr>
-                <a:t>--open</a:t>
-              </a:r>
-              <a:endParaRPr lang="LID4096" sz="2400" dirty="0">
-                <a:latin typeface="Courier New" panose="02070309020205020404" pitchFamily="49" charset="0"/>
-                <a:cs typeface="Courier New" panose="02070309020205020404" pitchFamily="49" charset="0"/>
-              </a:endParaRPr>
-            </a:p>
-          </p:txBody>
-        </p:sp>
-        <p:pic>
-          <p:nvPicPr>
-            <p:cNvPr id="12" name="Graphic 11" descr="Smiling face with solid fill with solid fill">
-              <a:extLst>
-                <a:ext uri="{FF2B5EF4-FFF2-40B4-BE49-F238E27FC236}">
-                  <a16:creationId xmlns:a16="http://schemas.microsoft.com/office/drawing/2014/main" id="{BA1EB4FF-1075-D0BC-B773-69ACAD9735BE}"/>
-                </a:ext>
-              </a:extLst>
-            </p:cNvPr>
-            <p:cNvPicPr>
-              <a:picLocks noChangeAspect="1"/>
-            </p:cNvPicPr>
-            <p:nvPr/>
-          </p:nvPicPr>
-          <p:blipFill>
-            <a:blip r:embed="rId3">
-              <a:extLst>
-                <a:ext uri="{96DAC541-7B7A-43D3-8B79-37D633B846F1}">
-                  <asvg:svgBlip xmlns:asvg="http://schemas.microsoft.com/office/drawing/2016/SVG/main" r:embed="rId4"/>
-                </a:ext>
-              </a:extLst>
-            </a:blip>
-            <a:stretch>
-              <a:fillRect/>
-            </a:stretch>
-          </p:blipFill>
-          <p:spPr>
-            <a:xfrm>
-              <a:off x="8523514" y="1121704"/>
-              <a:ext cx="914400" cy="914400"/>
-            </a:xfrm>
-            <a:prstGeom prst="rect">
-              <a:avLst/>
-            </a:prstGeom>
-          </p:spPr>
-        </p:pic>
-      </p:grpSp>
-    </p:spTree>
-    <p:extLst>
-      <p:ext uri="{BB962C8B-B14F-4D97-AF65-F5344CB8AC3E}">
-        <p14:creationId xmlns:p14="http://schemas.microsoft.com/office/powerpoint/2010/main" val="632838584"/>
-      </p:ext>
-    </p:extLst>
-  </p:cSld>
-  <p:clrMapOvr>
-    <a:masterClrMapping/>
-  </p:clrMapOvr>
-  <p:timing>
-    <p:tnLst>
-      <p:par>
-        <p:cTn id="1" dur="indefinite" restart="never" nodeType="tmRoot">
-          <p:childTnLst>
-            <p:seq concurrent="1" nextAc="seek">
-              <p:cTn id="2" dur="indefinite" nodeType="mainSeq">
-                <p:childTnLst>
-                  <p:par>
-                    <p:cTn id="3" fill="hold">
-                      <p:stCondLst>
-                        <p:cond delay="indefinite"/>
-                        <p:cond evt="onBegin" delay="0">
-                          <p:tn val="2"/>
-                        </p:cond>
-                      </p:stCondLst>
-                      <p:childTnLst>
-                        <p:par>
-                          <p:cTn id="4" fill="hold">
-                            <p:stCondLst>
-                              <p:cond delay="0"/>
-                            </p:stCondLst>
-                            <p:childTnLst>
-                              <p:par>
-                                <p:cTn id="5" presetID="1" presetClass="entr" presetSubtype="0" fill="hold" grpId="0" nodeType="withEffect">
-                                  <p:stCondLst>
-                                    <p:cond delay="0"/>
-                                  </p:stCondLst>
-                                  <p:childTnLst>
-                                    <p:set>
-                                      <p:cBhvr>
-                                        <p:cTn id="6" dur="1" fill="hold">
-                                          <p:stCondLst>
-                                            <p:cond delay="0"/>
-                                          </p:stCondLst>
-                                        </p:cTn>
-                                        <p:tgtEl>
-                                          <p:spTgt spid="4"/>
-                                        </p:tgtEl>
-                                        <p:attrNameLst>
-                                          <p:attrName>style.visibility</p:attrName>
-                                        </p:attrNameLst>
-                                      </p:cBhvr>
-                                      <p:to>
-                                        <p:strVal val="visible"/>
-                                      </p:to>
-                                    </p:set>
-                                  </p:childTnLst>
-                                </p:cTn>
-                              </p:par>
-                            </p:childTnLst>
-                          </p:cTn>
-                        </p:par>
-                      </p:childTnLst>
-                    </p:cTn>
-                  </p:par>
-                </p:childTnLst>
-              </p:cTn>
-              <p:prevCondLst>
-                <p:cond evt="onPrev" delay="0">
-                  <p:tgtEl>
-                    <p:sldTgt/>
-                  </p:tgtEl>
-                </p:cond>
-              </p:prevCondLst>
-              <p:nextCondLst>
-                <p:cond evt="onNext" delay="0">
-                  <p:tgtEl>
-                    <p:sldTgt/>
-                  </p:tgtEl>
-                </p:cond>
-              </p:nextCondLst>
-            </p:seq>
-          </p:childTnLst>
-        </p:cTn>
-      </p:par>
-    </p:tnLst>
-    <p:bldLst>
-      <p:bldP spid="4" grpId="0" animBg="1"/>
     </p:bldLst>
   </p:timing>
 </p:sld>
@@ -25543,6 +26001,598 @@
           <p:cNvPr id="2" name="Title 1">
             <a:extLst>
               <a:ext uri="{FF2B5EF4-FFF2-40B4-BE49-F238E27FC236}">
+                <a16:creationId xmlns:a16="http://schemas.microsoft.com/office/drawing/2014/main" id="{F49AF386-E6D7-F5DB-C51F-93F7299117AE}"/>
+              </a:ext>
+            </a:extLst>
+          </p:cNvPr>
+          <p:cNvSpPr>
+            <a:spLocks noGrp="1"/>
+          </p:cNvSpPr>
+          <p:nvPr>
+            <p:ph type="title"/>
+          </p:nvPr>
+        </p:nvSpPr>
+        <p:spPr/>
+        <p:txBody>
+          <a:bodyPr/>
+          <a:lstStyle/>
+          <a:p>
+            <a:r>
+              <a:rPr lang="en-US" dirty="0"/>
+              <a:t>Experiment plots</a:t>
+            </a:r>
+            <a:endParaRPr lang="LID4096" dirty="0"/>
+          </a:p>
+        </p:txBody>
+      </p:sp>
+      <p:sp>
+        <p:nvSpPr>
+          <p:cNvPr id="3" name="Slide Number Placeholder 2">
+            <a:extLst>
+              <a:ext uri="{FF2B5EF4-FFF2-40B4-BE49-F238E27FC236}">
+                <a16:creationId xmlns:a16="http://schemas.microsoft.com/office/drawing/2014/main" id="{399FF7DD-5DA6-18C4-4D1D-4257F4FC3F9D}"/>
+              </a:ext>
+            </a:extLst>
+          </p:cNvPr>
+          <p:cNvSpPr>
+            <a:spLocks noGrp="1"/>
+          </p:cNvSpPr>
+          <p:nvPr>
+            <p:ph type="sldNum" sz="quarter" idx="12"/>
+          </p:nvPr>
+        </p:nvSpPr>
+        <p:spPr/>
+        <p:txBody>
+          <a:bodyPr/>
+          <a:lstStyle/>
+          <a:p>
+            <a:fld id="{9C7CE217-4467-4B8D-A735-B008FA7C4816}" type="slidenum">
+              <a:rPr lang="LID4096" smtClean="0"/>
+              <a:t>40</a:t>
+            </a:fld>
+            <a:endParaRPr lang="LID4096"/>
+          </a:p>
+        </p:txBody>
+      </p:sp>
+      <p:sp>
+        <p:nvSpPr>
+          <p:cNvPr id="4" name="TextBox 3">
+            <a:extLst>
+              <a:ext uri="{FF2B5EF4-FFF2-40B4-BE49-F238E27FC236}">
+                <a16:creationId xmlns:a16="http://schemas.microsoft.com/office/drawing/2014/main" id="{DF273256-D8A0-52DF-0E7A-3CB389C77D61}"/>
+              </a:ext>
+            </a:extLst>
+          </p:cNvPr>
+          <p:cNvSpPr txBox="1"/>
+          <p:nvPr/>
+        </p:nvSpPr>
+        <p:spPr>
+          <a:xfrm>
+            <a:off x="1317171" y="1879057"/>
+            <a:ext cx="4180115" cy="369332"/>
+          </a:xfrm>
+          <a:prstGeom prst="rect">
+            <a:avLst/>
+          </a:prstGeom>
+          <a:solidFill>
+            <a:schemeClr val="tx1"/>
+          </a:solidFill>
+          <a:ln>
+            <a:solidFill>
+              <a:schemeClr val="tx1"/>
+            </a:solidFill>
+          </a:ln>
+        </p:spPr>
+        <p:txBody>
+          <a:bodyPr wrap="square" rtlCol="0">
+            <a:spAutoFit/>
+          </a:bodyPr>
+          <a:lstStyle/>
+          <a:p>
+            <a:r>
+              <a:rPr lang="en-US" b="1" dirty="0">
+                <a:solidFill>
+                  <a:schemeClr val="bg1"/>
+                </a:solidFill>
+                <a:latin typeface="Courier New" pitchFamily="49" charset="0"/>
+                <a:cs typeface="Courier New" pitchFamily="49" charset="0"/>
+              </a:rPr>
+              <a:t>$  </a:t>
+            </a:r>
+            <a:r>
+              <a:rPr lang="en-US" b="1" dirty="0" err="1">
+                <a:solidFill>
+                  <a:schemeClr val="bg1"/>
+                </a:solidFill>
+                <a:latin typeface="Courier New" pitchFamily="49" charset="0"/>
+                <a:cs typeface="Courier New" pitchFamily="49" charset="0"/>
+              </a:rPr>
+              <a:t>dvc</a:t>
+            </a:r>
+            <a:r>
+              <a:rPr lang="en-US" b="1" dirty="0">
+                <a:solidFill>
+                  <a:schemeClr val="bg1"/>
+                </a:solidFill>
+                <a:latin typeface="Courier New" pitchFamily="49" charset="0"/>
+                <a:cs typeface="Courier New" pitchFamily="49" charset="0"/>
+              </a:rPr>
+              <a:t> plots show  </a:t>
+            </a:r>
+            <a:r>
+              <a:rPr lang="en-US" b="1" dirty="0" err="1">
+                <a:solidFill>
+                  <a:schemeClr val="bg1"/>
+                </a:solidFill>
+                <a:latin typeface="Courier New" pitchFamily="49" charset="0"/>
+                <a:cs typeface="Courier New" pitchFamily="49" charset="0"/>
+              </a:rPr>
+              <a:t>high_temp</a:t>
+            </a:r>
+            <a:endParaRPr lang="nl-BE" b="1" dirty="0">
+              <a:solidFill>
+                <a:schemeClr val="bg1"/>
+              </a:solidFill>
+              <a:latin typeface="Courier New" pitchFamily="49" charset="0"/>
+              <a:cs typeface="Courier New" pitchFamily="49" charset="0"/>
+            </a:endParaRPr>
+          </a:p>
+        </p:txBody>
+      </p:sp>
+      <p:pic>
+        <p:nvPicPr>
+          <p:cNvPr id="6" name="Picture 5">
+            <a:extLst>
+              <a:ext uri="{FF2B5EF4-FFF2-40B4-BE49-F238E27FC236}">
+                <a16:creationId xmlns:a16="http://schemas.microsoft.com/office/drawing/2014/main" id="{E06A1521-DD7F-157E-A284-99D6450215E4}"/>
+              </a:ext>
+            </a:extLst>
+          </p:cNvPr>
+          <p:cNvPicPr>
+            <a:picLocks noChangeAspect="1"/>
+          </p:cNvPicPr>
+          <p:nvPr/>
+        </p:nvPicPr>
+        <p:blipFill>
+          <a:blip r:embed="rId2"/>
+          <a:stretch>
+            <a:fillRect/>
+          </a:stretch>
+        </p:blipFill>
+        <p:spPr>
+          <a:xfrm>
+            <a:off x="1132114" y="2683802"/>
+            <a:ext cx="8946821" cy="4174198"/>
+          </a:xfrm>
+          <a:prstGeom prst="rect">
+            <a:avLst/>
+          </a:prstGeom>
+        </p:spPr>
+      </p:pic>
+      <p:grpSp>
+        <p:nvGrpSpPr>
+          <p:cNvPr id="7" name="Group 6">
+            <a:extLst>
+              <a:ext uri="{FF2B5EF4-FFF2-40B4-BE49-F238E27FC236}">
+                <a16:creationId xmlns:a16="http://schemas.microsoft.com/office/drawing/2014/main" id="{9CE147B6-8370-4B6E-1245-BB840C21CD24}"/>
+              </a:ext>
+            </a:extLst>
+          </p:cNvPr>
+          <p:cNvGrpSpPr/>
+          <p:nvPr/>
+        </p:nvGrpSpPr>
+        <p:grpSpPr>
+          <a:xfrm>
+            <a:off x="8105240" y="2058353"/>
+            <a:ext cx="3368302" cy="1250898"/>
+            <a:chOff x="88563" y="5501785"/>
+            <a:chExt cx="5303059" cy="1135701"/>
+          </a:xfrm>
+        </p:grpSpPr>
+        <p:sp>
+          <p:nvSpPr>
+            <p:cNvPr id="8" name="TextBox 7">
+              <a:extLst>
+                <a:ext uri="{FF2B5EF4-FFF2-40B4-BE49-F238E27FC236}">
+                  <a16:creationId xmlns:a16="http://schemas.microsoft.com/office/drawing/2014/main" id="{BBA59516-5AAB-7B87-0309-2D1C1CAD1650}"/>
+                </a:ext>
+              </a:extLst>
+            </p:cNvPr>
+            <p:cNvSpPr txBox="1"/>
+            <p:nvPr/>
+          </p:nvSpPr>
+          <p:spPr>
+            <a:xfrm>
+              <a:off x="2083561" y="5501785"/>
+              <a:ext cx="3308061" cy="586809"/>
+            </a:xfrm>
+            <a:prstGeom prst="rect">
+              <a:avLst/>
+            </a:prstGeom>
+            <a:solidFill>
+              <a:schemeClr val="bg1"/>
+            </a:solidFill>
+            <a:ln w="19050">
+              <a:solidFill>
+                <a:srgbClr val="C00000"/>
+              </a:solidFill>
+            </a:ln>
+          </p:spPr>
+          <p:txBody>
+            <a:bodyPr wrap="square" rtlCol="0">
+              <a:spAutoFit/>
+            </a:bodyPr>
+            <a:lstStyle/>
+            <a:p>
+              <a:pPr marL="0" marR="0" lvl="0" indent="0" algn="l" defTabSz="914400" rtl="0" eaLnBrk="1" fontAlgn="auto" latinLnBrk="0" hangingPunct="1">
+                <a:lnSpc>
+                  <a:spcPct val="100000"/>
+                </a:lnSpc>
+                <a:spcBef>
+                  <a:spcPts val="0"/>
+                </a:spcBef>
+                <a:spcAft>
+                  <a:spcPts val="0"/>
+                </a:spcAft>
+                <a:buClrTx/>
+                <a:buSzTx/>
+                <a:buFontTx/>
+                <a:buNone/>
+                <a:tabLst/>
+                <a:defRPr/>
+              </a:pPr>
+              <a:r>
+                <a:rPr kumimoji="0" lang="en-US" sz="1800" b="0" i="0" u="none" strike="noStrike" kern="1200" cap="none" spc="0" normalizeH="0" baseline="0" noProof="0" dirty="0">
+                  <a:ln>
+                    <a:noFill/>
+                  </a:ln>
+                  <a:solidFill>
+                    <a:prstClr val="black"/>
+                  </a:solidFill>
+                  <a:effectLst/>
+                  <a:uLnTx/>
+                  <a:uFillTx/>
+                  <a:ea typeface="+mn-ea"/>
+                  <a:cs typeface="+mn-cs"/>
+                </a:rPr>
+                <a:t>Plots based on TSV files, interactive</a:t>
+              </a:r>
+              <a:endParaRPr kumimoji="0" lang="nl-BE" sz="1800" b="0" i="0" u="none" strike="noStrike" kern="1200" cap="none" spc="0" normalizeH="0" baseline="0" noProof="0" dirty="0">
+                <a:ln>
+                  <a:noFill/>
+                </a:ln>
+                <a:solidFill>
+                  <a:prstClr val="black"/>
+                </a:solidFill>
+                <a:effectLst/>
+                <a:uLnTx/>
+                <a:uFillTx/>
+                <a:latin typeface="Courier New" panose="02070309020205020404" pitchFamily="49" charset="0"/>
+                <a:cs typeface="Courier New" panose="02070309020205020404" pitchFamily="49" charset="0"/>
+              </a:endParaRPr>
+            </a:p>
+          </p:txBody>
+        </p:sp>
+        <p:cxnSp>
+          <p:nvCxnSpPr>
+            <p:cNvPr id="9" name="Straight Arrow Connector 8">
+              <a:extLst>
+                <a:ext uri="{FF2B5EF4-FFF2-40B4-BE49-F238E27FC236}">
+                  <a16:creationId xmlns:a16="http://schemas.microsoft.com/office/drawing/2014/main" id="{A90F7800-678F-D266-462D-92AB4961B9D6}"/>
+                </a:ext>
+              </a:extLst>
+            </p:cNvPr>
+            <p:cNvCxnSpPr>
+              <a:cxnSpLocks/>
+              <a:stCxn id="8" idx="1"/>
+            </p:cNvCxnSpPr>
+            <p:nvPr/>
+          </p:nvCxnSpPr>
+          <p:spPr>
+            <a:xfrm flipH="1">
+              <a:off x="88563" y="5795190"/>
+              <a:ext cx="1994998" cy="842296"/>
+            </a:xfrm>
+            <a:prstGeom prst="straightConnector1">
+              <a:avLst/>
+            </a:prstGeom>
+            <a:ln w="28575">
+              <a:solidFill>
+                <a:srgbClr val="C00000"/>
+              </a:solidFill>
+              <a:tailEnd type="stealth" w="lg" len="lg"/>
+            </a:ln>
+          </p:spPr>
+          <p:style>
+            <a:lnRef idx="1">
+              <a:schemeClr val="accent1"/>
+            </a:lnRef>
+            <a:fillRef idx="0">
+              <a:schemeClr val="accent1"/>
+            </a:fillRef>
+            <a:effectRef idx="0">
+              <a:schemeClr val="accent1"/>
+            </a:effectRef>
+            <a:fontRef idx="minor">
+              <a:schemeClr val="tx1"/>
+            </a:fontRef>
+          </p:style>
+        </p:cxnSp>
+      </p:grpSp>
+      <p:sp>
+        <p:nvSpPr>
+          <p:cNvPr id="10" name="TextBox 9">
+            <a:extLst>
+              <a:ext uri="{FF2B5EF4-FFF2-40B4-BE49-F238E27FC236}">
+                <a16:creationId xmlns:a16="http://schemas.microsoft.com/office/drawing/2014/main" id="{763E99FA-21E3-0262-02EC-49D61910601E}"/>
+              </a:ext>
+            </a:extLst>
+          </p:cNvPr>
+          <p:cNvSpPr txBox="1"/>
+          <p:nvPr/>
+        </p:nvSpPr>
+        <p:spPr>
+          <a:xfrm>
+            <a:off x="8523514" y="4973022"/>
+            <a:ext cx="1107996" cy="369332"/>
+          </a:xfrm>
+          <a:prstGeom prst="rect">
+            <a:avLst/>
+          </a:prstGeom>
+          <a:solidFill>
+            <a:schemeClr val="bg1"/>
+          </a:solidFill>
+          <a:ln>
+            <a:solidFill>
+              <a:schemeClr val="tx1"/>
+            </a:solidFill>
+          </a:ln>
+        </p:spPr>
+        <p:txBody>
+          <a:bodyPr wrap="none" rtlCol="0">
+            <a:spAutoFit/>
+          </a:bodyPr>
+          <a:lstStyle/>
+          <a:p>
+            <a:r>
+              <a:rPr lang="en-US" dirty="0"/>
+              <a:t>HTML file</a:t>
+            </a:r>
+            <a:endParaRPr lang="LID4096" dirty="0"/>
+          </a:p>
+        </p:txBody>
+      </p:sp>
+      <p:grpSp>
+        <p:nvGrpSpPr>
+          <p:cNvPr id="13" name="Group 12">
+            <a:extLst>
+              <a:ext uri="{FF2B5EF4-FFF2-40B4-BE49-F238E27FC236}">
+                <a16:creationId xmlns:a16="http://schemas.microsoft.com/office/drawing/2014/main" id="{60332A15-2890-7F95-4177-670EBE5F6AAD}"/>
+              </a:ext>
+            </a:extLst>
+          </p:cNvPr>
+          <p:cNvGrpSpPr/>
+          <p:nvPr/>
+        </p:nvGrpSpPr>
+        <p:grpSpPr>
+          <a:xfrm>
+            <a:off x="6061878" y="752657"/>
+            <a:ext cx="3376036" cy="1283447"/>
+            <a:chOff x="6061878" y="752657"/>
+            <a:chExt cx="3376036" cy="1283447"/>
+          </a:xfrm>
+        </p:grpSpPr>
+        <p:sp>
+          <p:nvSpPr>
+            <p:cNvPr id="5" name="TextBox 4">
+              <a:extLst>
+                <a:ext uri="{FF2B5EF4-FFF2-40B4-BE49-F238E27FC236}">
+                  <a16:creationId xmlns:a16="http://schemas.microsoft.com/office/drawing/2014/main" id="{C9869AB2-DDDF-0CA2-D329-91BB16218C8C}"/>
+                </a:ext>
+              </a:extLst>
+            </p:cNvPr>
+            <p:cNvSpPr txBox="1"/>
+            <p:nvPr/>
+          </p:nvSpPr>
+          <p:spPr>
+            <a:xfrm>
+              <a:off x="6061878" y="752657"/>
+              <a:ext cx="3015634" cy="830997"/>
+            </a:xfrm>
+            <a:prstGeom prst="rect">
+              <a:avLst/>
+            </a:prstGeom>
+            <a:noFill/>
+            <a:ln>
+              <a:solidFill>
+                <a:schemeClr val="tx1"/>
+              </a:solidFill>
+            </a:ln>
+          </p:spPr>
+          <p:txBody>
+            <a:bodyPr wrap="none" rtlCol="0">
+              <a:spAutoFit/>
+            </a:bodyPr>
+            <a:lstStyle/>
+            <a:p>
+              <a:r>
+                <a:rPr lang="en-US" sz="2400" dirty="0"/>
+                <a:t>If you have a browser,</a:t>
+              </a:r>
+              <a:br>
+                <a:rPr lang="en-US" sz="2400" dirty="0"/>
+              </a:br>
+              <a:r>
+                <a:rPr lang="en-US" sz="2400" dirty="0"/>
+                <a:t>use </a:t>
+              </a:r>
+              <a:r>
+                <a:rPr lang="en-US" sz="2400" dirty="0">
+                  <a:latin typeface="Courier New" panose="02070309020205020404" pitchFamily="49" charset="0"/>
+                  <a:cs typeface="Courier New" panose="02070309020205020404" pitchFamily="49" charset="0"/>
+                </a:rPr>
+                <a:t>--open</a:t>
+              </a:r>
+              <a:endParaRPr lang="LID4096" sz="2400" dirty="0">
+                <a:latin typeface="Courier New" panose="02070309020205020404" pitchFamily="49" charset="0"/>
+                <a:cs typeface="Courier New" panose="02070309020205020404" pitchFamily="49" charset="0"/>
+              </a:endParaRPr>
+            </a:p>
+          </p:txBody>
+        </p:sp>
+        <p:pic>
+          <p:nvPicPr>
+            <p:cNvPr id="12" name="Graphic 11" descr="Smiling face with solid fill with solid fill">
+              <a:extLst>
+                <a:ext uri="{FF2B5EF4-FFF2-40B4-BE49-F238E27FC236}">
+                  <a16:creationId xmlns:a16="http://schemas.microsoft.com/office/drawing/2014/main" id="{BA1EB4FF-1075-D0BC-B773-69ACAD9735BE}"/>
+                </a:ext>
+              </a:extLst>
+            </p:cNvPr>
+            <p:cNvPicPr>
+              <a:picLocks noChangeAspect="1"/>
+            </p:cNvPicPr>
+            <p:nvPr/>
+          </p:nvPicPr>
+          <p:blipFill>
+            <a:blip r:embed="rId3">
+              <a:extLst>
+                <a:ext uri="{96DAC541-7B7A-43D3-8B79-37D633B846F1}">
+                  <asvg:svgBlip xmlns:asvg="http://schemas.microsoft.com/office/drawing/2016/SVG/main" r:embed="rId4"/>
+                </a:ext>
+              </a:extLst>
+            </a:blip>
+            <a:stretch>
+              <a:fillRect/>
+            </a:stretch>
+          </p:blipFill>
+          <p:spPr>
+            <a:xfrm>
+              <a:off x="8523514" y="1121704"/>
+              <a:ext cx="914400" cy="914400"/>
+            </a:xfrm>
+            <a:prstGeom prst="rect">
+              <a:avLst/>
+            </a:prstGeom>
+          </p:spPr>
+        </p:pic>
+      </p:grpSp>
+    </p:spTree>
+    <p:extLst>
+      <p:ext uri="{BB962C8B-B14F-4D97-AF65-F5344CB8AC3E}">
+        <p14:creationId xmlns:p14="http://schemas.microsoft.com/office/powerpoint/2010/main" val="632838584"/>
+      </p:ext>
+    </p:extLst>
+  </p:cSld>
+  <p:clrMapOvr>
+    <a:masterClrMapping/>
+  </p:clrMapOvr>
+  <p:timing>
+    <p:tnLst>
+      <p:par>
+        <p:cTn id="1" dur="indefinite" restart="never" nodeType="tmRoot">
+          <p:childTnLst>
+            <p:seq concurrent="1" nextAc="seek">
+              <p:cTn id="2" dur="indefinite" nodeType="mainSeq">
+                <p:childTnLst>
+                  <p:par>
+                    <p:cTn id="3" fill="hold">
+                      <p:stCondLst>
+                        <p:cond delay="indefinite"/>
+                        <p:cond evt="onBegin" delay="0">
+                          <p:tn val="2"/>
+                        </p:cond>
+                      </p:stCondLst>
+                      <p:childTnLst>
+                        <p:par>
+                          <p:cTn id="4" fill="hold">
+                            <p:stCondLst>
+                              <p:cond delay="0"/>
+                            </p:stCondLst>
+                            <p:childTnLst>
+                              <p:par>
+                                <p:cTn id="5" presetID="1" presetClass="entr" presetSubtype="0" fill="hold" grpId="0" nodeType="withEffect">
+                                  <p:stCondLst>
+                                    <p:cond delay="0"/>
+                                  </p:stCondLst>
+                                  <p:childTnLst>
+                                    <p:set>
+                                      <p:cBhvr>
+                                        <p:cTn id="6" dur="1" fill="hold">
+                                          <p:stCondLst>
+                                            <p:cond delay="0"/>
+                                          </p:stCondLst>
+                                        </p:cTn>
+                                        <p:tgtEl>
+                                          <p:spTgt spid="4"/>
+                                        </p:tgtEl>
+                                        <p:attrNameLst>
+                                          <p:attrName>style.visibility</p:attrName>
+                                        </p:attrNameLst>
+                                      </p:cBhvr>
+                                      <p:to>
+                                        <p:strVal val="visible"/>
+                                      </p:to>
+                                    </p:set>
+                                  </p:childTnLst>
+                                </p:cTn>
+                              </p:par>
+                            </p:childTnLst>
+                          </p:cTn>
+                        </p:par>
+                      </p:childTnLst>
+                    </p:cTn>
+                  </p:par>
+                </p:childTnLst>
+              </p:cTn>
+              <p:prevCondLst>
+                <p:cond evt="onPrev" delay="0">
+                  <p:tgtEl>
+                    <p:sldTgt/>
+                  </p:tgtEl>
+                </p:cond>
+              </p:prevCondLst>
+              <p:nextCondLst>
+                <p:cond evt="onNext" delay="0">
+                  <p:tgtEl>
+                    <p:sldTgt/>
+                  </p:tgtEl>
+                </p:cond>
+              </p:nextCondLst>
+            </p:seq>
+          </p:childTnLst>
+        </p:cTn>
+      </p:par>
+    </p:tnLst>
+    <p:bldLst>
+      <p:bldP spid="4" grpId="0" animBg="1"/>
+    </p:bldLst>
+  </p:timing>
+</p:sld>
+</file>
+
+<file path=ppt/slides/slide41.xml><?xml version="1.0" encoding="utf-8"?>
+<p:sld xmlns:a="http://schemas.openxmlformats.org/drawingml/2006/main" xmlns:r="http://schemas.openxmlformats.org/officeDocument/2006/relationships" xmlns:p="http://schemas.openxmlformats.org/presentationml/2006/main">
+  <p:cSld>
+    <p:spTree>
+      <p:nvGrpSpPr>
+        <p:cNvPr id="1" name=""/>
+        <p:cNvGrpSpPr/>
+        <p:nvPr/>
+      </p:nvGrpSpPr>
+      <p:grpSpPr>
+        <a:xfrm>
+          <a:off x="0" y="0"/>
+          <a:ext cx="0" cy="0"/>
+          <a:chOff x="0" y="0"/>
+          <a:chExt cx="0" cy="0"/>
+        </a:xfrm>
+      </p:grpSpPr>
+      <p:sp>
+        <p:nvSpPr>
+          <p:cNvPr id="2" name="Title 1">
+            <a:extLst>
+              <a:ext uri="{FF2B5EF4-FFF2-40B4-BE49-F238E27FC236}">
                 <a16:creationId xmlns:a16="http://schemas.microsoft.com/office/drawing/2014/main" id="{108206CA-3919-5554-121C-1B9552CA43CF}"/>
               </a:ext>
             </a:extLst>
@@ -25656,7 +26706,7 @@
           <a:p>
             <a:fld id="{9C7CE217-4467-4B8D-A735-B008FA7C4816}" type="slidenum">
               <a:rPr lang="LID4096" smtClean="0"/>
-              <a:t>40</a:t>
+              <a:t>41</a:t>
             </a:fld>
             <a:endParaRPr lang="LID4096"/>
           </a:p>
@@ -26448,7 +27498,7 @@
 </p:sld>
 </file>
 
-<file path=ppt/slides/slide41.xml><?xml version="1.0" encoding="utf-8"?>
+<file path=ppt/slides/slide42.xml><?xml version="1.0" encoding="utf-8"?>
 <p:sld xmlns:a="http://schemas.openxmlformats.org/drawingml/2006/main" xmlns:r="http://schemas.openxmlformats.org/officeDocument/2006/relationships" xmlns:p="http://schemas.openxmlformats.org/presentationml/2006/main">
   <p:cSld>
     <p:spTree>
@@ -26555,7 +27605,7 @@
           <a:p>
             <a:fld id="{9C7CE217-4467-4B8D-A735-B008FA7C4816}" type="slidenum">
               <a:rPr lang="LID4096" smtClean="0"/>
-              <a:t>41</a:t>
+              <a:t>42</a:t>
             </a:fld>
             <a:endParaRPr lang="LID4096"/>
           </a:p>
@@ -27203,7 +28253,7 @@
 </p:sld>
 </file>
 
-<file path=ppt/slides/slide42.xml><?xml version="1.0" encoding="utf-8"?>
+<file path=ppt/slides/slide43.xml><?xml version="1.0" encoding="utf-8"?>
 <p:sld xmlns:a="http://schemas.openxmlformats.org/drawingml/2006/main" xmlns:r="http://schemas.openxmlformats.org/officeDocument/2006/relationships" xmlns:p="http://schemas.openxmlformats.org/presentationml/2006/main">
   <p:cSld>
     <p:spTree>
@@ -27329,7 +28379,7 @@
           <a:p>
             <a:fld id="{9C7CE217-4467-4B8D-A735-B008FA7C4816}" type="slidenum">
               <a:rPr lang="LID4096" smtClean="0"/>
-              <a:t>42</a:t>
+              <a:t>43</a:t>
             </a:fld>
             <a:endParaRPr lang="LID4096"/>
           </a:p>

</xml_diff>

<commit_message>
Add section on experiment pipelines & queue
</commit_message>
<xml_diff>
--- a/mlops_on_hpc.pptx
+++ b/mlops_on_hpc.pptx
@@ -5,7 +5,7 @@
     <p:sldMasterId id="2147483648" r:id="rId1"/>
   </p:sldMasterIdLst>
   <p:notesMasterIdLst>
-    <p:notesMasterId r:id="rId45"/>
+    <p:notesMasterId r:id="rId51"/>
   </p:notesMasterIdLst>
   <p:sldIdLst>
     <p:sldId id="257" r:id="rId2"/>
@@ -51,6 +51,12 @@
     <p:sldId id="391" r:id="rId42"/>
     <p:sldId id="393" r:id="rId43"/>
     <p:sldId id="394" r:id="rId44"/>
+    <p:sldId id="397" r:id="rId45"/>
+    <p:sldId id="398" r:id="rId46"/>
+    <p:sldId id="399" r:id="rId47"/>
+    <p:sldId id="400" r:id="rId48"/>
+    <p:sldId id="401" r:id="rId49"/>
+    <p:sldId id="402" r:id="rId50"/>
   </p:sldIdLst>
   <p:sldSz cx="12192000" cy="6858000"/>
   <p:notesSz cx="6858000" cy="9144000"/>
@@ -29192,6 +29198,3405 @@
   <p:clrMapOvr>
     <a:masterClrMapping/>
   </p:clrMapOvr>
+</p:sld>
+</file>
+
+<file path=ppt/slides/slide44.xml><?xml version="1.0" encoding="utf-8"?>
+<p:sld xmlns:a="http://schemas.openxmlformats.org/drawingml/2006/main" xmlns:r="http://schemas.openxmlformats.org/officeDocument/2006/relationships" xmlns:p="http://schemas.openxmlformats.org/presentationml/2006/main">
+  <p:cSld>
+    <p:spTree>
+      <p:nvGrpSpPr>
+        <p:cNvPr id="1" name="">
+          <a:extLst>
+            <a:ext uri="{FF2B5EF4-FFF2-40B4-BE49-F238E27FC236}">
+              <a16:creationId xmlns:a16="http://schemas.microsoft.com/office/drawing/2014/main" id="{C0380915-6496-8594-95CA-983C936C84CF}"/>
+            </a:ext>
+          </a:extLst>
+        </p:cNvPr>
+        <p:cNvGrpSpPr/>
+        <p:nvPr/>
+      </p:nvGrpSpPr>
+      <p:grpSpPr>
+        <a:xfrm>
+          <a:off x="0" y="0"/>
+          <a:ext cx="0" cy="0"/>
+          <a:chOff x="0" y="0"/>
+          <a:chExt cx="0" cy="0"/>
+        </a:xfrm>
+      </p:grpSpPr>
+      <p:sp>
+        <p:nvSpPr>
+          <p:cNvPr id="2" name="Title 1">
+            <a:extLst>
+              <a:ext uri="{FF2B5EF4-FFF2-40B4-BE49-F238E27FC236}">
+                <a16:creationId xmlns:a16="http://schemas.microsoft.com/office/drawing/2014/main" id="{34E248AE-579D-3672-BC55-0435E386AF01}"/>
+              </a:ext>
+            </a:extLst>
+          </p:cNvPr>
+          <p:cNvSpPr>
+            <a:spLocks noGrp="1"/>
+          </p:cNvSpPr>
+          <p:nvPr>
+            <p:ph type="title"/>
+          </p:nvPr>
+        </p:nvSpPr>
+        <p:spPr/>
+        <p:txBody>
+          <a:bodyPr/>
+          <a:lstStyle/>
+          <a:p>
+            <a:r>
+              <a:rPr lang="en-US" dirty="0"/>
+              <a:t>Data Version Control</a:t>
+            </a:r>
+            <a:endParaRPr lang="LID4096" dirty="0"/>
+          </a:p>
+        </p:txBody>
+      </p:sp>
+      <p:sp>
+        <p:nvSpPr>
+          <p:cNvPr id="3" name="Text Placeholder 2">
+            <a:extLst>
+              <a:ext uri="{FF2B5EF4-FFF2-40B4-BE49-F238E27FC236}">
+                <a16:creationId xmlns:a16="http://schemas.microsoft.com/office/drawing/2014/main" id="{DAB69F1D-805B-C683-401C-988A9C78E401}"/>
+              </a:ext>
+            </a:extLst>
+          </p:cNvPr>
+          <p:cNvSpPr>
+            <a:spLocks noGrp="1"/>
+          </p:cNvSpPr>
+          <p:nvPr>
+            <p:ph type="body" idx="1"/>
+          </p:nvPr>
+        </p:nvSpPr>
+        <p:spPr/>
+        <p:txBody>
+          <a:bodyPr/>
+          <a:lstStyle/>
+          <a:p>
+            <a:r>
+              <a:rPr lang="en-US" dirty="0"/>
+              <a:t>Experiment management &amp; pipelines</a:t>
+            </a:r>
+            <a:endParaRPr lang="LID4096" dirty="0"/>
+          </a:p>
+        </p:txBody>
+      </p:sp>
+      <p:sp>
+        <p:nvSpPr>
+          <p:cNvPr id="4" name="Slide Number Placeholder 3">
+            <a:extLst>
+              <a:ext uri="{FF2B5EF4-FFF2-40B4-BE49-F238E27FC236}">
+                <a16:creationId xmlns:a16="http://schemas.microsoft.com/office/drawing/2014/main" id="{5F85FC04-9F55-83C4-BE76-F5E339243E71}"/>
+              </a:ext>
+            </a:extLst>
+          </p:cNvPr>
+          <p:cNvSpPr>
+            <a:spLocks noGrp="1"/>
+          </p:cNvSpPr>
+          <p:nvPr>
+            <p:ph type="sldNum" sz="quarter" idx="12"/>
+          </p:nvPr>
+        </p:nvSpPr>
+        <p:spPr/>
+        <p:txBody>
+          <a:bodyPr/>
+          <a:lstStyle/>
+          <a:p>
+            <a:fld id="{9C7CE217-4467-4B8D-A735-B008FA7C4816}" type="slidenum">
+              <a:rPr lang="LID4096" smtClean="0"/>
+              <a:t>44</a:t>
+            </a:fld>
+            <a:endParaRPr lang="LID4096"/>
+          </a:p>
+        </p:txBody>
+      </p:sp>
+      <p:pic>
+        <p:nvPicPr>
+          <p:cNvPr id="5" name="Picture 4">
+            <a:extLst>
+              <a:ext uri="{FF2B5EF4-FFF2-40B4-BE49-F238E27FC236}">
+                <a16:creationId xmlns:a16="http://schemas.microsoft.com/office/drawing/2014/main" id="{84D3830D-FC92-C049-8D91-E9C1645C2AE6}"/>
+              </a:ext>
+            </a:extLst>
+          </p:cNvPr>
+          <p:cNvPicPr>
+            <a:picLocks noChangeAspect="1"/>
+          </p:cNvPicPr>
+          <p:nvPr/>
+        </p:nvPicPr>
+        <p:blipFill>
+          <a:blip r:embed="rId2"/>
+          <a:stretch>
+            <a:fillRect/>
+          </a:stretch>
+        </p:blipFill>
+        <p:spPr>
+          <a:xfrm>
+            <a:off x="7775545" y="3429000"/>
+            <a:ext cx="2450335" cy="1527856"/>
+          </a:xfrm>
+          <a:prstGeom prst="rect">
+            <a:avLst/>
+          </a:prstGeom>
+        </p:spPr>
+      </p:pic>
+    </p:spTree>
+    <p:extLst>
+      <p:ext uri="{BB962C8B-B14F-4D97-AF65-F5344CB8AC3E}">
+        <p14:creationId xmlns:p14="http://schemas.microsoft.com/office/powerpoint/2010/main" val="2384991313"/>
+      </p:ext>
+    </p:extLst>
+  </p:cSld>
+  <p:clrMapOvr>
+    <a:masterClrMapping/>
+  </p:clrMapOvr>
+</p:sld>
+</file>
+
+<file path=ppt/slides/slide45.xml><?xml version="1.0" encoding="utf-8"?>
+<p:sld xmlns:a="http://schemas.openxmlformats.org/drawingml/2006/main" xmlns:r="http://schemas.openxmlformats.org/officeDocument/2006/relationships" xmlns:p="http://schemas.openxmlformats.org/presentationml/2006/main">
+  <p:cSld>
+    <p:bg>
+      <p:bgPr>
+        <a:solidFill>
+          <a:schemeClr val="bg1"/>
+        </a:solidFill>
+        <a:effectLst/>
+      </p:bgPr>
+    </p:bg>
+    <p:spTree>
+      <p:nvGrpSpPr>
+        <p:cNvPr id="1" name=""/>
+        <p:cNvGrpSpPr/>
+        <p:nvPr/>
+      </p:nvGrpSpPr>
+      <p:grpSpPr>
+        <a:xfrm>
+          <a:off x="0" y="0"/>
+          <a:ext cx="0" cy="0"/>
+          <a:chOff x="0" y="0"/>
+          <a:chExt cx="0" cy="0"/>
+        </a:xfrm>
+      </p:grpSpPr>
+      <p:sp useBgFill="1">
+        <p:nvSpPr>
+          <p:cNvPr id="12" name="Slide Background">
+            <a:extLst>
+              <a:ext uri="{FF2B5EF4-FFF2-40B4-BE49-F238E27FC236}">
+                <a16:creationId xmlns:a16="http://schemas.microsoft.com/office/drawing/2014/main" id="{C0763A76-9F1C-4FC5-82B7-DD475DA461B2}"/>
+              </a:ext>
+              <a:ext uri="{C183D7F6-B498-43B3-948B-1728B52AA6E4}">
+                <adec:decorative xmlns:adec="http://schemas.microsoft.com/office/drawing/2017/decorative" val="1"/>
+              </a:ext>
+            </a:extLst>
+          </p:cNvPr>
+          <p:cNvSpPr>
+            <a:spLocks noGrp="1" noRot="1" noChangeAspect="1" noMove="1" noResize="1" noEditPoints="1" noAdjustHandles="1" noChangeArrowheads="1" noChangeShapeType="1" noTextEdit="1"/>
+          </p:cNvSpPr>
+          <p:nvPr>
+            <p:extLst>
+              <p:ext uri="{386F3935-93C4-4BCD-93E2-E3B085C9AB24}">
+                <p16:designElem xmlns:p16="http://schemas.microsoft.com/office/powerpoint/2015/main" val="1"/>
+              </p:ext>
+            </p:extLst>
+          </p:nvPr>
+        </p:nvSpPr>
+        <p:spPr bwMode="white">
+          <a:xfrm>
+            <a:off x="-1" y="0"/>
+            <a:ext cx="12191999" cy="6858000"/>
+          </a:xfrm>
+          <a:prstGeom prst="rect">
+            <a:avLst/>
+          </a:prstGeom>
+          <a:ln>
+            <a:noFill/>
+          </a:ln>
+        </p:spPr>
+        <p:style>
+          <a:lnRef idx="2">
+            <a:schemeClr val="accent1">
+              <a:shade val="50000"/>
+            </a:schemeClr>
+          </a:lnRef>
+          <a:fillRef idx="1">
+            <a:schemeClr val="accent1"/>
+          </a:fillRef>
+          <a:effectRef idx="0">
+            <a:schemeClr val="accent1"/>
+          </a:effectRef>
+          <a:fontRef idx="minor">
+            <a:schemeClr val="lt1"/>
+          </a:fontRef>
+        </p:style>
+        <p:txBody>
+          <a:bodyPr rtlCol="0" anchor="ctr"/>
+          <a:lstStyle>
+            <a:defPPr>
+              <a:defRPr lang="en-US"/>
+            </a:defPPr>
+            <a:lvl1pPr marL="0" algn="l" defTabSz="914400" rtl="0" eaLnBrk="1" latinLnBrk="0" hangingPunct="1">
+              <a:defRPr sz="1800" kern="1200">
+                <a:solidFill>
+                  <a:schemeClr val="lt1"/>
+                </a:solidFill>
+                <a:latin typeface="+mn-lt"/>
+                <a:ea typeface="+mn-ea"/>
+                <a:cs typeface="+mn-cs"/>
+              </a:defRPr>
+            </a:lvl1pPr>
+            <a:lvl2pPr marL="457200" algn="l" defTabSz="914400" rtl="0" eaLnBrk="1" latinLnBrk="0" hangingPunct="1">
+              <a:defRPr sz="1800" kern="1200">
+                <a:solidFill>
+                  <a:schemeClr val="lt1"/>
+                </a:solidFill>
+                <a:latin typeface="+mn-lt"/>
+                <a:ea typeface="+mn-ea"/>
+                <a:cs typeface="+mn-cs"/>
+              </a:defRPr>
+            </a:lvl2pPr>
+            <a:lvl3pPr marL="914400" algn="l" defTabSz="914400" rtl="0" eaLnBrk="1" latinLnBrk="0" hangingPunct="1">
+              <a:defRPr sz="1800" kern="1200">
+                <a:solidFill>
+                  <a:schemeClr val="lt1"/>
+                </a:solidFill>
+                <a:latin typeface="+mn-lt"/>
+                <a:ea typeface="+mn-ea"/>
+                <a:cs typeface="+mn-cs"/>
+              </a:defRPr>
+            </a:lvl3pPr>
+            <a:lvl4pPr marL="1371600" algn="l" defTabSz="914400" rtl="0" eaLnBrk="1" latinLnBrk="0" hangingPunct="1">
+              <a:defRPr sz="1800" kern="1200">
+                <a:solidFill>
+                  <a:schemeClr val="lt1"/>
+                </a:solidFill>
+                <a:latin typeface="+mn-lt"/>
+                <a:ea typeface="+mn-ea"/>
+                <a:cs typeface="+mn-cs"/>
+              </a:defRPr>
+            </a:lvl4pPr>
+            <a:lvl5pPr marL="1828800" algn="l" defTabSz="914400" rtl="0" eaLnBrk="1" latinLnBrk="0" hangingPunct="1">
+              <a:defRPr sz="1800" kern="1200">
+                <a:solidFill>
+                  <a:schemeClr val="lt1"/>
+                </a:solidFill>
+                <a:latin typeface="+mn-lt"/>
+                <a:ea typeface="+mn-ea"/>
+                <a:cs typeface="+mn-cs"/>
+              </a:defRPr>
+            </a:lvl5pPr>
+            <a:lvl6pPr marL="2286000" algn="l" defTabSz="914400" rtl="0" eaLnBrk="1" latinLnBrk="0" hangingPunct="1">
+              <a:defRPr sz="1800" kern="1200">
+                <a:solidFill>
+                  <a:schemeClr val="lt1"/>
+                </a:solidFill>
+                <a:latin typeface="+mn-lt"/>
+                <a:ea typeface="+mn-ea"/>
+                <a:cs typeface="+mn-cs"/>
+              </a:defRPr>
+            </a:lvl6pPr>
+            <a:lvl7pPr marL="2743200" algn="l" defTabSz="914400" rtl="0" eaLnBrk="1" latinLnBrk="0" hangingPunct="1">
+              <a:defRPr sz="1800" kern="1200">
+                <a:solidFill>
+                  <a:schemeClr val="lt1"/>
+                </a:solidFill>
+                <a:latin typeface="+mn-lt"/>
+                <a:ea typeface="+mn-ea"/>
+                <a:cs typeface="+mn-cs"/>
+              </a:defRPr>
+            </a:lvl7pPr>
+            <a:lvl8pPr marL="3200400" algn="l" defTabSz="914400" rtl="0" eaLnBrk="1" latinLnBrk="0" hangingPunct="1">
+              <a:defRPr sz="1800" kern="1200">
+                <a:solidFill>
+                  <a:schemeClr val="lt1"/>
+                </a:solidFill>
+                <a:latin typeface="+mn-lt"/>
+                <a:ea typeface="+mn-ea"/>
+                <a:cs typeface="+mn-cs"/>
+              </a:defRPr>
+            </a:lvl8pPr>
+            <a:lvl9pPr marL="3657600" algn="l" defTabSz="914400" rtl="0" eaLnBrk="1" latinLnBrk="0" hangingPunct="1">
+              <a:defRPr sz="1800" kern="1200">
+                <a:solidFill>
+                  <a:schemeClr val="lt1"/>
+                </a:solidFill>
+                <a:latin typeface="+mn-lt"/>
+                <a:ea typeface="+mn-ea"/>
+                <a:cs typeface="+mn-cs"/>
+              </a:defRPr>
+            </a:lvl9pPr>
+          </a:lstStyle>
+          <a:p>
+            <a:pPr algn="ctr"/>
+            <a:endParaRPr lang="en-US"/>
+          </a:p>
+        </p:txBody>
+      </p:sp>
+      <p:sp useBgFill="1">
+        <p:nvSpPr>
+          <p:cNvPr id="14" name="Rectangle 13">
+            <a:extLst>
+              <a:ext uri="{FF2B5EF4-FFF2-40B4-BE49-F238E27FC236}">
+                <a16:creationId xmlns:a16="http://schemas.microsoft.com/office/drawing/2014/main" id="{E81BF4F6-F2CF-4984-9D14-D6966D92F99F}"/>
+              </a:ext>
+              <a:ext uri="{C183D7F6-B498-43B3-948B-1728B52AA6E4}">
+                <adec:decorative xmlns:adec="http://schemas.microsoft.com/office/drawing/2017/decorative" val="1"/>
+              </a:ext>
+            </a:extLst>
+          </p:cNvPr>
+          <p:cNvSpPr>
+            <a:spLocks noGrp="1" noRot="1" noChangeAspect="1" noMove="1" noResize="1" noEditPoints="1" noAdjustHandles="1" noChangeArrowheads="1" noChangeShapeType="1" noTextEdit="1"/>
+          </p:cNvSpPr>
+          <p:nvPr>
+            <p:extLst>
+              <p:ext uri="{386F3935-93C4-4BCD-93E2-E3B085C9AB24}">
+                <p16:designElem xmlns:p16="http://schemas.microsoft.com/office/powerpoint/2015/main" val="1"/>
+              </p:ext>
+            </p:extLst>
+          </p:nvPr>
+        </p:nvSpPr>
+        <p:spPr>
+          <a:xfrm>
+            <a:off x="1" y="0"/>
+            <a:ext cx="8522446" cy="2285999"/>
+          </a:xfrm>
+          <a:prstGeom prst="rect">
+            <a:avLst/>
+          </a:prstGeom>
+          <a:ln>
+            <a:noFill/>
+          </a:ln>
+          <a:effectLst>
+            <a:outerShdw blurRad="596900" dist="304800" dir="7140000" sx="90000" sy="90000" algn="t" rotWithShape="0">
+              <a:srgbClr val="000000">
+                <a:alpha val="15000"/>
+              </a:srgbClr>
+            </a:outerShdw>
+          </a:effectLst>
+        </p:spPr>
+        <p:style>
+          <a:lnRef idx="2">
+            <a:schemeClr val="accent1">
+              <a:shade val="50000"/>
+            </a:schemeClr>
+          </a:lnRef>
+          <a:fillRef idx="1">
+            <a:schemeClr val="accent1"/>
+          </a:fillRef>
+          <a:effectRef idx="0">
+            <a:schemeClr val="accent1"/>
+          </a:effectRef>
+          <a:fontRef idx="minor">
+            <a:schemeClr val="lt1"/>
+          </a:fontRef>
+        </p:style>
+        <p:txBody>
+          <a:bodyPr rtlCol="0" anchor="ctr"/>
+          <a:lstStyle/>
+          <a:p>
+            <a:pPr algn="ctr"/>
+            <a:endParaRPr lang="en-US"/>
+          </a:p>
+        </p:txBody>
+      </p:sp>
+      <p:sp>
+        <p:nvSpPr>
+          <p:cNvPr id="5" name="Title 4">
+            <a:extLst>
+              <a:ext uri="{FF2B5EF4-FFF2-40B4-BE49-F238E27FC236}">
+                <a16:creationId xmlns:a16="http://schemas.microsoft.com/office/drawing/2014/main" id="{D9E7FA19-4BC4-C638-81F6-077D0A15990B}"/>
+              </a:ext>
+            </a:extLst>
+          </p:cNvPr>
+          <p:cNvSpPr>
+            <a:spLocks noGrp="1"/>
+          </p:cNvSpPr>
+          <p:nvPr>
+            <p:ph type="title"/>
+          </p:nvPr>
+        </p:nvSpPr>
+        <p:spPr>
+          <a:xfrm>
+            <a:off x="761803" y="350196"/>
+            <a:ext cx="4646904" cy="1624520"/>
+          </a:xfrm>
+        </p:spPr>
+        <p:txBody>
+          <a:bodyPr anchor="ctr">
+            <a:normAutofit/>
+          </a:bodyPr>
+          <a:lstStyle/>
+          <a:p>
+            <a:r>
+              <a:rPr lang="en-US" sz="4000"/>
+              <a:t>Pipelines &amp; DVCLive</a:t>
+            </a:r>
+            <a:endParaRPr lang="LID4096" sz="4000"/>
+          </a:p>
+        </p:txBody>
+      </p:sp>
+      <p:sp>
+        <p:nvSpPr>
+          <p:cNvPr id="6" name="Content Placeholder 5">
+            <a:extLst>
+              <a:ext uri="{FF2B5EF4-FFF2-40B4-BE49-F238E27FC236}">
+                <a16:creationId xmlns:a16="http://schemas.microsoft.com/office/drawing/2014/main" id="{20528C44-C257-7D56-531F-9ACBC298B7E4}"/>
+              </a:ext>
+            </a:extLst>
+          </p:cNvPr>
+          <p:cNvSpPr>
+            <a:spLocks noGrp="1"/>
+          </p:cNvSpPr>
+          <p:nvPr>
+            <p:ph idx="1"/>
+          </p:nvPr>
+        </p:nvSpPr>
+        <p:spPr>
+          <a:xfrm>
+            <a:off x="761802" y="2743200"/>
+            <a:ext cx="4646905" cy="3613149"/>
+          </a:xfrm>
+        </p:spPr>
+        <p:txBody>
+          <a:bodyPr anchor="ctr">
+            <a:normAutofit/>
+          </a:bodyPr>
+          <a:lstStyle/>
+          <a:p>
+            <a:r>
+              <a:rPr lang="en-US" sz="2000" dirty="0"/>
+              <a:t>Experiment == stage</a:t>
+            </a:r>
+          </a:p>
+          <a:p>
+            <a:pPr lvl="1"/>
+            <a:r>
+              <a:rPr lang="en-US" sz="2000" dirty="0"/>
+              <a:t>Uses </a:t>
+            </a:r>
+            <a:r>
+              <a:rPr lang="en-US" sz="2000" dirty="0" err="1"/>
+              <a:t>DVCLive</a:t>
+            </a:r>
+            <a:endParaRPr lang="en-US" sz="2000" dirty="0"/>
+          </a:p>
+          <a:p>
+            <a:r>
+              <a:rPr lang="en-US" sz="2400" dirty="0"/>
+              <a:t>Keep track of</a:t>
+            </a:r>
+          </a:p>
+          <a:p>
+            <a:pPr lvl="1"/>
+            <a:r>
+              <a:rPr lang="en-US" sz="2000" dirty="0"/>
+              <a:t>Dependencies</a:t>
+            </a:r>
+          </a:p>
+          <a:p>
+            <a:pPr lvl="1"/>
+            <a:r>
+              <a:rPr lang="en-US" sz="2000" dirty="0"/>
+              <a:t>Parameters</a:t>
+            </a:r>
+          </a:p>
+          <a:p>
+            <a:pPr lvl="1"/>
+            <a:r>
+              <a:rPr lang="en-US" sz="2000" dirty="0"/>
+              <a:t>Metrics</a:t>
+            </a:r>
+          </a:p>
+          <a:p>
+            <a:pPr lvl="1"/>
+            <a:r>
+              <a:rPr lang="en-US" sz="2000" dirty="0"/>
+              <a:t>Outputs</a:t>
+            </a:r>
+            <a:endParaRPr lang="LID4096" sz="2000" dirty="0"/>
+          </a:p>
+        </p:txBody>
+      </p:sp>
+      <p:pic>
+        <p:nvPicPr>
+          <p:cNvPr id="8" name="Picture 7" descr="Manometer beer equipment">
+            <a:extLst>
+              <a:ext uri="{FF2B5EF4-FFF2-40B4-BE49-F238E27FC236}">
+                <a16:creationId xmlns:a16="http://schemas.microsoft.com/office/drawing/2014/main" id="{01EE5749-D367-9BA3-1232-18424D093EA9}"/>
+              </a:ext>
+            </a:extLst>
+          </p:cNvPr>
+          <p:cNvPicPr>
+            <a:picLocks noChangeAspect="1"/>
+          </p:cNvPicPr>
+          <p:nvPr/>
+        </p:nvPicPr>
+        <p:blipFill>
+          <a:blip r:embed="rId2"/>
+          <a:srcRect l="33039" r="8006" b="-1"/>
+          <a:stretch>
+            <a:fillRect/>
+          </a:stretch>
+        </p:blipFill>
+        <p:spPr>
+          <a:xfrm>
+            <a:off x="6096000" y="1"/>
+            <a:ext cx="6102825" cy="6858000"/>
+          </a:xfrm>
+          <a:prstGeom prst="rect">
+            <a:avLst/>
+          </a:prstGeom>
+        </p:spPr>
+      </p:pic>
+      <p:sp>
+        <p:nvSpPr>
+          <p:cNvPr id="4" name="Slide Number Placeholder 3">
+            <a:extLst>
+              <a:ext uri="{FF2B5EF4-FFF2-40B4-BE49-F238E27FC236}">
+                <a16:creationId xmlns:a16="http://schemas.microsoft.com/office/drawing/2014/main" id="{34D450FD-72CB-BD96-1D52-EE1365A0BABA}"/>
+              </a:ext>
+            </a:extLst>
+          </p:cNvPr>
+          <p:cNvSpPr>
+            <a:spLocks noGrp="1"/>
+          </p:cNvSpPr>
+          <p:nvPr>
+            <p:ph type="sldNum" sz="quarter" idx="12"/>
+          </p:nvPr>
+        </p:nvSpPr>
+        <p:spPr>
+          <a:xfrm>
+            <a:off x="8732520" y="6356350"/>
+            <a:ext cx="3200400" cy="365125"/>
+          </a:xfrm>
+        </p:spPr>
+        <p:txBody>
+          <a:bodyPr>
+            <a:normAutofit/>
+          </a:bodyPr>
+          <a:lstStyle/>
+          <a:p>
+            <a:pPr>
+              <a:spcAft>
+                <a:spcPts val="600"/>
+              </a:spcAft>
+            </a:pPr>
+            <a:fld id="{9C7CE217-4467-4B8D-A735-B008FA7C4816}" type="slidenum">
+              <a:rPr lang="LID4096">
+                <a:solidFill>
+                  <a:srgbClr val="FFFFFF"/>
+                </a:solidFill>
+              </a:rPr>
+              <a:pPr>
+                <a:spcAft>
+                  <a:spcPts val="600"/>
+                </a:spcAft>
+              </a:pPr>
+              <a:t>45</a:t>
+            </a:fld>
+            <a:endParaRPr lang="LID4096">
+              <a:solidFill>
+                <a:srgbClr val="FFFFFF"/>
+              </a:solidFill>
+            </a:endParaRPr>
+          </a:p>
+        </p:txBody>
+      </p:sp>
+    </p:spTree>
+    <p:extLst>
+      <p:ext uri="{BB962C8B-B14F-4D97-AF65-F5344CB8AC3E}">
+        <p14:creationId xmlns:p14="http://schemas.microsoft.com/office/powerpoint/2010/main" val="3385275385"/>
+      </p:ext>
+    </p:extLst>
+  </p:cSld>
+  <p:clrMapOvr>
+    <a:masterClrMapping/>
+  </p:clrMapOvr>
+</p:sld>
+</file>
+
+<file path=ppt/slides/slide46.xml><?xml version="1.0" encoding="utf-8"?>
+<p:sld xmlns:a="http://schemas.openxmlformats.org/drawingml/2006/main" xmlns:r="http://schemas.openxmlformats.org/officeDocument/2006/relationships" xmlns:p="http://schemas.openxmlformats.org/presentationml/2006/main">
+  <p:cSld>
+    <p:spTree>
+      <p:nvGrpSpPr>
+        <p:cNvPr id="1" name=""/>
+        <p:cNvGrpSpPr/>
+        <p:nvPr/>
+      </p:nvGrpSpPr>
+      <p:grpSpPr>
+        <a:xfrm>
+          <a:off x="0" y="0"/>
+          <a:ext cx="0" cy="0"/>
+          <a:chOff x="0" y="0"/>
+          <a:chExt cx="0" cy="0"/>
+        </a:xfrm>
+      </p:grpSpPr>
+      <p:sp>
+        <p:nvSpPr>
+          <p:cNvPr id="2" name="Title 1">
+            <a:extLst>
+              <a:ext uri="{FF2B5EF4-FFF2-40B4-BE49-F238E27FC236}">
+                <a16:creationId xmlns:a16="http://schemas.microsoft.com/office/drawing/2014/main" id="{54C82DBD-FEF5-0FF4-FBD1-3F111CAB91BC}"/>
+              </a:ext>
+            </a:extLst>
+          </p:cNvPr>
+          <p:cNvSpPr>
+            <a:spLocks noGrp="1"/>
+          </p:cNvSpPr>
+          <p:nvPr>
+            <p:ph type="title"/>
+          </p:nvPr>
+        </p:nvSpPr>
+        <p:spPr/>
+        <p:txBody>
+          <a:bodyPr/>
+          <a:lstStyle/>
+          <a:p>
+            <a:r>
+              <a:rPr lang="en-US" dirty="0"/>
+              <a:t>Experiments in pipelines</a:t>
+            </a:r>
+            <a:endParaRPr lang="LID4096" dirty="0"/>
+          </a:p>
+        </p:txBody>
+      </p:sp>
+      <p:sp>
+        <p:nvSpPr>
+          <p:cNvPr id="3" name="Content Placeholder 2">
+            <a:extLst>
+              <a:ext uri="{FF2B5EF4-FFF2-40B4-BE49-F238E27FC236}">
+                <a16:creationId xmlns:a16="http://schemas.microsoft.com/office/drawing/2014/main" id="{E79D0B90-64C3-3AD3-CA17-042F56417865}"/>
+              </a:ext>
+            </a:extLst>
+          </p:cNvPr>
+          <p:cNvSpPr>
+            <a:spLocks noGrp="1"/>
+          </p:cNvSpPr>
+          <p:nvPr>
+            <p:ph idx="1"/>
+          </p:nvPr>
+        </p:nvSpPr>
+        <p:spPr/>
+        <p:txBody>
+          <a:bodyPr/>
+          <a:lstStyle/>
+          <a:p>
+            <a:r>
+              <a:rPr lang="en-US" dirty="0"/>
+              <a:t>Add stage as usual</a:t>
+            </a:r>
+          </a:p>
+          <a:p>
+            <a:pPr lvl="1"/>
+            <a:r>
+              <a:rPr lang="en-US" dirty="0"/>
+              <a:t>Contains </a:t>
+            </a:r>
+            <a:r>
+              <a:rPr lang="en-US" dirty="0" err="1"/>
+              <a:t>DVCLive</a:t>
+            </a:r>
+            <a:r>
+              <a:rPr lang="en-US" dirty="0"/>
+              <a:t> experiment management</a:t>
+            </a:r>
+          </a:p>
+          <a:p>
+            <a:pPr lvl="1"/>
+            <a:r>
+              <a:rPr lang="en-US" dirty="0"/>
+              <a:t>Parameters read from </a:t>
+            </a:r>
+            <a:r>
+              <a:rPr lang="en-US" dirty="0" err="1">
+                <a:latin typeface="Courier New" panose="02070309020205020404" pitchFamily="49" charset="0"/>
+                <a:cs typeface="Courier New" panose="02070309020205020404" pitchFamily="49" charset="0"/>
+              </a:rPr>
+              <a:t>params.yaml</a:t>
+            </a:r>
+            <a:endParaRPr lang="en-US" dirty="0">
+              <a:latin typeface="Courier New" panose="02070309020205020404" pitchFamily="49" charset="0"/>
+              <a:cs typeface="Courier New" panose="02070309020205020404" pitchFamily="49" charset="0"/>
+            </a:endParaRPr>
+          </a:p>
+          <a:p>
+            <a:r>
+              <a:rPr lang="en-US" dirty="0"/>
+              <a:t>Run experiment</a:t>
+            </a:r>
+          </a:p>
+          <a:p>
+            <a:endParaRPr lang="en-US" dirty="0"/>
+          </a:p>
+          <a:p>
+            <a:r>
+              <a:rPr lang="en-US" dirty="0"/>
+              <a:t>Run experiment with specific parameter value</a:t>
+            </a:r>
+          </a:p>
+          <a:p>
+            <a:endParaRPr lang="en-US" dirty="0"/>
+          </a:p>
+          <a:p>
+            <a:r>
+              <a:rPr lang="en-US" dirty="0"/>
+              <a:t>Prepare workspace for specific experiment, e.g., </a:t>
+            </a:r>
+            <a:r>
+              <a:rPr lang="en-US" dirty="0" err="1">
+                <a:latin typeface="Courier New" panose="02070309020205020404" pitchFamily="49" charset="0"/>
+                <a:cs typeface="Courier New" panose="02070309020205020404" pitchFamily="49" charset="0"/>
+              </a:rPr>
+              <a:t>high_a</a:t>
+            </a:r>
+            <a:endParaRPr lang="en-US" dirty="0">
+              <a:latin typeface="Courier New" panose="02070309020205020404" pitchFamily="49" charset="0"/>
+              <a:cs typeface="Courier New" panose="02070309020205020404" pitchFamily="49" charset="0"/>
+            </a:endParaRPr>
+          </a:p>
+          <a:p>
+            <a:endParaRPr lang="en-US" dirty="0"/>
+          </a:p>
+          <a:p>
+            <a:endParaRPr lang="LID4096" dirty="0"/>
+          </a:p>
+        </p:txBody>
+      </p:sp>
+      <p:sp>
+        <p:nvSpPr>
+          <p:cNvPr id="4" name="Slide Number Placeholder 3">
+            <a:extLst>
+              <a:ext uri="{FF2B5EF4-FFF2-40B4-BE49-F238E27FC236}">
+                <a16:creationId xmlns:a16="http://schemas.microsoft.com/office/drawing/2014/main" id="{8F8322AA-E6A9-9A7E-60AC-B72ED487031C}"/>
+              </a:ext>
+            </a:extLst>
+          </p:cNvPr>
+          <p:cNvSpPr>
+            <a:spLocks noGrp="1"/>
+          </p:cNvSpPr>
+          <p:nvPr>
+            <p:ph type="sldNum" sz="quarter" idx="12"/>
+          </p:nvPr>
+        </p:nvSpPr>
+        <p:spPr/>
+        <p:txBody>
+          <a:bodyPr/>
+          <a:lstStyle/>
+          <a:p>
+            <a:fld id="{9C7CE217-4467-4B8D-A735-B008FA7C4816}" type="slidenum">
+              <a:rPr lang="LID4096" smtClean="0"/>
+              <a:t>46</a:t>
+            </a:fld>
+            <a:endParaRPr lang="LID4096"/>
+          </a:p>
+        </p:txBody>
+      </p:sp>
+      <p:sp>
+        <p:nvSpPr>
+          <p:cNvPr id="5" name="TextBox 4">
+            <a:extLst>
+              <a:ext uri="{FF2B5EF4-FFF2-40B4-BE49-F238E27FC236}">
+                <a16:creationId xmlns:a16="http://schemas.microsoft.com/office/drawing/2014/main" id="{F618B632-4041-16BF-9C39-26D4BD9DEEC1}"/>
+              </a:ext>
+            </a:extLst>
+          </p:cNvPr>
+          <p:cNvSpPr txBox="1"/>
+          <p:nvPr/>
+        </p:nvSpPr>
+        <p:spPr>
+          <a:xfrm>
+            <a:off x="1349828" y="3609890"/>
+            <a:ext cx="5606143" cy="369332"/>
+          </a:xfrm>
+          <a:prstGeom prst="rect">
+            <a:avLst/>
+          </a:prstGeom>
+          <a:solidFill>
+            <a:schemeClr val="tx1"/>
+          </a:solidFill>
+          <a:ln>
+            <a:solidFill>
+              <a:schemeClr val="tx1"/>
+            </a:solidFill>
+          </a:ln>
+        </p:spPr>
+        <p:txBody>
+          <a:bodyPr wrap="square" rtlCol="0">
+            <a:spAutoFit/>
+          </a:bodyPr>
+          <a:lstStyle/>
+          <a:p>
+            <a:r>
+              <a:rPr lang="en-US" b="1" dirty="0">
+                <a:solidFill>
+                  <a:schemeClr val="bg1"/>
+                </a:solidFill>
+                <a:latin typeface="Courier New" pitchFamily="49" charset="0"/>
+                <a:cs typeface="Courier New" pitchFamily="49" charset="0"/>
+              </a:rPr>
+              <a:t>$  </a:t>
+            </a:r>
+            <a:r>
+              <a:rPr lang="en-US" b="1" dirty="0" err="1">
+                <a:solidFill>
+                  <a:schemeClr val="bg1"/>
+                </a:solidFill>
+                <a:latin typeface="Courier New" pitchFamily="49" charset="0"/>
+                <a:cs typeface="Courier New" pitchFamily="49" charset="0"/>
+              </a:rPr>
+              <a:t>dvc</a:t>
+            </a:r>
+            <a:r>
+              <a:rPr lang="en-US" b="1" dirty="0">
+                <a:solidFill>
+                  <a:schemeClr val="bg1"/>
+                </a:solidFill>
+                <a:latin typeface="Courier New" pitchFamily="49" charset="0"/>
+                <a:cs typeface="Courier New" pitchFamily="49" charset="0"/>
+              </a:rPr>
+              <a:t> exp run</a:t>
+            </a:r>
+            <a:endParaRPr lang="nl-BE" b="1" dirty="0">
+              <a:solidFill>
+                <a:schemeClr val="bg1"/>
+              </a:solidFill>
+              <a:latin typeface="Courier New" pitchFamily="49" charset="0"/>
+              <a:cs typeface="Courier New" pitchFamily="49" charset="0"/>
+            </a:endParaRPr>
+          </a:p>
+        </p:txBody>
+      </p:sp>
+      <p:sp>
+        <p:nvSpPr>
+          <p:cNvPr id="6" name="TextBox 5">
+            <a:extLst>
+              <a:ext uri="{FF2B5EF4-FFF2-40B4-BE49-F238E27FC236}">
+                <a16:creationId xmlns:a16="http://schemas.microsoft.com/office/drawing/2014/main" id="{8041F1C2-ABC2-273C-7742-1E9CE66F2C17}"/>
+              </a:ext>
+            </a:extLst>
+          </p:cNvPr>
+          <p:cNvSpPr txBox="1"/>
+          <p:nvPr/>
+        </p:nvSpPr>
+        <p:spPr>
+          <a:xfrm>
+            <a:off x="1349827" y="4632558"/>
+            <a:ext cx="5606143" cy="369332"/>
+          </a:xfrm>
+          <a:prstGeom prst="rect">
+            <a:avLst/>
+          </a:prstGeom>
+          <a:solidFill>
+            <a:schemeClr val="tx1"/>
+          </a:solidFill>
+          <a:ln>
+            <a:solidFill>
+              <a:schemeClr val="tx1"/>
+            </a:solidFill>
+          </a:ln>
+        </p:spPr>
+        <p:txBody>
+          <a:bodyPr wrap="square" rtlCol="0">
+            <a:spAutoFit/>
+          </a:bodyPr>
+          <a:lstStyle/>
+          <a:p>
+            <a:r>
+              <a:rPr lang="en-US" b="1" dirty="0">
+                <a:solidFill>
+                  <a:schemeClr val="bg1"/>
+                </a:solidFill>
+                <a:latin typeface="Courier New" pitchFamily="49" charset="0"/>
+                <a:cs typeface="Courier New" pitchFamily="49" charset="0"/>
+              </a:rPr>
+              <a:t>$  </a:t>
+            </a:r>
+            <a:r>
+              <a:rPr lang="en-US" b="1" dirty="0" err="1">
+                <a:solidFill>
+                  <a:schemeClr val="bg1"/>
+                </a:solidFill>
+                <a:latin typeface="Courier New" pitchFamily="49" charset="0"/>
+                <a:cs typeface="Courier New" pitchFamily="49" charset="0"/>
+              </a:rPr>
+              <a:t>dvc</a:t>
+            </a:r>
+            <a:r>
+              <a:rPr lang="en-US" b="1" dirty="0">
+                <a:solidFill>
+                  <a:schemeClr val="bg1"/>
+                </a:solidFill>
+                <a:latin typeface="Courier New" pitchFamily="49" charset="0"/>
+                <a:cs typeface="Courier New" pitchFamily="49" charset="0"/>
+              </a:rPr>
+              <a:t> exp run  --set-param a=2.0</a:t>
+            </a:r>
+            <a:endParaRPr lang="nl-BE" b="1" dirty="0">
+              <a:solidFill>
+                <a:schemeClr val="bg1"/>
+              </a:solidFill>
+              <a:latin typeface="Courier New" pitchFamily="49" charset="0"/>
+              <a:cs typeface="Courier New" pitchFamily="49" charset="0"/>
+            </a:endParaRPr>
+          </a:p>
+        </p:txBody>
+      </p:sp>
+      <p:grpSp>
+        <p:nvGrpSpPr>
+          <p:cNvPr id="7" name="Group 6">
+            <a:extLst>
+              <a:ext uri="{FF2B5EF4-FFF2-40B4-BE49-F238E27FC236}">
+                <a16:creationId xmlns:a16="http://schemas.microsoft.com/office/drawing/2014/main" id="{D8B25769-28A9-2124-8B58-79C5B91E1965}"/>
+              </a:ext>
+            </a:extLst>
+          </p:cNvPr>
+          <p:cNvGrpSpPr/>
+          <p:nvPr/>
+        </p:nvGrpSpPr>
+        <p:grpSpPr>
+          <a:xfrm>
+            <a:off x="7456714" y="4172597"/>
+            <a:ext cx="3897086" cy="830997"/>
+            <a:chOff x="-418324" y="5501785"/>
+            <a:chExt cx="6135578" cy="754469"/>
+          </a:xfrm>
+        </p:grpSpPr>
+        <p:sp>
+          <p:nvSpPr>
+            <p:cNvPr id="8" name="TextBox 7">
+              <a:extLst>
+                <a:ext uri="{FF2B5EF4-FFF2-40B4-BE49-F238E27FC236}">
+                  <a16:creationId xmlns:a16="http://schemas.microsoft.com/office/drawing/2014/main" id="{BA518634-1A20-8570-E9E3-2B7A841DD994}"/>
+                </a:ext>
+              </a:extLst>
+            </p:cNvPr>
+            <p:cNvSpPr txBox="1"/>
+            <p:nvPr/>
+          </p:nvSpPr>
+          <p:spPr>
+            <a:xfrm>
+              <a:off x="2083561" y="5501785"/>
+              <a:ext cx="3633693" cy="754469"/>
+            </a:xfrm>
+            <a:prstGeom prst="rect">
+              <a:avLst/>
+            </a:prstGeom>
+            <a:solidFill>
+              <a:schemeClr val="bg1"/>
+            </a:solidFill>
+            <a:ln w="19050">
+              <a:solidFill>
+                <a:srgbClr val="C00000"/>
+              </a:solidFill>
+            </a:ln>
+          </p:spPr>
+          <p:txBody>
+            <a:bodyPr wrap="square" rtlCol="0">
+              <a:spAutoFit/>
+            </a:bodyPr>
+            <a:lstStyle/>
+            <a:p>
+              <a:pPr marL="0" marR="0" lvl="0" indent="0" algn="l" defTabSz="914400" rtl="0" eaLnBrk="1" fontAlgn="auto" latinLnBrk="0" hangingPunct="1">
+                <a:lnSpc>
+                  <a:spcPct val="100000"/>
+                </a:lnSpc>
+                <a:spcBef>
+                  <a:spcPts val="0"/>
+                </a:spcBef>
+                <a:spcAft>
+                  <a:spcPts val="0"/>
+                </a:spcAft>
+                <a:buClrTx/>
+                <a:buSzTx/>
+                <a:buFontTx/>
+                <a:buNone/>
+                <a:tabLst/>
+                <a:defRPr/>
+              </a:pPr>
+              <a:r>
+                <a:rPr kumimoji="0" lang="en-US" sz="2400" b="0" i="0" u="none" strike="noStrike" kern="1200" cap="none" spc="0" normalizeH="0" baseline="0" noProof="0" dirty="0">
+                  <a:ln>
+                    <a:noFill/>
+                  </a:ln>
+                  <a:solidFill>
+                    <a:prstClr val="black"/>
+                  </a:solidFill>
+                  <a:effectLst/>
+                  <a:uLnTx/>
+                  <a:uFillTx/>
+                  <a:ea typeface="+mn-ea"/>
+                  <a:cs typeface="+mn-cs"/>
+                </a:rPr>
+                <a:t>Modifies </a:t>
+              </a:r>
+              <a:r>
+                <a:rPr kumimoji="0" lang="en-US" sz="2400" b="0" i="0" u="none" strike="noStrike" kern="1200" cap="none" spc="0" normalizeH="0" baseline="0" noProof="0" dirty="0" err="1">
+                  <a:ln>
+                    <a:noFill/>
+                  </a:ln>
+                  <a:solidFill>
+                    <a:prstClr val="black"/>
+                  </a:solidFill>
+                  <a:effectLst/>
+                  <a:uLnTx/>
+                  <a:uFillTx/>
+                  <a:latin typeface="Courier New" panose="02070309020205020404" pitchFamily="49" charset="0"/>
+                  <a:cs typeface="Courier New" panose="02070309020205020404" pitchFamily="49" charset="0"/>
+                </a:rPr>
+                <a:t>params.yaml</a:t>
+              </a:r>
+              <a:endParaRPr kumimoji="0" lang="nl-BE" sz="2400" b="0" i="0" u="none" strike="noStrike" kern="1200" cap="none" spc="0" normalizeH="0" baseline="0" noProof="0" dirty="0">
+                <a:ln>
+                  <a:noFill/>
+                </a:ln>
+                <a:solidFill>
+                  <a:prstClr val="black"/>
+                </a:solidFill>
+                <a:effectLst/>
+                <a:uLnTx/>
+                <a:uFillTx/>
+                <a:latin typeface="Courier New" panose="02070309020205020404" pitchFamily="49" charset="0"/>
+                <a:cs typeface="Courier New" panose="02070309020205020404" pitchFamily="49" charset="0"/>
+              </a:endParaRPr>
+            </a:p>
+          </p:txBody>
+        </p:sp>
+        <p:cxnSp>
+          <p:nvCxnSpPr>
+            <p:cNvPr id="9" name="Straight Arrow Connector 8">
+              <a:extLst>
+                <a:ext uri="{FF2B5EF4-FFF2-40B4-BE49-F238E27FC236}">
+                  <a16:creationId xmlns:a16="http://schemas.microsoft.com/office/drawing/2014/main" id="{9C4A9833-410D-0FDB-BCC7-786F2FC6A843}"/>
+                </a:ext>
+              </a:extLst>
+            </p:cNvPr>
+            <p:cNvCxnSpPr>
+              <a:cxnSpLocks/>
+              <a:stCxn id="8" idx="1"/>
+            </p:cNvCxnSpPr>
+            <p:nvPr/>
+          </p:nvCxnSpPr>
+          <p:spPr>
+            <a:xfrm flipH="1">
+              <a:off x="-418324" y="5879020"/>
+              <a:ext cx="2501884" cy="208027"/>
+            </a:xfrm>
+            <a:prstGeom prst="straightConnector1">
+              <a:avLst/>
+            </a:prstGeom>
+            <a:ln w="28575">
+              <a:solidFill>
+                <a:srgbClr val="C00000"/>
+              </a:solidFill>
+              <a:tailEnd type="stealth" w="lg" len="lg"/>
+            </a:ln>
+          </p:spPr>
+          <p:style>
+            <a:lnRef idx="1">
+              <a:schemeClr val="accent1"/>
+            </a:lnRef>
+            <a:fillRef idx="0">
+              <a:schemeClr val="accent1"/>
+            </a:fillRef>
+            <a:effectRef idx="0">
+              <a:schemeClr val="accent1"/>
+            </a:effectRef>
+            <a:fontRef idx="minor">
+              <a:schemeClr val="tx1"/>
+            </a:fontRef>
+          </p:style>
+        </p:cxnSp>
+      </p:grpSp>
+      <p:sp>
+        <p:nvSpPr>
+          <p:cNvPr id="13" name="TextBox 12">
+            <a:extLst>
+              <a:ext uri="{FF2B5EF4-FFF2-40B4-BE49-F238E27FC236}">
+                <a16:creationId xmlns:a16="http://schemas.microsoft.com/office/drawing/2014/main" id="{BBEC9D5B-063F-5A20-E7C0-58F4A2A325F5}"/>
+              </a:ext>
+            </a:extLst>
+          </p:cNvPr>
+          <p:cNvSpPr txBox="1"/>
+          <p:nvPr/>
+        </p:nvSpPr>
+        <p:spPr>
+          <a:xfrm>
+            <a:off x="1349826" y="5655226"/>
+            <a:ext cx="5606143" cy="369332"/>
+          </a:xfrm>
+          <a:prstGeom prst="rect">
+            <a:avLst/>
+          </a:prstGeom>
+          <a:solidFill>
+            <a:schemeClr val="tx1"/>
+          </a:solidFill>
+          <a:ln>
+            <a:solidFill>
+              <a:schemeClr val="tx1"/>
+            </a:solidFill>
+          </a:ln>
+        </p:spPr>
+        <p:txBody>
+          <a:bodyPr wrap="square" rtlCol="0">
+            <a:spAutoFit/>
+          </a:bodyPr>
+          <a:lstStyle/>
+          <a:p>
+            <a:r>
+              <a:rPr lang="en-US" b="1" dirty="0">
+                <a:solidFill>
+                  <a:schemeClr val="bg1"/>
+                </a:solidFill>
+                <a:latin typeface="Courier New" pitchFamily="49" charset="0"/>
+                <a:cs typeface="Courier New" pitchFamily="49" charset="0"/>
+              </a:rPr>
+              <a:t>$  </a:t>
+            </a:r>
+            <a:r>
+              <a:rPr lang="en-US" b="1" dirty="0" err="1">
+                <a:solidFill>
+                  <a:schemeClr val="bg1"/>
+                </a:solidFill>
+                <a:latin typeface="Courier New" pitchFamily="49" charset="0"/>
+                <a:cs typeface="Courier New" pitchFamily="49" charset="0"/>
+              </a:rPr>
+              <a:t>dvc</a:t>
+            </a:r>
+            <a:r>
+              <a:rPr lang="en-US" b="1" dirty="0">
+                <a:solidFill>
+                  <a:schemeClr val="bg1"/>
+                </a:solidFill>
+                <a:latin typeface="Courier New" pitchFamily="49" charset="0"/>
+                <a:cs typeface="Courier New" pitchFamily="49" charset="0"/>
+              </a:rPr>
+              <a:t> exp apply </a:t>
+            </a:r>
+            <a:r>
+              <a:rPr lang="en-US" b="1" dirty="0" err="1">
+                <a:solidFill>
+                  <a:schemeClr val="bg1"/>
+                </a:solidFill>
+                <a:latin typeface="Courier New" pitchFamily="49" charset="0"/>
+                <a:cs typeface="Courier New" pitchFamily="49" charset="0"/>
+              </a:rPr>
+              <a:t>high_a</a:t>
+            </a:r>
+            <a:endParaRPr lang="nl-BE" b="1" dirty="0">
+              <a:solidFill>
+                <a:schemeClr val="bg1"/>
+              </a:solidFill>
+              <a:latin typeface="Courier New" pitchFamily="49" charset="0"/>
+              <a:cs typeface="Courier New" pitchFamily="49" charset="0"/>
+            </a:endParaRPr>
+          </a:p>
+        </p:txBody>
+      </p:sp>
+    </p:spTree>
+    <p:extLst>
+      <p:ext uri="{BB962C8B-B14F-4D97-AF65-F5344CB8AC3E}">
+        <p14:creationId xmlns:p14="http://schemas.microsoft.com/office/powerpoint/2010/main" val="3427536214"/>
+      </p:ext>
+    </p:extLst>
+  </p:cSld>
+  <p:clrMapOvr>
+    <a:masterClrMapping/>
+  </p:clrMapOvr>
+  <p:timing>
+    <p:tnLst>
+      <p:par>
+        <p:cTn id="1" dur="indefinite" restart="never" nodeType="tmRoot">
+          <p:childTnLst>
+            <p:seq concurrent="1" nextAc="seek">
+              <p:cTn id="2" dur="indefinite" nodeType="mainSeq">
+                <p:childTnLst>
+                  <p:par>
+                    <p:cTn id="3" fill="hold">
+                      <p:stCondLst>
+                        <p:cond delay="indefinite"/>
+                        <p:cond evt="onBegin" delay="0">
+                          <p:tn val="2"/>
+                        </p:cond>
+                      </p:stCondLst>
+                      <p:childTnLst>
+                        <p:par>
+                          <p:cTn id="4" fill="hold">
+                            <p:stCondLst>
+                              <p:cond delay="0"/>
+                            </p:stCondLst>
+                            <p:childTnLst>
+                              <p:par>
+                                <p:cTn id="5" presetID="1" presetClass="entr" presetSubtype="0" fill="hold" grpId="0" nodeType="withEffect">
+                                  <p:stCondLst>
+                                    <p:cond delay="0"/>
+                                  </p:stCondLst>
+                                  <p:childTnLst>
+                                    <p:set>
+                                      <p:cBhvr>
+                                        <p:cTn id="6" dur="1" fill="hold">
+                                          <p:stCondLst>
+                                            <p:cond delay="0"/>
+                                          </p:stCondLst>
+                                        </p:cTn>
+                                        <p:tgtEl>
+                                          <p:spTgt spid="5"/>
+                                        </p:tgtEl>
+                                        <p:attrNameLst>
+                                          <p:attrName>style.visibility</p:attrName>
+                                        </p:attrNameLst>
+                                      </p:cBhvr>
+                                      <p:to>
+                                        <p:strVal val="visible"/>
+                                      </p:to>
+                                    </p:set>
+                                  </p:childTnLst>
+                                </p:cTn>
+                              </p:par>
+                              <p:par>
+                                <p:cTn id="7" presetID="1" presetClass="entr" presetSubtype="0" fill="hold" grpId="0" nodeType="withEffect">
+                                  <p:stCondLst>
+                                    <p:cond delay="0"/>
+                                  </p:stCondLst>
+                                  <p:childTnLst>
+                                    <p:set>
+                                      <p:cBhvr>
+                                        <p:cTn id="8" dur="1" fill="hold">
+                                          <p:stCondLst>
+                                            <p:cond delay="0"/>
+                                          </p:stCondLst>
+                                        </p:cTn>
+                                        <p:tgtEl>
+                                          <p:spTgt spid="6"/>
+                                        </p:tgtEl>
+                                        <p:attrNameLst>
+                                          <p:attrName>style.visibility</p:attrName>
+                                        </p:attrNameLst>
+                                      </p:cBhvr>
+                                      <p:to>
+                                        <p:strVal val="visible"/>
+                                      </p:to>
+                                    </p:set>
+                                  </p:childTnLst>
+                                </p:cTn>
+                              </p:par>
+                              <p:par>
+                                <p:cTn id="9" presetID="1" presetClass="entr" presetSubtype="0" fill="hold" grpId="0" nodeType="withEffect">
+                                  <p:stCondLst>
+                                    <p:cond delay="0"/>
+                                  </p:stCondLst>
+                                  <p:childTnLst>
+                                    <p:set>
+                                      <p:cBhvr>
+                                        <p:cTn id="10" dur="1" fill="hold">
+                                          <p:stCondLst>
+                                            <p:cond delay="0"/>
+                                          </p:stCondLst>
+                                        </p:cTn>
+                                        <p:tgtEl>
+                                          <p:spTgt spid="13"/>
+                                        </p:tgtEl>
+                                        <p:attrNameLst>
+                                          <p:attrName>style.visibility</p:attrName>
+                                        </p:attrNameLst>
+                                      </p:cBhvr>
+                                      <p:to>
+                                        <p:strVal val="visible"/>
+                                      </p:to>
+                                    </p:set>
+                                  </p:childTnLst>
+                                </p:cTn>
+                              </p:par>
+                            </p:childTnLst>
+                          </p:cTn>
+                        </p:par>
+                      </p:childTnLst>
+                    </p:cTn>
+                  </p:par>
+                </p:childTnLst>
+              </p:cTn>
+              <p:prevCondLst>
+                <p:cond evt="onPrev" delay="0">
+                  <p:tgtEl>
+                    <p:sldTgt/>
+                  </p:tgtEl>
+                </p:cond>
+              </p:prevCondLst>
+              <p:nextCondLst>
+                <p:cond evt="onNext" delay="0">
+                  <p:tgtEl>
+                    <p:sldTgt/>
+                  </p:tgtEl>
+                </p:cond>
+              </p:nextCondLst>
+            </p:seq>
+          </p:childTnLst>
+        </p:cTn>
+      </p:par>
+    </p:tnLst>
+    <p:bldLst>
+      <p:bldP spid="5" grpId="0" animBg="1"/>
+      <p:bldP spid="6" grpId="0" animBg="1"/>
+      <p:bldP spid="13" grpId="0" animBg="1"/>
+    </p:bldLst>
+  </p:timing>
+</p:sld>
+</file>
+
+<file path=ppt/slides/slide47.xml><?xml version="1.0" encoding="utf-8"?>
+<p:sld xmlns:a="http://schemas.openxmlformats.org/drawingml/2006/main" xmlns:r="http://schemas.openxmlformats.org/officeDocument/2006/relationships" xmlns:p="http://schemas.openxmlformats.org/presentationml/2006/main">
+  <p:cSld>
+    <p:spTree>
+      <p:nvGrpSpPr>
+        <p:cNvPr id="1" name=""/>
+        <p:cNvGrpSpPr/>
+        <p:nvPr/>
+      </p:nvGrpSpPr>
+      <p:grpSpPr>
+        <a:xfrm>
+          <a:off x="0" y="0"/>
+          <a:ext cx="0" cy="0"/>
+          <a:chOff x="0" y="0"/>
+          <a:chExt cx="0" cy="0"/>
+        </a:xfrm>
+      </p:grpSpPr>
+      <p:sp>
+        <p:nvSpPr>
+          <p:cNvPr id="2" name="Title 1">
+            <a:extLst>
+              <a:ext uri="{FF2B5EF4-FFF2-40B4-BE49-F238E27FC236}">
+                <a16:creationId xmlns:a16="http://schemas.microsoft.com/office/drawing/2014/main" id="{1AC650B7-9531-E003-0160-20919755F349}"/>
+              </a:ext>
+            </a:extLst>
+          </p:cNvPr>
+          <p:cNvSpPr>
+            <a:spLocks noGrp="1"/>
+          </p:cNvSpPr>
+          <p:nvPr>
+            <p:ph type="title"/>
+          </p:nvPr>
+        </p:nvSpPr>
+        <p:spPr/>
+        <p:txBody>
+          <a:bodyPr/>
+          <a:lstStyle/>
+          <a:p>
+            <a:r>
+              <a:rPr lang="en-US" dirty="0"/>
+              <a:t>Queues &amp; parameter sweeps</a:t>
+            </a:r>
+            <a:endParaRPr lang="LID4096" dirty="0"/>
+          </a:p>
+        </p:txBody>
+      </p:sp>
+      <p:sp>
+        <p:nvSpPr>
+          <p:cNvPr id="3" name="Content Placeholder 2">
+            <a:extLst>
+              <a:ext uri="{FF2B5EF4-FFF2-40B4-BE49-F238E27FC236}">
+                <a16:creationId xmlns:a16="http://schemas.microsoft.com/office/drawing/2014/main" id="{F5256BB4-5101-B73B-611B-F2108D1BD44F}"/>
+              </a:ext>
+            </a:extLst>
+          </p:cNvPr>
+          <p:cNvSpPr>
+            <a:spLocks noGrp="1"/>
+          </p:cNvSpPr>
+          <p:nvPr>
+            <p:ph idx="1"/>
+          </p:nvPr>
+        </p:nvSpPr>
+        <p:spPr/>
+        <p:txBody>
+          <a:bodyPr/>
+          <a:lstStyle/>
+          <a:p>
+            <a:r>
+              <a:rPr lang="en-US" dirty="0"/>
+              <a:t>Add experiment to queue</a:t>
+            </a:r>
+          </a:p>
+          <a:p>
+            <a:endParaRPr lang="en-US" dirty="0"/>
+          </a:p>
+          <a:p>
+            <a:r>
+              <a:rPr lang="en-US" dirty="0"/>
+              <a:t>Queue parameter sweep</a:t>
+            </a:r>
+          </a:p>
+          <a:p>
+            <a:endParaRPr lang="en-US" dirty="0"/>
+          </a:p>
+          <a:p>
+            <a:r>
+              <a:rPr lang="en-US" dirty="0"/>
+              <a:t>Run queued experiment sequentially</a:t>
+            </a:r>
+          </a:p>
+        </p:txBody>
+      </p:sp>
+      <p:sp>
+        <p:nvSpPr>
+          <p:cNvPr id="4" name="Slide Number Placeholder 3">
+            <a:extLst>
+              <a:ext uri="{FF2B5EF4-FFF2-40B4-BE49-F238E27FC236}">
+                <a16:creationId xmlns:a16="http://schemas.microsoft.com/office/drawing/2014/main" id="{7F3F2AA8-F2D6-153C-80B0-D1A5AB31721A}"/>
+              </a:ext>
+            </a:extLst>
+          </p:cNvPr>
+          <p:cNvSpPr>
+            <a:spLocks noGrp="1"/>
+          </p:cNvSpPr>
+          <p:nvPr>
+            <p:ph type="sldNum" sz="quarter" idx="12"/>
+          </p:nvPr>
+        </p:nvSpPr>
+        <p:spPr/>
+        <p:txBody>
+          <a:bodyPr/>
+          <a:lstStyle/>
+          <a:p>
+            <a:fld id="{9C7CE217-4467-4B8D-A735-B008FA7C4816}" type="slidenum">
+              <a:rPr lang="LID4096" smtClean="0"/>
+              <a:t>47</a:t>
+            </a:fld>
+            <a:endParaRPr lang="LID4096"/>
+          </a:p>
+        </p:txBody>
+      </p:sp>
+      <p:sp>
+        <p:nvSpPr>
+          <p:cNvPr id="5" name="TextBox 4">
+            <a:extLst>
+              <a:ext uri="{FF2B5EF4-FFF2-40B4-BE49-F238E27FC236}">
+                <a16:creationId xmlns:a16="http://schemas.microsoft.com/office/drawing/2014/main" id="{38E83890-6D9E-4A0A-C56E-959CEC4CA7BE}"/>
+              </a:ext>
+            </a:extLst>
+          </p:cNvPr>
+          <p:cNvSpPr txBox="1"/>
+          <p:nvPr/>
+        </p:nvSpPr>
+        <p:spPr>
+          <a:xfrm>
+            <a:off x="1349828" y="2292717"/>
+            <a:ext cx="7260772" cy="369332"/>
+          </a:xfrm>
+          <a:prstGeom prst="rect">
+            <a:avLst/>
+          </a:prstGeom>
+          <a:solidFill>
+            <a:schemeClr val="tx1"/>
+          </a:solidFill>
+          <a:ln>
+            <a:solidFill>
+              <a:schemeClr val="tx1"/>
+            </a:solidFill>
+          </a:ln>
+        </p:spPr>
+        <p:txBody>
+          <a:bodyPr wrap="square" rtlCol="0">
+            <a:spAutoFit/>
+          </a:bodyPr>
+          <a:lstStyle/>
+          <a:p>
+            <a:r>
+              <a:rPr lang="en-US" b="1" dirty="0">
+                <a:solidFill>
+                  <a:schemeClr val="bg1"/>
+                </a:solidFill>
+                <a:latin typeface="Courier New" pitchFamily="49" charset="0"/>
+                <a:cs typeface="Courier New" pitchFamily="49" charset="0"/>
+              </a:rPr>
+              <a:t>$  </a:t>
+            </a:r>
+            <a:r>
+              <a:rPr lang="en-US" b="1" dirty="0" err="1">
+                <a:solidFill>
+                  <a:schemeClr val="bg1"/>
+                </a:solidFill>
+                <a:latin typeface="Courier New" pitchFamily="49" charset="0"/>
+                <a:cs typeface="Courier New" pitchFamily="49" charset="0"/>
+              </a:rPr>
+              <a:t>dvc</a:t>
+            </a:r>
+            <a:r>
+              <a:rPr lang="en-US" b="1" dirty="0">
+                <a:solidFill>
+                  <a:schemeClr val="bg1"/>
+                </a:solidFill>
+                <a:latin typeface="Courier New" pitchFamily="49" charset="0"/>
+                <a:cs typeface="Courier New" pitchFamily="49" charset="0"/>
+              </a:rPr>
+              <a:t> exp run  --queue</a:t>
+            </a:r>
+            <a:endParaRPr lang="nl-BE" b="1" dirty="0">
+              <a:solidFill>
+                <a:schemeClr val="bg1"/>
+              </a:solidFill>
+              <a:latin typeface="Courier New" pitchFamily="49" charset="0"/>
+              <a:cs typeface="Courier New" pitchFamily="49" charset="0"/>
+            </a:endParaRPr>
+          </a:p>
+        </p:txBody>
+      </p:sp>
+      <p:sp>
+        <p:nvSpPr>
+          <p:cNvPr id="6" name="TextBox 5">
+            <a:extLst>
+              <a:ext uri="{FF2B5EF4-FFF2-40B4-BE49-F238E27FC236}">
+                <a16:creationId xmlns:a16="http://schemas.microsoft.com/office/drawing/2014/main" id="{4B1E0867-C179-9BD8-2CC6-CCE42549A8C8}"/>
+              </a:ext>
+            </a:extLst>
+          </p:cNvPr>
+          <p:cNvSpPr txBox="1"/>
+          <p:nvPr/>
+        </p:nvSpPr>
+        <p:spPr>
+          <a:xfrm>
+            <a:off x="1349827" y="3361450"/>
+            <a:ext cx="7260773" cy="369332"/>
+          </a:xfrm>
+          <a:prstGeom prst="rect">
+            <a:avLst/>
+          </a:prstGeom>
+          <a:solidFill>
+            <a:schemeClr val="tx1"/>
+          </a:solidFill>
+          <a:ln>
+            <a:solidFill>
+              <a:schemeClr val="tx1"/>
+            </a:solidFill>
+          </a:ln>
+        </p:spPr>
+        <p:txBody>
+          <a:bodyPr wrap="square" rtlCol="0">
+            <a:spAutoFit/>
+          </a:bodyPr>
+          <a:lstStyle/>
+          <a:p>
+            <a:r>
+              <a:rPr lang="en-US" b="1" dirty="0">
+                <a:solidFill>
+                  <a:schemeClr val="bg1"/>
+                </a:solidFill>
+                <a:latin typeface="Courier New" pitchFamily="49" charset="0"/>
+                <a:cs typeface="Courier New" pitchFamily="49" charset="0"/>
+              </a:rPr>
+              <a:t>$  </a:t>
+            </a:r>
+            <a:r>
+              <a:rPr lang="en-US" b="1" dirty="0" err="1">
+                <a:solidFill>
+                  <a:schemeClr val="bg1"/>
+                </a:solidFill>
+                <a:latin typeface="Courier New" pitchFamily="49" charset="0"/>
+                <a:cs typeface="Courier New" pitchFamily="49" charset="0"/>
+              </a:rPr>
+              <a:t>dvc</a:t>
+            </a:r>
+            <a:r>
+              <a:rPr lang="en-US" b="1" dirty="0">
+                <a:solidFill>
+                  <a:schemeClr val="bg1"/>
+                </a:solidFill>
+                <a:latin typeface="Courier New" pitchFamily="49" charset="0"/>
+                <a:cs typeface="Courier New" pitchFamily="49" charset="0"/>
+              </a:rPr>
+              <a:t> exp run  --queue  -set-param 'a=3.0,4.0,5.0'</a:t>
+            </a:r>
+            <a:endParaRPr lang="nl-BE" b="1" dirty="0">
+              <a:solidFill>
+                <a:schemeClr val="bg1"/>
+              </a:solidFill>
+              <a:latin typeface="Courier New" pitchFamily="49" charset="0"/>
+              <a:cs typeface="Courier New" pitchFamily="49" charset="0"/>
+            </a:endParaRPr>
+          </a:p>
+        </p:txBody>
+      </p:sp>
+      <p:sp>
+        <p:nvSpPr>
+          <p:cNvPr id="7" name="TextBox 6">
+            <a:extLst>
+              <a:ext uri="{FF2B5EF4-FFF2-40B4-BE49-F238E27FC236}">
+                <a16:creationId xmlns:a16="http://schemas.microsoft.com/office/drawing/2014/main" id="{36358864-2BCD-DFF1-8CB3-D650EB88646A}"/>
+              </a:ext>
+            </a:extLst>
+          </p:cNvPr>
+          <p:cNvSpPr txBox="1"/>
+          <p:nvPr/>
+        </p:nvSpPr>
+        <p:spPr>
+          <a:xfrm>
+            <a:off x="1349827" y="4354374"/>
+            <a:ext cx="7260772" cy="369332"/>
+          </a:xfrm>
+          <a:prstGeom prst="rect">
+            <a:avLst/>
+          </a:prstGeom>
+          <a:solidFill>
+            <a:schemeClr val="tx1"/>
+          </a:solidFill>
+          <a:ln>
+            <a:solidFill>
+              <a:schemeClr val="tx1"/>
+            </a:solidFill>
+          </a:ln>
+        </p:spPr>
+        <p:txBody>
+          <a:bodyPr wrap="square" rtlCol="0">
+            <a:spAutoFit/>
+          </a:bodyPr>
+          <a:lstStyle/>
+          <a:p>
+            <a:r>
+              <a:rPr lang="en-US" b="1" dirty="0">
+                <a:solidFill>
+                  <a:schemeClr val="bg1"/>
+                </a:solidFill>
+                <a:latin typeface="Courier New" pitchFamily="49" charset="0"/>
+                <a:cs typeface="Courier New" pitchFamily="49" charset="0"/>
+              </a:rPr>
+              <a:t>$  </a:t>
+            </a:r>
+            <a:r>
+              <a:rPr lang="en-US" b="1" dirty="0" err="1">
+                <a:solidFill>
+                  <a:schemeClr val="bg1"/>
+                </a:solidFill>
+                <a:latin typeface="Courier New" pitchFamily="49" charset="0"/>
+                <a:cs typeface="Courier New" pitchFamily="49" charset="0"/>
+              </a:rPr>
+              <a:t>dvc</a:t>
+            </a:r>
+            <a:r>
+              <a:rPr lang="en-US" b="1" dirty="0">
+                <a:solidFill>
+                  <a:schemeClr val="bg1"/>
+                </a:solidFill>
+                <a:latin typeface="Courier New" pitchFamily="49" charset="0"/>
+                <a:cs typeface="Courier New" pitchFamily="49" charset="0"/>
+              </a:rPr>
+              <a:t> exp run  --run-all</a:t>
+            </a:r>
+            <a:endParaRPr lang="nl-BE" b="1" dirty="0">
+              <a:solidFill>
+                <a:schemeClr val="bg1"/>
+              </a:solidFill>
+              <a:latin typeface="Courier New" pitchFamily="49" charset="0"/>
+              <a:cs typeface="Courier New" pitchFamily="49" charset="0"/>
+            </a:endParaRPr>
+          </a:p>
+        </p:txBody>
+      </p:sp>
+    </p:spTree>
+    <p:extLst>
+      <p:ext uri="{BB962C8B-B14F-4D97-AF65-F5344CB8AC3E}">
+        <p14:creationId xmlns:p14="http://schemas.microsoft.com/office/powerpoint/2010/main" val="2473658947"/>
+      </p:ext>
+    </p:extLst>
+  </p:cSld>
+  <p:clrMapOvr>
+    <a:masterClrMapping/>
+  </p:clrMapOvr>
+  <p:timing>
+    <p:tnLst>
+      <p:par>
+        <p:cTn id="1" dur="indefinite" restart="never" nodeType="tmRoot">
+          <p:childTnLst>
+            <p:seq concurrent="1" nextAc="seek">
+              <p:cTn id="2" dur="indefinite" nodeType="mainSeq">
+                <p:childTnLst>
+                  <p:par>
+                    <p:cTn id="3" fill="hold">
+                      <p:stCondLst>
+                        <p:cond delay="indefinite"/>
+                        <p:cond evt="onBegin" delay="0">
+                          <p:tn val="2"/>
+                        </p:cond>
+                      </p:stCondLst>
+                      <p:childTnLst>
+                        <p:par>
+                          <p:cTn id="4" fill="hold">
+                            <p:stCondLst>
+                              <p:cond delay="0"/>
+                            </p:stCondLst>
+                            <p:childTnLst>
+                              <p:par>
+                                <p:cTn id="5" presetID="1" presetClass="entr" presetSubtype="0" fill="hold" grpId="0" nodeType="withEffect">
+                                  <p:stCondLst>
+                                    <p:cond delay="0"/>
+                                  </p:stCondLst>
+                                  <p:childTnLst>
+                                    <p:set>
+                                      <p:cBhvr>
+                                        <p:cTn id="6" dur="1" fill="hold">
+                                          <p:stCondLst>
+                                            <p:cond delay="0"/>
+                                          </p:stCondLst>
+                                        </p:cTn>
+                                        <p:tgtEl>
+                                          <p:spTgt spid="5"/>
+                                        </p:tgtEl>
+                                        <p:attrNameLst>
+                                          <p:attrName>style.visibility</p:attrName>
+                                        </p:attrNameLst>
+                                      </p:cBhvr>
+                                      <p:to>
+                                        <p:strVal val="visible"/>
+                                      </p:to>
+                                    </p:set>
+                                  </p:childTnLst>
+                                </p:cTn>
+                              </p:par>
+                              <p:par>
+                                <p:cTn id="7" presetID="1" presetClass="entr" presetSubtype="0" fill="hold" grpId="0" nodeType="withEffect">
+                                  <p:stCondLst>
+                                    <p:cond delay="0"/>
+                                  </p:stCondLst>
+                                  <p:childTnLst>
+                                    <p:set>
+                                      <p:cBhvr>
+                                        <p:cTn id="8" dur="1" fill="hold">
+                                          <p:stCondLst>
+                                            <p:cond delay="0"/>
+                                          </p:stCondLst>
+                                        </p:cTn>
+                                        <p:tgtEl>
+                                          <p:spTgt spid="6"/>
+                                        </p:tgtEl>
+                                        <p:attrNameLst>
+                                          <p:attrName>style.visibility</p:attrName>
+                                        </p:attrNameLst>
+                                      </p:cBhvr>
+                                      <p:to>
+                                        <p:strVal val="visible"/>
+                                      </p:to>
+                                    </p:set>
+                                  </p:childTnLst>
+                                </p:cTn>
+                              </p:par>
+                              <p:par>
+                                <p:cTn id="9" presetID="1" presetClass="entr" presetSubtype="0" fill="hold" grpId="0" nodeType="withEffect">
+                                  <p:stCondLst>
+                                    <p:cond delay="0"/>
+                                  </p:stCondLst>
+                                  <p:childTnLst>
+                                    <p:set>
+                                      <p:cBhvr>
+                                        <p:cTn id="10" dur="1" fill="hold">
+                                          <p:stCondLst>
+                                            <p:cond delay="0"/>
+                                          </p:stCondLst>
+                                        </p:cTn>
+                                        <p:tgtEl>
+                                          <p:spTgt spid="7"/>
+                                        </p:tgtEl>
+                                        <p:attrNameLst>
+                                          <p:attrName>style.visibility</p:attrName>
+                                        </p:attrNameLst>
+                                      </p:cBhvr>
+                                      <p:to>
+                                        <p:strVal val="visible"/>
+                                      </p:to>
+                                    </p:set>
+                                  </p:childTnLst>
+                                </p:cTn>
+                              </p:par>
+                            </p:childTnLst>
+                          </p:cTn>
+                        </p:par>
+                      </p:childTnLst>
+                    </p:cTn>
+                  </p:par>
+                </p:childTnLst>
+              </p:cTn>
+              <p:prevCondLst>
+                <p:cond evt="onPrev" delay="0">
+                  <p:tgtEl>
+                    <p:sldTgt/>
+                  </p:tgtEl>
+                </p:cond>
+              </p:prevCondLst>
+              <p:nextCondLst>
+                <p:cond evt="onNext" delay="0">
+                  <p:tgtEl>
+                    <p:sldTgt/>
+                  </p:tgtEl>
+                </p:cond>
+              </p:nextCondLst>
+            </p:seq>
+          </p:childTnLst>
+        </p:cTn>
+      </p:par>
+    </p:tnLst>
+    <p:bldLst>
+      <p:bldP spid="5" grpId="0" animBg="1"/>
+      <p:bldP spid="6" grpId="0" animBg="1"/>
+      <p:bldP spid="7" grpId="0" animBg="1"/>
+    </p:bldLst>
+  </p:timing>
+</p:sld>
+</file>
+
+<file path=ppt/slides/slide48.xml><?xml version="1.0" encoding="utf-8"?>
+<p:sld xmlns:a="http://schemas.openxmlformats.org/drawingml/2006/main" xmlns:r="http://schemas.openxmlformats.org/officeDocument/2006/relationships" xmlns:p="http://schemas.openxmlformats.org/presentationml/2006/main">
+  <p:cSld>
+    <p:spTree>
+      <p:nvGrpSpPr>
+        <p:cNvPr id="1" name=""/>
+        <p:cNvGrpSpPr/>
+        <p:nvPr/>
+      </p:nvGrpSpPr>
+      <p:grpSpPr>
+        <a:xfrm>
+          <a:off x="0" y="0"/>
+          <a:ext cx="0" cy="0"/>
+          <a:chOff x="0" y="0"/>
+          <a:chExt cx="0" cy="0"/>
+        </a:xfrm>
+      </p:grpSpPr>
+      <p:sp>
+        <p:nvSpPr>
+          <p:cNvPr id="2" name="Title 1">
+            <a:extLst>
+              <a:ext uri="{FF2B5EF4-FFF2-40B4-BE49-F238E27FC236}">
+                <a16:creationId xmlns:a16="http://schemas.microsoft.com/office/drawing/2014/main" id="{B8728D75-D4F9-4A2E-F1A2-13424666649E}"/>
+              </a:ext>
+            </a:extLst>
+          </p:cNvPr>
+          <p:cNvSpPr>
+            <a:spLocks noGrp="1"/>
+          </p:cNvSpPr>
+          <p:nvPr>
+            <p:ph type="title"/>
+          </p:nvPr>
+        </p:nvSpPr>
+        <p:spPr/>
+        <p:txBody>
+          <a:bodyPr/>
+          <a:lstStyle/>
+          <a:p>
+            <a:r>
+              <a:rPr lang="en-US" dirty="0"/>
+              <a:t>Queue status &amp; management</a:t>
+            </a:r>
+            <a:endParaRPr lang="LID4096" dirty="0"/>
+          </a:p>
+        </p:txBody>
+      </p:sp>
+      <p:sp>
+        <p:nvSpPr>
+          <p:cNvPr id="3" name="Content Placeholder 2">
+            <a:extLst>
+              <a:ext uri="{FF2B5EF4-FFF2-40B4-BE49-F238E27FC236}">
+                <a16:creationId xmlns:a16="http://schemas.microsoft.com/office/drawing/2014/main" id="{218DC946-4F82-703E-7F74-6B2866FCD2AB}"/>
+              </a:ext>
+            </a:extLst>
+          </p:cNvPr>
+          <p:cNvSpPr>
+            <a:spLocks noGrp="1"/>
+          </p:cNvSpPr>
+          <p:nvPr>
+            <p:ph idx="1"/>
+          </p:nvPr>
+        </p:nvSpPr>
+        <p:spPr/>
+        <p:txBody>
+          <a:bodyPr>
+            <a:normAutofit lnSpcReduction="10000"/>
+          </a:bodyPr>
+          <a:lstStyle/>
+          <a:p>
+            <a:r>
+              <a:rPr lang="en-US" dirty="0"/>
+              <a:t>Check status</a:t>
+            </a:r>
+          </a:p>
+          <a:p>
+            <a:endParaRPr lang="en-US" dirty="0"/>
+          </a:p>
+          <a:p>
+            <a:endParaRPr lang="en-US" dirty="0"/>
+          </a:p>
+          <a:p>
+            <a:endParaRPr lang="en-US" dirty="0"/>
+          </a:p>
+          <a:p>
+            <a:endParaRPr lang="en-US" dirty="0"/>
+          </a:p>
+          <a:p>
+            <a:endParaRPr lang="en-US" dirty="0"/>
+          </a:p>
+          <a:p>
+            <a:r>
+              <a:rPr lang="en-US" dirty="0"/>
+              <a:t>Show logs</a:t>
+            </a:r>
+          </a:p>
+          <a:p>
+            <a:endParaRPr lang="en-US" dirty="0"/>
+          </a:p>
+          <a:p>
+            <a:r>
+              <a:rPr lang="en-US" dirty="0"/>
+              <a:t>Remove queued/completed task</a:t>
+            </a:r>
+            <a:endParaRPr lang="LID4096" dirty="0"/>
+          </a:p>
+        </p:txBody>
+      </p:sp>
+      <p:sp>
+        <p:nvSpPr>
+          <p:cNvPr id="4" name="Slide Number Placeholder 3">
+            <a:extLst>
+              <a:ext uri="{FF2B5EF4-FFF2-40B4-BE49-F238E27FC236}">
+                <a16:creationId xmlns:a16="http://schemas.microsoft.com/office/drawing/2014/main" id="{8EFB2601-ED0B-3E66-CEFD-7D6F43BD2EAB}"/>
+              </a:ext>
+            </a:extLst>
+          </p:cNvPr>
+          <p:cNvSpPr>
+            <a:spLocks noGrp="1"/>
+          </p:cNvSpPr>
+          <p:nvPr>
+            <p:ph type="sldNum" sz="quarter" idx="12"/>
+          </p:nvPr>
+        </p:nvSpPr>
+        <p:spPr/>
+        <p:txBody>
+          <a:bodyPr/>
+          <a:lstStyle/>
+          <a:p>
+            <a:fld id="{9C7CE217-4467-4B8D-A735-B008FA7C4816}" type="slidenum">
+              <a:rPr lang="LID4096" smtClean="0"/>
+              <a:t>48</a:t>
+            </a:fld>
+            <a:endParaRPr lang="LID4096"/>
+          </a:p>
+        </p:txBody>
+      </p:sp>
+      <p:sp>
+        <p:nvSpPr>
+          <p:cNvPr id="5" name="TextBox 4">
+            <a:extLst>
+              <a:ext uri="{FF2B5EF4-FFF2-40B4-BE49-F238E27FC236}">
+                <a16:creationId xmlns:a16="http://schemas.microsoft.com/office/drawing/2014/main" id="{32241780-6D75-A4E4-73FB-961362A1BCB6}"/>
+              </a:ext>
+            </a:extLst>
+          </p:cNvPr>
+          <p:cNvSpPr txBox="1"/>
+          <p:nvPr/>
+        </p:nvSpPr>
+        <p:spPr>
+          <a:xfrm>
+            <a:off x="1209868" y="2264313"/>
+            <a:ext cx="7260772" cy="2308324"/>
+          </a:xfrm>
+          <a:prstGeom prst="rect">
+            <a:avLst/>
+          </a:prstGeom>
+          <a:solidFill>
+            <a:schemeClr val="tx1"/>
+          </a:solidFill>
+          <a:ln>
+            <a:solidFill>
+              <a:schemeClr val="tx1"/>
+            </a:solidFill>
+          </a:ln>
+        </p:spPr>
+        <p:txBody>
+          <a:bodyPr wrap="square" rtlCol="0">
+            <a:spAutoFit/>
+          </a:bodyPr>
+          <a:lstStyle/>
+          <a:p>
+            <a:r>
+              <a:rPr lang="en-US" b="1" dirty="0">
+                <a:solidFill>
+                  <a:schemeClr val="bg1"/>
+                </a:solidFill>
+                <a:latin typeface="Courier New" pitchFamily="49" charset="0"/>
+                <a:cs typeface="Courier New" pitchFamily="49" charset="0"/>
+              </a:rPr>
+              <a:t>$  </a:t>
+            </a:r>
+            <a:r>
+              <a:rPr lang="en-US" b="1" dirty="0" err="1">
+                <a:solidFill>
+                  <a:schemeClr val="bg1"/>
+                </a:solidFill>
+                <a:latin typeface="Courier New" pitchFamily="49" charset="0"/>
+                <a:cs typeface="Courier New" pitchFamily="49" charset="0"/>
+              </a:rPr>
+              <a:t>dvc</a:t>
+            </a:r>
+            <a:r>
+              <a:rPr lang="en-US" b="1" dirty="0">
+                <a:solidFill>
+                  <a:schemeClr val="bg1"/>
+                </a:solidFill>
+                <a:latin typeface="Courier New" pitchFamily="49" charset="0"/>
+                <a:cs typeface="Courier New" pitchFamily="49" charset="0"/>
+              </a:rPr>
+              <a:t> queue status</a:t>
+            </a:r>
+          </a:p>
+          <a:p>
+            <a:r>
+              <a:rPr lang="nl-BE" b="1" dirty="0" err="1">
+                <a:solidFill>
+                  <a:schemeClr val="bg1"/>
+                </a:solidFill>
+                <a:latin typeface="Courier New" pitchFamily="49" charset="0"/>
+                <a:cs typeface="Courier New" pitchFamily="49" charset="0"/>
+              </a:rPr>
+              <a:t>Task</a:t>
+            </a:r>
+            <a:r>
+              <a:rPr lang="nl-BE" b="1" dirty="0">
+                <a:solidFill>
+                  <a:schemeClr val="bg1"/>
+                </a:solidFill>
+                <a:latin typeface="Courier New" pitchFamily="49" charset="0"/>
+                <a:cs typeface="Courier New" pitchFamily="49" charset="0"/>
+              </a:rPr>
+              <a:t>     Name        </a:t>
+            </a:r>
+            <a:r>
+              <a:rPr lang="nl-BE" b="1" dirty="0" err="1">
+                <a:solidFill>
+                  <a:schemeClr val="bg1"/>
+                </a:solidFill>
+                <a:latin typeface="Courier New" pitchFamily="49" charset="0"/>
+                <a:cs typeface="Courier New" pitchFamily="49" charset="0"/>
+              </a:rPr>
+              <a:t>Created</a:t>
+            </a:r>
+            <a:r>
+              <a:rPr lang="nl-BE" b="1" dirty="0">
+                <a:solidFill>
+                  <a:schemeClr val="bg1"/>
+                </a:solidFill>
+                <a:latin typeface="Courier New" pitchFamily="49" charset="0"/>
+                <a:cs typeface="Courier New" pitchFamily="49" charset="0"/>
+              </a:rPr>
+              <a:t>    Status</a:t>
+            </a:r>
+          </a:p>
+          <a:p>
+            <a:r>
+              <a:rPr lang="nl-BE" b="1" dirty="0">
+                <a:solidFill>
+                  <a:schemeClr val="bg1"/>
+                </a:solidFill>
+                <a:latin typeface="Courier New" pitchFamily="49" charset="0"/>
+                <a:cs typeface="Courier New" pitchFamily="49" charset="0"/>
+              </a:rPr>
+              <a:t>db756f8  found-</a:t>
+            </a:r>
+            <a:r>
+              <a:rPr lang="nl-BE" b="1" dirty="0" err="1">
+                <a:solidFill>
+                  <a:schemeClr val="bg1"/>
+                </a:solidFill>
+                <a:latin typeface="Courier New" pitchFamily="49" charset="0"/>
+                <a:cs typeface="Courier New" pitchFamily="49" charset="0"/>
+              </a:rPr>
+              <a:t>impi</a:t>
+            </a:r>
+            <a:r>
+              <a:rPr lang="nl-BE" b="1" dirty="0">
+                <a:solidFill>
+                  <a:schemeClr val="bg1"/>
+                </a:solidFill>
+                <a:latin typeface="Courier New" pitchFamily="49" charset="0"/>
+                <a:cs typeface="Courier New" pitchFamily="49" charset="0"/>
+              </a:rPr>
+              <a:t>  02:24 PM   </a:t>
+            </a:r>
+            <a:r>
+              <a:rPr lang="nl-BE" b="1" dirty="0" err="1">
+                <a:solidFill>
+                  <a:schemeClr val="bg1"/>
+                </a:solidFill>
+                <a:latin typeface="Courier New" pitchFamily="49" charset="0"/>
+                <a:cs typeface="Courier New" pitchFamily="49" charset="0"/>
+              </a:rPr>
+              <a:t>Queued</a:t>
+            </a:r>
+            <a:endParaRPr lang="nl-BE" b="1" dirty="0">
+              <a:solidFill>
+                <a:schemeClr val="bg1"/>
+              </a:solidFill>
+              <a:latin typeface="Courier New" pitchFamily="49" charset="0"/>
+              <a:cs typeface="Courier New" pitchFamily="49" charset="0"/>
+            </a:endParaRPr>
+          </a:p>
+          <a:p>
+            <a:r>
+              <a:rPr lang="nl-BE" b="1" dirty="0">
+                <a:solidFill>
+                  <a:schemeClr val="bg1"/>
+                </a:solidFill>
+                <a:latin typeface="Courier New" pitchFamily="49" charset="0"/>
+                <a:cs typeface="Courier New" pitchFamily="49" charset="0"/>
+              </a:rPr>
+              <a:t>6c431db  </a:t>
+            </a:r>
+            <a:r>
+              <a:rPr lang="nl-BE" b="1" dirty="0" err="1">
+                <a:solidFill>
+                  <a:schemeClr val="bg1"/>
+                </a:solidFill>
+                <a:latin typeface="Courier New" pitchFamily="49" charset="0"/>
+                <a:cs typeface="Courier New" pitchFamily="49" charset="0"/>
+              </a:rPr>
+              <a:t>fuzzy-sash</a:t>
+            </a:r>
+            <a:r>
+              <a:rPr lang="nl-BE" b="1" dirty="0">
+                <a:solidFill>
+                  <a:schemeClr val="bg1"/>
+                </a:solidFill>
+                <a:latin typeface="Courier New" pitchFamily="49" charset="0"/>
+                <a:cs typeface="Courier New" pitchFamily="49" charset="0"/>
+              </a:rPr>
+              <a:t>  02:24 PM   </a:t>
+            </a:r>
+            <a:r>
+              <a:rPr lang="nl-BE" b="1" dirty="0" err="1">
+                <a:solidFill>
+                  <a:schemeClr val="bg1"/>
+                </a:solidFill>
+                <a:latin typeface="Courier New" pitchFamily="49" charset="0"/>
+                <a:cs typeface="Courier New" pitchFamily="49" charset="0"/>
+              </a:rPr>
+              <a:t>Queued</a:t>
+            </a:r>
+            <a:endParaRPr lang="nl-BE" b="1" dirty="0">
+              <a:solidFill>
+                <a:schemeClr val="bg1"/>
+              </a:solidFill>
+              <a:latin typeface="Courier New" pitchFamily="49" charset="0"/>
+              <a:cs typeface="Courier New" pitchFamily="49" charset="0"/>
+            </a:endParaRPr>
+          </a:p>
+          <a:p>
+            <a:r>
+              <a:rPr lang="nl-BE" b="1" dirty="0">
+                <a:solidFill>
+                  <a:schemeClr val="bg1"/>
+                </a:solidFill>
+                <a:latin typeface="Courier New" pitchFamily="49" charset="0"/>
+                <a:cs typeface="Courier New" pitchFamily="49" charset="0"/>
+              </a:rPr>
+              <a:t>96f84ca  </a:t>
+            </a:r>
+            <a:r>
+              <a:rPr lang="nl-BE" b="1" dirty="0" err="1">
+                <a:solidFill>
+                  <a:schemeClr val="bg1"/>
+                </a:solidFill>
+                <a:latin typeface="Courier New" pitchFamily="49" charset="0"/>
+                <a:cs typeface="Courier New" pitchFamily="49" charset="0"/>
+              </a:rPr>
+              <a:t>regal-coho</a:t>
+            </a:r>
+            <a:r>
+              <a:rPr lang="nl-BE" b="1" dirty="0">
+                <a:solidFill>
+                  <a:schemeClr val="bg1"/>
+                </a:solidFill>
+                <a:latin typeface="Courier New" pitchFamily="49" charset="0"/>
+                <a:cs typeface="Courier New" pitchFamily="49" charset="0"/>
+              </a:rPr>
+              <a:t>  02:24 PM   </a:t>
+            </a:r>
+            <a:r>
+              <a:rPr lang="nl-BE" b="1" dirty="0" err="1">
+                <a:solidFill>
+                  <a:schemeClr val="bg1"/>
+                </a:solidFill>
+                <a:latin typeface="Courier New" pitchFamily="49" charset="0"/>
+                <a:cs typeface="Courier New" pitchFamily="49" charset="0"/>
+              </a:rPr>
+              <a:t>Queued</a:t>
+            </a:r>
+            <a:endParaRPr lang="nl-BE" b="1" dirty="0">
+              <a:solidFill>
+                <a:schemeClr val="bg1"/>
+              </a:solidFill>
+              <a:latin typeface="Courier New" pitchFamily="49" charset="0"/>
+              <a:cs typeface="Courier New" pitchFamily="49" charset="0"/>
+            </a:endParaRPr>
+          </a:p>
+          <a:p>
+            <a:r>
+              <a:rPr lang="nl-BE" b="1" dirty="0">
+                <a:solidFill>
+                  <a:schemeClr val="bg1"/>
+                </a:solidFill>
+                <a:latin typeface="Courier New" pitchFamily="49" charset="0"/>
+                <a:cs typeface="Courier New" pitchFamily="49" charset="0"/>
+              </a:rPr>
+              <a:t>20cacaa  </a:t>
+            </a:r>
+            <a:r>
+              <a:rPr lang="nl-BE" b="1" dirty="0" err="1">
+                <a:solidFill>
+                  <a:schemeClr val="bg1"/>
+                </a:solidFill>
+                <a:latin typeface="Courier New" pitchFamily="49" charset="0"/>
+                <a:cs typeface="Courier New" pitchFamily="49" charset="0"/>
+              </a:rPr>
+              <a:t>muley</a:t>
+            </a:r>
+            <a:r>
+              <a:rPr lang="nl-BE" b="1" dirty="0">
+                <a:solidFill>
+                  <a:schemeClr val="bg1"/>
+                </a:solidFill>
+                <a:latin typeface="Courier New" pitchFamily="49" charset="0"/>
+                <a:cs typeface="Courier New" pitchFamily="49" charset="0"/>
+              </a:rPr>
+              <a:t>-tams  02:17 PM   </a:t>
+            </a:r>
+            <a:r>
+              <a:rPr lang="nl-BE" b="1" dirty="0" err="1">
+                <a:solidFill>
+                  <a:schemeClr val="bg1"/>
+                </a:solidFill>
+                <a:latin typeface="Courier New" pitchFamily="49" charset="0"/>
+                <a:cs typeface="Courier New" pitchFamily="49" charset="0"/>
+              </a:rPr>
+              <a:t>Success</a:t>
+            </a:r>
+            <a:endParaRPr lang="nl-BE" b="1" dirty="0">
+              <a:solidFill>
+                <a:schemeClr val="bg1"/>
+              </a:solidFill>
+              <a:latin typeface="Courier New" pitchFamily="49" charset="0"/>
+              <a:cs typeface="Courier New" pitchFamily="49" charset="0"/>
+            </a:endParaRPr>
+          </a:p>
+          <a:p>
+            <a:r>
+              <a:rPr lang="nl-BE" b="1" dirty="0">
+                <a:solidFill>
+                  <a:schemeClr val="bg1"/>
+                </a:solidFill>
+                <a:latin typeface="Courier New" pitchFamily="49" charset="0"/>
+                <a:cs typeface="Courier New" pitchFamily="49" charset="0"/>
+              </a:rPr>
+              <a:t>cf70af4  </a:t>
+            </a:r>
+            <a:r>
+              <a:rPr lang="nl-BE" b="1" dirty="0" err="1">
+                <a:solidFill>
+                  <a:schemeClr val="bg1"/>
+                </a:solidFill>
+                <a:latin typeface="Courier New" pitchFamily="49" charset="0"/>
+                <a:cs typeface="Courier New" pitchFamily="49" charset="0"/>
+              </a:rPr>
+              <a:t>dopey</a:t>
+            </a:r>
+            <a:r>
+              <a:rPr lang="nl-BE" b="1" dirty="0">
+                <a:solidFill>
+                  <a:schemeClr val="bg1"/>
+                </a:solidFill>
+                <a:latin typeface="Courier New" pitchFamily="49" charset="0"/>
+                <a:cs typeface="Courier New" pitchFamily="49" charset="0"/>
+              </a:rPr>
+              <a:t>-vang  02:17 PM   </a:t>
+            </a:r>
+            <a:r>
+              <a:rPr lang="nl-BE" b="1" dirty="0" err="1">
+                <a:solidFill>
+                  <a:schemeClr val="bg1"/>
+                </a:solidFill>
+                <a:latin typeface="Courier New" pitchFamily="49" charset="0"/>
+                <a:cs typeface="Courier New" pitchFamily="49" charset="0"/>
+              </a:rPr>
+              <a:t>Success</a:t>
+            </a:r>
+            <a:endParaRPr lang="nl-BE" b="1" dirty="0">
+              <a:solidFill>
+                <a:schemeClr val="bg1"/>
+              </a:solidFill>
+              <a:latin typeface="Courier New" pitchFamily="49" charset="0"/>
+              <a:cs typeface="Courier New" pitchFamily="49" charset="0"/>
+            </a:endParaRPr>
+          </a:p>
+          <a:p>
+            <a:r>
+              <a:rPr lang="nl-BE" b="1" dirty="0">
+                <a:solidFill>
+                  <a:schemeClr val="bg1"/>
+                </a:solidFill>
+                <a:latin typeface="Courier New" pitchFamily="49" charset="0"/>
+                <a:cs typeface="Courier New" pitchFamily="49" charset="0"/>
+              </a:rPr>
+              <a:t>097310c  </a:t>
+            </a:r>
+            <a:r>
+              <a:rPr lang="nl-BE" b="1" dirty="0" err="1">
+                <a:solidFill>
+                  <a:schemeClr val="bg1"/>
+                </a:solidFill>
+                <a:latin typeface="Courier New" pitchFamily="49" charset="0"/>
+                <a:cs typeface="Courier New" pitchFamily="49" charset="0"/>
+              </a:rPr>
+              <a:t>umber</a:t>
+            </a:r>
+            <a:r>
+              <a:rPr lang="nl-BE" b="1" dirty="0">
+                <a:solidFill>
+                  <a:schemeClr val="bg1"/>
+                </a:solidFill>
+                <a:latin typeface="Courier New" pitchFamily="49" charset="0"/>
+                <a:cs typeface="Courier New" pitchFamily="49" charset="0"/>
+              </a:rPr>
+              <a:t>-wind  02:17 PM   </a:t>
+            </a:r>
+            <a:r>
+              <a:rPr lang="nl-BE" b="1" dirty="0" err="1">
+                <a:solidFill>
+                  <a:schemeClr val="bg1"/>
+                </a:solidFill>
+                <a:latin typeface="Courier New" pitchFamily="49" charset="0"/>
+                <a:cs typeface="Courier New" pitchFamily="49" charset="0"/>
+              </a:rPr>
+              <a:t>Success</a:t>
+            </a:r>
+            <a:endParaRPr lang="nl-BE" b="1" dirty="0">
+              <a:solidFill>
+                <a:schemeClr val="bg1"/>
+              </a:solidFill>
+              <a:latin typeface="Courier New" pitchFamily="49" charset="0"/>
+              <a:cs typeface="Courier New" pitchFamily="49" charset="0"/>
+            </a:endParaRPr>
+          </a:p>
+        </p:txBody>
+      </p:sp>
+      <p:sp>
+        <p:nvSpPr>
+          <p:cNvPr id="6" name="TextBox 5">
+            <a:extLst>
+              <a:ext uri="{FF2B5EF4-FFF2-40B4-BE49-F238E27FC236}">
+                <a16:creationId xmlns:a16="http://schemas.microsoft.com/office/drawing/2014/main" id="{23FAA8EE-9C06-79BD-0BC0-F0CBA594B01D}"/>
+              </a:ext>
+            </a:extLst>
+          </p:cNvPr>
+          <p:cNvSpPr txBox="1"/>
+          <p:nvPr/>
+        </p:nvSpPr>
+        <p:spPr>
+          <a:xfrm>
+            <a:off x="1209868" y="5066607"/>
+            <a:ext cx="7260772" cy="369332"/>
+          </a:xfrm>
+          <a:prstGeom prst="rect">
+            <a:avLst/>
+          </a:prstGeom>
+          <a:solidFill>
+            <a:schemeClr val="tx1"/>
+          </a:solidFill>
+          <a:ln>
+            <a:solidFill>
+              <a:schemeClr val="tx1"/>
+            </a:solidFill>
+          </a:ln>
+        </p:spPr>
+        <p:txBody>
+          <a:bodyPr wrap="square" rtlCol="0">
+            <a:spAutoFit/>
+          </a:bodyPr>
+          <a:lstStyle/>
+          <a:p>
+            <a:r>
+              <a:rPr lang="en-US" b="1" dirty="0">
+                <a:solidFill>
+                  <a:schemeClr val="bg1"/>
+                </a:solidFill>
+                <a:latin typeface="Courier New" pitchFamily="49" charset="0"/>
+                <a:cs typeface="Courier New" pitchFamily="49" charset="0"/>
+              </a:rPr>
+              <a:t>$  </a:t>
+            </a:r>
+            <a:r>
+              <a:rPr lang="en-US" b="1" dirty="0" err="1">
+                <a:solidFill>
+                  <a:schemeClr val="bg1"/>
+                </a:solidFill>
+                <a:latin typeface="Courier New" pitchFamily="49" charset="0"/>
+                <a:cs typeface="Courier New" pitchFamily="49" charset="0"/>
+              </a:rPr>
+              <a:t>dvc</a:t>
+            </a:r>
+            <a:r>
+              <a:rPr lang="en-US" b="1" dirty="0">
+                <a:solidFill>
+                  <a:schemeClr val="bg1"/>
+                </a:solidFill>
+                <a:latin typeface="Courier New" pitchFamily="49" charset="0"/>
+                <a:cs typeface="Courier New" pitchFamily="49" charset="0"/>
+              </a:rPr>
+              <a:t> queue logs dopey-vang</a:t>
+            </a:r>
+            <a:endParaRPr lang="nl-BE" b="1" dirty="0">
+              <a:solidFill>
+                <a:schemeClr val="bg1"/>
+              </a:solidFill>
+              <a:latin typeface="Courier New" pitchFamily="49" charset="0"/>
+              <a:cs typeface="Courier New" pitchFamily="49" charset="0"/>
+            </a:endParaRPr>
+          </a:p>
+        </p:txBody>
+      </p:sp>
+      <p:sp>
+        <p:nvSpPr>
+          <p:cNvPr id="7" name="TextBox 6">
+            <a:extLst>
+              <a:ext uri="{FF2B5EF4-FFF2-40B4-BE49-F238E27FC236}">
+                <a16:creationId xmlns:a16="http://schemas.microsoft.com/office/drawing/2014/main" id="{B2390648-381A-8592-AF74-56EEA48F56D3}"/>
+              </a:ext>
+            </a:extLst>
+          </p:cNvPr>
+          <p:cNvSpPr txBox="1"/>
+          <p:nvPr/>
+        </p:nvSpPr>
+        <p:spPr>
+          <a:xfrm>
+            <a:off x="1209868" y="5993477"/>
+            <a:ext cx="7260772" cy="369332"/>
+          </a:xfrm>
+          <a:prstGeom prst="rect">
+            <a:avLst/>
+          </a:prstGeom>
+          <a:solidFill>
+            <a:schemeClr val="tx1"/>
+          </a:solidFill>
+          <a:ln>
+            <a:solidFill>
+              <a:schemeClr val="tx1"/>
+            </a:solidFill>
+          </a:ln>
+        </p:spPr>
+        <p:txBody>
+          <a:bodyPr wrap="square" rtlCol="0">
+            <a:spAutoFit/>
+          </a:bodyPr>
+          <a:lstStyle/>
+          <a:p>
+            <a:r>
+              <a:rPr lang="en-US" b="1" dirty="0">
+                <a:solidFill>
+                  <a:schemeClr val="bg1"/>
+                </a:solidFill>
+                <a:latin typeface="Courier New" pitchFamily="49" charset="0"/>
+                <a:cs typeface="Courier New" pitchFamily="49" charset="0"/>
+              </a:rPr>
+              <a:t>$  </a:t>
+            </a:r>
+            <a:r>
+              <a:rPr lang="en-US" b="1" dirty="0" err="1">
+                <a:solidFill>
+                  <a:schemeClr val="bg1"/>
+                </a:solidFill>
+                <a:latin typeface="Courier New" pitchFamily="49" charset="0"/>
+                <a:cs typeface="Courier New" pitchFamily="49" charset="0"/>
+              </a:rPr>
+              <a:t>dvc</a:t>
+            </a:r>
+            <a:r>
+              <a:rPr lang="en-US" b="1" dirty="0">
+                <a:solidFill>
+                  <a:schemeClr val="bg1"/>
+                </a:solidFill>
+                <a:latin typeface="Courier New" pitchFamily="49" charset="0"/>
+                <a:cs typeface="Courier New" pitchFamily="49" charset="0"/>
+              </a:rPr>
+              <a:t> queue remove dopey-vang</a:t>
+            </a:r>
+            <a:endParaRPr lang="nl-BE" b="1" dirty="0">
+              <a:solidFill>
+                <a:schemeClr val="bg1"/>
+              </a:solidFill>
+              <a:latin typeface="Courier New" pitchFamily="49" charset="0"/>
+              <a:cs typeface="Courier New" pitchFamily="49" charset="0"/>
+            </a:endParaRPr>
+          </a:p>
+        </p:txBody>
+      </p:sp>
+    </p:spTree>
+    <p:extLst>
+      <p:ext uri="{BB962C8B-B14F-4D97-AF65-F5344CB8AC3E}">
+        <p14:creationId xmlns:p14="http://schemas.microsoft.com/office/powerpoint/2010/main" val="596771741"/>
+      </p:ext>
+    </p:extLst>
+  </p:cSld>
+  <p:clrMapOvr>
+    <a:masterClrMapping/>
+  </p:clrMapOvr>
+  <p:timing>
+    <p:tnLst>
+      <p:par>
+        <p:cTn id="1" dur="indefinite" restart="never" nodeType="tmRoot">
+          <p:childTnLst>
+            <p:seq concurrent="1" nextAc="seek">
+              <p:cTn id="2" dur="indefinite" nodeType="mainSeq">
+                <p:childTnLst>
+                  <p:par>
+                    <p:cTn id="3" fill="hold">
+                      <p:stCondLst>
+                        <p:cond delay="indefinite"/>
+                        <p:cond evt="onBegin" delay="0">
+                          <p:tn val="2"/>
+                        </p:cond>
+                      </p:stCondLst>
+                      <p:childTnLst>
+                        <p:par>
+                          <p:cTn id="4" fill="hold">
+                            <p:stCondLst>
+                              <p:cond delay="0"/>
+                            </p:stCondLst>
+                            <p:childTnLst>
+                              <p:par>
+                                <p:cTn id="5" presetID="1" presetClass="entr" presetSubtype="0" fill="hold" grpId="0" nodeType="withEffect">
+                                  <p:stCondLst>
+                                    <p:cond delay="0"/>
+                                  </p:stCondLst>
+                                  <p:childTnLst>
+                                    <p:set>
+                                      <p:cBhvr>
+                                        <p:cTn id="6" dur="1" fill="hold">
+                                          <p:stCondLst>
+                                            <p:cond delay="0"/>
+                                          </p:stCondLst>
+                                        </p:cTn>
+                                        <p:tgtEl>
+                                          <p:spTgt spid="5"/>
+                                        </p:tgtEl>
+                                        <p:attrNameLst>
+                                          <p:attrName>style.visibility</p:attrName>
+                                        </p:attrNameLst>
+                                      </p:cBhvr>
+                                      <p:to>
+                                        <p:strVal val="visible"/>
+                                      </p:to>
+                                    </p:set>
+                                  </p:childTnLst>
+                                </p:cTn>
+                              </p:par>
+                              <p:par>
+                                <p:cTn id="7" presetID="1" presetClass="entr" presetSubtype="0" fill="hold" grpId="0" nodeType="withEffect">
+                                  <p:stCondLst>
+                                    <p:cond delay="0"/>
+                                  </p:stCondLst>
+                                  <p:childTnLst>
+                                    <p:set>
+                                      <p:cBhvr>
+                                        <p:cTn id="8" dur="1" fill="hold">
+                                          <p:stCondLst>
+                                            <p:cond delay="0"/>
+                                          </p:stCondLst>
+                                        </p:cTn>
+                                        <p:tgtEl>
+                                          <p:spTgt spid="6"/>
+                                        </p:tgtEl>
+                                        <p:attrNameLst>
+                                          <p:attrName>style.visibility</p:attrName>
+                                        </p:attrNameLst>
+                                      </p:cBhvr>
+                                      <p:to>
+                                        <p:strVal val="visible"/>
+                                      </p:to>
+                                    </p:set>
+                                  </p:childTnLst>
+                                </p:cTn>
+                              </p:par>
+                              <p:par>
+                                <p:cTn id="9" presetID="1" presetClass="entr" presetSubtype="0" fill="hold" grpId="0" nodeType="withEffect">
+                                  <p:stCondLst>
+                                    <p:cond delay="0"/>
+                                  </p:stCondLst>
+                                  <p:childTnLst>
+                                    <p:set>
+                                      <p:cBhvr>
+                                        <p:cTn id="10" dur="1" fill="hold">
+                                          <p:stCondLst>
+                                            <p:cond delay="0"/>
+                                          </p:stCondLst>
+                                        </p:cTn>
+                                        <p:tgtEl>
+                                          <p:spTgt spid="7"/>
+                                        </p:tgtEl>
+                                        <p:attrNameLst>
+                                          <p:attrName>style.visibility</p:attrName>
+                                        </p:attrNameLst>
+                                      </p:cBhvr>
+                                      <p:to>
+                                        <p:strVal val="visible"/>
+                                      </p:to>
+                                    </p:set>
+                                  </p:childTnLst>
+                                </p:cTn>
+                              </p:par>
+                            </p:childTnLst>
+                          </p:cTn>
+                        </p:par>
+                      </p:childTnLst>
+                    </p:cTn>
+                  </p:par>
+                </p:childTnLst>
+              </p:cTn>
+              <p:prevCondLst>
+                <p:cond evt="onPrev" delay="0">
+                  <p:tgtEl>
+                    <p:sldTgt/>
+                  </p:tgtEl>
+                </p:cond>
+              </p:prevCondLst>
+              <p:nextCondLst>
+                <p:cond evt="onNext" delay="0">
+                  <p:tgtEl>
+                    <p:sldTgt/>
+                  </p:tgtEl>
+                </p:cond>
+              </p:nextCondLst>
+            </p:seq>
+          </p:childTnLst>
+        </p:cTn>
+      </p:par>
+    </p:tnLst>
+    <p:bldLst>
+      <p:bldP spid="5" grpId="0" animBg="1"/>
+      <p:bldP spid="6" grpId="0" animBg="1"/>
+      <p:bldP spid="7" grpId="0" animBg="1"/>
+    </p:bldLst>
+  </p:timing>
+</p:sld>
+</file>
+
+<file path=ppt/slides/slide49.xml><?xml version="1.0" encoding="utf-8"?>
+<p:sld xmlns:a="http://schemas.openxmlformats.org/drawingml/2006/main" xmlns:r="http://schemas.openxmlformats.org/officeDocument/2006/relationships" xmlns:p="http://schemas.openxmlformats.org/presentationml/2006/main">
+  <p:cSld>
+    <p:spTree>
+      <p:nvGrpSpPr>
+        <p:cNvPr id="1" name=""/>
+        <p:cNvGrpSpPr/>
+        <p:nvPr/>
+      </p:nvGrpSpPr>
+      <p:grpSpPr>
+        <a:xfrm>
+          <a:off x="0" y="0"/>
+          <a:ext cx="0" cy="0"/>
+          <a:chOff x="0" y="0"/>
+          <a:chExt cx="0" cy="0"/>
+        </a:xfrm>
+      </p:grpSpPr>
+      <p:sp>
+        <p:nvSpPr>
+          <p:cNvPr id="2" name="Title 1">
+            <a:extLst>
+              <a:ext uri="{FF2B5EF4-FFF2-40B4-BE49-F238E27FC236}">
+                <a16:creationId xmlns:a16="http://schemas.microsoft.com/office/drawing/2014/main" id="{54B7F20D-B717-4A43-8652-C8EA897CAB2B}"/>
+              </a:ext>
+            </a:extLst>
+          </p:cNvPr>
+          <p:cNvSpPr>
+            <a:spLocks noGrp="1"/>
+          </p:cNvSpPr>
+          <p:nvPr>
+            <p:ph type="title"/>
+          </p:nvPr>
+        </p:nvSpPr>
+        <p:spPr/>
+        <p:txBody>
+          <a:bodyPr/>
+          <a:lstStyle/>
+          <a:p>
+            <a:r>
+              <a:rPr lang="en-US" dirty="0"/>
+              <a:t>Queue control</a:t>
+            </a:r>
+            <a:endParaRPr lang="LID4096" dirty="0"/>
+          </a:p>
+        </p:txBody>
+      </p:sp>
+      <p:sp>
+        <p:nvSpPr>
+          <p:cNvPr id="3" name="Content Placeholder 2">
+            <a:extLst>
+              <a:ext uri="{FF2B5EF4-FFF2-40B4-BE49-F238E27FC236}">
+                <a16:creationId xmlns:a16="http://schemas.microsoft.com/office/drawing/2014/main" id="{B07487BA-C93F-A595-3900-803762A10713}"/>
+              </a:ext>
+            </a:extLst>
+          </p:cNvPr>
+          <p:cNvSpPr>
+            <a:spLocks noGrp="1"/>
+          </p:cNvSpPr>
+          <p:nvPr>
+            <p:ph idx="1"/>
+          </p:nvPr>
+        </p:nvSpPr>
+        <p:spPr/>
+        <p:txBody>
+          <a:bodyPr/>
+          <a:lstStyle/>
+          <a:p>
+            <a:r>
+              <a:rPr lang="en-US" dirty="0"/>
+              <a:t>Run all tasks in queue, 2 workers</a:t>
+            </a:r>
+          </a:p>
+          <a:p>
+            <a:endParaRPr lang="en-US" dirty="0"/>
+          </a:p>
+          <a:p>
+            <a:r>
+              <a:rPr lang="en-US" dirty="0"/>
+              <a:t>Stop all workers</a:t>
+            </a:r>
+          </a:p>
+          <a:p>
+            <a:endParaRPr lang="en-US" dirty="0"/>
+          </a:p>
+          <a:p>
+            <a:r>
+              <a:rPr lang="en-US" dirty="0"/>
+              <a:t>Stop &amp; kill all workers</a:t>
+            </a:r>
+          </a:p>
+          <a:p>
+            <a:endParaRPr lang="en-US" dirty="0"/>
+          </a:p>
+          <a:p>
+            <a:r>
+              <a:rPr lang="en-US" dirty="0"/>
+              <a:t>Kill specific running task</a:t>
+            </a:r>
+            <a:endParaRPr lang="LID4096" dirty="0"/>
+          </a:p>
+        </p:txBody>
+      </p:sp>
+      <p:sp>
+        <p:nvSpPr>
+          <p:cNvPr id="4" name="Slide Number Placeholder 3">
+            <a:extLst>
+              <a:ext uri="{FF2B5EF4-FFF2-40B4-BE49-F238E27FC236}">
+                <a16:creationId xmlns:a16="http://schemas.microsoft.com/office/drawing/2014/main" id="{BC552D53-879C-4DE5-6A08-14B28745E110}"/>
+              </a:ext>
+            </a:extLst>
+          </p:cNvPr>
+          <p:cNvSpPr>
+            <a:spLocks noGrp="1"/>
+          </p:cNvSpPr>
+          <p:nvPr>
+            <p:ph type="sldNum" sz="quarter" idx="12"/>
+          </p:nvPr>
+        </p:nvSpPr>
+        <p:spPr/>
+        <p:txBody>
+          <a:bodyPr/>
+          <a:lstStyle/>
+          <a:p>
+            <a:fld id="{9C7CE217-4467-4B8D-A735-B008FA7C4816}" type="slidenum">
+              <a:rPr lang="LID4096" smtClean="0"/>
+              <a:t>49</a:t>
+            </a:fld>
+            <a:endParaRPr lang="LID4096"/>
+          </a:p>
+        </p:txBody>
+      </p:sp>
+      <p:sp>
+        <p:nvSpPr>
+          <p:cNvPr id="8" name="TextBox 7">
+            <a:extLst>
+              <a:ext uri="{FF2B5EF4-FFF2-40B4-BE49-F238E27FC236}">
+                <a16:creationId xmlns:a16="http://schemas.microsoft.com/office/drawing/2014/main" id="{CA1816CD-E0CB-C635-DC4E-978238819E41}"/>
+              </a:ext>
+            </a:extLst>
+          </p:cNvPr>
+          <p:cNvSpPr txBox="1"/>
+          <p:nvPr/>
+        </p:nvSpPr>
+        <p:spPr>
+          <a:xfrm>
+            <a:off x="1181876" y="2410501"/>
+            <a:ext cx="4267202" cy="369332"/>
+          </a:xfrm>
+          <a:prstGeom prst="rect">
+            <a:avLst/>
+          </a:prstGeom>
+          <a:solidFill>
+            <a:schemeClr val="tx1"/>
+          </a:solidFill>
+          <a:ln>
+            <a:solidFill>
+              <a:schemeClr val="tx1"/>
+            </a:solidFill>
+          </a:ln>
+        </p:spPr>
+        <p:txBody>
+          <a:bodyPr wrap="square" rtlCol="0">
+            <a:spAutoFit/>
+          </a:bodyPr>
+          <a:lstStyle/>
+          <a:p>
+            <a:r>
+              <a:rPr lang="en-US" b="1" dirty="0">
+                <a:solidFill>
+                  <a:schemeClr val="bg1"/>
+                </a:solidFill>
+                <a:latin typeface="Courier New" pitchFamily="49" charset="0"/>
+                <a:cs typeface="Courier New" pitchFamily="49" charset="0"/>
+              </a:rPr>
+              <a:t>$  </a:t>
+            </a:r>
+            <a:r>
+              <a:rPr lang="en-US" b="1" dirty="0" err="1">
+                <a:solidFill>
+                  <a:schemeClr val="bg1"/>
+                </a:solidFill>
+                <a:latin typeface="Courier New" pitchFamily="49" charset="0"/>
+                <a:cs typeface="Courier New" pitchFamily="49" charset="0"/>
+              </a:rPr>
+              <a:t>dvc</a:t>
+            </a:r>
+            <a:r>
+              <a:rPr lang="en-US" b="1" dirty="0">
+                <a:solidFill>
+                  <a:schemeClr val="bg1"/>
+                </a:solidFill>
+                <a:latin typeface="Courier New" pitchFamily="49" charset="0"/>
+                <a:cs typeface="Courier New" pitchFamily="49" charset="0"/>
+              </a:rPr>
+              <a:t> queue start  --jobs 2</a:t>
+            </a:r>
+            <a:endParaRPr lang="nl-BE" b="1" dirty="0">
+              <a:solidFill>
+                <a:schemeClr val="bg1"/>
+              </a:solidFill>
+              <a:latin typeface="Courier New" pitchFamily="49" charset="0"/>
+              <a:cs typeface="Courier New" pitchFamily="49" charset="0"/>
+            </a:endParaRPr>
+          </a:p>
+        </p:txBody>
+      </p:sp>
+      <p:grpSp>
+        <p:nvGrpSpPr>
+          <p:cNvPr id="12" name="Group 11">
+            <a:extLst>
+              <a:ext uri="{FF2B5EF4-FFF2-40B4-BE49-F238E27FC236}">
+                <a16:creationId xmlns:a16="http://schemas.microsoft.com/office/drawing/2014/main" id="{01F8B04C-A4F0-BC88-48E5-AA94D8A28E75}"/>
+              </a:ext>
+            </a:extLst>
+          </p:cNvPr>
+          <p:cNvGrpSpPr/>
+          <p:nvPr/>
+        </p:nvGrpSpPr>
+        <p:grpSpPr>
+          <a:xfrm>
+            <a:off x="5355772" y="2095538"/>
+            <a:ext cx="3254828" cy="917156"/>
+            <a:chOff x="8922121" y="5118668"/>
+            <a:chExt cx="3254828" cy="917156"/>
+          </a:xfrm>
+        </p:grpSpPr>
+        <p:sp>
+          <p:nvSpPr>
+            <p:cNvPr id="9" name="TextBox 8">
+              <a:extLst>
+                <a:ext uri="{FF2B5EF4-FFF2-40B4-BE49-F238E27FC236}">
+                  <a16:creationId xmlns:a16="http://schemas.microsoft.com/office/drawing/2014/main" id="{6D3776D9-521E-BC27-1EE7-1C3BB8327889}"/>
+                </a:ext>
+              </a:extLst>
+            </p:cNvPr>
+            <p:cNvSpPr txBox="1"/>
+            <p:nvPr/>
+          </p:nvSpPr>
+          <p:spPr>
+            <a:xfrm>
+              <a:off x="8922121" y="5574159"/>
+              <a:ext cx="2943306" cy="461665"/>
+            </a:xfrm>
+            <a:prstGeom prst="rect">
+              <a:avLst/>
+            </a:prstGeom>
+            <a:solidFill>
+              <a:schemeClr val="bg1"/>
+            </a:solidFill>
+            <a:ln>
+              <a:solidFill>
+                <a:schemeClr val="tx1"/>
+              </a:solidFill>
+            </a:ln>
+          </p:spPr>
+          <p:txBody>
+            <a:bodyPr wrap="none" rtlCol="0">
+              <a:spAutoFit/>
+            </a:bodyPr>
+            <a:lstStyle/>
+            <a:p>
+              <a:r>
+                <a:rPr lang="en-US" sz="2400" dirty="0"/>
+                <a:t>Don’t oversubscribe!</a:t>
+              </a:r>
+              <a:endParaRPr lang="LID4096" sz="2400" dirty="0"/>
+            </a:p>
+          </p:txBody>
+        </p:sp>
+        <p:pic>
+          <p:nvPicPr>
+            <p:cNvPr id="11" name="Picture 3" descr="C:\Users\lucg5005\AppData\Local\Microsoft\Windows\Temporary Internet Files\Content.IE5\T8RCCH8G\cute_snail_by_gniyuhs-d4lvbji[1].png">
+              <a:extLst>
+                <a:ext uri="{FF2B5EF4-FFF2-40B4-BE49-F238E27FC236}">
+                  <a16:creationId xmlns:a16="http://schemas.microsoft.com/office/drawing/2014/main" id="{B6E5AF44-60EB-BAD4-7CAC-6EDA44E5D29A}"/>
+                </a:ext>
+              </a:extLst>
+            </p:cNvPr>
+            <p:cNvPicPr>
+              <a:picLocks noChangeAspect="1" noChangeArrowheads="1"/>
+            </p:cNvPicPr>
+            <p:nvPr/>
+          </p:nvPicPr>
+          <p:blipFill>
+            <a:blip r:embed="rId2" cstate="print">
+              <a:extLst>
+                <a:ext uri="{28A0092B-C50C-407E-A947-70E740481C1C}">
+                  <a14:useLocalDpi xmlns:a14="http://schemas.microsoft.com/office/drawing/2010/main" val="0"/>
+                </a:ext>
+              </a:extLst>
+            </a:blip>
+            <a:srcRect/>
+            <a:stretch>
+              <a:fillRect/>
+            </a:stretch>
+          </p:blipFill>
+          <p:spPr bwMode="auto">
+            <a:xfrm>
+              <a:off x="11534991" y="5118668"/>
+              <a:ext cx="641958" cy="641958"/>
+            </a:xfrm>
+            <a:prstGeom prst="rect">
+              <a:avLst/>
+            </a:prstGeom>
+            <a:noFill/>
+            <a:extLst>
+              <a:ext uri="{909E8E84-426E-40DD-AFC4-6F175D3DCCD1}">
+                <a14:hiddenFill xmlns:a14="http://schemas.microsoft.com/office/drawing/2010/main">
+                  <a:solidFill>
+                    <a:srgbClr val="FFFFFF"/>
+                  </a:solidFill>
+                </a14:hiddenFill>
+              </a:ext>
+            </a:extLst>
+          </p:spPr>
+        </p:pic>
+      </p:grpSp>
+      <p:sp>
+        <p:nvSpPr>
+          <p:cNvPr id="5" name="TextBox 4">
+            <a:extLst>
+              <a:ext uri="{FF2B5EF4-FFF2-40B4-BE49-F238E27FC236}">
+                <a16:creationId xmlns:a16="http://schemas.microsoft.com/office/drawing/2014/main" id="{25EB37C2-F18E-67D6-EB6A-1BDC1181921E}"/>
+              </a:ext>
+            </a:extLst>
+          </p:cNvPr>
+          <p:cNvSpPr txBox="1"/>
+          <p:nvPr/>
+        </p:nvSpPr>
+        <p:spPr>
+          <a:xfrm>
+            <a:off x="1181876" y="3339856"/>
+            <a:ext cx="4267202" cy="369332"/>
+          </a:xfrm>
+          <a:prstGeom prst="rect">
+            <a:avLst/>
+          </a:prstGeom>
+          <a:solidFill>
+            <a:schemeClr val="tx1"/>
+          </a:solidFill>
+          <a:ln>
+            <a:solidFill>
+              <a:schemeClr val="tx1"/>
+            </a:solidFill>
+          </a:ln>
+        </p:spPr>
+        <p:txBody>
+          <a:bodyPr wrap="square" rtlCol="0">
+            <a:spAutoFit/>
+          </a:bodyPr>
+          <a:lstStyle/>
+          <a:p>
+            <a:r>
+              <a:rPr lang="en-US" b="1" dirty="0">
+                <a:solidFill>
+                  <a:schemeClr val="bg1"/>
+                </a:solidFill>
+                <a:latin typeface="Courier New" pitchFamily="49" charset="0"/>
+                <a:cs typeface="Courier New" pitchFamily="49" charset="0"/>
+              </a:rPr>
+              <a:t>$  </a:t>
+            </a:r>
+            <a:r>
+              <a:rPr lang="en-US" b="1" dirty="0" err="1">
+                <a:solidFill>
+                  <a:schemeClr val="bg1"/>
+                </a:solidFill>
+                <a:latin typeface="Courier New" pitchFamily="49" charset="0"/>
+                <a:cs typeface="Courier New" pitchFamily="49" charset="0"/>
+              </a:rPr>
+              <a:t>dvc</a:t>
+            </a:r>
+            <a:r>
+              <a:rPr lang="en-US" b="1" dirty="0">
+                <a:solidFill>
+                  <a:schemeClr val="bg1"/>
+                </a:solidFill>
+                <a:latin typeface="Courier New" pitchFamily="49" charset="0"/>
+                <a:cs typeface="Courier New" pitchFamily="49" charset="0"/>
+              </a:rPr>
+              <a:t> queue stop</a:t>
+            </a:r>
+            <a:endParaRPr lang="nl-BE" b="1" dirty="0">
+              <a:solidFill>
+                <a:schemeClr val="bg1"/>
+              </a:solidFill>
+              <a:latin typeface="Courier New" pitchFamily="49" charset="0"/>
+              <a:cs typeface="Courier New" pitchFamily="49" charset="0"/>
+            </a:endParaRPr>
+          </a:p>
+        </p:txBody>
+      </p:sp>
+      <p:sp>
+        <p:nvSpPr>
+          <p:cNvPr id="6" name="TextBox 5">
+            <a:extLst>
+              <a:ext uri="{FF2B5EF4-FFF2-40B4-BE49-F238E27FC236}">
+                <a16:creationId xmlns:a16="http://schemas.microsoft.com/office/drawing/2014/main" id="{9B0012E2-9BD1-4440-A21C-5DE9AD7F25AD}"/>
+              </a:ext>
+            </a:extLst>
+          </p:cNvPr>
+          <p:cNvSpPr txBox="1"/>
+          <p:nvPr/>
+        </p:nvSpPr>
+        <p:spPr>
+          <a:xfrm>
+            <a:off x="1181876" y="4363513"/>
+            <a:ext cx="4267202" cy="369332"/>
+          </a:xfrm>
+          <a:prstGeom prst="rect">
+            <a:avLst/>
+          </a:prstGeom>
+          <a:solidFill>
+            <a:schemeClr val="tx1"/>
+          </a:solidFill>
+          <a:ln>
+            <a:solidFill>
+              <a:schemeClr val="tx1"/>
+            </a:solidFill>
+          </a:ln>
+        </p:spPr>
+        <p:txBody>
+          <a:bodyPr wrap="square" rtlCol="0">
+            <a:spAutoFit/>
+          </a:bodyPr>
+          <a:lstStyle/>
+          <a:p>
+            <a:r>
+              <a:rPr lang="en-US" b="1" dirty="0">
+                <a:solidFill>
+                  <a:schemeClr val="bg1"/>
+                </a:solidFill>
+                <a:latin typeface="Courier New" pitchFamily="49" charset="0"/>
+                <a:cs typeface="Courier New" pitchFamily="49" charset="0"/>
+              </a:rPr>
+              <a:t>$  </a:t>
+            </a:r>
+            <a:r>
+              <a:rPr lang="en-US" b="1" dirty="0" err="1">
+                <a:solidFill>
+                  <a:schemeClr val="bg1"/>
+                </a:solidFill>
+                <a:latin typeface="Courier New" pitchFamily="49" charset="0"/>
+                <a:cs typeface="Courier New" pitchFamily="49" charset="0"/>
+              </a:rPr>
+              <a:t>dvc</a:t>
+            </a:r>
+            <a:r>
+              <a:rPr lang="en-US" b="1" dirty="0">
+                <a:solidFill>
+                  <a:schemeClr val="bg1"/>
+                </a:solidFill>
+                <a:latin typeface="Courier New" pitchFamily="49" charset="0"/>
+                <a:cs typeface="Courier New" pitchFamily="49" charset="0"/>
+              </a:rPr>
+              <a:t> queue stop  --kill</a:t>
+            </a:r>
+            <a:endParaRPr lang="nl-BE" b="1" dirty="0">
+              <a:solidFill>
+                <a:schemeClr val="bg1"/>
+              </a:solidFill>
+              <a:latin typeface="Courier New" pitchFamily="49" charset="0"/>
+              <a:cs typeface="Courier New" pitchFamily="49" charset="0"/>
+            </a:endParaRPr>
+          </a:p>
+        </p:txBody>
+      </p:sp>
+      <p:sp>
+        <p:nvSpPr>
+          <p:cNvPr id="7" name="TextBox 6">
+            <a:extLst>
+              <a:ext uri="{FF2B5EF4-FFF2-40B4-BE49-F238E27FC236}">
+                <a16:creationId xmlns:a16="http://schemas.microsoft.com/office/drawing/2014/main" id="{11B9849E-3E9C-4178-C39F-D5D31A0D8F0C}"/>
+              </a:ext>
+            </a:extLst>
+          </p:cNvPr>
+          <p:cNvSpPr txBox="1"/>
+          <p:nvPr/>
+        </p:nvSpPr>
+        <p:spPr>
+          <a:xfrm>
+            <a:off x="1181876" y="5387170"/>
+            <a:ext cx="4267202" cy="369332"/>
+          </a:xfrm>
+          <a:prstGeom prst="rect">
+            <a:avLst/>
+          </a:prstGeom>
+          <a:solidFill>
+            <a:schemeClr val="tx1"/>
+          </a:solidFill>
+          <a:ln>
+            <a:solidFill>
+              <a:schemeClr val="tx1"/>
+            </a:solidFill>
+          </a:ln>
+        </p:spPr>
+        <p:txBody>
+          <a:bodyPr wrap="square" rtlCol="0">
+            <a:spAutoFit/>
+          </a:bodyPr>
+          <a:lstStyle/>
+          <a:p>
+            <a:r>
+              <a:rPr lang="en-US" b="1" dirty="0">
+                <a:solidFill>
+                  <a:schemeClr val="bg1"/>
+                </a:solidFill>
+                <a:latin typeface="Courier New" pitchFamily="49" charset="0"/>
+                <a:cs typeface="Courier New" pitchFamily="49" charset="0"/>
+              </a:rPr>
+              <a:t>$  </a:t>
+            </a:r>
+            <a:r>
+              <a:rPr lang="en-US" b="1" dirty="0" err="1">
+                <a:solidFill>
+                  <a:schemeClr val="bg1"/>
+                </a:solidFill>
+                <a:latin typeface="Courier New" pitchFamily="49" charset="0"/>
+                <a:cs typeface="Courier New" pitchFamily="49" charset="0"/>
+              </a:rPr>
+              <a:t>dvc</a:t>
+            </a:r>
+            <a:r>
+              <a:rPr lang="en-US" b="1" dirty="0">
+                <a:solidFill>
+                  <a:schemeClr val="bg1"/>
+                </a:solidFill>
+                <a:latin typeface="Courier New" pitchFamily="49" charset="0"/>
+                <a:cs typeface="Courier New" pitchFamily="49" charset="0"/>
+              </a:rPr>
+              <a:t> queue kill leaky-wasp</a:t>
+            </a:r>
+            <a:endParaRPr lang="nl-BE" b="1" dirty="0">
+              <a:solidFill>
+                <a:schemeClr val="bg1"/>
+              </a:solidFill>
+              <a:latin typeface="Courier New" pitchFamily="49" charset="0"/>
+              <a:cs typeface="Courier New" pitchFamily="49" charset="0"/>
+            </a:endParaRPr>
+          </a:p>
+        </p:txBody>
+      </p:sp>
+    </p:spTree>
+    <p:extLst>
+      <p:ext uri="{BB962C8B-B14F-4D97-AF65-F5344CB8AC3E}">
+        <p14:creationId xmlns:p14="http://schemas.microsoft.com/office/powerpoint/2010/main" val="137643053"/>
+      </p:ext>
+    </p:extLst>
+  </p:cSld>
+  <p:clrMapOvr>
+    <a:masterClrMapping/>
+  </p:clrMapOvr>
+  <p:timing>
+    <p:tnLst>
+      <p:par>
+        <p:cTn id="1" dur="indefinite" restart="never" nodeType="tmRoot">
+          <p:childTnLst>
+            <p:seq concurrent="1" nextAc="seek">
+              <p:cTn id="2" dur="indefinite" nodeType="mainSeq">
+                <p:childTnLst>
+                  <p:par>
+                    <p:cTn id="3" fill="hold">
+                      <p:stCondLst>
+                        <p:cond delay="indefinite"/>
+                        <p:cond evt="onBegin" delay="0">
+                          <p:tn val="2"/>
+                        </p:cond>
+                      </p:stCondLst>
+                      <p:childTnLst>
+                        <p:par>
+                          <p:cTn id="4" fill="hold">
+                            <p:stCondLst>
+                              <p:cond delay="0"/>
+                            </p:stCondLst>
+                            <p:childTnLst>
+                              <p:par>
+                                <p:cTn id="5" presetID="1" presetClass="entr" presetSubtype="0" fill="hold" grpId="0" nodeType="withEffect">
+                                  <p:stCondLst>
+                                    <p:cond delay="0"/>
+                                  </p:stCondLst>
+                                  <p:childTnLst>
+                                    <p:set>
+                                      <p:cBhvr>
+                                        <p:cTn id="6" dur="1" fill="hold">
+                                          <p:stCondLst>
+                                            <p:cond delay="0"/>
+                                          </p:stCondLst>
+                                        </p:cTn>
+                                        <p:tgtEl>
+                                          <p:spTgt spid="8"/>
+                                        </p:tgtEl>
+                                        <p:attrNameLst>
+                                          <p:attrName>style.visibility</p:attrName>
+                                        </p:attrNameLst>
+                                      </p:cBhvr>
+                                      <p:to>
+                                        <p:strVal val="visible"/>
+                                      </p:to>
+                                    </p:set>
+                                  </p:childTnLst>
+                                </p:cTn>
+                              </p:par>
+                              <p:par>
+                                <p:cTn id="7" presetID="1" presetClass="entr" presetSubtype="0" fill="hold" grpId="0" nodeType="withEffect">
+                                  <p:stCondLst>
+                                    <p:cond delay="0"/>
+                                  </p:stCondLst>
+                                  <p:childTnLst>
+                                    <p:set>
+                                      <p:cBhvr>
+                                        <p:cTn id="8" dur="1" fill="hold">
+                                          <p:stCondLst>
+                                            <p:cond delay="0"/>
+                                          </p:stCondLst>
+                                        </p:cTn>
+                                        <p:tgtEl>
+                                          <p:spTgt spid="5"/>
+                                        </p:tgtEl>
+                                        <p:attrNameLst>
+                                          <p:attrName>style.visibility</p:attrName>
+                                        </p:attrNameLst>
+                                      </p:cBhvr>
+                                      <p:to>
+                                        <p:strVal val="visible"/>
+                                      </p:to>
+                                    </p:set>
+                                  </p:childTnLst>
+                                </p:cTn>
+                              </p:par>
+                              <p:par>
+                                <p:cTn id="9" presetID="1" presetClass="entr" presetSubtype="0" fill="hold" grpId="0" nodeType="withEffect">
+                                  <p:stCondLst>
+                                    <p:cond delay="0"/>
+                                  </p:stCondLst>
+                                  <p:childTnLst>
+                                    <p:set>
+                                      <p:cBhvr>
+                                        <p:cTn id="10" dur="1" fill="hold">
+                                          <p:stCondLst>
+                                            <p:cond delay="0"/>
+                                          </p:stCondLst>
+                                        </p:cTn>
+                                        <p:tgtEl>
+                                          <p:spTgt spid="6"/>
+                                        </p:tgtEl>
+                                        <p:attrNameLst>
+                                          <p:attrName>style.visibility</p:attrName>
+                                        </p:attrNameLst>
+                                      </p:cBhvr>
+                                      <p:to>
+                                        <p:strVal val="visible"/>
+                                      </p:to>
+                                    </p:set>
+                                  </p:childTnLst>
+                                </p:cTn>
+                              </p:par>
+                              <p:par>
+                                <p:cTn id="11" presetID="1" presetClass="entr" presetSubtype="0" fill="hold" grpId="0" nodeType="withEffect">
+                                  <p:stCondLst>
+                                    <p:cond delay="0"/>
+                                  </p:stCondLst>
+                                  <p:childTnLst>
+                                    <p:set>
+                                      <p:cBhvr>
+                                        <p:cTn id="12" dur="1" fill="hold">
+                                          <p:stCondLst>
+                                            <p:cond delay="0"/>
+                                          </p:stCondLst>
+                                        </p:cTn>
+                                        <p:tgtEl>
+                                          <p:spTgt spid="7"/>
+                                        </p:tgtEl>
+                                        <p:attrNameLst>
+                                          <p:attrName>style.visibility</p:attrName>
+                                        </p:attrNameLst>
+                                      </p:cBhvr>
+                                      <p:to>
+                                        <p:strVal val="visible"/>
+                                      </p:to>
+                                    </p:set>
+                                  </p:childTnLst>
+                                </p:cTn>
+                              </p:par>
+                            </p:childTnLst>
+                          </p:cTn>
+                        </p:par>
+                      </p:childTnLst>
+                    </p:cTn>
+                  </p:par>
+                </p:childTnLst>
+              </p:cTn>
+              <p:prevCondLst>
+                <p:cond evt="onPrev" delay="0">
+                  <p:tgtEl>
+                    <p:sldTgt/>
+                  </p:tgtEl>
+                </p:cond>
+              </p:prevCondLst>
+              <p:nextCondLst>
+                <p:cond evt="onNext" delay="0">
+                  <p:tgtEl>
+                    <p:sldTgt/>
+                  </p:tgtEl>
+                </p:cond>
+              </p:nextCondLst>
+            </p:seq>
+          </p:childTnLst>
+        </p:cTn>
+      </p:par>
+    </p:tnLst>
+    <p:bldLst>
+      <p:bldP spid="8" grpId="0" animBg="1"/>
+      <p:bldP spid="5" grpId="0" animBg="1"/>
+      <p:bldP spid="6" grpId="0" animBg="1"/>
+      <p:bldP spid="7" grpId="0" animBg="1"/>
+    </p:bldLst>
+  </p:timing>
 </p:sld>
 </file>
 

</xml_diff>